<commit_message>
Added FileStatsController and FileStatsItem to dev guide
</commit_message>
<xml_diff>
--- a/docs/Diagrams.pptx
+++ b/docs/Diagrams.pptx
@@ -5,16 +5,17 @@
     <p:sldMasterId id="2147483672" r:id="rId1"/>
   </p:sldMasterIdLst>
   <p:notesMasterIdLst>
-    <p:notesMasterId r:id="rId6"/>
+    <p:notesMasterId r:id="rId7"/>
   </p:notesMasterIdLst>
   <p:handoutMasterIdLst>
-    <p:handoutMasterId r:id="rId7"/>
+    <p:handoutMasterId r:id="rId8"/>
   </p:handoutMasterIdLst>
   <p:sldIdLst>
     <p:sldId id="256" r:id="rId2"/>
     <p:sldId id="257" r:id="rId3"/>
-    <p:sldId id="258" r:id="rId4"/>
-    <p:sldId id="259" r:id="rId5"/>
+    <p:sldId id="260" r:id="rId4"/>
+    <p:sldId id="258" r:id="rId5"/>
+    <p:sldId id="259" r:id="rId6"/>
   </p:sldIdLst>
   <p:sldSz cx="12192000" cy="6858000"/>
   <p:notesSz cx="6742113" cy="9872663"/>
@@ -7051,6 +7052,282 @@
           <a:chExt cx="0" cy="0"/>
         </a:xfrm>
       </p:grpSpPr>
+      <p:grpSp>
+        <p:nvGrpSpPr>
+          <p:cNvPr id="27" name="Group 26"/>
+          <p:cNvGrpSpPr/>
+          <p:nvPr/>
+        </p:nvGrpSpPr>
+        <p:grpSpPr>
+          <a:xfrm>
+            <a:off x="2506664" y="2554559"/>
+            <a:ext cx="7178672" cy="1748882"/>
+            <a:chOff x="2953619" y="2819400"/>
+            <a:chExt cx="7178672" cy="1748882"/>
+          </a:xfrm>
+        </p:grpSpPr>
+        <p:sp>
+          <p:nvSpPr>
+            <p:cNvPr id="5" name="Rectangle 4"/>
+            <p:cNvSpPr/>
+            <p:nvPr/>
+          </p:nvSpPr>
+          <p:spPr>
+            <a:xfrm>
+              <a:off x="3045980" y="2819400"/>
+              <a:ext cx="7086311" cy="1219200"/>
+            </a:xfrm>
+            <a:prstGeom prst="rect">
+              <a:avLst/>
+            </a:prstGeom>
+            <a:solidFill>
+              <a:schemeClr val="bg1"/>
+            </a:solidFill>
+            <a:ln>
+              <a:noFill/>
+            </a:ln>
+            <a:effectLst>
+              <a:outerShdw blurRad="127000" dist="38100" dir="5400000" sx="101000" sy="101000" algn="t" rotWithShape="0">
+                <a:prstClr val="black">
+                  <a:alpha val="20000"/>
+                </a:prstClr>
+              </a:outerShdw>
+            </a:effectLst>
+          </p:spPr>
+          <p:style>
+            <a:lnRef idx="2">
+              <a:schemeClr val="accent1">
+                <a:shade val="50000"/>
+              </a:schemeClr>
+            </a:lnRef>
+            <a:fillRef idx="1">
+              <a:schemeClr val="accent1"/>
+            </a:fillRef>
+            <a:effectRef idx="0">
+              <a:schemeClr val="accent1"/>
+            </a:effectRef>
+            <a:fontRef idx="minor">
+              <a:schemeClr val="lt1"/>
+            </a:fontRef>
+          </p:style>
+          <p:txBody>
+            <a:bodyPr rtlCol="0" anchor="ctr"/>
+            <a:lstStyle/>
+            <a:p>
+              <a:pPr algn="ctr"/>
+              <a:endParaRPr lang="en-GB" dirty="0"/>
+            </a:p>
+          </p:txBody>
+        </p:sp>
+        <p:sp>
+          <p:nvSpPr>
+            <p:cNvPr id="6" name="Oval 5"/>
+            <p:cNvSpPr/>
+            <p:nvPr/>
+          </p:nvSpPr>
+          <p:spPr>
+            <a:xfrm>
+              <a:off x="3253221" y="3050309"/>
+              <a:ext cx="766618" cy="766618"/>
+            </a:xfrm>
+            <a:prstGeom prst="ellipse">
+              <a:avLst/>
+            </a:prstGeom>
+            <a:solidFill>
+              <a:srgbClr val="51FF61"/>
+            </a:solidFill>
+            <a:ln>
+              <a:noFill/>
+            </a:ln>
+          </p:spPr>
+          <p:style>
+            <a:lnRef idx="2">
+              <a:schemeClr val="accent1">
+                <a:shade val="50000"/>
+              </a:schemeClr>
+            </a:lnRef>
+            <a:fillRef idx="1">
+              <a:schemeClr val="accent1"/>
+            </a:fillRef>
+            <a:effectRef idx="0">
+              <a:schemeClr val="accent1"/>
+            </a:effectRef>
+            <a:fontRef idx="minor">
+              <a:schemeClr val="lt1"/>
+            </a:fontRef>
+          </p:style>
+          <p:txBody>
+            <a:bodyPr wrap="none" rtlCol="0" anchor="ctr"/>
+            <a:lstStyle/>
+            <a:p>
+              <a:pPr algn="ctr"/>
+              <a:r>
+                <a:rPr lang="en-US" b="1" dirty="0" smtClean="0">
+                  <a:solidFill>
+                    <a:schemeClr val="tx1"/>
+                  </a:solidFill>
+                  <a:latin typeface="Segoe UI" panose="020B0502040204020203" pitchFamily="34" charset="0"/>
+                  <a:cs typeface="Segoe UI" panose="020B0502040204020203" pitchFamily="34" charset="0"/>
+                </a:rPr>
+                <a:t>100%</a:t>
+              </a:r>
+              <a:endParaRPr lang="en-GB" b="1" dirty="0">
+                <a:solidFill>
+                  <a:schemeClr val="tx1"/>
+                </a:solidFill>
+                <a:latin typeface="Segoe UI" panose="020B0502040204020203" pitchFamily="34" charset="0"/>
+                <a:cs typeface="Segoe UI" panose="020B0502040204020203" pitchFamily="34" charset="0"/>
+              </a:endParaRPr>
+            </a:p>
+          </p:txBody>
+        </p:sp>
+        <p:sp>
+          <p:nvSpPr>
+            <p:cNvPr id="8" name="TextBox 7"/>
+            <p:cNvSpPr txBox="1"/>
+            <p:nvPr/>
+          </p:nvSpPr>
+          <p:spPr>
+            <a:xfrm>
+              <a:off x="4125482" y="3047472"/>
+              <a:ext cx="4419095" cy="684803"/>
+            </a:xfrm>
+            <a:prstGeom prst="rect">
+              <a:avLst/>
+            </a:prstGeom>
+            <a:noFill/>
+          </p:spPr>
+          <p:txBody>
+            <a:bodyPr wrap="none" rtlCol="0">
+              <a:spAutoFit/>
+            </a:bodyPr>
+            <a:lstStyle/>
+            <a:p>
+              <a:pPr>
+                <a:spcAft>
+                  <a:spcPts val="300"/>
+                </a:spcAft>
+              </a:pPr>
+              <a:r>
+                <a:rPr lang="en-US" b="1" dirty="0" smtClean="0">
+                  <a:latin typeface="Segoe UI" panose="020B0502040204020203" pitchFamily="34" charset="0"/>
+                  <a:cs typeface="Segoe UI" panose="020B0502040204020203" pitchFamily="34" charset="0"/>
+                </a:rPr>
+                <a:t>main\resources\layouts\</a:t>
+              </a:r>
+              <a:r>
+                <a:rPr lang="en-US" b="1" dirty="0" err="1" smtClean="0">
+                  <a:latin typeface="Segoe UI" panose="020B0502040204020203" pitchFamily="34" charset="0"/>
+                  <a:cs typeface="Segoe UI" panose="020B0502040204020203" pitchFamily="34" charset="0"/>
+                </a:rPr>
+                <a:t>Summary.fxml</a:t>
+              </a:r>
+              <a:endParaRPr lang="en-US" b="1" dirty="0" smtClean="0">
+                <a:latin typeface="Segoe UI" panose="020B0502040204020203" pitchFamily="34" charset="0"/>
+                <a:cs typeface="Segoe UI" panose="020B0502040204020203" pitchFamily="34" charset="0"/>
+              </a:endParaRPr>
+            </a:p>
+            <a:p>
+              <a:pPr>
+                <a:spcAft>
+                  <a:spcPts val="300"/>
+                </a:spcAft>
+              </a:pPr>
+              <a:r>
+                <a:rPr lang="en-US" dirty="0" smtClean="0">
+                  <a:latin typeface="Segoe UI" panose="020B0502040204020203" pitchFamily="34" charset="0"/>
+                  <a:cs typeface="Segoe UI" panose="020B0502040204020203" pitchFamily="34" charset="0"/>
+                </a:rPr>
+                <a:t>25 lines</a:t>
+              </a:r>
+              <a:endParaRPr lang="en-GB" dirty="0">
+                <a:latin typeface="Segoe UI" panose="020B0502040204020203" pitchFamily="34" charset="0"/>
+                <a:cs typeface="Segoe UI" panose="020B0502040204020203" pitchFamily="34" charset="0"/>
+              </a:endParaRPr>
+            </a:p>
+          </p:txBody>
+        </p:sp>
+        <p:sp>
+          <p:nvSpPr>
+            <p:cNvPr id="26" name="TextBox 25"/>
+            <p:cNvSpPr txBox="1"/>
+            <p:nvPr/>
+          </p:nvSpPr>
+          <p:spPr>
+            <a:xfrm>
+              <a:off x="2953619" y="4229728"/>
+              <a:ext cx="3203121" cy="338554"/>
+            </a:xfrm>
+            <a:prstGeom prst="rect">
+              <a:avLst/>
+            </a:prstGeom>
+            <a:noFill/>
+          </p:spPr>
+          <p:txBody>
+            <a:bodyPr wrap="none" rtlCol="0">
+              <a:spAutoFit/>
+            </a:bodyPr>
+            <a:lstStyle/>
+            <a:p>
+              <a:r>
+                <a:rPr lang="en-US" sz="1600" dirty="0" smtClean="0">
+                  <a:latin typeface="Roboto Condensed" pitchFamily="2" charset="0"/>
+                  <a:ea typeface="Roboto Condensed" pitchFamily="2" charset="0"/>
+                </a:rPr>
+                <a:t>Figure </a:t>
+              </a:r>
+              <a:r>
+                <a:rPr lang="en-US" sz="1600" dirty="0" smtClean="0">
+                  <a:latin typeface="Roboto Condensed" pitchFamily="2" charset="0"/>
+                  <a:ea typeface="Roboto Condensed" pitchFamily="2" charset="0"/>
+                </a:rPr>
+                <a:t>3: Appearance of a </a:t>
+              </a:r>
+              <a:r>
+                <a:rPr lang="en-US" sz="1600" dirty="0" err="1" smtClean="0">
+                  <a:latin typeface="Roboto Condensed" pitchFamily="2" charset="0"/>
+                  <a:ea typeface="Roboto Condensed" pitchFamily="2" charset="0"/>
+                </a:rPr>
+                <a:t>FileStatsItem</a:t>
+              </a:r>
+              <a:endParaRPr lang="en-GB" sz="1600" dirty="0">
+                <a:latin typeface="Roboto Condensed" pitchFamily="2" charset="0"/>
+                <a:ea typeface="Roboto Condensed" pitchFamily="2" charset="0"/>
+              </a:endParaRPr>
+            </a:p>
+          </p:txBody>
+        </p:sp>
+      </p:grpSp>
+    </p:spTree>
+    <p:extLst>
+      <p:ext uri="{BB962C8B-B14F-4D97-AF65-F5344CB8AC3E}">
+        <p14:creationId xmlns:p14="http://schemas.microsoft.com/office/powerpoint/2010/main" val="1945888093"/>
+      </p:ext>
+    </p:extLst>
+  </p:cSld>
+  <p:clrMapOvr>
+    <a:masterClrMapping/>
+  </p:clrMapOvr>
+</p:sld>
+</file>
+
+<file path=ppt/slides/slide4.xml><?xml version="1.0" encoding="utf-8"?>
+<p:sld xmlns:a="http://schemas.openxmlformats.org/drawingml/2006/main" xmlns:r="http://schemas.openxmlformats.org/officeDocument/2006/relationships" xmlns:p="http://schemas.openxmlformats.org/presentationml/2006/main">
+  <p:cSld>
+    <p:spTree>
+      <p:nvGrpSpPr>
+        <p:cNvPr id="1" name=""/>
+        <p:cNvGrpSpPr/>
+        <p:nvPr/>
+      </p:nvGrpSpPr>
+      <p:grpSpPr>
+        <a:xfrm>
+          <a:off x="0" y="0"/>
+          <a:ext cx="0" cy="0"/>
+          <a:chOff x="0" y="0"/>
+          <a:chExt cx="0" cy="0"/>
+        </a:xfrm>
+      </p:grpSpPr>
       <p:sp>
         <p:nvSpPr>
           <p:cNvPr id="140" name="TextBox 139"/>
@@ -7078,7 +7355,21 @@
                 <a:latin typeface="Roboto Condensed" pitchFamily="2" charset="0"/>
                 <a:ea typeface="Roboto Condensed" pitchFamily="2" charset="0"/>
               </a:rPr>
-              <a:t>Figure 3: Class diagram for Backend component</a:t>
+              <a:t>Figure </a:t>
+            </a:r>
+            <a:r>
+              <a:rPr lang="en-US" sz="1600" dirty="0" smtClean="0">
+                <a:latin typeface="Roboto Condensed" pitchFamily="2" charset="0"/>
+                <a:ea typeface="Roboto Condensed" pitchFamily="2" charset="0"/>
+              </a:rPr>
+              <a:t>4: </a:t>
+            </a:r>
+            <a:r>
+              <a:rPr lang="en-US" sz="1600" dirty="0" smtClean="0">
+                <a:latin typeface="Roboto Condensed" pitchFamily="2" charset="0"/>
+                <a:ea typeface="Roboto Condensed" pitchFamily="2" charset="0"/>
+              </a:rPr>
+              <a:t>Class diagram for Backend component</a:t>
             </a:r>
             <a:endParaRPr lang="en-GB" sz="1600" dirty="0">
               <a:latin typeface="Roboto Condensed" pitchFamily="2" charset="0"/>
@@ -8569,7 +8860,7 @@
 </p:sld>
 </file>
 
-<file path=ppt/slides/slide4.xml><?xml version="1.0" encoding="utf-8"?>
+<file path=ppt/slides/slide5.xml><?xml version="1.0" encoding="utf-8"?>
 <p:sld xmlns:a="http://schemas.openxmlformats.org/drawingml/2006/main" xmlns:r="http://schemas.openxmlformats.org/officeDocument/2006/relationships" xmlns:p="http://schemas.openxmlformats.org/presentationml/2006/main">
   <p:cSld>
     <p:spTree>
@@ -9251,7 +9542,21 @@
                 <a:latin typeface="Roboto Condensed" pitchFamily="2" charset="0"/>
                 <a:ea typeface="Roboto Condensed" pitchFamily="2" charset="0"/>
               </a:rPr>
-              <a:t>Figure 4: Class diagram for Data component</a:t>
+              <a:t>Figure </a:t>
+            </a:r>
+            <a:r>
+              <a:rPr lang="en-US" sz="1600" dirty="0" smtClean="0">
+                <a:latin typeface="Roboto Condensed" pitchFamily="2" charset="0"/>
+                <a:ea typeface="Roboto Condensed" pitchFamily="2" charset="0"/>
+              </a:rPr>
+              <a:t>5: </a:t>
+            </a:r>
+            <a:r>
+              <a:rPr lang="en-US" sz="1600" dirty="0" smtClean="0">
+                <a:latin typeface="Roboto Condensed" pitchFamily="2" charset="0"/>
+                <a:ea typeface="Roboto Condensed" pitchFamily="2" charset="0"/>
+              </a:rPr>
+              <a:t>Class diagram for Data component</a:t>
             </a:r>
             <a:endParaRPr lang="en-GB" sz="1600" dirty="0">
               <a:latin typeface="Roboto Condensed" pitchFamily="2" charset="0"/>

</xml_diff>

<commit_message>
Updated dev guide for Backend component
</commit_message>
<xml_diff>
--- a/docs/Diagrams.pptx
+++ b/docs/Diagrams.pptx
@@ -842,7 +842,7 @@
           <a:p>
             <a:fld id="{0EBC881F-A445-44A1-8BB1-A4D1BDD4D291}" type="datetime1">
               <a:rPr lang="en-GB" smtClean="0"/>
-              <a:t>28/07/2015</a:t>
+              <a:t>29/07/2015</a:t>
             </a:fld>
             <a:endParaRPr lang="en-GB"/>
           </a:p>
@@ -1012,7 +1012,7 @@
           <a:p>
             <a:fld id="{2584BEDC-1639-4090-8CAA-F6974F06BD49}" type="datetime1">
               <a:rPr lang="en-GB" smtClean="0"/>
-              <a:t>28/07/2015</a:t>
+              <a:t>29/07/2015</a:t>
             </a:fld>
             <a:endParaRPr lang="en-GB"/>
           </a:p>
@@ -1192,7 +1192,7 @@
           <a:p>
             <a:fld id="{00C779A6-9523-4A2E-A931-C8A709BD1078}" type="datetime1">
               <a:rPr lang="en-GB" smtClean="0"/>
-              <a:t>28/07/2015</a:t>
+              <a:t>29/07/2015</a:t>
             </a:fld>
             <a:endParaRPr lang="en-GB"/>
           </a:p>
@@ -1362,7 +1362,7 @@
           <a:p>
             <a:fld id="{3A5F7889-DF91-41C1-A5B0-E479EFB53093}" type="datetime1">
               <a:rPr lang="en-GB" smtClean="0"/>
-              <a:t>28/07/2015</a:t>
+              <a:t>29/07/2015</a:t>
             </a:fld>
             <a:endParaRPr lang="en-GB"/>
           </a:p>
@@ -1608,7 +1608,7 @@
           <a:p>
             <a:fld id="{B34262BB-05D7-48AA-A628-76FDB16BFEC4}" type="datetime1">
               <a:rPr lang="en-GB" smtClean="0"/>
-              <a:t>28/07/2015</a:t>
+              <a:t>29/07/2015</a:t>
             </a:fld>
             <a:endParaRPr lang="en-GB"/>
           </a:p>
@@ -1840,7 +1840,7 @@
           <a:p>
             <a:fld id="{5F96665D-1DD0-4E23-81EB-F6A1D45CFD28}" type="datetime1">
               <a:rPr lang="en-GB" smtClean="0"/>
-              <a:t>28/07/2015</a:t>
+              <a:t>29/07/2015</a:t>
             </a:fld>
             <a:endParaRPr lang="en-GB"/>
           </a:p>
@@ -2207,7 +2207,7 @@
           <a:p>
             <a:fld id="{D42FA776-28A0-43EC-9C84-117ACD802889}" type="datetime1">
               <a:rPr lang="en-GB" smtClean="0"/>
-              <a:t>28/07/2015</a:t>
+              <a:t>29/07/2015</a:t>
             </a:fld>
             <a:endParaRPr lang="en-GB"/>
           </a:p>
@@ -2325,7 +2325,7 @@
           <a:p>
             <a:fld id="{07BBC80A-0A96-4EDF-BA2F-C903D39F13F1}" type="datetime1">
               <a:rPr lang="en-GB" smtClean="0"/>
-              <a:t>28/07/2015</a:t>
+              <a:t>29/07/2015</a:t>
             </a:fld>
             <a:endParaRPr lang="en-GB"/>
           </a:p>
@@ -2420,7 +2420,7 @@
           <a:p>
             <a:fld id="{009CBC1F-8C05-4E88-A975-5E80693FEDD6}" type="datetime1">
               <a:rPr lang="en-GB" smtClean="0"/>
-              <a:t>28/07/2015</a:t>
+              <a:t>29/07/2015</a:t>
             </a:fld>
             <a:endParaRPr lang="en-GB"/>
           </a:p>
@@ -2697,7 +2697,7 @@
           <a:p>
             <a:fld id="{1672ABC0-87DA-4D74-93ED-587A9A376247}" type="datetime1">
               <a:rPr lang="en-GB" smtClean="0"/>
-              <a:t>28/07/2015</a:t>
+              <a:t>29/07/2015</a:t>
             </a:fld>
             <a:endParaRPr lang="en-GB"/>
           </a:p>
@@ -2954,7 +2954,7 @@
           <a:p>
             <a:fld id="{2874912F-E8E8-454B-8EB3-6790668B87CF}" type="datetime1">
               <a:rPr lang="en-GB" smtClean="0"/>
-              <a:t>28/07/2015</a:t>
+              <a:t>29/07/2015</a:t>
             </a:fld>
             <a:endParaRPr lang="en-GB"/>
           </a:p>
@@ -3167,7 +3167,7 @@
           <a:p>
             <a:fld id="{B1FA066A-16B7-44A6-B43D-AE26935FC13F}" type="datetime1">
               <a:rPr lang="en-GB" smtClean="0"/>
-              <a:t>28/07/2015</a:t>
+              <a:t>29/07/2015</a:t>
             </a:fld>
             <a:endParaRPr lang="en-GB"/>
           </a:p>
@@ -7274,14 +7274,7 @@
                   <a:latin typeface="Roboto Condensed" pitchFamily="2" charset="0"/>
                   <a:ea typeface="Roboto Condensed" pitchFamily="2" charset="0"/>
                 </a:rPr>
-                <a:t>Figure </a:t>
-              </a:r>
-              <a:r>
-                <a:rPr lang="en-US" sz="1600" dirty="0" smtClean="0">
-                  <a:latin typeface="Roboto Condensed" pitchFamily="2" charset="0"/>
-                  <a:ea typeface="Roboto Condensed" pitchFamily="2" charset="0"/>
-                </a:rPr>
-                <a:t>3: Appearance of a </a:t>
+                <a:t>Figure 3: Appearance of a </a:t>
               </a:r>
               <a:r>
                 <a:rPr lang="en-US" sz="1600" dirty="0" err="1" smtClean="0">
@@ -7336,7 +7329,7 @@
         </p:nvSpPr>
         <p:spPr>
           <a:xfrm>
-            <a:off x="2021545" y="6265657"/>
+            <a:off x="1441694" y="6218090"/>
             <a:ext cx="3855543" cy="338554"/>
           </a:xfrm>
           <a:prstGeom prst="rect">
@@ -7355,21 +7348,7 @@
                 <a:latin typeface="Roboto Condensed" pitchFamily="2" charset="0"/>
                 <a:ea typeface="Roboto Condensed" pitchFamily="2" charset="0"/>
               </a:rPr>
-              <a:t>Figure </a:t>
-            </a:r>
-            <a:r>
-              <a:rPr lang="en-US" sz="1600" dirty="0" smtClean="0">
-                <a:latin typeface="Roboto Condensed" pitchFamily="2" charset="0"/>
-                <a:ea typeface="Roboto Condensed" pitchFamily="2" charset="0"/>
-              </a:rPr>
-              <a:t>4: </a:t>
-            </a:r>
-            <a:r>
-              <a:rPr lang="en-US" sz="1600" dirty="0" smtClean="0">
-                <a:latin typeface="Roboto Condensed" pitchFamily="2" charset="0"/>
-                <a:ea typeface="Roboto Condensed" pitchFamily="2" charset="0"/>
-              </a:rPr>
-              <a:t>Class diagram for Backend component</a:t>
+              <a:t>Figure 4: Class diagram for Backend component</a:t>
             </a:r>
             <a:endParaRPr lang="en-GB" sz="1600" dirty="0">
               <a:latin typeface="Roboto Condensed" pitchFamily="2" charset="0"/>
@@ -7378,182 +7357,462 @@
           </a:p>
         </p:txBody>
       </p:sp>
+      <p:sp>
+        <p:nvSpPr>
+          <p:cNvPr id="5" name="Rounded Rectangle 4"/>
+          <p:cNvSpPr/>
+          <p:nvPr/>
+        </p:nvSpPr>
+        <p:spPr>
+          <a:xfrm>
+            <a:off x="3297664" y="541919"/>
+            <a:ext cx="5491624" cy="4487277"/>
+          </a:xfrm>
+          <a:prstGeom prst="roundRect">
+            <a:avLst>
+              <a:gd name="adj" fmla="val 4530"/>
+            </a:avLst>
+          </a:prstGeom>
+          <a:solidFill>
+            <a:schemeClr val="accent5">
+              <a:lumMod val="60000"/>
+              <a:lumOff val="40000"/>
+            </a:schemeClr>
+          </a:solidFill>
+          <a:ln>
+            <a:noFill/>
+          </a:ln>
+        </p:spPr>
+        <p:style>
+          <a:lnRef idx="2">
+            <a:schemeClr val="accent1">
+              <a:shade val="50000"/>
+            </a:schemeClr>
+          </a:lnRef>
+          <a:fillRef idx="1">
+            <a:schemeClr val="accent1"/>
+          </a:fillRef>
+          <a:effectRef idx="0">
+            <a:schemeClr val="accent1"/>
+          </a:effectRef>
+          <a:fontRef idx="minor">
+            <a:schemeClr val="lt1"/>
+          </a:fontRef>
+        </p:style>
+        <p:txBody>
+          <a:bodyPr rot="0" spcFirstLastPara="0" vertOverflow="overflow" horzOverflow="overflow" vert="horz" wrap="square" lIns="91440" tIns="91440" rIns="91440" bIns="45720" numCol="1" spcCol="0" rtlCol="0" fromWordArt="0" anchor="t" anchorCtr="0" forceAA="0" compatLnSpc="1">
+            <a:prstTxWarp prst="textNoShape">
+              <a:avLst/>
+            </a:prstTxWarp>
+            <a:noAutofit/>
+          </a:bodyPr>
+          <a:lstStyle/>
+          <a:p>
+            <a:pPr algn="ctr"/>
+            <a:r>
+              <a:rPr lang="en-US" dirty="0">
+                <a:latin typeface="Roboto Condensed" pitchFamily="2" charset="0"/>
+                <a:ea typeface="Roboto Condensed" pitchFamily="2" charset="0"/>
+              </a:rPr>
+              <a:t>Backend</a:t>
+            </a:r>
+            <a:endParaRPr lang="en-GB" dirty="0">
+              <a:latin typeface="Roboto Condensed" pitchFamily="2" charset="0"/>
+              <a:ea typeface="Roboto Condensed" pitchFamily="2" charset="0"/>
+            </a:endParaRPr>
+          </a:p>
+        </p:txBody>
+      </p:sp>
+      <p:sp>
+        <p:nvSpPr>
+          <p:cNvPr id="12" name="Rectangle 11"/>
+          <p:cNvSpPr/>
+          <p:nvPr/>
+        </p:nvSpPr>
+        <p:spPr>
+          <a:xfrm>
+            <a:off x="3535614" y="1189745"/>
+            <a:ext cx="5015724" cy="3582689"/>
+          </a:xfrm>
+          <a:prstGeom prst="rect">
+            <a:avLst/>
+          </a:prstGeom>
+          <a:solidFill>
+            <a:schemeClr val="bg1"/>
+          </a:solidFill>
+          <a:ln>
+            <a:solidFill>
+              <a:srgbClr val="6A8ED0"/>
+            </a:solidFill>
+          </a:ln>
+        </p:spPr>
+        <p:style>
+          <a:lnRef idx="2">
+            <a:schemeClr val="accent1">
+              <a:shade val="50000"/>
+            </a:schemeClr>
+          </a:lnRef>
+          <a:fillRef idx="1">
+            <a:schemeClr val="accent1"/>
+          </a:fillRef>
+          <a:effectRef idx="0">
+            <a:schemeClr val="accent1"/>
+          </a:effectRef>
+          <a:fontRef idx="minor">
+            <a:schemeClr val="lt1"/>
+          </a:fontRef>
+        </p:style>
+        <p:txBody>
+          <a:bodyPr rot="0" spcFirstLastPara="0" vertOverflow="overflow" horzOverflow="overflow" vert="horz" wrap="square" lIns="91440" tIns="45720" rIns="91440" bIns="45720" numCol="1" spcCol="0" rtlCol="0" fromWordArt="0" anchor="t" anchorCtr="0" forceAA="0" compatLnSpc="1">
+            <a:prstTxWarp prst="textNoShape">
+              <a:avLst/>
+            </a:prstTxWarp>
+            <a:noAutofit/>
+          </a:bodyPr>
+          <a:lstStyle/>
+          <a:p>
+            <a:pPr algn="ctr"/>
+            <a:endParaRPr lang="en-GB" sz="1400" dirty="0">
+              <a:solidFill>
+                <a:schemeClr val="tx1">
+                  <a:lumMod val="75000"/>
+                  <a:lumOff val="25000"/>
+                </a:schemeClr>
+              </a:solidFill>
+              <a:latin typeface="Roboto Condensed" pitchFamily="2" charset="0"/>
+              <a:ea typeface="Roboto Condensed" pitchFamily="2" charset="0"/>
+            </a:endParaRPr>
+          </a:p>
+        </p:txBody>
+      </p:sp>
+      <p:sp>
+        <p:nvSpPr>
+          <p:cNvPr id="13" name="Rectangle 12"/>
+          <p:cNvSpPr/>
+          <p:nvPr/>
+        </p:nvSpPr>
+        <p:spPr>
+          <a:xfrm>
+            <a:off x="3535614" y="963166"/>
+            <a:ext cx="735640" cy="226578"/>
+          </a:xfrm>
+          <a:prstGeom prst="rect">
+            <a:avLst/>
+          </a:prstGeom>
+          <a:solidFill>
+            <a:schemeClr val="bg1"/>
+          </a:solidFill>
+          <a:ln>
+            <a:solidFill>
+              <a:srgbClr val="6A8ED0"/>
+            </a:solidFill>
+          </a:ln>
+        </p:spPr>
+        <p:style>
+          <a:lnRef idx="2">
+            <a:schemeClr val="accent1">
+              <a:shade val="50000"/>
+            </a:schemeClr>
+          </a:lnRef>
+          <a:fillRef idx="1">
+            <a:schemeClr val="accent1"/>
+          </a:fillRef>
+          <a:effectRef idx="0">
+            <a:schemeClr val="accent1"/>
+          </a:effectRef>
+          <a:fontRef idx="minor">
+            <a:schemeClr val="lt1"/>
+          </a:fontRef>
+        </p:style>
+        <p:txBody>
+          <a:bodyPr rot="0" spcFirstLastPara="0" vertOverflow="overflow" horzOverflow="overflow" vert="horz" wrap="square" lIns="91440" tIns="45720" rIns="91440" bIns="45720" numCol="1" spcCol="0" rtlCol="0" fromWordArt="0" anchor="ctr" anchorCtr="0" forceAA="0" compatLnSpc="1">
+            <a:prstTxWarp prst="textNoShape">
+              <a:avLst/>
+            </a:prstTxWarp>
+            <a:noAutofit/>
+          </a:bodyPr>
+          <a:lstStyle/>
+          <a:p>
+            <a:pPr algn="ctr"/>
+            <a:endParaRPr lang="en-GB"/>
+          </a:p>
+        </p:txBody>
+      </p:sp>
+      <p:sp>
+        <p:nvSpPr>
+          <p:cNvPr id="10" name="Rectangle 9"/>
+          <p:cNvSpPr/>
+          <p:nvPr/>
+        </p:nvSpPr>
+        <p:spPr>
+          <a:xfrm>
+            <a:off x="6089588" y="1505022"/>
+            <a:ext cx="2134137" cy="758872"/>
+          </a:xfrm>
+          <a:prstGeom prst="rect">
+            <a:avLst/>
+          </a:prstGeom>
+          <a:solidFill>
+            <a:schemeClr val="accent5">
+              <a:lumMod val="40000"/>
+              <a:lumOff val="60000"/>
+            </a:schemeClr>
+          </a:solidFill>
+          <a:ln>
+            <a:noFill/>
+          </a:ln>
+        </p:spPr>
+        <p:style>
+          <a:lnRef idx="2">
+            <a:schemeClr val="accent1">
+              <a:shade val="50000"/>
+            </a:schemeClr>
+          </a:lnRef>
+          <a:fillRef idx="1">
+            <a:schemeClr val="accent1"/>
+          </a:fillRef>
+          <a:effectRef idx="0">
+            <a:schemeClr val="accent1"/>
+          </a:effectRef>
+          <a:fontRef idx="minor">
+            <a:schemeClr val="lt1"/>
+          </a:fontRef>
+        </p:style>
+        <p:txBody>
+          <a:bodyPr rot="0" spcFirstLastPara="0" vertOverflow="overflow" horzOverflow="overflow" vert="horz" wrap="square" lIns="91440" tIns="45720" rIns="91440" bIns="45720" numCol="1" spcCol="0" rtlCol="0" fromWordArt="0" anchor="ctr" anchorCtr="0" forceAA="0" compatLnSpc="1">
+            <a:prstTxWarp prst="textNoShape">
+              <a:avLst/>
+            </a:prstTxWarp>
+            <a:noAutofit/>
+          </a:bodyPr>
+          <a:lstStyle/>
+          <a:p>
+            <a:pPr algn="ctr"/>
+            <a:r>
+              <a:rPr lang="en-US" dirty="0">
+                <a:solidFill>
+                  <a:schemeClr val="tx1">
+                    <a:lumMod val="65000"/>
+                    <a:lumOff val="35000"/>
+                  </a:schemeClr>
+                </a:solidFill>
+                <a:latin typeface="Roboto" pitchFamily="2" charset="0"/>
+                <a:ea typeface="Roboto" pitchFamily="2" charset="0"/>
+              </a:rPr>
+              <a:t>CommandParser</a:t>
+            </a:r>
+            <a:endParaRPr lang="en-GB" dirty="0">
+              <a:solidFill>
+                <a:schemeClr val="tx1">
+                  <a:lumMod val="65000"/>
+                  <a:lumOff val="35000"/>
+                </a:schemeClr>
+              </a:solidFill>
+              <a:latin typeface="Roboto" pitchFamily="2" charset="0"/>
+              <a:ea typeface="Roboto" pitchFamily="2" charset="0"/>
+            </a:endParaRPr>
+          </a:p>
+        </p:txBody>
+      </p:sp>
+      <p:sp>
+        <p:nvSpPr>
+          <p:cNvPr id="11" name="Rectangle 10"/>
+          <p:cNvSpPr/>
+          <p:nvPr/>
+        </p:nvSpPr>
+        <p:spPr>
+          <a:xfrm>
+            <a:off x="6949645" y="3116081"/>
+            <a:ext cx="1274081" cy="548640"/>
+          </a:xfrm>
+          <a:prstGeom prst="rect">
+            <a:avLst/>
+          </a:prstGeom>
+          <a:solidFill>
+            <a:schemeClr val="accent5">
+              <a:lumMod val="40000"/>
+              <a:lumOff val="60000"/>
+            </a:schemeClr>
+          </a:solidFill>
+          <a:ln>
+            <a:noFill/>
+          </a:ln>
+        </p:spPr>
+        <p:style>
+          <a:lnRef idx="2">
+            <a:schemeClr val="accent1">
+              <a:shade val="50000"/>
+            </a:schemeClr>
+          </a:lnRef>
+          <a:fillRef idx="1">
+            <a:schemeClr val="accent1"/>
+          </a:fillRef>
+          <a:effectRef idx="0">
+            <a:schemeClr val="accent1"/>
+          </a:effectRef>
+          <a:fontRef idx="minor">
+            <a:schemeClr val="lt1"/>
+          </a:fontRef>
+        </p:style>
+        <p:txBody>
+          <a:bodyPr rot="0" spcFirstLastPara="0" vertOverflow="overflow" horzOverflow="overflow" vert="horz" wrap="square" lIns="91440" tIns="45720" rIns="91440" bIns="45720" numCol="1" spcCol="0" rtlCol="0" fromWordArt="0" anchor="ctr" anchorCtr="0" forceAA="0" compatLnSpc="1">
+            <a:prstTxWarp prst="textNoShape">
+              <a:avLst/>
+            </a:prstTxWarp>
+            <a:noAutofit/>
+          </a:bodyPr>
+          <a:lstStyle/>
+          <a:p>
+            <a:pPr algn="ctr"/>
+            <a:r>
+              <a:rPr lang="en-US" dirty="0">
+                <a:solidFill>
+                  <a:schemeClr val="tx1">
+                    <a:lumMod val="65000"/>
+                    <a:lumOff val="35000"/>
+                  </a:schemeClr>
+                </a:solidFill>
+                <a:latin typeface="Roboto" pitchFamily="2" charset="0"/>
+                <a:ea typeface="Roboto" pitchFamily="2" charset="0"/>
+              </a:rPr>
+              <a:t>Command</a:t>
+            </a:r>
+            <a:endParaRPr lang="en-GB" dirty="0">
+              <a:solidFill>
+                <a:schemeClr val="tx1">
+                  <a:lumMod val="65000"/>
+                  <a:lumOff val="35000"/>
+                </a:schemeClr>
+              </a:solidFill>
+              <a:latin typeface="Roboto" pitchFamily="2" charset="0"/>
+              <a:ea typeface="Roboto" pitchFamily="2" charset="0"/>
+            </a:endParaRPr>
+          </a:p>
+        </p:txBody>
+      </p:sp>
+      <p:sp>
+        <p:nvSpPr>
+          <p:cNvPr id="19" name="Rectangle 18"/>
+          <p:cNvSpPr/>
+          <p:nvPr/>
+        </p:nvSpPr>
+        <p:spPr>
+          <a:xfrm>
+            <a:off x="6949644" y="3922884"/>
+            <a:ext cx="1274080" cy="548640"/>
+          </a:xfrm>
+          <a:prstGeom prst="rect">
+            <a:avLst/>
+          </a:prstGeom>
+          <a:solidFill>
+            <a:schemeClr val="accent5">
+              <a:lumMod val="40000"/>
+              <a:lumOff val="60000"/>
+            </a:schemeClr>
+          </a:solidFill>
+          <a:ln>
+            <a:noFill/>
+          </a:ln>
+        </p:spPr>
+        <p:style>
+          <a:lnRef idx="2">
+            <a:schemeClr val="accent1">
+              <a:shade val="50000"/>
+            </a:schemeClr>
+          </a:lnRef>
+          <a:fillRef idx="1">
+            <a:schemeClr val="accent1"/>
+          </a:fillRef>
+          <a:effectRef idx="0">
+            <a:schemeClr val="accent1"/>
+          </a:effectRef>
+          <a:fontRef idx="minor">
+            <a:schemeClr val="lt1"/>
+          </a:fontRef>
+        </p:style>
+        <p:txBody>
+          <a:bodyPr rot="0" spcFirstLastPara="0" vertOverflow="overflow" horzOverflow="overflow" vert="horz" wrap="square" lIns="91440" tIns="45720" rIns="91440" bIns="45720" numCol="1" spcCol="0" rtlCol="0" fromWordArt="0" anchor="ctr" anchorCtr="0" forceAA="0" compatLnSpc="1">
+            <a:prstTxWarp prst="textNoShape">
+              <a:avLst/>
+            </a:prstTxWarp>
+            <a:noAutofit/>
+          </a:bodyPr>
+          <a:lstStyle/>
+          <a:p>
+            <a:pPr algn="ctr"/>
+            <a:r>
+              <a:rPr lang="en-US" dirty="0">
+                <a:solidFill>
+                  <a:schemeClr val="tx1">
+                    <a:lumMod val="65000"/>
+                    <a:lumOff val="35000"/>
+                  </a:schemeClr>
+                </a:solidFill>
+                <a:latin typeface="Roboto" pitchFamily="2" charset="0"/>
+                <a:ea typeface="Roboto" pitchFamily="2" charset="0"/>
+              </a:rPr>
+              <a:t>Storage</a:t>
+            </a:r>
+            <a:endParaRPr lang="en-GB" dirty="0">
+              <a:solidFill>
+                <a:schemeClr val="tx1">
+                  <a:lumMod val="65000"/>
+                  <a:lumOff val="35000"/>
+                </a:schemeClr>
+              </a:solidFill>
+              <a:latin typeface="Roboto" pitchFamily="2" charset="0"/>
+              <a:ea typeface="Roboto" pitchFamily="2" charset="0"/>
+            </a:endParaRPr>
+          </a:p>
+        </p:txBody>
+      </p:sp>
       <p:grpSp>
         <p:nvGrpSpPr>
-          <p:cNvPr id="78" name="Group 77"/>
+          <p:cNvPr id="20" name="Group 19"/>
           <p:cNvGrpSpPr/>
           <p:nvPr/>
         </p:nvGrpSpPr>
         <p:grpSpPr>
           <a:xfrm>
-            <a:off x="2152021" y="541919"/>
-            <a:ext cx="7924903" cy="5528809"/>
-            <a:chOff x="2234603" y="486034"/>
-            <a:chExt cx="7924903" cy="5528809"/>
-          </a:xfrm>
+            <a:off x="9073913" y="5029196"/>
+            <a:ext cx="1003011" cy="1041532"/>
+            <a:chOff x="8931564" y="2654187"/>
+            <a:chExt cx="1339272" cy="1390707"/>
+          </a:xfrm>
+          <a:solidFill>
+            <a:srgbClr val="FFCC29"/>
+          </a:solidFill>
         </p:grpSpPr>
         <p:sp>
           <p:nvSpPr>
-            <p:cNvPr id="5" name="Rounded Rectangle 4"/>
+            <p:cNvPr id="21" name="Rectangle 20"/>
             <p:cNvSpPr/>
             <p:nvPr/>
           </p:nvSpPr>
           <p:spPr>
             <a:xfrm>
-              <a:off x="3380246" y="486034"/>
-              <a:ext cx="5491624" cy="4487277"/>
+              <a:off x="8931564" y="2654187"/>
+              <a:ext cx="1339272" cy="1123486"/>
             </a:xfrm>
-            <a:prstGeom prst="roundRect">
-              <a:avLst>
-                <a:gd name="adj" fmla="val 4530"/>
-              </a:avLst>
+            <a:prstGeom prst="rect">
+              <a:avLst/>
             </a:prstGeom>
-            <a:solidFill>
-              <a:schemeClr val="accent5">
-                <a:lumMod val="60000"/>
-                <a:lumOff val="40000"/>
-              </a:schemeClr>
-            </a:solidFill>
+            <a:grpFill/>
             <a:ln>
               <a:noFill/>
             </a:ln>
           </p:spPr>
           <p:style>
             <a:lnRef idx="2">
-              <a:schemeClr val="accent1">
+              <a:schemeClr val="accent4">
                 <a:shade val="50000"/>
               </a:schemeClr>
             </a:lnRef>
             <a:fillRef idx="1">
-              <a:schemeClr val="accent1"/>
+              <a:schemeClr val="accent4"/>
             </a:fillRef>
             <a:effectRef idx="0">
-              <a:schemeClr val="accent1"/>
-            </a:effectRef>
-            <a:fontRef idx="minor">
-              <a:schemeClr val="lt1"/>
-            </a:fontRef>
-          </p:style>
-          <p:txBody>
-            <a:bodyPr rot="0" spcFirstLastPara="0" vertOverflow="overflow" horzOverflow="overflow" vert="horz" wrap="square" lIns="91440" tIns="91440" rIns="91440" bIns="45720" numCol="1" spcCol="0" rtlCol="0" fromWordArt="0" anchor="t" anchorCtr="0" forceAA="0" compatLnSpc="1">
-              <a:prstTxWarp prst="textNoShape">
-                <a:avLst/>
-              </a:prstTxWarp>
-              <a:noAutofit/>
-            </a:bodyPr>
-            <a:lstStyle/>
-            <a:p>
-              <a:pPr algn="ctr"/>
-              <a:r>
-                <a:rPr lang="en-US" dirty="0">
-                  <a:latin typeface="Roboto Condensed" pitchFamily="2" charset="0"/>
-                  <a:ea typeface="Roboto Condensed" pitchFamily="2" charset="0"/>
-                </a:rPr>
-                <a:t>Backend</a:t>
-              </a:r>
-              <a:endParaRPr lang="en-GB" dirty="0">
-                <a:latin typeface="Roboto Condensed" pitchFamily="2" charset="0"/>
-                <a:ea typeface="Roboto Condensed" pitchFamily="2" charset="0"/>
-              </a:endParaRPr>
-            </a:p>
-          </p:txBody>
-        </p:sp>
-        <p:sp>
-          <p:nvSpPr>
-            <p:cNvPr id="12" name="Rectangle 11"/>
-            <p:cNvSpPr/>
-            <p:nvPr/>
-          </p:nvSpPr>
-          <p:spPr>
-            <a:xfrm>
-              <a:off x="3618196" y="1133860"/>
-              <a:ext cx="5015724" cy="3582689"/>
-            </a:xfrm>
-            <a:prstGeom prst="rect">
-              <a:avLst/>
-            </a:prstGeom>
-            <a:solidFill>
-              <a:schemeClr val="bg1"/>
-            </a:solidFill>
-            <a:ln>
-              <a:solidFill>
-                <a:srgbClr val="6A8ED0"/>
-              </a:solidFill>
-            </a:ln>
-          </p:spPr>
-          <p:style>
-            <a:lnRef idx="2">
-              <a:schemeClr val="accent1">
-                <a:shade val="50000"/>
-              </a:schemeClr>
-            </a:lnRef>
-            <a:fillRef idx="1">
-              <a:schemeClr val="accent1"/>
-            </a:fillRef>
-            <a:effectRef idx="0">
-              <a:schemeClr val="accent1"/>
-            </a:effectRef>
-            <a:fontRef idx="minor">
-              <a:schemeClr val="lt1"/>
-            </a:fontRef>
-          </p:style>
-          <p:txBody>
-            <a:bodyPr rot="0" spcFirstLastPara="0" vertOverflow="overflow" horzOverflow="overflow" vert="horz" wrap="square" lIns="91440" tIns="45720" rIns="91440" bIns="45720" numCol="1" spcCol="0" rtlCol="0" fromWordArt="0" anchor="t" anchorCtr="0" forceAA="0" compatLnSpc="1">
-              <a:prstTxWarp prst="textNoShape">
-                <a:avLst/>
-              </a:prstTxWarp>
-              <a:noAutofit/>
-            </a:bodyPr>
-            <a:lstStyle/>
-            <a:p>
-              <a:pPr algn="ctr"/>
-              <a:endParaRPr lang="en-GB" sz="1400" dirty="0">
-                <a:solidFill>
-                  <a:schemeClr val="tx1">
-                    <a:lumMod val="75000"/>
-                    <a:lumOff val="25000"/>
-                  </a:schemeClr>
-                </a:solidFill>
-                <a:latin typeface="Roboto Condensed" pitchFamily="2" charset="0"/>
-                <a:ea typeface="Roboto Condensed" pitchFamily="2" charset="0"/>
-              </a:endParaRPr>
-            </a:p>
-          </p:txBody>
-        </p:sp>
-        <p:sp>
-          <p:nvSpPr>
-            <p:cNvPr id="13" name="Rectangle 12"/>
-            <p:cNvSpPr/>
-            <p:nvPr/>
-          </p:nvSpPr>
-          <p:spPr>
-            <a:xfrm>
-              <a:off x="3618196" y="907281"/>
-              <a:ext cx="735640" cy="226578"/>
-            </a:xfrm>
-            <a:prstGeom prst="rect">
-              <a:avLst/>
-            </a:prstGeom>
-            <a:solidFill>
-              <a:schemeClr val="bg1"/>
-            </a:solidFill>
-            <a:ln>
-              <a:solidFill>
-                <a:srgbClr val="6A8ED0"/>
-              </a:solidFill>
-            </a:ln>
-          </p:spPr>
-          <p:style>
-            <a:lnRef idx="2">
-              <a:schemeClr val="accent1">
-                <a:shade val="50000"/>
-              </a:schemeClr>
-            </a:lnRef>
-            <a:fillRef idx="1">
-              <a:schemeClr val="accent1"/>
-            </a:fillRef>
-            <a:effectRef idx="0">
-              <a:schemeClr val="accent1"/>
+              <a:schemeClr val="accent4"/>
             </a:effectRef>
             <a:fontRef idx="minor">
               <a:schemeClr val="lt1"/>
@@ -7569,380 +7828,28 @@
             <a:lstStyle/>
             <a:p>
               <a:pPr algn="ctr"/>
-              <a:endParaRPr lang="en-GB"/>
-            </a:p>
-          </p:txBody>
-        </p:sp>
-        <p:sp>
-          <p:nvSpPr>
-            <p:cNvPr id="10" name="Rectangle 9"/>
-            <p:cNvSpPr/>
-            <p:nvPr/>
-          </p:nvSpPr>
-          <p:spPr>
-            <a:xfrm>
-              <a:off x="6172170" y="1449137"/>
-              <a:ext cx="2134137" cy="758872"/>
-            </a:xfrm>
-            <a:prstGeom prst="rect">
-              <a:avLst/>
-            </a:prstGeom>
-            <a:solidFill>
-              <a:schemeClr val="accent5">
-                <a:lumMod val="40000"/>
-                <a:lumOff val="60000"/>
-              </a:schemeClr>
-            </a:solidFill>
-            <a:ln>
-              <a:noFill/>
-            </a:ln>
-          </p:spPr>
-          <p:style>
-            <a:lnRef idx="2">
-              <a:schemeClr val="accent1">
-                <a:shade val="50000"/>
-              </a:schemeClr>
-            </a:lnRef>
-            <a:fillRef idx="1">
-              <a:schemeClr val="accent1"/>
-            </a:fillRef>
-            <a:effectRef idx="0">
-              <a:schemeClr val="accent1"/>
-            </a:effectRef>
-            <a:fontRef idx="minor">
-              <a:schemeClr val="lt1"/>
-            </a:fontRef>
-          </p:style>
-          <p:txBody>
-            <a:bodyPr rot="0" spcFirstLastPara="0" vertOverflow="overflow" horzOverflow="overflow" vert="horz" wrap="square" lIns="91440" tIns="45720" rIns="91440" bIns="45720" numCol="1" spcCol="0" rtlCol="0" fromWordArt="0" anchor="ctr" anchorCtr="0" forceAA="0" compatLnSpc="1">
-              <a:prstTxWarp prst="textNoShape">
-                <a:avLst/>
-              </a:prstTxWarp>
-              <a:noAutofit/>
-            </a:bodyPr>
-            <a:lstStyle/>
-            <a:p>
-              <a:pPr algn="ctr"/>
-              <a:r>
-                <a:rPr lang="en-US" dirty="0">
-                  <a:solidFill>
-                    <a:schemeClr val="tx1">
-                      <a:lumMod val="65000"/>
-                      <a:lumOff val="35000"/>
-                    </a:schemeClr>
-                  </a:solidFill>
-                  <a:latin typeface="Roboto" pitchFamily="2" charset="0"/>
-                  <a:ea typeface="Roboto" pitchFamily="2" charset="0"/>
-                </a:rPr>
-                <a:t>CommandParser</a:t>
-              </a:r>
-              <a:endParaRPr lang="en-GB" dirty="0">
-                <a:solidFill>
-                  <a:schemeClr val="tx1">
-                    <a:lumMod val="65000"/>
-                    <a:lumOff val="35000"/>
-                  </a:schemeClr>
-                </a:solidFill>
-                <a:latin typeface="Roboto" pitchFamily="2" charset="0"/>
-                <a:ea typeface="Roboto" pitchFamily="2" charset="0"/>
+              <a:endParaRPr lang="en-GB" sz="1400" dirty="0">
+                <a:latin typeface="Roboto Condensed" pitchFamily="2" charset="0"/>
+                <a:ea typeface="Roboto Condensed" pitchFamily="2" charset="0"/>
               </a:endParaRPr>
             </a:p>
           </p:txBody>
         </p:sp>
         <p:sp>
           <p:nvSpPr>
-            <p:cNvPr id="11" name="Rectangle 10"/>
+            <p:cNvPr id="22" name="Oval 21"/>
             <p:cNvSpPr/>
             <p:nvPr/>
           </p:nvSpPr>
           <p:spPr>
             <a:xfrm>
-              <a:off x="7032227" y="3060196"/>
-              <a:ext cx="1274081" cy="548640"/>
-            </a:xfrm>
-            <a:prstGeom prst="rect">
-              <a:avLst/>
-            </a:prstGeom>
-            <a:solidFill>
-              <a:schemeClr val="accent5">
-                <a:lumMod val="40000"/>
-                <a:lumOff val="60000"/>
-              </a:schemeClr>
-            </a:solidFill>
-            <a:ln>
-              <a:noFill/>
-            </a:ln>
-          </p:spPr>
-          <p:style>
-            <a:lnRef idx="2">
-              <a:schemeClr val="accent1">
-                <a:shade val="50000"/>
-              </a:schemeClr>
-            </a:lnRef>
-            <a:fillRef idx="1">
-              <a:schemeClr val="accent1"/>
-            </a:fillRef>
-            <a:effectRef idx="0">
-              <a:schemeClr val="accent1"/>
-            </a:effectRef>
-            <a:fontRef idx="minor">
-              <a:schemeClr val="lt1"/>
-            </a:fontRef>
-          </p:style>
-          <p:txBody>
-            <a:bodyPr rot="0" spcFirstLastPara="0" vertOverflow="overflow" horzOverflow="overflow" vert="horz" wrap="square" lIns="91440" tIns="45720" rIns="91440" bIns="45720" numCol="1" spcCol="0" rtlCol="0" fromWordArt="0" anchor="ctr" anchorCtr="0" forceAA="0" compatLnSpc="1">
-              <a:prstTxWarp prst="textNoShape">
-                <a:avLst/>
-              </a:prstTxWarp>
-              <a:noAutofit/>
-            </a:bodyPr>
-            <a:lstStyle/>
-            <a:p>
-              <a:pPr algn="ctr"/>
-              <a:r>
-                <a:rPr lang="en-US" dirty="0">
-                  <a:solidFill>
-                    <a:schemeClr val="tx1">
-                      <a:lumMod val="65000"/>
-                      <a:lumOff val="35000"/>
-                    </a:schemeClr>
-                  </a:solidFill>
-                  <a:latin typeface="Roboto" pitchFamily="2" charset="0"/>
-                  <a:ea typeface="Roboto" pitchFamily="2" charset="0"/>
-                </a:rPr>
-                <a:t>Command</a:t>
-              </a:r>
-              <a:endParaRPr lang="en-GB" dirty="0">
-                <a:solidFill>
-                  <a:schemeClr val="tx1">
-                    <a:lumMod val="65000"/>
-                    <a:lumOff val="35000"/>
-                  </a:schemeClr>
-                </a:solidFill>
-                <a:latin typeface="Roboto" pitchFamily="2" charset="0"/>
-                <a:ea typeface="Roboto" pitchFamily="2" charset="0"/>
-              </a:endParaRPr>
-            </a:p>
-          </p:txBody>
-        </p:sp>
-        <p:sp>
-          <p:nvSpPr>
-            <p:cNvPr id="19" name="Rectangle 18"/>
-            <p:cNvSpPr/>
-            <p:nvPr/>
-          </p:nvSpPr>
-          <p:spPr>
-            <a:xfrm>
-              <a:off x="7032226" y="3866999"/>
-              <a:ext cx="1274080" cy="548640"/>
-            </a:xfrm>
-            <a:prstGeom prst="rect">
-              <a:avLst/>
-            </a:prstGeom>
-            <a:solidFill>
-              <a:schemeClr val="accent5">
-                <a:lumMod val="40000"/>
-                <a:lumOff val="60000"/>
-              </a:schemeClr>
-            </a:solidFill>
-            <a:ln>
-              <a:noFill/>
-            </a:ln>
-          </p:spPr>
-          <p:style>
-            <a:lnRef idx="2">
-              <a:schemeClr val="accent1">
-                <a:shade val="50000"/>
-              </a:schemeClr>
-            </a:lnRef>
-            <a:fillRef idx="1">
-              <a:schemeClr val="accent1"/>
-            </a:fillRef>
-            <a:effectRef idx="0">
-              <a:schemeClr val="accent1"/>
-            </a:effectRef>
-            <a:fontRef idx="minor">
-              <a:schemeClr val="lt1"/>
-            </a:fontRef>
-          </p:style>
-          <p:txBody>
-            <a:bodyPr rot="0" spcFirstLastPara="0" vertOverflow="overflow" horzOverflow="overflow" vert="horz" wrap="square" lIns="91440" tIns="45720" rIns="91440" bIns="45720" numCol="1" spcCol="0" rtlCol="0" fromWordArt="0" anchor="ctr" anchorCtr="0" forceAA="0" compatLnSpc="1">
-              <a:prstTxWarp prst="textNoShape">
-                <a:avLst/>
-              </a:prstTxWarp>
-              <a:noAutofit/>
-            </a:bodyPr>
-            <a:lstStyle/>
-            <a:p>
-              <a:pPr algn="ctr"/>
-              <a:r>
-                <a:rPr lang="en-US" dirty="0">
-                  <a:solidFill>
-                    <a:schemeClr val="tx1">
-                      <a:lumMod val="65000"/>
-                      <a:lumOff val="35000"/>
-                    </a:schemeClr>
-                  </a:solidFill>
-                  <a:latin typeface="Roboto" pitchFamily="2" charset="0"/>
-                  <a:ea typeface="Roboto" pitchFamily="2" charset="0"/>
-                </a:rPr>
-                <a:t>Storage</a:t>
-              </a:r>
-              <a:endParaRPr lang="en-GB" dirty="0">
-                <a:solidFill>
-                  <a:schemeClr val="tx1">
-                    <a:lumMod val="65000"/>
-                    <a:lumOff val="35000"/>
-                  </a:schemeClr>
-                </a:solidFill>
-                <a:latin typeface="Roboto" pitchFamily="2" charset="0"/>
-                <a:ea typeface="Roboto" pitchFamily="2" charset="0"/>
-              </a:endParaRPr>
-            </a:p>
-          </p:txBody>
-        </p:sp>
-        <p:grpSp>
-          <p:nvGrpSpPr>
-            <p:cNvPr id="20" name="Group 19"/>
-            <p:cNvGrpSpPr/>
-            <p:nvPr/>
-          </p:nvGrpSpPr>
-          <p:grpSpPr>
-            <a:xfrm>
-              <a:off x="9156495" y="4973311"/>
-              <a:ext cx="1003011" cy="1041532"/>
-              <a:chOff x="8931564" y="2654187"/>
-              <a:chExt cx="1339272" cy="1390707"/>
-            </a:xfrm>
-            <a:solidFill>
-              <a:srgbClr val="FFCC29"/>
-            </a:solidFill>
-          </p:grpSpPr>
-          <p:sp>
-            <p:nvSpPr>
-              <p:cNvPr id="21" name="Rectangle 20"/>
-              <p:cNvSpPr/>
-              <p:nvPr/>
-            </p:nvSpPr>
-            <p:spPr>
-              <a:xfrm>
-                <a:off x="8931564" y="2654187"/>
-                <a:ext cx="1339272" cy="1123486"/>
-              </a:xfrm>
-              <a:prstGeom prst="rect">
-                <a:avLst/>
-              </a:prstGeom>
-              <a:grpFill/>
-              <a:ln>
-                <a:noFill/>
-              </a:ln>
-            </p:spPr>
-            <p:style>
-              <a:lnRef idx="2">
-                <a:schemeClr val="accent4">
-                  <a:shade val="50000"/>
-                </a:schemeClr>
-              </a:lnRef>
-              <a:fillRef idx="1">
-                <a:schemeClr val="accent4"/>
-              </a:fillRef>
-              <a:effectRef idx="0">
-                <a:schemeClr val="accent4"/>
-              </a:effectRef>
-              <a:fontRef idx="minor">
-                <a:schemeClr val="lt1"/>
-              </a:fontRef>
-            </p:style>
-            <p:txBody>
-              <a:bodyPr rot="0" spcFirstLastPara="0" vertOverflow="overflow" horzOverflow="overflow" vert="horz" wrap="square" lIns="91440" tIns="45720" rIns="91440" bIns="45720" numCol="1" spcCol="0" rtlCol="0" fromWordArt="0" anchor="ctr" anchorCtr="0" forceAA="0" compatLnSpc="1">
-                <a:prstTxWarp prst="textNoShape">
-                  <a:avLst/>
-                </a:prstTxWarp>
-                <a:noAutofit/>
-              </a:bodyPr>
-              <a:lstStyle/>
-              <a:p>
-                <a:pPr algn="ctr"/>
-                <a:endParaRPr lang="en-GB" sz="1400" dirty="0">
-                  <a:latin typeface="Roboto Condensed" pitchFamily="2" charset="0"/>
-                  <a:ea typeface="Roboto Condensed" pitchFamily="2" charset="0"/>
-                </a:endParaRPr>
-              </a:p>
-            </p:txBody>
-          </p:sp>
-          <p:sp>
-            <p:nvSpPr>
-              <p:cNvPr id="22" name="Oval 21"/>
-              <p:cNvSpPr/>
-              <p:nvPr/>
-            </p:nvSpPr>
-            <p:spPr>
-              <a:xfrm>
-                <a:off x="8931564" y="3510452"/>
-                <a:ext cx="1339272" cy="534442"/>
-              </a:xfrm>
-              <a:prstGeom prst="ellipse">
-                <a:avLst/>
-              </a:prstGeom>
-              <a:grpFill/>
-              <a:ln>
-                <a:noFill/>
-              </a:ln>
-            </p:spPr>
-            <p:style>
-              <a:lnRef idx="2">
-                <a:schemeClr val="accent4">
-                  <a:shade val="50000"/>
-                </a:schemeClr>
-              </a:lnRef>
-              <a:fillRef idx="1">
-                <a:schemeClr val="accent4"/>
-              </a:fillRef>
-              <a:effectRef idx="0">
-                <a:schemeClr val="accent4"/>
-              </a:effectRef>
-              <a:fontRef idx="minor">
-                <a:schemeClr val="lt1"/>
-              </a:fontRef>
-            </p:style>
-            <p:txBody>
-              <a:bodyPr rot="0" spcFirstLastPara="0" vertOverflow="overflow" horzOverflow="overflow" vert="horz" wrap="square" lIns="91440" tIns="45720" rIns="91440" bIns="45720" numCol="1" spcCol="0" rtlCol="0" fromWordArt="0" anchor="ctr" anchorCtr="0" forceAA="0" compatLnSpc="1">
-                <a:prstTxWarp prst="textNoShape">
-                  <a:avLst/>
-                </a:prstTxWarp>
-                <a:noAutofit/>
-              </a:bodyPr>
-              <a:lstStyle/>
-              <a:p>
-                <a:pPr algn="ctr"/>
-                <a:endParaRPr lang="en-GB" sz="2200">
-                  <a:latin typeface="Roboto Condensed" pitchFamily="2" charset="0"/>
-                  <a:ea typeface="Roboto Condensed" pitchFamily="2" charset="0"/>
-                </a:endParaRPr>
-              </a:p>
-            </p:txBody>
-          </p:sp>
-        </p:grpSp>
-        <p:sp>
-          <p:nvSpPr>
-            <p:cNvPr id="23" name="Oval 22"/>
-            <p:cNvSpPr/>
-            <p:nvPr/>
-          </p:nvSpPr>
-          <p:spPr>
-            <a:xfrm>
-              <a:off x="9156495" y="4773183"/>
-              <a:ext cx="1003011" cy="400256"/>
+              <a:off x="8931564" y="3510452"/>
+              <a:ext cx="1339272" cy="534442"/>
             </a:xfrm>
             <a:prstGeom prst="ellipse">
               <a:avLst/>
             </a:prstGeom>
-            <a:solidFill>
-              <a:schemeClr val="accent4">
-                <a:lumMod val="60000"/>
-                <a:lumOff val="40000"/>
-              </a:schemeClr>
-            </a:solidFill>
+            <a:grpFill/>
             <a:ln>
               <a:noFill/>
             </a:ln>
@@ -7980,496 +7887,398 @@
             </a:p>
           </p:txBody>
         </p:sp>
-        <p:cxnSp>
-          <p:nvCxnSpPr>
-            <p:cNvPr id="24" name="Straight Arrow Connector 23"/>
-            <p:cNvCxnSpPr/>
-            <p:nvPr/>
-          </p:nvCxnSpPr>
-          <p:spPr>
-            <a:xfrm flipV="1">
-              <a:off x="8306307" y="4148971"/>
-              <a:ext cx="1354931" cy="6143"/>
-            </a:xfrm>
-            <a:prstGeom prst="straightConnector1">
+      </p:grpSp>
+      <p:sp>
+        <p:nvSpPr>
+          <p:cNvPr id="23" name="Oval 22"/>
+          <p:cNvSpPr/>
+          <p:nvPr/>
+        </p:nvSpPr>
+        <p:spPr>
+          <a:xfrm>
+            <a:off x="9073913" y="4829068"/>
+            <a:ext cx="1003011" cy="400256"/>
+          </a:xfrm>
+          <a:prstGeom prst="ellipse">
+            <a:avLst/>
+          </a:prstGeom>
+          <a:solidFill>
+            <a:schemeClr val="accent4">
+              <a:lumMod val="60000"/>
+              <a:lumOff val="40000"/>
+            </a:schemeClr>
+          </a:solidFill>
+          <a:ln>
+            <a:noFill/>
+          </a:ln>
+        </p:spPr>
+        <p:style>
+          <a:lnRef idx="2">
+            <a:schemeClr val="accent4">
+              <a:shade val="50000"/>
+            </a:schemeClr>
+          </a:lnRef>
+          <a:fillRef idx="1">
+            <a:schemeClr val="accent4"/>
+          </a:fillRef>
+          <a:effectRef idx="0">
+            <a:schemeClr val="accent4"/>
+          </a:effectRef>
+          <a:fontRef idx="minor">
+            <a:schemeClr val="lt1"/>
+          </a:fontRef>
+        </p:style>
+        <p:txBody>
+          <a:bodyPr rot="0" spcFirstLastPara="0" vertOverflow="overflow" horzOverflow="overflow" vert="horz" wrap="square" lIns="91440" tIns="45720" rIns="91440" bIns="45720" numCol="1" spcCol="0" rtlCol="0" fromWordArt="0" anchor="ctr" anchorCtr="0" forceAA="0" compatLnSpc="1">
+            <a:prstTxWarp prst="textNoShape">
               <a:avLst/>
-            </a:prstGeom>
-            <a:ln w="25400" cap="sq">
-              <a:solidFill>
-                <a:schemeClr val="tx1">
-                  <a:lumMod val="50000"/>
-                  <a:lumOff val="50000"/>
-                </a:schemeClr>
-              </a:solidFill>
-              <a:prstDash val="sysDash"/>
-              <a:tailEnd type="none" w="lg" len="lg"/>
-            </a:ln>
-          </p:spPr>
-          <p:style>
-            <a:lnRef idx="1">
-              <a:schemeClr val="accent1"/>
-            </a:lnRef>
-            <a:fillRef idx="0">
-              <a:schemeClr val="accent1"/>
-            </a:fillRef>
-            <a:effectRef idx="0">
-              <a:schemeClr val="accent1"/>
-            </a:effectRef>
-            <a:fontRef idx="minor">
-              <a:schemeClr val="tx1"/>
-            </a:fontRef>
-          </p:style>
-        </p:cxnSp>
-        <p:cxnSp>
-          <p:nvCxnSpPr>
-            <p:cNvPr id="25" name="Straight Arrow Connector 24"/>
-            <p:cNvCxnSpPr/>
-            <p:nvPr/>
-          </p:nvCxnSpPr>
-          <p:spPr>
-            <a:xfrm>
-              <a:off x="9661237" y="4148971"/>
-              <a:ext cx="0" cy="858759"/>
-            </a:xfrm>
-            <a:prstGeom prst="straightConnector1">
-              <a:avLst/>
-            </a:prstGeom>
-            <a:ln w="25400" cap="sq">
-              <a:solidFill>
-                <a:schemeClr val="tx1">
-                  <a:lumMod val="50000"/>
-                  <a:lumOff val="50000"/>
-                </a:schemeClr>
-              </a:solidFill>
-              <a:prstDash val="sysDash"/>
-              <a:tailEnd type="arrow" w="med" len="med"/>
-            </a:ln>
-          </p:spPr>
-          <p:style>
-            <a:lnRef idx="1">
-              <a:schemeClr val="accent1"/>
-            </a:lnRef>
-            <a:fillRef idx="0">
-              <a:schemeClr val="accent1"/>
-            </a:fillRef>
-            <a:effectRef idx="0">
-              <a:schemeClr val="accent1"/>
-            </a:effectRef>
-            <a:fontRef idx="minor">
-              <a:schemeClr val="tx1"/>
-            </a:fontRef>
-          </p:style>
-        </p:cxnSp>
-        <p:sp>
-          <p:nvSpPr>
-            <p:cNvPr id="26" name="TextBox 25"/>
-            <p:cNvSpPr txBox="1"/>
-            <p:nvPr/>
-          </p:nvSpPr>
-          <p:spPr>
-            <a:xfrm>
-              <a:off x="9195274" y="5236106"/>
-              <a:ext cx="925450" cy="584775"/>
-            </a:xfrm>
-            <a:prstGeom prst="rect">
-              <a:avLst/>
-            </a:prstGeom>
-            <a:noFill/>
-          </p:spPr>
-          <p:txBody>
-            <a:bodyPr wrap="square" rtlCol="0">
-              <a:spAutoFit/>
-            </a:bodyPr>
-            <a:lstStyle/>
-            <a:p>
-              <a:pPr algn="ctr"/>
-              <a:r>
-                <a:rPr lang="en-US" sz="1600" dirty="0">
-                  <a:latin typeface="Roboto Condensed" pitchFamily="2" charset="0"/>
-                  <a:ea typeface="Roboto Condensed" pitchFamily="2" charset="0"/>
-                </a:rPr>
-                <a:t>Collated files</a:t>
-              </a:r>
-              <a:endParaRPr lang="en-GB" sz="1600" dirty="0">
+            </a:prstTxWarp>
+            <a:noAutofit/>
+          </a:bodyPr>
+          <a:lstStyle/>
+          <a:p>
+            <a:pPr algn="ctr"/>
+            <a:endParaRPr lang="en-GB" sz="2200">
+              <a:latin typeface="Roboto Condensed" pitchFamily="2" charset="0"/>
+              <a:ea typeface="Roboto Condensed" pitchFamily="2" charset="0"/>
+            </a:endParaRPr>
+          </a:p>
+        </p:txBody>
+      </p:sp>
+      <p:cxnSp>
+        <p:nvCxnSpPr>
+          <p:cNvPr id="24" name="Straight Arrow Connector 23"/>
+          <p:cNvCxnSpPr/>
+          <p:nvPr/>
+        </p:nvCxnSpPr>
+        <p:spPr>
+          <a:xfrm flipV="1">
+            <a:off x="8223725" y="4204856"/>
+            <a:ext cx="1354931" cy="6143"/>
+          </a:xfrm>
+          <a:prstGeom prst="straightConnector1">
+            <a:avLst/>
+          </a:prstGeom>
+          <a:ln w="25400" cap="sq">
+            <a:solidFill>
+              <a:schemeClr val="tx1">
+                <a:lumMod val="50000"/>
+                <a:lumOff val="50000"/>
+              </a:schemeClr>
+            </a:solidFill>
+            <a:prstDash val="sysDash"/>
+            <a:tailEnd type="none" w="lg" len="lg"/>
+          </a:ln>
+        </p:spPr>
+        <p:style>
+          <a:lnRef idx="1">
+            <a:schemeClr val="accent1"/>
+          </a:lnRef>
+          <a:fillRef idx="0">
+            <a:schemeClr val="accent1"/>
+          </a:fillRef>
+          <a:effectRef idx="0">
+            <a:schemeClr val="accent1"/>
+          </a:effectRef>
+          <a:fontRef idx="minor">
+            <a:schemeClr val="tx1"/>
+          </a:fontRef>
+        </p:style>
+      </p:cxnSp>
+      <p:cxnSp>
+        <p:nvCxnSpPr>
+          <p:cNvPr id="25" name="Straight Arrow Connector 24"/>
+          <p:cNvCxnSpPr/>
+          <p:nvPr/>
+        </p:nvCxnSpPr>
+        <p:spPr>
+          <a:xfrm>
+            <a:off x="9578655" y="4204856"/>
+            <a:ext cx="0" cy="858759"/>
+          </a:xfrm>
+          <a:prstGeom prst="straightConnector1">
+            <a:avLst/>
+          </a:prstGeom>
+          <a:ln w="25400" cap="sq">
+            <a:solidFill>
+              <a:schemeClr val="tx1">
+                <a:lumMod val="50000"/>
+                <a:lumOff val="50000"/>
+              </a:schemeClr>
+            </a:solidFill>
+            <a:prstDash val="sysDash"/>
+            <a:tailEnd type="arrow" w="med" len="med"/>
+          </a:ln>
+        </p:spPr>
+        <p:style>
+          <a:lnRef idx="1">
+            <a:schemeClr val="accent1"/>
+          </a:lnRef>
+          <a:fillRef idx="0">
+            <a:schemeClr val="accent1"/>
+          </a:fillRef>
+          <a:effectRef idx="0">
+            <a:schemeClr val="accent1"/>
+          </a:effectRef>
+          <a:fontRef idx="minor">
+            <a:schemeClr val="tx1"/>
+          </a:fontRef>
+        </p:style>
+      </p:cxnSp>
+      <p:sp>
+        <p:nvSpPr>
+          <p:cNvPr id="26" name="TextBox 25"/>
+          <p:cNvSpPr txBox="1"/>
+          <p:nvPr/>
+        </p:nvSpPr>
+        <p:spPr>
+          <a:xfrm>
+            <a:off x="9112692" y="5291991"/>
+            <a:ext cx="925450" cy="584775"/>
+          </a:xfrm>
+          <a:prstGeom prst="rect">
+            <a:avLst/>
+          </a:prstGeom>
+          <a:noFill/>
+        </p:spPr>
+        <p:txBody>
+          <a:bodyPr wrap="square" rtlCol="0">
+            <a:spAutoFit/>
+          </a:bodyPr>
+          <a:lstStyle/>
+          <a:p>
+            <a:pPr algn="ctr"/>
+            <a:r>
+              <a:rPr lang="en-US" sz="1600" dirty="0">
                 <a:latin typeface="Roboto Condensed" pitchFamily="2" charset="0"/>
                 <a:ea typeface="Roboto Condensed" pitchFamily="2" charset="0"/>
-              </a:endParaRPr>
-            </a:p>
-          </p:txBody>
-        </p:sp>
-        <p:sp>
-          <p:nvSpPr>
-            <p:cNvPr id="29" name="Rounded Rectangle 28"/>
-            <p:cNvSpPr/>
-            <p:nvPr/>
-          </p:nvSpPr>
-          <p:spPr>
-            <a:xfrm>
-              <a:off x="2234603" y="1043710"/>
-              <a:ext cx="910945" cy="3781710"/>
-            </a:xfrm>
-            <a:prstGeom prst="roundRect">
-              <a:avLst>
-                <a:gd name="adj" fmla="val 16801"/>
-              </a:avLst>
-            </a:prstGeom>
+              </a:rPr>
+              <a:t>Collated files</a:t>
+            </a:r>
+            <a:endParaRPr lang="en-GB" sz="1600" dirty="0">
+              <a:latin typeface="Roboto Condensed" pitchFamily="2" charset="0"/>
+              <a:ea typeface="Roboto Condensed" pitchFamily="2" charset="0"/>
+            </a:endParaRPr>
+          </a:p>
+        </p:txBody>
+      </p:sp>
+      <p:sp>
+        <p:nvSpPr>
+          <p:cNvPr id="29" name="Rounded Rectangle 28"/>
+          <p:cNvSpPr/>
+          <p:nvPr/>
+        </p:nvSpPr>
+        <p:spPr>
+          <a:xfrm>
+            <a:off x="1489319" y="1099595"/>
+            <a:ext cx="1521736" cy="1890855"/>
+          </a:xfrm>
+          <a:prstGeom prst="roundRect">
+            <a:avLst>
+              <a:gd name="adj" fmla="val 16801"/>
+            </a:avLst>
+          </a:prstGeom>
+          <a:solidFill>
+            <a:schemeClr val="accent6">
+              <a:lumMod val="60000"/>
+              <a:lumOff val="40000"/>
+            </a:schemeClr>
+          </a:solidFill>
+          <a:ln>
+            <a:noFill/>
+          </a:ln>
+        </p:spPr>
+        <p:style>
+          <a:lnRef idx="2">
+            <a:schemeClr val="accent1">
+              <a:shade val="50000"/>
+            </a:schemeClr>
+          </a:lnRef>
+          <a:fillRef idx="1">
+            <a:schemeClr val="accent1"/>
+          </a:fillRef>
+          <a:effectRef idx="0">
+            <a:schemeClr val="accent1"/>
+          </a:effectRef>
+          <a:fontRef idx="minor">
+            <a:schemeClr val="lt1"/>
+          </a:fontRef>
+        </p:style>
+        <p:txBody>
+          <a:bodyPr rot="0" spcFirstLastPara="0" vertOverflow="overflow" horzOverflow="overflow" vert="horz" wrap="square" lIns="91440" tIns="91440" rIns="91440" bIns="45720" numCol="1" spcCol="0" rtlCol="0" fromWordArt="0" anchor="ctr" anchorCtr="0" forceAA="0" compatLnSpc="1">
+            <a:prstTxWarp prst="textNoShape">
+              <a:avLst/>
+            </a:prstTxWarp>
+            <a:noAutofit/>
+          </a:bodyPr>
+          <a:lstStyle/>
+          <a:p>
+            <a:pPr algn="ctr"/>
+            <a:r>
+              <a:rPr lang="en-US" dirty="0">
+                <a:latin typeface="Roboto Condensed" pitchFamily="2" charset="0"/>
+                <a:ea typeface="Roboto Condensed" pitchFamily="2" charset="0"/>
+              </a:rPr>
+              <a:t>Graphical UI</a:t>
+            </a:r>
+            <a:endParaRPr lang="en-GB" dirty="0">
+              <a:latin typeface="Roboto Condensed" pitchFamily="2" charset="0"/>
+              <a:ea typeface="Roboto Condensed" pitchFamily="2" charset="0"/>
+            </a:endParaRPr>
+          </a:p>
+        </p:txBody>
+      </p:sp>
+      <p:cxnSp>
+        <p:nvCxnSpPr>
+          <p:cNvPr id="31" name="Straight Arrow Connector 30"/>
+          <p:cNvCxnSpPr>
+            <a:endCxn id="19" idx="1"/>
+          </p:cNvCxnSpPr>
+          <p:nvPr/>
+        </p:nvCxnSpPr>
+        <p:spPr>
+          <a:xfrm flipV="1">
+            <a:off x="5664588" y="4197204"/>
+            <a:ext cx="1285056" cy="2679"/>
+          </a:xfrm>
+          <a:prstGeom prst="straightConnector1">
+            <a:avLst/>
+          </a:prstGeom>
+          <a:ln w="25400">
             <a:solidFill>
-              <a:schemeClr val="accent6">
-                <a:lumMod val="60000"/>
-                <a:lumOff val="40000"/>
+              <a:schemeClr val="tx1">
+                <a:lumMod val="50000"/>
+                <a:lumOff val="50000"/>
               </a:schemeClr>
             </a:solidFill>
-            <a:ln>
-              <a:noFill/>
-            </a:ln>
-          </p:spPr>
-          <p:style>
-            <a:lnRef idx="2">
-              <a:schemeClr val="accent1">
-                <a:shade val="50000"/>
+            <a:prstDash val="solid"/>
+            <a:tailEnd type="arrow" w="med" len="med"/>
+          </a:ln>
+        </p:spPr>
+        <p:style>
+          <a:lnRef idx="1">
+            <a:schemeClr val="accent1"/>
+          </a:lnRef>
+          <a:fillRef idx="0">
+            <a:schemeClr val="accent1"/>
+          </a:fillRef>
+          <a:effectRef idx="0">
+            <a:schemeClr val="accent1"/>
+          </a:effectRef>
+          <a:fontRef idx="minor">
+            <a:schemeClr val="tx1"/>
+          </a:fontRef>
+        </p:style>
+      </p:cxnSp>
+      <p:cxnSp>
+        <p:nvCxnSpPr>
+          <p:cNvPr id="55" name="Straight Arrow Connector 54"/>
+          <p:cNvCxnSpPr>
+            <a:endCxn id="10" idx="1"/>
+          </p:cNvCxnSpPr>
+          <p:nvPr/>
+        </p:nvCxnSpPr>
+        <p:spPr>
+          <a:xfrm>
+            <a:off x="5664589" y="1884458"/>
+            <a:ext cx="424998" cy="0"/>
+          </a:xfrm>
+          <a:prstGeom prst="straightConnector1">
+            <a:avLst/>
+          </a:prstGeom>
+          <a:ln w="25400">
+            <a:solidFill>
+              <a:schemeClr val="tx1">
+                <a:lumMod val="50000"/>
+                <a:lumOff val="50000"/>
               </a:schemeClr>
-            </a:lnRef>
-            <a:fillRef idx="1">
-              <a:schemeClr val="accent1"/>
-            </a:fillRef>
-            <a:effectRef idx="0">
-              <a:schemeClr val="accent1"/>
-            </a:effectRef>
-            <a:fontRef idx="minor">
-              <a:schemeClr val="lt1"/>
-            </a:fontRef>
-          </p:style>
-          <p:txBody>
-            <a:bodyPr rot="0" spcFirstLastPara="0" vertOverflow="overflow" horzOverflow="overflow" vert="vert" wrap="square" lIns="91440" tIns="91440" rIns="91440" bIns="45720" numCol="1" spcCol="0" rtlCol="0" fromWordArt="0" anchor="ctr" anchorCtr="0" forceAA="0" compatLnSpc="1">
-              <a:prstTxWarp prst="textNoShape">
-                <a:avLst/>
-              </a:prstTxWarp>
-              <a:noAutofit/>
-            </a:bodyPr>
-            <a:lstStyle/>
-            <a:p>
-              <a:pPr algn="ctr"/>
-              <a:r>
-                <a:rPr lang="en-US" dirty="0">
-                  <a:latin typeface="Roboto Condensed" pitchFamily="2" charset="0"/>
-                  <a:ea typeface="Roboto Condensed" pitchFamily="2" charset="0"/>
-                </a:rPr>
-                <a:t>Graphical UI</a:t>
-              </a:r>
-              <a:endParaRPr lang="en-GB" dirty="0">
-                <a:latin typeface="Roboto Condensed" pitchFamily="2" charset="0"/>
-                <a:ea typeface="Roboto Condensed" pitchFamily="2" charset="0"/>
-              </a:endParaRPr>
-            </a:p>
-          </p:txBody>
-        </p:sp>
-        <p:cxnSp>
-          <p:nvCxnSpPr>
-            <p:cNvPr id="31" name="Straight Arrow Connector 30"/>
-            <p:cNvCxnSpPr>
-              <a:endCxn id="19" idx="1"/>
-            </p:cNvCxnSpPr>
-            <p:nvPr/>
-          </p:nvCxnSpPr>
-          <p:spPr>
-            <a:xfrm flipV="1">
-              <a:off x="5747170" y="4141319"/>
-              <a:ext cx="1285056" cy="2679"/>
-            </a:xfrm>
-            <a:prstGeom prst="straightConnector1">
-              <a:avLst/>
-            </a:prstGeom>
-            <a:ln w="25400">
-              <a:solidFill>
-                <a:schemeClr val="tx1">
-                  <a:lumMod val="50000"/>
-                  <a:lumOff val="50000"/>
-                </a:schemeClr>
-              </a:solidFill>
-              <a:prstDash val="solid"/>
-              <a:tailEnd type="arrow" w="med" len="med"/>
-            </a:ln>
-          </p:spPr>
-          <p:style>
-            <a:lnRef idx="1">
-              <a:schemeClr val="accent1"/>
-            </a:lnRef>
-            <a:fillRef idx="0">
-              <a:schemeClr val="accent1"/>
-            </a:fillRef>
-            <a:effectRef idx="0">
-              <a:schemeClr val="accent1"/>
-            </a:effectRef>
-            <a:fontRef idx="minor">
-              <a:schemeClr val="tx1"/>
-            </a:fontRef>
-          </p:style>
-        </p:cxnSp>
-        <p:cxnSp>
-          <p:nvCxnSpPr>
-            <p:cNvPr id="55" name="Straight Arrow Connector 54"/>
-            <p:cNvCxnSpPr>
-              <a:endCxn id="10" idx="1"/>
-            </p:cNvCxnSpPr>
-            <p:nvPr/>
-          </p:nvCxnSpPr>
-          <p:spPr>
-            <a:xfrm>
-              <a:off x="5747171" y="1828573"/>
-              <a:ext cx="424998" cy="0"/>
-            </a:xfrm>
-            <a:prstGeom prst="straightConnector1">
-              <a:avLst/>
-            </a:prstGeom>
-            <a:ln w="25400">
-              <a:solidFill>
-                <a:schemeClr val="tx1">
-                  <a:lumMod val="50000"/>
-                  <a:lumOff val="50000"/>
-                </a:schemeClr>
-              </a:solidFill>
-              <a:prstDash val="solid"/>
-              <a:tailEnd type="arrow" w="med" len="med"/>
-            </a:ln>
-          </p:spPr>
-          <p:style>
-            <a:lnRef idx="1">
-              <a:schemeClr val="accent1"/>
-            </a:lnRef>
-            <a:fillRef idx="0">
-              <a:schemeClr val="accent1"/>
-            </a:fillRef>
-            <a:effectRef idx="0">
-              <a:schemeClr val="accent1"/>
-            </a:effectRef>
-            <a:fontRef idx="minor">
-              <a:schemeClr val="tx1"/>
-            </a:fontRef>
-          </p:style>
-        </p:cxnSp>
-        <p:cxnSp>
-          <p:nvCxnSpPr>
-            <p:cNvPr id="59" name="Straight Arrow Connector 58"/>
-            <p:cNvCxnSpPr>
-              <a:stCxn id="10" idx="2"/>
-              <a:endCxn id="11" idx="0"/>
-            </p:cNvCxnSpPr>
-            <p:nvPr/>
-          </p:nvCxnSpPr>
-          <p:spPr>
-            <a:xfrm>
-              <a:off x="7239239" y="2208010"/>
-              <a:ext cx="430029" cy="852187"/>
-            </a:xfrm>
-            <a:prstGeom prst="straightConnector1">
-              <a:avLst/>
-            </a:prstGeom>
-            <a:ln w="25400">
-              <a:solidFill>
-                <a:schemeClr val="tx1">
-                  <a:lumMod val="50000"/>
-                  <a:lumOff val="50000"/>
-                </a:schemeClr>
-              </a:solidFill>
-              <a:prstDash val="solid"/>
-              <a:tailEnd type="arrow" w="med" len="med"/>
-            </a:ln>
-          </p:spPr>
-          <p:style>
-            <a:lnRef idx="1">
-              <a:schemeClr val="accent1"/>
-            </a:lnRef>
-            <a:fillRef idx="0">
-              <a:schemeClr val="accent1"/>
-            </a:fillRef>
-            <a:effectRef idx="0">
-              <a:schemeClr val="accent1"/>
-            </a:effectRef>
-            <a:fontRef idx="minor">
-              <a:schemeClr val="tx1"/>
-            </a:fontRef>
-          </p:style>
-        </p:cxnSp>
-        <p:sp>
-          <p:nvSpPr>
-            <p:cNvPr id="62" name="TextBox 61"/>
-            <p:cNvSpPr txBox="1"/>
-            <p:nvPr/>
-          </p:nvSpPr>
-          <p:spPr>
-            <a:xfrm rot="19978140">
-              <a:off x="7378559" y="2188994"/>
-              <a:ext cx="369332" cy="699872"/>
-            </a:xfrm>
-            <a:prstGeom prst="rect">
-              <a:avLst/>
-            </a:prstGeom>
-            <a:noFill/>
-          </p:spPr>
-          <p:txBody>
-            <a:bodyPr vert="vert" wrap="none" rtlCol="0">
-              <a:spAutoFit/>
-            </a:bodyPr>
-            <a:lstStyle/>
-            <a:p>
-              <a:r>
-                <a:rPr lang="en-US" sz="1200" dirty="0">
-                  <a:solidFill>
-                    <a:schemeClr val="tx1">
-                      <a:lumMod val="50000"/>
-                      <a:lumOff val="50000"/>
-                    </a:schemeClr>
-                  </a:solidFill>
-                  <a:latin typeface="Roboto Condensed" pitchFamily="2" charset="0"/>
-                  <a:ea typeface="Roboto Condensed" pitchFamily="2" charset="0"/>
-                </a:rPr>
-                <a:t>creates </a:t>
-              </a:r>
-              <a:r>
-                <a:rPr lang="en-GB" sz="1200" dirty="0">
-                  <a:solidFill>
-                    <a:schemeClr val="tx1">
-                      <a:lumMod val="50000"/>
-                      <a:lumOff val="50000"/>
-                    </a:schemeClr>
-                  </a:solidFill>
-                  <a:latin typeface="Roboto Condensed" pitchFamily="2" charset="0"/>
-                  <a:ea typeface="Roboto Condensed" pitchFamily="2" charset="0"/>
-                </a:rPr>
-                <a:t>►</a:t>
-              </a:r>
-            </a:p>
-          </p:txBody>
-        </p:sp>
-        <p:cxnSp>
-          <p:nvCxnSpPr>
-            <p:cNvPr id="71" name="Straight Arrow Connector 70"/>
-            <p:cNvCxnSpPr>
-              <a:endCxn id="11" idx="1"/>
-            </p:cNvCxnSpPr>
-            <p:nvPr/>
-          </p:nvCxnSpPr>
-          <p:spPr>
-            <a:xfrm>
-              <a:off x="5747170" y="3334516"/>
-              <a:ext cx="1285057" cy="0"/>
-            </a:xfrm>
-            <a:prstGeom prst="straightConnector1">
-              <a:avLst/>
-            </a:prstGeom>
-            <a:ln w="25400">
-              <a:solidFill>
-                <a:schemeClr val="tx1">
-                  <a:lumMod val="50000"/>
-                  <a:lumOff val="50000"/>
-                </a:schemeClr>
-              </a:solidFill>
-              <a:prstDash val="solid"/>
-              <a:tailEnd type="arrow" w="med" len="med"/>
-            </a:ln>
-          </p:spPr>
-          <p:style>
-            <a:lnRef idx="1">
-              <a:schemeClr val="accent1"/>
-            </a:lnRef>
-            <a:fillRef idx="0">
-              <a:schemeClr val="accent1"/>
-            </a:fillRef>
-            <a:effectRef idx="0">
-              <a:schemeClr val="accent1"/>
-            </a:effectRef>
-            <a:fontRef idx="minor">
-              <a:schemeClr val="tx1"/>
-            </a:fontRef>
-          </p:style>
-        </p:cxnSp>
-        <p:sp>
-          <p:nvSpPr>
-            <p:cNvPr id="73" name="TextBox 72"/>
-            <p:cNvSpPr txBox="1"/>
-            <p:nvPr/>
-          </p:nvSpPr>
-          <p:spPr>
-            <a:xfrm rot="16200000">
-              <a:off x="6201838" y="2800492"/>
-              <a:ext cx="369332" cy="788036"/>
-            </a:xfrm>
-            <a:prstGeom prst="rect">
-              <a:avLst/>
-            </a:prstGeom>
-            <a:noFill/>
-          </p:spPr>
-          <p:txBody>
-            <a:bodyPr vert="vert" wrap="none" rtlCol="0">
-              <a:spAutoFit/>
-            </a:bodyPr>
-            <a:lstStyle/>
-            <a:p>
-              <a:r>
-                <a:rPr lang="en-US" sz="1200" dirty="0">
-                  <a:solidFill>
-                    <a:schemeClr val="tx1">
-                      <a:lumMod val="50000"/>
-                      <a:lumOff val="50000"/>
-                    </a:schemeClr>
-                  </a:solidFill>
-                  <a:latin typeface="Roboto Condensed" pitchFamily="2" charset="0"/>
-                  <a:ea typeface="Roboto Condensed" pitchFamily="2" charset="0"/>
-                </a:rPr>
-                <a:t>executes </a:t>
-              </a:r>
-              <a:r>
-                <a:rPr lang="en-GB" sz="1200" dirty="0">
-                  <a:solidFill>
-                    <a:schemeClr val="tx1">
-                      <a:lumMod val="50000"/>
-                      <a:lumOff val="50000"/>
-                    </a:schemeClr>
-                  </a:solidFill>
-                  <a:latin typeface="Roboto Condensed" pitchFamily="2" charset="0"/>
-                  <a:ea typeface="Roboto Condensed" pitchFamily="2" charset="0"/>
-                </a:rPr>
-                <a:t>►</a:t>
-              </a:r>
-            </a:p>
-          </p:txBody>
-        </p:sp>
-        <p:sp>
-          <p:nvSpPr>
-            <p:cNvPr id="74" name="TextBox 73"/>
-            <p:cNvSpPr txBox="1"/>
-            <p:nvPr/>
-          </p:nvSpPr>
-          <p:spPr>
-            <a:xfrm>
-              <a:off x="5921458" y="1495906"/>
-              <a:ext cx="338554" cy="276999"/>
-            </a:xfrm>
-            <a:prstGeom prst="rect">
-              <a:avLst/>
-            </a:prstGeom>
-            <a:noFill/>
-          </p:spPr>
-          <p:txBody>
-            <a:bodyPr wrap="square" rtlCol="0">
-              <a:spAutoFit/>
-            </a:bodyPr>
-            <a:lstStyle/>
-            <a:p>
-              <a:r>
-                <a:rPr lang="en-US" sz="1200" dirty="0">
-                  <a:solidFill>
-                    <a:schemeClr val="tx1">
-                      <a:lumMod val="50000"/>
-                      <a:lumOff val="50000"/>
-                    </a:schemeClr>
-                  </a:solidFill>
-                  <a:latin typeface="Roboto Condensed" pitchFamily="2" charset="0"/>
-                  <a:ea typeface="Roboto Condensed" pitchFamily="2" charset="0"/>
-                </a:rPr>
-                <a:t>1</a:t>
-              </a:r>
-              <a:endParaRPr lang="en-GB" sz="1200" dirty="0">
+            </a:solidFill>
+            <a:prstDash val="solid"/>
+            <a:tailEnd type="arrow" w="med" len="med"/>
+          </a:ln>
+        </p:spPr>
+        <p:style>
+          <a:lnRef idx="1">
+            <a:schemeClr val="accent1"/>
+          </a:lnRef>
+          <a:fillRef idx="0">
+            <a:schemeClr val="accent1"/>
+          </a:fillRef>
+          <a:effectRef idx="0">
+            <a:schemeClr val="accent1"/>
+          </a:effectRef>
+          <a:fontRef idx="minor">
+            <a:schemeClr val="tx1"/>
+          </a:fontRef>
+        </p:style>
+      </p:cxnSp>
+      <p:cxnSp>
+        <p:nvCxnSpPr>
+          <p:cNvPr id="59" name="Straight Arrow Connector 58"/>
+          <p:cNvCxnSpPr>
+            <a:stCxn id="10" idx="2"/>
+            <a:endCxn id="11" idx="0"/>
+          </p:cNvCxnSpPr>
+          <p:nvPr/>
+        </p:nvCxnSpPr>
+        <p:spPr>
+          <a:xfrm>
+            <a:off x="7156657" y="2263895"/>
+            <a:ext cx="430029" cy="852187"/>
+          </a:xfrm>
+          <a:prstGeom prst="straightConnector1">
+            <a:avLst/>
+          </a:prstGeom>
+          <a:ln w="25400">
+            <a:solidFill>
+              <a:schemeClr val="tx1">
+                <a:lumMod val="50000"/>
+                <a:lumOff val="50000"/>
+              </a:schemeClr>
+            </a:solidFill>
+            <a:prstDash val="solid"/>
+            <a:tailEnd type="arrow" w="med" len="med"/>
+          </a:ln>
+        </p:spPr>
+        <p:style>
+          <a:lnRef idx="1">
+            <a:schemeClr val="accent1"/>
+          </a:lnRef>
+          <a:fillRef idx="0">
+            <a:schemeClr val="accent1"/>
+          </a:fillRef>
+          <a:effectRef idx="0">
+            <a:schemeClr val="accent1"/>
+          </a:effectRef>
+          <a:fontRef idx="minor">
+            <a:schemeClr val="tx1"/>
+          </a:fontRef>
+        </p:style>
+      </p:cxnSp>
+      <p:sp>
+        <p:nvSpPr>
+          <p:cNvPr id="62" name="TextBox 61"/>
+          <p:cNvSpPr txBox="1"/>
+          <p:nvPr/>
+        </p:nvSpPr>
+        <p:spPr>
+          <a:xfrm rot="19978140">
+            <a:off x="7295977" y="2244879"/>
+            <a:ext cx="369332" cy="699872"/>
+          </a:xfrm>
+          <a:prstGeom prst="rect">
+            <a:avLst/>
+          </a:prstGeom>
+          <a:noFill/>
+        </p:spPr>
+        <p:txBody>
+          <a:bodyPr vert="vert" wrap="none" rtlCol="0">
+            <a:spAutoFit/>
+          </a:bodyPr>
+          <a:lstStyle/>
+          <a:p>
+            <a:r>
+              <a:rPr lang="en-US" sz="1200" dirty="0">
                 <a:solidFill>
                   <a:schemeClr val="tx1">
                     <a:lumMod val="50000"/>
@@ -8478,46 +8287,11 @@
                 </a:solidFill>
                 <a:latin typeface="Roboto Condensed" pitchFamily="2" charset="0"/>
                 <a:ea typeface="Roboto Condensed" pitchFamily="2" charset="0"/>
-              </a:endParaRPr>
-            </a:p>
-          </p:txBody>
-        </p:sp>
-        <p:sp>
-          <p:nvSpPr>
-            <p:cNvPr id="75" name="TextBox 74"/>
-            <p:cNvSpPr txBox="1"/>
-            <p:nvPr/>
-          </p:nvSpPr>
-          <p:spPr>
-            <a:xfrm>
-              <a:off x="6794276" y="3833999"/>
-              <a:ext cx="338554" cy="276999"/>
-            </a:xfrm>
-            <a:prstGeom prst="rect">
-              <a:avLst/>
-            </a:prstGeom>
-            <a:noFill/>
-          </p:spPr>
-          <p:txBody>
-            <a:bodyPr wrap="square" rtlCol="0">
-              <a:spAutoFit/>
-            </a:bodyPr>
-            <a:lstStyle/>
-            <a:p>
-              <a:r>
-                <a:rPr lang="en-US" sz="1200" dirty="0">
-                  <a:solidFill>
-                    <a:schemeClr val="tx1">
-                      <a:lumMod val="50000"/>
-                      <a:lumOff val="50000"/>
-                    </a:schemeClr>
-                  </a:solidFill>
-                  <a:latin typeface="Roboto Condensed" pitchFamily="2" charset="0"/>
-                  <a:ea typeface="Roboto Condensed" pitchFamily="2" charset="0"/>
-                </a:rPr>
-                <a:t>1</a:t>
-              </a:r>
-              <a:endParaRPr lang="en-GB" sz="1200" dirty="0">
+              </a:rPr>
+              <a:t>creates </a:t>
+            </a:r>
+            <a:r>
+              <a:rPr lang="en-GB" sz="1200" dirty="0">
                 <a:solidFill>
                   <a:schemeClr val="tx1">
                     <a:lumMod val="50000"/>
@@ -8526,46 +8300,78 @@
                 </a:solidFill>
                 <a:latin typeface="Roboto Condensed" pitchFamily="2" charset="0"/>
                 <a:ea typeface="Roboto Condensed" pitchFamily="2" charset="0"/>
-              </a:endParaRPr>
-            </a:p>
-          </p:txBody>
-        </p:sp>
-        <p:sp>
-          <p:nvSpPr>
-            <p:cNvPr id="81" name="TextBox 80"/>
-            <p:cNvSpPr txBox="1"/>
-            <p:nvPr/>
-          </p:nvSpPr>
-          <p:spPr>
-            <a:xfrm>
-              <a:off x="7643762" y="2785483"/>
-              <a:ext cx="338554" cy="369332"/>
-            </a:xfrm>
-            <a:prstGeom prst="rect">
-              <a:avLst/>
-            </a:prstGeom>
-            <a:noFill/>
-          </p:spPr>
-          <p:txBody>
-            <a:bodyPr wrap="square" rtlCol="0">
-              <a:spAutoFit/>
-            </a:bodyPr>
-            <a:lstStyle/>
-            <a:p>
-              <a:r>
-                <a:rPr lang="en-US" dirty="0">
-                  <a:solidFill>
-                    <a:schemeClr val="tx1">
-                      <a:lumMod val="50000"/>
-                      <a:lumOff val="50000"/>
-                    </a:schemeClr>
-                  </a:solidFill>
-                  <a:latin typeface="Roboto Condensed" pitchFamily="2" charset="0"/>
-                  <a:ea typeface="Roboto Condensed" pitchFamily="2" charset="0"/>
-                </a:rPr>
-                <a:t>*</a:t>
-              </a:r>
-              <a:endParaRPr lang="en-GB" dirty="0">
+              </a:rPr>
+              <a:t>►</a:t>
+            </a:r>
+          </a:p>
+        </p:txBody>
+      </p:sp>
+      <p:cxnSp>
+        <p:nvCxnSpPr>
+          <p:cNvPr id="71" name="Straight Arrow Connector 70"/>
+          <p:cNvCxnSpPr>
+            <a:endCxn id="11" idx="1"/>
+          </p:cNvCxnSpPr>
+          <p:nvPr/>
+        </p:nvCxnSpPr>
+        <p:spPr>
+          <a:xfrm>
+            <a:off x="5664588" y="3390401"/>
+            <a:ext cx="1285057" cy="0"/>
+          </a:xfrm>
+          <a:prstGeom prst="straightConnector1">
+            <a:avLst/>
+          </a:prstGeom>
+          <a:ln w="25400">
+            <a:solidFill>
+              <a:schemeClr val="tx1">
+                <a:lumMod val="50000"/>
+                <a:lumOff val="50000"/>
+              </a:schemeClr>
+            </a:solidFill>
+            <a:prstDash val="solid"/>
+            <a:tailEnd type="arrow" w="med" len="med"/>
+          </a:ln>
+        </p:spPr>
+        <p:style>
+          <a:lnRef idx="1">
+            <a:schemeClr val="accent1"/>
+          </a:lnRef>
+          <a:fillRef idx="0">
+            <a:schemeClr val="accent1"/>
+          </a:fillRef>
+          <a:effectRef idx="0">
+            <a:schemeClr val="accent1"/>
+          </a:effectRef>
+          <a:fontRef idx="minor">
+            <a:schemeClr val="tx1"/>
+          </a:fontRef>
+        </p:style>
+      </p:cxnSp>
+      <p:sp>
+        <p:nvSpPr>
+          <p:cNvPr id="73" name="TextBox 72"/>
+          <p:cNvSpPr txBox="1"/>
+          <p:nvPr/>
+        </p:nvSpPr>
+        <p:spPr>
+          <a:xfrm rot="16200000">
+            <a:off x="6119256" y="2856377"/>
+            <a:ext cx="369332" cy="788036"/>
+          </a:xfrm>
+          <a:prstGeom prst="rect">
+            <a:avLst/>
+          </a:prstGeom>
+          <a:noFill/>
+        </p:spPr>
+        <p:txBody>
+          <a:bodyPr vert="vert" wrap="none" rtlCol="0">
+            <a:spAutoFit/>
+          </a:bodyPr>
+          <a:lstStyle/>
+          <a:p>
+            <a:r>
+              <a:rPr lang="en-US" sz="1200" dirty="0">
                 <a:solidFill>
                   <a:schemeClr val="tx1">
                     <a:lumMod val="50000"/>
@@ -8574,46 +8380,11 @@
                 </a:solidFill>
                 <a:latin typeface="Roboto Condensed" pitchFamily="2" charset="0"/>
                 <a:ea typeface="Roboto Condensed" pitchFamily="2" charset="0"/>
-              </a:endParaRPr>
-            </a:p>
-          </p:txBody>
-        </p:sp>
-        <p:sp>
-          <p:nvSpPr>
-            <p:cNvPr id="124" name="TextBox 123"/>
-            <p:cNvSpPr txBox="1"/>
-            <p:nvPr/>
-          </p:nvSpPr>
-          <p:spPr>
-            <a:xfrm>
-              <a:off x="6772185" y="3014811"/>
-              <a:ext cx="338554" cy="369332"/>
-            </a:xfrm>
-            <a:prstGeom prst="rect">
-              <a:avLst/>
-            </a:prstGeom>
-            <a:noFill/>
-          </p:spPr>
-          <p:txBody>
-            <a:bodyPr wrap="square" rtlCol="0">
-              <a:spAutoFit/>
-            </a:bodyPr>
-            <a:lstStyle/>
-            <a:p>
-              <a:r>
-                <a:rPr lang="en-US" dirty="0">
-                  <a:solidFill>
-                    <a:schemeClr val="tx1">
-                      <a:lumMod val="50000"/>
-                      <a:lumOff val="50000"/>
-                    </a:schemeClr>
-                  </a:solidFill>
-                  <a:latin typeface="Roboto Condensed" pitchFamily="2" charset="0"/>
-                  <a:ea typeface="Roboto Condensed" pitchFamily="2" charset="0"/>
-                </a:rPr>
-                <a:t>*</a:t>
-              </a:r>
-              <a:endParaRPr lang="en-GB" dirty="0">
+              </a:rPr>
+              <a:t>executes </a:t>
+            </a:r>
+            <a:r>
+              <a:rPr lang="en-GB" sz="1200" dirty="0">
                 <a:solidFill>
                   <a:schemeClr val="tx1">
                     <a:lumMod val="50000"/>
@@ -8622,74 +8393,256 @@
                 </a:solidFill>
                 <a:latin typeface="Roboto Condensed" pitchFamily="2" charset="0"/>
                 <a:ea typeface="Roboto Condensed" pitchFamily="2" charset="0"/>
-              </a:endParaRPr>
-            </a:p>
-          </p:txBody>
-        </p:sp>
-        <p:sp>
-          <p:nvSpPr>
-            <p:cNvPr id="7" name="Rectangle 6"/>
-            <p:cNvSpPr/>
-            <p:nvPr/>
-          </p:nvSpPr>
-          <p:spPr>
-            <a:xfrm>
-              <a:off x="3922087" y="1449137"/>
-              <a:ext cx="1828800" cy="2966502"/>
-            </a:xfrm>
-            <a:prstGeom prst="rect">
+              </a:rPr>
+              <a:t>►</a:t>
+            </a:r>
+          </a:p>
+        </p:txBody>
+      </p:sp>
+      <p:sp>
+        <p:nvSpPr>
+          <p:cNvPr id="74" name="TextBox 73"/>
+          <p:cNvSpPr txBox="1"/>
+          <p:nvPr/>
+        </p:nvSpPr>
+        <p:spPr>
+          <a:xfrm>
+            <a:off x="5838876" y="1551791"/>
+            <a:ext cx="338554" cy="276999"/>
+          </a:xfrm>
+          <a:prstGeom prst="rect">
+            <a:avLst/>
+          </a:prstGeom>
+          <a:noFill/>
+        </p:spPr>
+        <p:txBody>
+          <a:bodyPr wrap="square" rtlCol="0">
+            <a:spAutoFit/>
+          </a:bodyPr>
+          <a:lstStyle/>
+          <a:p>
+            <a:r>
+              <a:rPr lang="en-US" sz="1200" dirty="0">
+                <a:solidFill>
+                  <a:schemeClr val="tx1">
+                    <a:lumMod val="50000"/>
+                    <a:lumOff val="50000"/>
+                  </a:schemeClr>
+                </a:solidFill>
+                <a:latin typeface="Roboto Condensed" pitchFamily="2" charset="0"/>
+                <a:ea typeface="Roboto Condensed" pitchFamily="2" charset="0"/>
+              </a:rPr>
+              <a:t>1</a:t>
+            </a:r>
+            <a:endParaRPr lang="en-GB" sz="1200" dirty="0">
+              <a:solidFill>
+                <a:schemeClr val="tx1">
+                  <a:lumMod val="50000"/>
+                  <a:lumOff val="50000"/>
+                </a:schemeClr>
+              </a:solidFill>
+              <a:latin typeface="Roboto Condensed" pitchFamily="2" charset="0"/>
+              <a:ea typeface="Roboto Condensed" pitchFamily="2" charset="0"/>
+            </a:endParaRPr>
+          </a:p>
+        </p:txBody>
+      </p:sp>
+      <p:sp>
+        <p:nvSpPr>
+          <p:cNvPr id="75" name="TextBox 74"/>
+          <p:cNvSpPr txBox="1"/>
+          <p:nvPr/>
+        </p:nvSpPr>
+        <p:spPr>
+          <a:xfrm>
+            <a:off x="6711694" y="3889884"/>
+            <a:ext cx="338554" cy="276999"/>
+          </a:xfrm>
+          <a:prstGeom prst="rect">
+            <a:avLst/>
+          </a:prstGeom>
+          <a:noFill/>
+        </p:spPr>
+        <p:txBody>
+          <a:bodyPr wrap="square" rtlCol="0">
+            <a:spAutoFit/>
+          </a:bodyPr>
+          <a:lstStyle/>
+          <a:p>
+            <a:r>
+              <a:rPr lang="en-US" sz="1200" dirty="0">
+                <a:solidFill>
+                  <a:schemeClr val="tx1">
+                    <a:lumMod val="50000"/>
+                    <a:lumOff val="50000"/>
+                  </a:schemeClr>
+                </a:solidFill>
+                <a:latin typeface="Roboto Condensed" pitchFamily="2" charset="0"/>
+                <a:ea typeface="Roboto Condensed" pitchFamily="2" charset="0"/>
+              </a:rPr>
+              <a:t>1</a:t>
+            </a:r>
+            <a:endParaRPr lang="en-GB" sz="1200" dirty="0">
+              <a:solidFill>
+                <a:schemeClr val="tx1">
+                  <a:lumMod val="50000"/>
+                  <a:lumOff val="50000"/>
+                </a:schemeClr>
+              </a:solidFill>
+              <a:latin typeface="Roboto Condensed" pitchFamily="2" charset="0"/>
+              <a:ea typeface="Roboto Condensed" pitchFamily="2" charset="0"/>
+            </a:endParaRPr>
+          </a:p>
+        </p:txBody>
+      </p:sp>
+      <p:sp>
+        <p:nvSpPr>
+          <p:cNvPr id="81" name="TextBox 80"/>
+          <p:cNvSpPr txBox="1"/>
+          <p:nvPr/>
+        </p:nvSpPr>
+        <p:spPr>
+          <a:xfrm>
+            <a:off x="7561180" y="2841368"/>
+            <a:ext cx="338554" cy="369332"/>
+          </a:xfrm>
+          <a:prstGeom prst="rect">
+            <a:avLst/>
+          </a:prstGeom>
+          <a:noFill/>
+        </p:spPr>
+        <p:txBody>
+          <a:bodyPr wrap="square" rtlCol="0">
+            <a:spAutoFit/>
+          </a:bodyPr>
+          <a:lstStyle/>
+          <a:p>
+            <a:r>
+              <a:rPr lang="en-US" dirty="0">
+                <a:solidFill>
+                  <a:schemeClr val="tx1">
+                    <a:lumMod val="50000"/>
+                    <a:lumOff val="50000"/>
+                  </a:schemeClr>
+                </a:solidFill>
+                <a:latin typeface="Roboto Condensed" pitchFamily="2" charset="0"/>
+                <a:ea typeface="Roboto Condensed" pitchFamily="2" charset="0"/>
+              </a:rPr>
+              <a:t>*</a:t>
+            </a:r>
+            <a:endParaRPr lang="en-GB" dirty="0">
+              <a:solidFill>
+                <a:schemeClr val="tx1">
+                  <a:lumMod val="50000"/>
+                  <a:lumOff val="50000"/>
+                </a:schemeClr>
+              </a:solidFill>
+              <a:latin typeface="Roboto Condensed" pitchFamily="2" charset="0"/>
+              <a:ea typeface="Roboto Condensed" pitchFamily="2" charset="0"/>
+            </a:endParaRPr>
+          </a:p>
+        </p:txBody>
+      </p:sp>
+      <p:sp>
+        <p:nvSpPr>
+          <p:cNvPr id="124" name="TextBox 123"/>
+          <p:cNvSpPr txBox="1"/>
+          <p:nvPr/>
+        </p:nvSpPr>
+        <p:spPr>
+          <a:xfrm>
+            <a:off x="6689603" y="3070696"/>
+            <a:ext cx="338554" cy="369332"/>
+          </a:xfrm>
+          <a:prstGeom prst="rect">
+            <a:avLst/>
+          </a:prstGeom>
+          <a:noFill/>
+        </p:spPr>
+        <p:txBody>
+          <a:bodyPr wrap="square" rtlCol="0">
+            <a:spAutoFit/>
+          </a:bodyPr>
+          <a:lstStyle/>
+          <a:p>
+            <a:r>
+              <a:rPr lang="en-US" dirty="0">
+                <a:solidFill>
+                  <a:schemeClr val="tx1">
+                    <a:lumMod val="50000"/>
+                    <a:lumOff val="50000"/>
+                  </a:schemeClr>
+                </a:solidFill>
+                <a:latin typeface="Roboto Condensed" pitchFamily="2" charset="0"/>
+                <a:ea typeface="Roboto Condensed" pitchFamily="2" charset="0"/>
+              </a:rPr>
+              <a:t>*</a:t>
+            </a:r>
+            <a:endParaRPr lang="en-GB" dirty="0">
+              <a:solidFill>
+                <a:schemeClr val="tx1">
+                  <a:lumMod val="50000"/>
+                  <a:lumOff val="50000"/>
+                </a:schemeClr>
+              </a:solidFill>
+              <a:latin typeface="Roboto Condensed" pitchFamily="2" charset="0"/>
+              <a:ea typeface="Roboto Condensed" pitchFamily="2" charset="0"/>
+            </a:endParaRPr>
+          </a:p>
+        </p:txBody>
+      </p:sp>
+      <p:sp>
+        <p:nvSpPr>
+          <p:cNvPr id="7" name="Rectangle 6"/>
+          <p:cNvSpPr/>
+          <p:nvPr/>
+        </p:nvSpPr>
+        <p:spPr>
+          <a:xfrm>
+            <a:off x="3839505" y="1505022"/>
+            <a:ext cx="1828800" cy="2966502"/>
+          </a:xfrm>
+          <a:prstGeom prst="rect">
+            <a:avLst/>
+          </a:prstGeom>
+          <a:solidFill>
+            <a:schemeClr val="accent5">
+              <a:lumMod val="40000"/>
+              <a:lumOff val="60000"/>
+            </a:schemeClr>
+          </a:solidFill>
+          <a:ln>
+            <a:noFill/>
+          </a:ln>
+        </p:spPr>
+        <p:style>
+          <a:lnRef idx="2">
+            <a:schemeClr val="accent1">
+              <a:shade val="50000"/>
+            </a:schemeClr>
+          </a:lnRef>
+          <a:fillRef idx="1">
+            <a:schemeClr val="accent1"/>
+          </a:fillRef>
+          <a:effectRef idx="0">
+            <a:schemeClr val="accent1"/>
+          </a:effectRef>
+          <a:fontRef idx="minor">
+            <a:schemeClr val="lt1"/>
+          </a:fontRef>
+        </p:style>
+        <p:txBody>
+          <a:bodyPr rot="0" spcFirstLastPara="0" vertOverflow="overflow" horzOverflow="overflow" vert="horz" wrap="square" lIns="91440" tIns="45720" rIns="91440" bIns="45720" numCol="1" spcCol="0" rtlCol="0" fromWordArt="0" anchor="ctr" anchorCtr="0" forceAA="0" compatLnSpc="1">
+            <a:prstTxWarp prst="textNoShape">
               <a:avLst/>
-            </a:prstGeom>
-            <a:solidFill>
-              <a:schemeClr val="accent5">
-                <a:lumMod val="40000"/>
-                <a:lumOff val="60000"/>
-              </a:schemeClr>
-            </a:solidFill>
-            <a:ln>
-              <a:noFill/>
-            </a:ln>
-          </p:spPr>
-          <p:style>
-            <a:lnRef idx="2">
-              <a:schemeClr val="accent1">
-                <a:shade val="50000"/>
-              </a:schemeClr>
-            </a:lnRef>
-            <a:fillRef idx="1">
-              <a:schemeClr val="accent1"/>
-            </a:fillRef>
-            <a:effectRef idx="0">
-              <a:schemeClr val="accent1"/>
-            </a:effectRef>
-            <a:fontRef idx="minor">
-              <a:schemeClr val="lt1"/>
-            </a:fontRef>
-          </p:style>
-          <p:txBody>
-            <a:bodyPr rot="0" spcFirstLastPara="0" vertOverflow="overflow" horzOverflow="overflow" vert="horz" wrap="square" lIns="91440" tIns="45720" rIns="91440" bIns="45720" numCol="1" spcCol="0" rtlCol="0" fromWordArt="0" anchor="ctr" anchorCtr="0" forceAA="0" compatLnSpc="1">
-              <a:prstTxWarp prst="textNoShape">
-                <a:avLst/>
-              </a:prstTxWarp>
-              <a:noAutofit/>
-            </a:bodyPr>
-            <a:lstStyle/>
-            <a:p>
-              <a:pPr algn="ctr"/>
-              <a:r>
-                <a:rPr lang="en-US" dirty="0">
-                  <a:solidFill>
-                    <a:schemeClr val="tx1">
-                      <a:lumMod val="65000"/>
-                      <a:lumOff val="35000"/>
-                    </a:schemeClr>
-                  </a:solidFill>
-                  <a:latin typeface="Roboto" pitchFamily="2" charset="0"/>
-                  <a:ea typeface="Roboto" pitchFamily="2" charset="0"/>
-                </a:rPr>
-                <a:t>Logic</a:t>
-              </a:r>
-              <a:endParaRPr lang="en-GB" dirty="0">
+            </a:prstTxWarp>
+            <a:noAutofit/>
+          </a:bodyPr>
+          <a:lstStyle/>
+          <a:p>
+            <a:pPr algn="ctr"/>
+            <a:r>
+              <a:rPr lang="en-US" dirty="0">
                 <a:solidFill>
                   <a:schemeClr val="tx1">
                     <a:lumMod val="65000"/>
@@ -8698,155 +8651,271 @@
                 </a:solidFill>
                 <a:latin typeface="Roboto" pitchFamily="2" charset="0"/>
                 <a:ea typeface="Roboto" pitchFamily="2" charset="0"/>
-              </a:endParaRPr>
-            </a:p>
-          </p:txBody>
-        </p:sp>
-        <p:cxnSp>
-          <p:nvCxnSpPr>
-            <p:cNvPr id="77" name="Straight Arrow Connector 76"/>
-            <p:cNvCxnSpPr>
-              <a:stCxn id="29" idx="3"/>
-              <a:endCxn id="7" idx="1"/>
-            </p:cNvCxnSpPr>
-            <p:nvPr/>
-          </p:nvCxnSpPr>
-          <p:spPr>
-            <a:xfrm flipV="1">
-              <a:off x="3145548" y="2932388"/>
-              <a:ext cx="776539" cy="2177"/>
-            </a:xfrm>
-            <a:prstGeom prst="straightConnector1">
-              <a:avLst/>
-            </a:prstGeom>
-            <a:ln w="25400">
+              </a:rPr>
+              <a:t>Logic</a:t>
+            </a:r>
+            <a:endParaRPr lang="en-GB" dirty="0">
               <a:solidFill>
                 <a:schemeClr val="tx1">
-                  <a:lumMod val="50000"/>
-                  <a:lumOff val="50000"/>
+                  <a:lumMod val="65000"/>
+                  <a:lumOff val="35000"/>
                 </a:schemeClr>
               </a:solidFill>
-              <a:prstDash val="sysDash"/>
-              <a:tailEnd type="arrow" w="med" len="med"/>
-            </a:ln>
-          </p:spPr>
-          <p:style>
-            <a:lnRef idx="1">
-              <a:schemeClr val="accent1"/>
-            </a:lnRef>
-            <a:fillRef idx="0">
-              <a:schemeClr val="accent1"/>
-            </a:fillRef>
-            <a:effectRef idx="0">
-              <a:schemeClr val="accent1"/>
-            </a:effectRef>
-            <a:fontRef idx="minor">
-              <a:schemeClr val="tx1"/>
-            </a:fontRef>
-          </p:style>
-        </p:cxnSp>
-        <p:sp>
-          <p:nvSpPr>
-            <p:cNvPr id="53" name="Rounded Rectangle 52"/>
-            <p:cNvSpPr/>
-            <p:nvPr/>
-          </p:nvSpPr>
-          <p:spPr>
-            <a:xfrm>
-              <a:off x="3380245" y="5175919"/>
-              <a:ext cx="2917799" cy="767213"/>
-            </a:xfrm>
-            <a:prstGeom prst="roundRect">
-              <a:avLst>
-                <a:gd name="adj" fmla="val 11057"/>
-              </a:avLst>
-            </a:prstGeom>
+              <a:latin typeface="Roboto" pitchFamily="2" charset="0"/>
+              <a:ea typeface="Roboto" pitchFamily="2" charset="0"/>
+            </a:endParaRPr>
+          </a:p>
+        </p:txBody>
+      </p:sp>
+      <p:cxnSp>
+        <p:nvCxnSpPr>
+          <p:cNvPr id="77" name="Straight Arrow Connector 76"/>
+          <p:cNvCxnSpPr>
+            <a:stCxn id="29" idx="3"/>
+          </p:cNvCxnSpPr>
+          <p:nvPr/>
+        </p:nvCxnSpPr>
+        <p:spPr>
+          <a:xfrm>
+            <a:off x="3011055" y="2045023"/>
+            <a:ext cx="828450" cy="0"/>
+          </a:xfrm>
+          <a:prstGeom prst="straightConnector1">
+            <a:avLst/>
+          </a:prstGeom>
+          <a:ln w="25400">
             <a:solidFill>
-              <a:srgbClr val="BF94E0"/>
+              <a:schemeClr val="tx1">
+                <a:lumMod val="50000"/>
+                <a:lumOff val="50000"/>
+              </a:schemeClr>
             </a:solidFill>
-            <a:ln>
-              <a:noFill/>
-            </a:ln>
-          </p:spPr>
-          <p:style>
-            <a:lnRef idx="2">
-              <a:schemeClr val="accent1">
-                <a:shade val="50000"/>
-              </a:schemeClr>
-            </a:lnRef>
-            <a:fillRef idx="1">
-              <a:schemeClr val="accent1"/>
-            </a:fillRef>
-            <a:effectRef idx="0">
-              <a:schemeClr val="accent1"/>
-            </a:effectRef>
-            <a:fontRef idx="minor">
-              <a:schemeClr val="lt1"/>
-            </a:fontRef>
-          </p:style>
-          <p:txBody>
-            <a:bodyPr rtlCol="0" anchor="ctr" anchorCtr="0"/>
-            <a:lstStyle/>
-            <a:p>
-              <a:pPr algn="ctr"/>
-              <a:r>
-                <a:rPr lang="en-US" dirty="0" smtClean="0">
-                  <a:latin typeface="Roboto Condensed" pitchFamily="2" charset="0"/>
-                  <a:ea typeface="Roboto Condensed" pitchFamily="2" charset="0"/>
-                </a:rPr>
-                <a:t>Data</a:t>
-              </a:r>
-              <a:endParaRPr lang="en-GB" dirty="0">
+            <a:prstDash val="sysDash"/>
+            <a:tailEnd type="arrow" w="med" len="med"/>
+          </a:ln>
+        </p:spPr>
+        <p:style>
+          <a:lnRef idx="1">
+            <a:schemeClr val="accent1"/>
+          </a:lnRef>
+          <a:fillRef idx="0">
+            <a:schemeClr val="accent1"/>
+          </a:fillRef>
+          <a:effectRef idx="0">
+            <a:schemeClr val="accent1"/>
+          </a:effectRef>
+          <a:fontRef idx="minor">
+            <a:schemeClr val="tx1"/>
+          </a:fontRef>
+        </p:style>
+      </p:cxnSp>
+      <p:sp>
+        <p:nvSpPr>
+          <p:cNvPr id="53" name="Rounded Rectangle 52"/>
+          <p:cNvSpPr/>
+          <p:nvPr/>
+        </p:nvSpPr>
+        <p:spPr>
+          <a:xfrm>
+            <a:off x="3297663" y="5231804"/>
+            <a:ext cx="2917799" cy="767213"/>
+          </a:xfrm>
+          <a:prstGeom prst="roundRect">
+            <a:avLst>
+              <a:gd name="adj" fmla="val 11057"/>
+            </a:avLst>
+          </a:prstGeom>
+          <a:solidFill>
+            <a:srgbClr val="BF94E0"/>
+          </a:solidFill>
+          <a:ln>
+            <a:noFill/>
+          </a:ln>
+        </p:spPr>
+        <p:style>
+          <a:lnRef idx="2">
+            <a:schemeClr val="accent1">
+              <a:shade val="50000"/>
+            </a:schemeClr>
+          </a:lnRef>
+          <a:fillRef idx="1">
+            <a:schemeClr val="accent1"/>
+          </a:fillRef>
+          <a:effectRef idx="0">
+            <a:schemeClr val="accent1"/>
+          </a:effectRef>
+          <a:fontRef idx="minor">
+            <a:schemeClr val="lt1"/>
+          </a:fontRef>
+        </p:style>
+        <p:txBody>
+          <a:bodyPr rtlCol="0" anchor="ctr" anchorCtr="0"/>
+          <a:lstStyle/>
+          <a:p>
+            <a:pPr algn="ctr"/>
+            <a:r>
+              <a:rPr lang="en-US" dirty="0" smtClean="0">
                 <a:latin typeface="Roboto Condensed" pitchFamily="2" charset="0"/>
                 <a:ea typeface="Roboto Condensed" pitchFamily="2" charset="0"/>
-              </a:endParaRPr>
-            </a:p>
-          </p:txBody>
-        </p:sp>
-        <p:cxnSp>
-          <p:nvCxnSpPr>
-            <p:cNvPr id="60" name="Straight Arrow Connector 59"/>
-            <p:cNvCxnSpPr>
-              <a:stCxn id="7" idx="2"/>
-              <a:endCxn id="53" idx="0"/>
-            </p:cNvCxnSpPr>
-            <p:nvPr/>
-          </p:nvCxnSpPr>
-          <p:spPr>
-            <a:xfrm>
-              <a:off x="4836487" y="4415639"/>
-              <a:ext cx="2658" cy="760280"/>
-            </a:xfrm>
-            <a:prstGeom prst="straightConnector1">
+              </a:rPr>
+              <a:t>Data</a:t>
+            </a:r>
+            <a:endParaRPr lang="en-GB" dirty="0">
+              <a:latin typeface="Roboto Condensed" pitchFamily="2" charset="0"/>
+              <a:ea typeface="Roboto Condensed" pitchFamily="2" charset="0"/>
+            </a:endParaRPr>
+          </a:p>
+        </p:txBody>
+      </p:sp>
+      <p:cxnSp>
+        <p:nvCxnSpPr>
+          <p:cNvPr id="60" name="Straight Arrow Connector 59"/>
+          <p:cNvCxnSpPr>
+            <a:stCxn id="7" idx="2"/>
+            <a:endCxn id="53" idx="0"/>
+          </p:cNvCxnSpPr>
+          <p:nvPr/>
+        </p:nvCxnSpPr>
+        <p:spPr>
+          <a:xfrm>
+            <a:off x="4753905" y="4471524"/>
+            <a:ext cx="2658" cy="760280"/>
+          </a:xfrm>
+          <a:prstGeom prst="straightConnector1">
+            <a:avLst/>
+          </a:prstGeom>
+          <a:ln w="25400">
+            <a:solidFill>
+              <a:schemeClr val="tx1">
+                <a:lumMod val="50000"/>
+                <a:lumOff val="50000"/>
+              </a:schemeClr>
+            </a:solidFill>
+            <a:prstDash val="sysDash"/>
+            <a:tailEnd type="arrow" w="med" len="med"/>
+          </a:ln>
+        </p:spPr>
+        <p:style>
+          <a:lnRef idx="1">
+            <a:schemeClr val="accent1"/>
+          </a:lnRef>
+          <a:fillRef idx="0">
+            <a:schemeClr val="accent1"/>
+          </a:fillRef>
+          <a:effectRef idx="0">
+            <a:schemeClr val="accent1"/>
+          </a:effectRef>
+          <a:fontRef idx="minor">
+            <a:schemeClr val="tx1"/>
+          </a:fontRef>
+        </p:style>
+      </p:cxnSp>
+      <p:sp>
+        <p:nvSpPr>
+          <p:cNvPr id="32" name="Rounded Rectangle 31"/>
+          <p:cNvSpPr/>
+          <p:nvPr/>
+        </p:nvSpPr>
+        <p:spPr>
+          <a:xfrm>
+            <a:off x="1489319" y="3303697"/>
+            <a:ext cx="1521736" cy="1153277"/>
+          </a:xfrm>
+          <a:prstGeom prst="roundRect">
+            <a:avLst>
+              <a:gd name="adj" fmla="val 21095"/>
+            </a:avLst>
+          </a:prstGeom>
+          <a:solidFill>
+            <a:schemeClr val="accent2">
+              <a:lumMod val="60000"/>
+              <a:lumOff val="40000"/>
+            </a:schemeClr>
+          </a:solidFill>
+          <a:ln>
+            <a:noFill/>
+          </a:ln>
+        </p:spPr>
+        <p:style>
+          <a:lnRef idx="2">
+            <a:schemeClr val="accent1">
+              <a:shade val="50000"/>
+            </a:schemeClr>
+          </a:lnRef>
+          <a:fillRef idx="1">
+            <a:schemeClr val="accent1"/>
+          </a:fillRef>
+          <a:effectRef idx="0">
+            <a:schemeClr val="accent1"/>
+          </a:effectRef>
+          <a:fontRef idx="minor">
+            <a:schemeClr val="lt1"/>
+          </a:fontRef>
+        </p:style>
+        <p:txBody>
+          <a:bodyPr rot="0" spcFirstLastPara="0" vertOverflow="overflow" horzOverflow="overflow" vert="horz" wrap="square" lIns="91440" tIns="45720" rIns="91440" bIns="45720" numCol="1" spcCol="0" rtlCol="0" fromWordArt="0" anchor="ctr" anchorCtr="0" forceAA="0" compatLnSpc="1">
+            <a:prstTxWarp prst="textNoShape">
               <a:avLst/>
-            </a:prstGeom>
-            <a:ln w="25400">
-              <a:solidFill>
-                <a:schemeClr val="tx1">
-                  <a:lumMod val="50000"/>
-                  <a:lumOff val="50000"/>
-                </a:schemeClr>
-              </a:solidFill>
-              <a:prstDash val="sysDash"/>
-              <a:tailEnd type="arrow" w="med" len="med"/>
-            </a:ln>
-          </p:spPr>
-          <p:style>
-            <a:lnRef idx="1">
-              <a:schemeClr val="accent1"/>
-            </a:lnRef>
-            <a:fillRef idx="0">
-              <a:schemeClr val="accent1"/>
-            </a:fillRef>
-            <a:effectRef idx="0">
-              <a:schemeClr val="accent1"/>
-            </a:effectRef>
-            <a:fontRef idx="minor">
-              <a:schemeClr val="tx1"/>
-            </a:fontRef>
-          </p:style>
-        </p:cxnSp>
-      </p:grpSp>
+            </a:prstTxWarp>
+            <a:noAutofit/>
+          </a:bodyPr>
+          <a:lstStyle/>
+          <a:p>
+            <a:pPr algn="ctr"/>
+            <a:r>
+              <a:rPr lang="en-US" dirty="0">
+                <a:latin typeface="Roboto Condensed" pitchFamily="2" charset="0"/>
+                <a:ea typeface="Roboto Condensed" pitchFamily="2" charset="0"/>
+              </a:rPr>
+              <a:t>Text UI</a:t>
+            </a:r>
+            <a:endParaRPr lang="en-GB" dirty="0">
+              <a:latin typeface="Roboto Condensed" pitchFamily="2" charset="0"/>
+              <a:ea typeface="Roboto Condensed" pitchFamily="2" charset="0"/>
+            </a:endParaRPr>
+          </a:p>
+        </p:txBody>
+      </p:sp>
+      <p:cxnSp>
+        <p:nvCxnSpPr>
+          <p:cNvPr id="36" name="Straight Arrow Connector 35"/>
+          <p:cNvCxnSpPr/>
+          <p:nvPr/>
+        </p:nvCxnSpPr>
+        <p:spPr>
+          <a:xfrm flipV="1">
+            <a:off x="3003997" y="3873632"/>
+            <a:ext cx="828450" cy="1"/>
+          </a:xfrm>
+          <a:prstGeom prst="straightConnector1">
+            <a:avLst/>
+          </a:prstGeom>
+          <a:ln w="25400">
+            <a:solidFill>
+              <a:schemeClr val="tx1">
+                <a:lumMod val="50000"/>
+                <a:lumOff val="50000"/>
+              </a:schemeClr>
+            </a:solidFill>
+            <a:prstDash val="sysDash"/>
+            <a:tailEnd type="arrow" w="med" len="med"/>
+          </a:ln>
+        </p:spPr>
+        <p:style>
+          <a:lnRef idx="1">
+            <a:schemeClr val="accent1"/>
+          </a:lnRef>
+          <a:fillRef idx="0">
+            <a:schemeClr val="accent1"/>
+          </a:fillRef>
+          <a:effectRef idx="0">
+            <a:schemeClr val="accent1"/>
+          </a:effectRef>
+          <a:fontRef idx="minor">
+            <a:schemeClr val="tx1"/>
+          </a:fontRef>
+        </p:style>
+      </p:cxnSp>
     </p:spTree>
     <p:extLst>
       <p:ext uri="{BB962C8B-B14F-4D97-AF65-F5344CB8AC3E}">
@@ -9542,21 +9611,7 @@
                 <a:latin typeface="Roboto Condensed" pitchFamily="2" charset="0"/>
                 <a:ea typeface="Roboto Condensed" pitchFamily="2" charset="0"/>
               </a:rPr>
-              <a:t>Figure </a:t>
-            </a:r>
-            <a:r>
-              <a:rPr lang="en-US" sz="1600" dirty="0" smtClean="0">
-                <a:latin typeface="Roboto Condensed" pitchFamily="2" charset="0"/>
-                <a:ea typeface="Roboto Condensed" pitchFamily="2" charset="0"/>
-              </a:rPr>
-              <a:t>5: </a:t>
-            </a:r>
-            <a:r>
-              <a:rPr lang="en-US" sz="1600" dirty="0" smtClean="0">
-                <a:latin typeface="Roboto Condensed" pitchFamily="2" charset="0"/>
-                <a:ea typeface="Roboto Condensed" pitchFamily="2" charset="0"/>
-              </a:rPr>
-              <a:t>Class diagram for Data component</a:t>
+              <a:t>Figure 5: Class diagram for Data component</a:t>
             </a:r>
             <a:endParaRPr lang="en-GB" sz="1600" dirty="0">
               <a:latin typeface="Roboto Condensed" pitchFamily="2" charset="0"/>

</xml_diff>

<commit_message>
Updated architecture diagram to show dependencies of UI with Data
</commit_message>
<xml_diff>
--- a/docs/Diagrams.pptx
+++ b/docs/Diagrams.pptx
@@ -3581,8 +3581,8 @@
         </p:nvSpPr>
         <p:spPr>
           <a:xfrm>
-            <a:off x="2546462" y="941130"/>
-            <a:ext cx="1828800" cy="1828800"/>
+            <a:off x="2279502" y="2828350"/>
+            <a:ext cx="1828800" cy="1408665"/>
           </a:xfrm>
           <a:prstGeom prst="roundRect">
             <a:avLst>
@@ -3647,7 +3647,7 @@
         </p:nvSpPr>
         <p:spPr>
           <a:xfrm>
-            <a:off x="2546462" y="3070112"/>
+            <a:off x="4351502" y="3167212"/>
             <a:ext cx="1828800" cy="730940"/>
           </a:xfrm>
           <a:prstGeom prst="roundRect">
@@ -3713,8 +3713,8 @@
         </p:nvSpPr>
         <p:spPr>
           <a:xfrm>
-            <a:off x="5120840" y="1536874"/>
-            <a:ext cx="3060474" cy="2048914"/>
+            <a:off x="5353712" y="966044"/>
+            <a:ext cx="2633083" cy="1658051"/>
           </a:xfrm>
           <a:prstGeom prst="roundRect">
             <a:avLst>
@@ -3779,7 +3779,7 @@
         </p:nvSpPr>
         <p:spPr>
           <a:xfrm>
-            <a:off x="2546462" y="4101294"/>
+            <a:off x="7415959" y="3031609"/>
             <a:ext cx="1828800" cy="1002145"/>
           </a:xfrm>
           <a:prstGeom prst="roundRect">
@@ -3834,90 +3834,420 @@
           </a:p>
         </p:txBody>
       </p:sp>
+      <p:cxnSp>
+        <p:nvCxnSpPr>
+          <p:cNvPr id="14" name="Straight Arrow Connector 13"/>
+          <p:cNvCxnSpPr>
+            <a:stCxn id="4" idx="0"/>
+            <a:endCxn id="6" idx="1"/>
+          </p:cNvCxnSpPr>
+          <p:nvPr/>
+        </p:nvCxnSpPr>
+        <p:spPr>
+          <a:xfrm flipV="1">
+            <a:off x="3193902" y="1795070"/>
+            <a:ext cx="2159810" cy="1033280"/>
+          </a:xfrm>
+          <a:prstGeom prst="straightConnector1">
+            <a:avLst/>
+          </a:prstGeom>
+          <a:ln w="25400">
+            <a:solidFill>
+              <a:schemeClr val="tx1">
+                <a:lumMod val="50000"/>
+                <a:lumOff val="50000"/>
+              </a:schemeClr>
+            </a:solidFill>
+            <a:prstDash val="sysDash"/>
+            <a:tailEnd type="arrow" w="med" len="med"/>
+          </a:ln>
+        </p:spPr>
+        <p:style>
+          <a:lnRef idx="1">
+            <a:schemeClr val="accent1"/>
+          </a:lnRef>
+          <a:fillRef idx="0">
+            <a:schemeClr val="accent1"/>
+          </a:fillRef>
+          <a:effectRef idx="0">
+            <a:schemeClr val="accent1"/>
+          </a:effectRef>
+          <a:fontRef idx="minor">
+            <a:schemeClr val="tx1"/>
+          </a:fontRef>
+        </p:style>
+      </p:cxnSp>
+      <p:cxnSp>
+        <p:nvCxnSpPr>
+          <p:cNvPr id="16" name="Straight Arrow Connector 15"/>
+          <p:cNvCxnSpPr>
+            <a:stCxn id="5" idx="0"/>
+          </p:cNvCxnSpPr>
+          <p:nvPr/>
+        </p:nvCxnSpPr>
+        <p:spPr>
+          <a:xfrm flipV="1">
+            <a:off x="5265902" y="2609416"/>
+            <a:ext cx="331010" cy="557796"/>
+          </a:xfrm>
+          <a:prstGeom prst="straightConnector1">
+            <a:avLst/>
+          </a:prstGeom>
+          <a:ln w="25400">
+            <a:solidFill>
+              <a:schemeClr val="tx1">
+                <a:lumMod val="50000"/>
+                <a:lumOff val="50000"/>
+              </a:schemeClr>
+            </a:solidFill>
+            <a:prstDash val="sysDash"/>
+            <a:tailEnd type="arrow" w="med" len="med"/>
+          </a:ln>
+        </p:spPr>
+        <p:style>
+          <a:lnRef idx="1">
+            <a:schemeClr val="accent1"/>
+          </a:lnRef>
+          <a:fillRef idx="0">
+            <a:schemeClr val="accent1"/>
+          </a:fillRef>
+          <a:effectRef idx="0">
+            <a:schemeClr val="accent1"/>
+          </a:effectRef>
+          <a:fontRef idx="minor">
+            <a:schemeClr val="tx1"/>
+          </a:fontRef>
+        </p:style>
+      </p:cxnSp>
+      <p:cxnSp>
+        <p:nvCxnSpPr>
+          <p:cNvPr id="17" name="Straight Arrow Connector 16"/>
+          <p:cNvCxnSpPr>
+            <a:stCxn id="7" idx="2"/>
+            <a:endCxn id="2" idx="3"/>
+          </p:cNvCxnSpPr>
+          <p:nvPr/>
+        </p:nvCxnSpPr>
+        <p:spPr>
+          <a:xfrm flipH="1">
+            <a:off x="7584655" y="4033754"/>
+            <a:ext cx="745704" cy="911147"/>
+          </a:xfrm>
+          <a:prstGeom prst="straightConnector1">
+            <a:avLst/>
+          </a:prstGeom>
+          <a:ln w="25400">
+            <a:solidFill>
+              <a:schemeClr val="bg1">
+                <a:lumMod val="85000"/>
+              </a:schemeClr>
+            </a:solidFill>
+            <a:prstDash val="sysDash"/>
+            <a:tailEnd type="arrow" w="med" len="med"/>
+          </a:ln>
+        </p:spPr>
+        <p:style>
+          <a:lnRef idx="1">
+            <a:schemeClr val="accent1"/>
+          </a:lnRef>
+          <a:fillRef idx="0">
+            <a:schemeClr val="accent1"/>
+          </a:fillRef>
+          <a:effectRef idx="0">
+            <a:schemeClr val="accent1"/>
+          </a:effectRef>
+          <a:fontRef idx="minor">
+            <a:schemeClr val="tx1"/>
+          </a:fontRef>
+        </p:style>
+      </p:cxnSp>
+      <p:cxnSp>
+        <p:nvCxnSpPr>
+          <p:cNvPr id="18" name="Straight Arrow Connector 17"/>
+          <p:cNvCxnSpPr/>
+          <p:nvPr/>
+        </p:nvCxnSpPr>
+        <p:spPr>
+          <a:xfrm>
+            <a:off x="7986795" y="1289109"/>
+            <a:ext cx="1047311" cy="0"/>
+          </a:xfrm>
+          <a:prstGeom prst="straightConnector1">
+            <a:avLst/>
+          </a:prstGeom>
+          <a:ln w="25400" cap="sq">
+            <a:solidFill>
+              <a:schemeClr val="tx1">
+                <a:lumMod val="50000"/>
+                <a:lumOff val="50000"/>
+              </a:schemeClr>
+            </a:solidFill>
+            <a:prstDash val="sysDash"/>
+            <a:tailEnd type="none" w="lg" len="lg"/>
+          </a:ln>
+        </p:spPr>
+        <p:style>
+          <a:lnRef idx="1">
+            <a:schemeClr val="accent1"/>
+          </a:lnRef>
+          <a:fillRef idx="0">
+            <a:schemeClr val="accent1"/>
+          </a:fillRef>
+          <a:effectRef idx="0">
+            <a:schemeClr val="accent1"/>
+          </a:effectRef>
+          <a:fontRef idx="minor">
+            <a:schemeClr val="tx1"/>
+          </a:fontRef>
+        </p:style>
+      </p:cxnSp>
       <p:grpSp>
         <p:nvGrpSpPr>
-          <p:cNvPr id="11" name="Group 10"/>
+          <p:cNvPr id="36" name="Group 35"/>
           <p:cNvGrpSpPr/>
           <p:nvPr/>
         </p:nvGrpSpPr>
         <p:grpSpPr>
           <a:xfrm>
-            <a:off x="8659856" y="3115038"/>
-            <a:ext cx="1003011" cy="1041532"/>
-            <a:chOff x="8931564" y="2654187"/>
-            <a:chExt cx="1339272" cy="1390707"/>
-          </a:xfrm>
-          <a:solidFill>
-            <a:srgbClr val="FFCC29"/>
-          </a:solidFill>
+            <a:off x="8284993" y="5721335"/>
+            <a:ext cx="1596672" cy="369332"/>
+            <a:chOff x="8284993" y="5404916"/>
+            <a:chExt cx="1596672" cy="369332"/>
+          </a:xfrm>
         </p:grpSpPr>
+        <p:cxnSp>
+          <p:nvCxnSpPr>
+            <p:cNvPr id="30" name="Straight Arrow Connector 29"/>
+            <p:cNvCxnSpPr/>
+            <p:nvPr/>
+          </p:nvCxnSpPr>
+          <p:spPr>
+            <a:xfrm>
+              <a:off x="8284993" y="5589582"/>
+              <a:ext cx="374862" cy="0"/>
+            </a:xfrm>
+            <a:prstGeom prst="straightConnector1">
+              <a:avLst/>
+            </a:prstGeom>
+            <a:ln w="25400">
+              <a:solidFill>
+                <a:schemeClr val="tx1">
+                  <a:lumMod val="50000"/>
+                  <a:lumOff val="50000"/>
+                </a:schemeClr>
+              </a:solidFill>
+              <a:prstDash val="sysDash"/>
+              <a:tailEnd type="arrow" w="med" len="med"/>
+            </a:ln>
+          </p:spPr>
+          <p:style>
+            <a:lnRef idx="1">
+              <a:schemeClr val="accent1"/>
+            </a:lnRef>
+            <a:fillRef idx="0">
+              <a:schemeClr val="accent1"/>
+            </a:fillRef>
+            <a:effectRef idx="0">
+              <a:schemeClr val="accent1"/>
+            </a:effectRef>
+            <a:fontRef idx="minor">
+              <a:schemeClr val="tx1"/>
+            </a:fontRef>
+          </p:style>
+        </p:cxnSp>
         <p:sp>
           <p:nvSpPr>
-            <p:cNvPr id="9" name="Rectangle 8"/>
-            <p:cNvSpPr/>
+            <p:cNvPr id="32" name="TextBox 31"/>
+            <p:cNvSpPr txBox="1"/>
             <p:nvPr/>
           </p:nvSpPr>
           <p:spPr>
             <a:xfrm>
-              <a:off x="8931564" y="2654187"/>
-              <a:ext cx="1339272" cy="1123486"/>
+              <a:off x="8659856" y="5404916"/>
+              <a:ext cx="1221809" cy="369332"/>
             </a:xfrm>
             <a:prstGeom prst="rect">
               <a:avLst/>
             </a:prstGeom>
-            <a:grpFill/>
-            <a:ln>
-              <a:noFill/>
-            </a:ln>
+            <a:noFill/>
           </p:spPr>
-          <p:style>
-            <a:lnRef idx="2">
-              <a:schemeClr val="accent4">
-                <a:shade val="50000"/>
-              </a:schemeClr>
-            </a:lnRef>
-            <a:fillRef idx="1">
-              <a:schemeClr val="accent4"/>
-            </a:fillRef>
-            <a:effectRef idx="0">
-              <a:schemeClr val="accent4"/>
-            </a:effectRef>
-            <a:fontRef idx="minor">
-              <a:schemeClr val="lt1"/>
-            </a:fontRef>
-          </p:style>
           <p:txBody>
-            <a:bodyPr rot="0" spcFirstLastPara="0" vertOverflow="overflow" horzOverflow="overflow" vert="horz" wrap="square" lIns="91440" tIns="45720" rIns="91440" bIns="45720" numCol="1" spcCol="0" rtlCol="0" fromWordArt="0" anchor="ctr" anchorCtr="0" forceAA="0" compatLnSpc="1">
-              <a:prstTxWarp prst="textNoShape">
-                <a:avLst/>
-              </a:prstTxWarp>
-              <a:noAutofit/>
+            <a:bodyPr wrap="none" rtlCol="0">
+              <a:spAutoFit/>
             </a:bodyPr>
             <a:lstStyle/>
             <a:p>
-              <a:pPr algn="ctr"/>
-              <a:endParaRPr lang="en-GB" sz="1400" dirty="0">
+              <a:r>
+                <a:rPr lang="en-US" dirty="0">
+                  <a:latin typeface="Roboto Condensed" pitchFamily="2" charset="0"/>
+                  <a:ea typeface="Roboto Condensed" pitchFamily="2" charset="0"/>
+                </a:rPr>
+                <a:t>dependency</a:t>
+              </a:r>
+              <a:endParaRPr lang="en-GB" dirty="0">
                 <a:latin typeface="Roboto Condensed" pitchFamily="2" charset="0"/>
                 <a:ea typeface="Roboto Condensed" pitchFamily="2" charset="0"/>
               </a:endParaRPr>
             </a:p>
           </p:txBody>
         </p:sp>
+      </p:grpSp>
+      <p:grpSp>
+        <p:nvGrpSpPr>
+          <p:cNvPr id="28" name="Group 27"/>
+          <p:cNvGrpSpPr/>
+          <p:nvPr/>
+        </p:nvGrpSpPr>
+        <p:grpSpPr>
+          <a:xfrm>
+            <a:off x="8532600" y="1515882"/>
+            <a:ext cx="1003011" cy="1241660"/>
+            <a:chOff x="9734276" y="941130"/>
+            <a:chExt cx="1003011" cy="1241660"/>
+          </a:xfrm>
+        </p:grpSpPr>
+        <p:grpSp>
+          <p:nvGrpSpPr>
+            <p:cNvPr id="11" name="Group 10"/>
+            <p:cNvGrpSpPr/>
+            <p:nvPr/>
+          </p:nvGrpSpPr>
+          <p:grpSpPr>
+            <a:xfrm>
+              <a:off x="9734276" y="1141258"/>
+              <a:ext cx="1003011" cy="1041532"/>
+              <a:chOff x="8931564" y="2654187"/>
+              <a:chExt cx="1339272" cy="1390707"/>
+            </a:xfrm>
+            <a:solidFill>
+              <a:srgbClr val="FFCC29"/>
+            </a:solidFill>
+          </p:grpSpPr>
+          <p:sp>
+            <p:nvSpPr>
+              <p:cNvPr id="9" name="Rectangle 8"/>
+              <p:cNvSpPr/>
+              <p:nvPr/>
+            </p:nvSpPr>
+            <p:spPr>
+              <a:xfrm>
+                <a:off x="8931564" y="2654187"/>
+                <a:ext cx="1339272" cy="1123486"/>
+              </a:xfrm>
+              <a:prstGeom prst="rect">
+                <a:avLst/>
+              </a:prstGeom>
+              <a:grpFill/>
+              <a:ln>
+                <a:noFill/>
+              </a:ln>
+            </p:spPr>
+            <p:style>
+              <a:lnRef idx="2">
+                <a:schemeClr val="accent4">
+                  <a:shade val="50000"/>
+                </a:schemeClr>
+              </a:lnRef>
+              <a:fillRef idx="1">
+                <a:schemeClr val="accent4"/>
+              </a:fillRef>
+              <a:effectRef idx="0">
+                <a:schemeClr val="accent4"/>
+              </a:effectRef>
+              <a:fontRef idx="minor">
+                <a:schemeClr val="lt1"/>
+              </a:fontRef>
+            </p:style>
+            <p:txBody>
+              <a:bodyPr rot="0" spcFirstLastPara="0" vertOverflow="overflow" horzOverflow="overflow" vert="horz" wrap="square" lIns="91440" tIns="45720" rIns="91440" bIns="45720" numCol="1" spcCol="0" rtlCol="0" fromWordArt="0" anchor="ctr" anchorCtr="0" forceAA="0" compatLnSpc="1">
+                <a:prstTxWarp prst="textNoShape">
+                  <a:avLst/>
+                </a:prstTxWarp>
+                <a:noAutofit/>
+              </a:bodyPr>
+              <a:lstStyle/>
+              <a:p>
+                <a:pPr algn="ctr"/>
+                <a:endParaRPr lang="en-GB" sz="1400" dirty="0">
+                  <a:latin typeface="Roboto Condensed" pitchFamily="2" charset="0"/>
+                  <a:ea typeface="Roboto Condensed" pitchFamily="2" charset="0"/>
+                </a:endParaRPr>
+              </a:p>
+            </p:txBody>
+          </p:sp>
+          <p:sp>
+            <p:nvSpPr>
+              <p:cNvPr id="10" name="Oval 9"/>
+              <p:cNvSpPr/>
+              <p:nvPr/>
+            </p:nvSpPr>
+            <p:spPr>
+              <a:xfrm>
+                <a:off x="8931564" y="3510452"/>
+                <a:ext cx="1339272" cy="534442"/>
+              </a:xfrm>
+              <a:prstGeom prst="ellipse">
+                <a:avLst/>
+              </a:prstGeom>
+              <a:grpFill/>
+              <a:ln>
+                <a:noFill/>
+              </a:ln>
+            </p:spPr>
+            <p:style>
+              <a:lnRef idx="2">
+                <a:schemeClr val="accent4">
+                  <a:shade val="50000"/>
+                </a:schemeClr>
+              </a:lnRef>
+              <a:fillRef idx="1">
+                <a:schemeClr val="accent4"/>
+              </a:fillRef>
+              <a:effectRef idx="0">
+                <a:schemeClr val="accent4"/>
+              </a:effectRef>
+              <a:fontRef idx="minor">
+                <a:schemeClr val="lt1"/>
+              </a:fontRef>
+            </p:style>
+            <p:txBody>
+              <a:bodyPr rot="0" spcFirstLastPara="0" vertOverflow="overflow" horzOverflow="overflow" vert="horz" wrap="square" lIns="91440" tIns="45720" rIns="91440" bIns="45720" numCol="1" spcCol="0" rtlCol="0" fromWordArt="0" anchor="ctr" anchorCtr="0" forceAA="0" compatLnSpc="1">
+                <a:prstTxWarp prst="textNoShape">
+                  <a:avLst/>
+                </a:prstTxWarp>
+                <a:noAutofit/>
+              </a:bodyPr>
+              <a:lstStyle/>
+              <a:p>
+                <a:pPr algn="ctr"/>
+                <a:endParaRPr lang="en-GB" sz="2200">
+                  <a:latin typeface="Roboto Condensed" pitchFamily="2" charset="0"/>
+                  <a:ea typeface="Roboto Condensed" pitchFamily="2" charset="0"/>
+                </a:endParaRPr>
+              </a:p>
+            </p:txBody>
+          </p:sp>
+        </p:grpSp>
         <p:sp>
           <p:nvSpPr>
-            <p:cNvPr id="10" name="Oval 9"/>
+            <p:cNvPr id="8" name="Oval 7"/>
             <p:cNvSpPr/>
             <p:nvPr/>
           </p:nvSpPr>
           <p:spPr>
             <a:xfrm>
-              <a:off x="8931564" y="3510452"/>
-              <a:ext cx="1339272" cy="534442"/>
+              <a:off x="9734276" y="941130"/>
+              <a:ext cx="1003011" cy="400256"/>
             </a:xfrm>
             <a:prstGeom prst="ellipse">
               <a:avLst/>
             </a:prstGeom>
-            <a:grpFill/>
+            <a:solidFill>
+              <a:schemeClr val="accent4">
+                <a:lumMod val="60000"/>
+                <a:lumOff val="40000"/>
+              </a:schemeClr>
+            </a:solidFill>
             <a:ln>
               <a:noFill/>
             </a:ln>
@@ -3955,26 +4285,96 @@
             </a:p>
           </p:txBody>
         </p:sp>
+        <p:sp>
+          <p:nvSpPr>
+            <p:cNvPr id="34" name="TextBox 33"/>
+            <p:cNvSpPr txBox="1"/>
+            <p:nvPr/>
+          </p:nvSpPr>
+          <p:spPr>
+            <a:xfrm>
+              <a:off x="9773055" y="1404053"/>
+              <a:ext cx="925450" cy="584775"/>
+            </a:xfrm>
+            <a:prstGeom prst="rect">
+              <a:avLst/>
+            </a:prstGeom>
+            <a:noFill/>
+          </p:spPr>
+          <p:txBody>
+            <a:bodyPr wrap="square" rtlCol="0">
+              <a:spAutoFit/>
+            </a:bodyPr>
+            <a:lstStyle/>
+            <a:p>
+              <a:pPr algn="ctr"/>
+              <a:r>
+                <a:rPr lang="en-US" sz="1600" dirty="0">
+                  <a:latin typeface="Roboto Condensed" pitchFamily="2" charset="0"/>
+                  <a:ea typeface="Roboto Condensed" pitchFamily="2" charset="0"/>
+                </a:rPr>
+                <a:t>Collated files</a:t>
+              </a:r>
+              <a:endParaRPr lang="en-GB" sz="1600" dirty="0">
+                <a:latin typeface="Roboto Condensed" pitchFamily="2" charset="0"/>
+                <a:ea typeface="Roboto Condensed" pitchFamily="2" charset="0"/>
+              </a:endParaRPr>
+            </a:p>
+          </p:txBody>
+        </p:sp>
       </p:grpSp>
       <p:sp>
         <p:nvSpPr>
-          <p:cNvPr id="8" name="Oval 7"/>
+          <p:cNvPr id="35" name="TextBox 34"/>
+          <p:cNvSpPr txBox="1"/>
+          <p:nvPr/>
+        </p:nvSpPr>
+        <p:spPr>
+          <a:xfrm>
+            <a:off x="2546462" y="5894075"/>
+            <a:ext cx="4459875" cy="338554"/>
+          </a:xfrm>
+          <a:prstGeom prst="rect">
+            <a:avLst/>
+          </a:prstGeom>
+          <a:noFill/>
+        </p:spPr>
+        <p:txBody>
+          <a:bodyPr wrap="none" rtlCol="0">
+            <a:spAutoFit/>
+          </a:bodyPr>
+          <a:lstStyle/>
+          <a:p>
+            <a:r>
+              <a:rPr lang="en-US" sz="1600" dirty="0" smtClean="0">
+                <a:latin typeface="Roboto Condensed" pitchFamily="2" charset="0"/>
+                <a:ea typeface="Roboto Condensed" pitchFamily="2" charset="0"/>
+              </a:rPr>
+              <a:t>Figure 1: Components of Collate and their dependencies</a:t>
+            </a:r>
+            <a:endParaRPr lang="en-GB" sz="1600" dirty="0">
+              <a:latin typeface="Roboto Condensed" pitchFamily="2" charset="0"/>
+              <a:ea typeface="Roboto Condensed" pitchFamily="2" charset="0"/>
+            </a:endParaRPr>
+          </a:p>
+        </p:txBody>
+      </p:sp>
+      <p:sp>
+        <p:nvSpPr>
+          <p:cNvPr id="2" name="Rounded Rectangle 1"/>
           <p:cNvSpPr/>
           <p:nvPr/>
         </p:nvSpPr>
         <p:spPr>
           <a:xfrm>
-            <a:off x="8659856" y="2914910"/>
-            <a:ext cx="1003011" cy="400256"/>
-          </a:xfrm>
-          <a:prstGeom prst="ellipse">
+            <a:off x="5755854" y="4443829"/>
+            <a:ext cx="1828801" cy="1002144"/>
+          </a:xfrm>
+          <a:prstGeom prst="roundRect">
             <a:avLst/>
           </a:prstGeom>
           <a:solidFill>
-            <a:schemeClr val="accent4">
-              <a:lumMod val="60000"/>
-              <a:lumOff val="40000"/>
-            </a:schemeClr>
+            <a:srgbClr val="BF94E0"/>
           </a:solidFill>
           <a:ln>
             <a:noFill/>
@@ -3982,31 +4382,33 @@
         </p:spPr>
         <p:style>
           <a:lnRef idx="2">
-            <a:schemeClr val="accent4">
+            <a:schemeClr val="accent1">
               <a:shade val="50000"/>
             </a:schemeClr>
           </a:lnRef>
           <a:fillRef idx="1">
-            <a:schemeClr val="accent4"/>
+            <a:schemeClr val="accent1"/>
           </a:fillRef>
           <a:effectRef idx="0">
-            <a:schemeClr val="accent4"/>
+            <a:schemeClr val="accent1"/>
           </a:effectRef>
           <a:fontRef idx="minor">
             <a:schemeClr val="lt1"/>
           </a:fontRef>
         </p:style>
         <p:txBody>
-          <a:bodyPr rot="0" spcFirstLastPara="0" vertOverflow="overflow" horzOverflow="overflow" vert="horz" wrap="square" lIns="91440" tIns="45720" rIns="91440" bIns="45720" numCol="1" spcCol="0" rtlCol="0" fromWordArt="0" anchor="ctr" anchorCtr="0" forceAA="0" compatLnSpc="1">
-            <a:prstTxWarp prst="textNoShape">
-              <a:avLst/>
-            </a:prstTxWarp>
-            <a:noAutofit/>
-          </a:bodyPr>
+          <a:bodyPr rtlCol="0" anchor="ctr"/>
           <a:lstStyle/>
           <a:p>
             <a:pPr algn="ctr"/>
-            <a:endParaRPr lang="en-GB" sz="2200">
+            <a:r>
+              <a:rPr lang="en-US" sz="2200" dirty="0" smtClean="0">
+                <a:latin typeface="Roboto Condensed" pitchFamily="2" charset="0"/>
+                <a:ea typeface="Roboto Condensed" pitchFamily="2" charset="0"/>
+              </a:rPr>
+              <a:t>Data</a:t>
+            </a:r>
+            <a:endParaRPr lang="en-GB" sz="2200" dirty="0">
               <a:latin typeface="Roboto Condensed" pitchFamily="2" charset="0"/>
               <a:ea typeface="Roboto Condensed" pitchFamily="2" charset="0"/>
             </a:endParaRPr>
@@ -4015,14 +4417,17 @@
       </p:sp>
       <p:cxnSp>
         <p:nvCxnSpPr>
-          <p:cNvPr id="14" name="Straight Arrow Connector 13"/>
-          <p:cNvCxnSpPr/>
+          <p:cNvPr id="21" name="Straight Arrow Connector 20"/>
+          <p:cNvCxnSpPr>
+            <a:stCxn id="6" idx="2"/>
+            <a:endCxn id="2" idx="0"/>
+          </p:cNvCxnSpPr>
           <p:nvPr/>
         </p:nvCxnSpPr>
         <p:spPr>
           <a:xfrm>
-            <a:off x="4375262" y="2354118"/>
-            <a:ext cx="745578" cy="0"/>
+            <a:off x="6670254" y="2624095"/>
+            <a:ext cx="1" cy="1819734"/>
           </a:xfrm>
           <a:prstGeom prst="straightConnector1">
             <a:avLst/>
@@ -4055,14 +4460,58 @@
       </p:cxnSp>
       <p:cxnSp>
         <p:nvCxnSpPr>
-          <p:cNvPr id="16" name="Straight Arrow Connector 15"/>
-          <p:cNvCxnSpPr/>
+          <p:cNvPr id="26" name="Straight Arrow Connector 25"/>
+          <p:cNvCxnSpPr>
+            <a:stCxn id="7" idx="0"/>
+            <a:endCxn id="6" idx="3"/>
+          </p:cNvCxnSpPr>
           <p:nvPr/>
         </p:nvCxnSpPr>
         <p:spPr>
-          <a:xfrm>
-            <a:off x="4375262" y="3435582"/>
-            <a:ext cx="745578" cy="0"/>
+          <a:xfrm flipH="1" flipV="1">
+            <a:off x="7986795" y="1795070"/>
+            <a:ext cx="343564" cy="1236539"/>
+          </a:xfrm>
+          <a:prstGeom prst="straightConnector1">
+            <a:avLst/>
+          </a:prstGeom>
+          <a:ln w="25400">
+            <a:solidFill>
+              <a:schemeClr val="bg1">
+                <a:lumMod val="85000"/>
+              </a:schemeClr>
+            </a:solidFill>
+            <a:prstDash val="sysDash"/>
+            <a:tailEnd type="arrow" w="med" len="med"/>
+          </a:ln>
+        </p:spPr>
+        <p:style>
+          <a:lnRef idx="1">
+            <a:schemeClr val="accent1"/>
+          </a:lnRef>
+          <a:fillRef idx="0">
+            <a:schemeClr val="accent1"/>
+          </a:fillRef>
+          <a:effectRef idx="0">
+            <a:schemeClr val="accent1"/>
+          </a:effectRef>
+          <a:fontRef idx="minor">
+            <a:schemeClr val="tx1"/>
+          </a:fontRef>
+        </p:style>
+      </p:cxnSp>
+      <p:cxnSp>
+        <p:nvCxnSpPr>
+          <p:cNvPr id="25" name="Straight Arrow Connector 24"/>
+          <p:cNvCxnSpPr>
+            <a:stCxn id="5" idx="2"/>
+          </p:cNvCxnSpPr>
+          <p:nvPr/>
+        </p:nvCxnSpPr>
+        <p:spPr>
+          <a:xfrm>
+            <a:off x="5265902" y="3898152"/>
+            <a:ext cx="533480" cy="588249"/>
           </a:xfrm>
           <a:prstGeom prst="straightConnector1">
             <a:avLst/>
@@ -4095,14 +4544,17 @@
       </p:cxnSp>
       <p:cxnSp>
         <p:nvCxnSpPr>
-          <p:cNvPr id="17" name="Straight Arrow Connector 16"/>
-          <p:cNvCxnSpPr/>
+          <p:cNvPr id="27" name="Straight Arrow Connector 26"/>
+          <p:cNvCxnSpPr>
+            <a:stCxn id="4" idx="2"/>
+            <a:endCxn id="2" idx="1"/>
+          </p:cNvCxnSpPr>
           <p:nvPr/>
         </p:nvCxnSpPr>
         <p:spPr>
-          <a:xfrm flipV="1">
-            <a:off x="4375262" y="3596148"/>
-            <a:ext cx="1233058" cy="720180"/>
+          <a:xfrm>
+            <a:off x="3193902" y="4237015"/>
+            <a:ext cx="2561952" cy="707886"/>
           </a:xfrm>
           <a:prstGeom prst="straightConnector1">
             <a:avLst/>
@@ -4135,59 +4587,19 @@
       </p:cxnSp>
       <p:cxnSp>
         <p:nvCxnSpPr>
-          <p:cNvPr id="18" name="Straight Arrow Connector 17"/>
-          <p:cNvCxnSpPr/>
-          <p:nvPr/>
-        </p:nvCxnSpPr>
-        <p:spPr>
-          <a:xfrm>
-            <a:off x="8181314" y="2258868"/>
-            <a:ext cx="983284" cy="0"/>
-          </a:xfrm>
-          <a:prstGeom prst="straightConnector1">
-            <a:avLst/>
-          </a:prstGeom>
-          <a:ln w="25400">
-            <a:solidFill>
-              <a:schemeClr val="tx1">
-                <a:lumMod val="50000"/>
-                <a:lumOff val="50000"/>
-              </a:schemeClr>
-            </a:solidFill>
-            <a:prstDash val="sysDash"/>
-            <a:tailEnd type="none" w="lg" len="lg"/>
-          </a:ln>
-        </p:spPr>
-        <p:style>
-          <a:lnRef idx="1">
-            <a:schemeClr val="accent1"/>
-          </a:lnRef>
-          <a:fillRef idx="0">
-            <a:schemeClr val="accent1"/>
-          </a:fillRef>
-          <a:effectRef idx="0">
-            <a:schemeClr val="accent1"/>
-          </a:effectRef>
-          <a:fontRef idx="minor">
-            <a:schemeClr val="tx1"/>
-          </a:fontRef>
-        </p:style>
-      </p:cxnSp>
-      <p:cxnSp>
-        <p:nvCxnSpPr>
           <p:cNvPr id="20" name="Straight Arrow Connector 19"/>
           <p:cNvCxnSpPr/>
           <p:nvPr/>
         </p:nvCxnSpPr>
         <p:spPr>
           <a:xfrm>
-            <a:off x="9164598" y="2258868"/>
-            <a:ext cx="0" cy="890588"/>
+            <a:off x="9034106" y="1289109"/>
+            <a:ext cx="0" cy="482750"/>
           </a:xfrm>
           <a:prstGeom prst="straightConnector1">
             <a:avLst/>
           </a:prstGeom>
-          <a:ln w="25400">
+          <a:ln w="25400" cap="sq">
             <a:solidFill>
               <a:schemeClr val="tx1">
                 <a:lumMod val="50000"/>
@@ -4215,274 +4627,25 @@
       </p:cxnSp>
       <p:cxnSp>
         <p:nvCxnSpPr>
-          <p:cNvPr id="30" name="Straight Arrow Connector 29"/>
-          <p:cNvCxnSpPr/>
+          <p:cNvPr id="90" name="Straight Arrow Connector 89"/>
+          <p:cNvCxnSpPr>
+            <a:stCxn id="7" idx="1"/>
+            <a:endCxn id="5" idx="3"/>
+          </p:cNvCxnSpPr>
           <p:nvPr/>
         </p:nvCxnSpPr>
         <p:spPr>
-          <a:xfrm>
-            <a:off x="8284993" y="5589582"/>
-            <a:ext cx="374862" cy="0"/>
+          <a:xfrm flipH="1">
+            <a:off x="6180302" y="3532682"/>
+            <a:ext cx="1235657" cy="0"/>
           </a:xfrm>
           <a:prstGeom prst="straightConnector1">
             <a:avLst/>
           </a:prstGeom>
           <a:ln w="25400">
             <a:solidFill>
-              <a:schemeClr val="tx1">
-                <a:lumMod val="50000"/>
-                <a:lumOff val="50000"/>
-              </a:schemeClr>
-            </a:solidFill>
-            <a:prstDash val="sysDash"/>
-            <a:tailEnd type="arrow" w="med" len="med"/>
-          </a:ln>
-        </p:spPr>
-        <p:style>
-          <a:lnRef idx="1">
-            <a:schemeClr val="accent1"/>
-          </a:lnRef>
-          <a:fillRef idx="0">
-            <a:schemeClr val="accent1"/>
-          </a:fillRef>
-          <a:effectRef idx="0">
-            <a:schemeClr val="accent1"/>
-          </a:effectRef>
-          <a:fontRef idx="minor">
-            <a:schemeClr val="tx1"/>
-          </a:fontRef>
-        </p:style>
-      </p:cxnSp>
-      <p:sp>
-        <p:nvSpPr>
-          <p:cNvPr id="32" name="TextBox 31"/>
-          <p:cNvSpPr txBox="1"/>
-          <p:nvPr/>
-        </p:nvSpPr>
-        <p:spPr>
-          <a:xfrm>
-            <a:off x="8659856" y="5404916"/>
-            <a:ext cx="1221809" cy="369332"/>
-          </a:xfrm>
-          <a:prstGeom prst="rect">
-            <a:avLst/>
-          </a:prstGeom>
-          <a:noFill/>
-        </p:spPr>
-        <p:txBody>
-          <a:bodyPr wrap="none" rtlCol="0">
-            <a:spAutoFit/>
-          </a:bodyPr>
-          <a:lstStyle/>
-          <a:p>
-            <a:r>
-              <a:rPr lang="en-US" dirty="0">
-                <a:latin typeface="Roboto Condensed" pitchFamily="2" charset="0"/>
-                <a:ea typeface="Roboto Condensed" pitchFamily="2" charset="0"/>
-              </a:rPr>
-              <a:t>dependency</a:t>
-            </a:r>
-            <a:endParaRPr lang="en-GB" dirty="0">
-              <a:latin typeface="Roboto Condensed" pitchFamily="2" charset="0"/>
-              <a:ea typeface="Roboto Condensed" pitchFamily="2" charset="0"/>
-            </a:endParaRPr>
-          </a:p>
-        </p:txBody>
-      </p:sp>
-      <p:sp>
-        <p:nvSpPr>
-          <p:cNvPr id="34" name="TextBox 33"/>
-          <p:cNvSpPr txBox="1"/>
-          <p:nvPr/>
-        </p:nvSpPr>
-        <p:spPr>
-          <a:xfrm>
-            <a:off x="8698635" y="3377833"/>
-            <a:ext cx="925450" cy="584775"/>
-          </a:xfrm>
-          <a:prstGeom prst="rect">
-            <a:avLst/>
-          </a:prstGeom>
-          <a:noFill/>
-        </p:spPr>
-        <p:txBody>
-          <a:bodyPr wrap="square" rtlCol="0">
-            <a:spAutoFit/>
-          </a:bodyPr>
-          <a:lstStyle/>
-          <a:p>
-            <a:pPr algn="ctr"/>
-            <a:r>
-              <a:rPr lang="en-US" sz="1600" dirty="0">
-                <a:latin typeface="Roboto Condensed" pitchFamily="2" charset="0"/>
-                <a:ea typeface="Roboto Condensed" pitchFamily="2" charset="0"/>
-              </a:rPr>
-              <a:t>Collated files</a:t>
-            </a:r>
-            <a:endParaRPr lang="en-GB" sz="1600" dirty="0">
-              <a:latin typeface="Roboto Condensed" pitchFamily="2" charset="0"/>
-              <a:ea typeface="Roboto Condensed" pitchFamily="2" charset="0"/>
-            </a:endParaRPr>
-          </a:p>
-        </p:txBody>
-      </p:sp>
-      <p:sp>
-        <p:nvSpPr>
-          <p:cNvPr id="35" name="TextBox 34"/>
-          <p:cNvSpPr txBox="1"/>
-          <p:nvPr/>
-        </p:nvSpPr>
-        <p:spPr>
-          <a:xfrm>
-            <a:off x="2546462" y="5894075"/>
-            <a:ext cx="4459875" cy="338554"/>
-          </a:xfrm>
-          <a:prstGeom prst="rect">
-            <a:avLst/>
-          </a:prstGeom>
-          <a:noFill/>
-        </p:spPr>
-        <p:txBody>
-          <a:bodyPr wrap="none" rtlCol="0">
-            <a:spAutoFit/>
-          </a:bodyPr>
-          <a:lstStyle/>
-          <a:p>
-            <a:r>
-              <a:rPr lang="en-US" sz="1600" dirty="0" smtClean="0">
-                <a:latin typeface="Roboto Condensed" pitchFamily="2" charset="0"/>
-                <a:ea typeface="Roboto Condensed" pitchFamily="2" charset="0"/>
-              </a:rPr>
-              <a:t>Figure 1: Components of Collate and their dependencies</a:t>
-            </a:r>
-            <a:endParaRPr lang="en-GB" sz="1600" dirty="0">
-              <a:latin typeface="Roboto Condensed" pitchFamily="2" charset="0"/>
-              <a:ea typeface="Roboto Condensed" pitchFamily="2" charset="0"/>
-            </a:endParaRPr>
-          </a:p>
-        </p:txBody>
-      </p:sp>
-      <p:sp>
-        <p:nvSpPr>
-          <p:cNvPr id="2" name="Rounded Rectangle 1"/>
-          <p:cNvSpPr/>
-          <p:nvPr/>
-        </p:nvSpPr>
-        <p:spPr>
-          <a:xfrm>
-            <a:off x="5736676" y="4101294"/>
-            <a:ext cx="1828801" cy="1002144"/>
-          </a:xfrm>
-          <a:prstGeom prst="roundRect">
-            <a:avLst/>
-          </a:prstGeom>
-          <a:solidFill>
-            <a:srgbClr val="BF94E0"/>
-          </a:solidFill>
-          <a:ln>
-            <a:noFill/>
-          </a:ln>
-        </p:spPr>
-        <p:style>
-          <a:lnRef idx="2">
-            <a:schemeClr val="accent1">
-              <a:shade val="50000"/>
-            </a:schemeClr>
-          </a:lnRef>
-          <a:fillRef idx="1">
-            <a:schemeClr val="accent1"/>
-          </a:fillRef>
-          <a:effectRef idx="0">
-            <a:schemeClr val="accent1"/>
-          </a:effectRef>
-          <a:fontRef idx="minor">
-            <a:schemeClr val="lt1"/>
-          </a:fontRef>
-        </p:style>
-        <p:txBody>
-          <a:bodyPr rtlCol="0" anchor="ctr"/>
-          <a:lstStyle/>
-          <a:p>
-            <a:pPr algn="ctr"/>
-            <a:r>
-              <a:rPr lang="en-US" sz="2200" dirty="0" smtClean="0">
-                <a:latin typeface="Roboto Condensed" pitchFamily="2" charset="0"/>
-                <a:ea typeface="Roboto Condensed" pitchFamily="2" charset="0"/>
-              </a:rPr>
-              <a:t>Data</a:t>
-            </a:r>
-            <a:endParaRPr lang="en-GB" sz="2200" dirty="0">
-              <a:latin typeface="Roboto Condensed" pitchFamily="2" charset="0"/>
-              <a:ea typeface="Roboto Condensed" pitchFamily="2" charset="0"/>
-            </a:endParaRPr>
-          </a:p>
-        </p:txBody>
-      </p:sp>
-      <p:cxnSp>
-        <p:nvCxnSpPr>
-          <p:cNvPr id="21" name="Straight Arrow Connector 20"/>
-          <p:cNvCxnSpPr>
-            <a:stCxn id="6" idx="2"/>
-            <a:endCxn id="2" idx="0"/>
-          </p:cNvCxnSpPr>
-          <p:nvPr/>
-        </p:nvCxnSpPr>
-        <p:spPr>
-          <a:xfrm>
-            <a:off x="6651077" y="3585788"/>
-            <a:ext cx="0" cy="515506"/>
-          </a:xfrm>
-          <a:prstGeom prst="straightConnector1">
-            <a:avLst/>
-          </a:prstGeom>
-          <a:ln w="25400">
-            <a:solidFill>
-              <a:schemeClr val="tx1">
-                <a:lumMod val="50000"/>
-                <a:lumOff val="50000"/>
-              </a:schemeClr>
-            </a:solidFill>
-            <a:prstDash val="sysDash"/>
-            <a:tailEnd type="arrow" w="med" len="med"/>
-          </a:ln>
-        </p:spPr>
-        <p:style>
-          <a:lnRef idx="1">
-            <a:schemeClr val="accent1"/>
-          </a:lnRef>
-          <a:fillRef idx="0">
-            <a:schemeClr val="accent1"/>
-          </a:fillRef>
-          <a:effectRef idx="0">
-            <a:schemeClr val="accent1"/>
-          </a:effectRef>
-          <a:fontRef idx="minor">
-            <a:schemeClr val="tx1"/>
-          </a:fontRef>
-        </p:style>
-      </p:cxnSp>
-      <p:cxnSp>
-        <p:nvCxnSpPr>
-          <p:cNvPr id="26" name="Straight Arrow Connector 25"/>
-          <p:cNvCxnSpPr>
-            <a:stCxn id="7" idx="3"/>
-            <a:endCxn id="2" idx="1"/>
-          </p:cNvCxnSpPr>
-          <p:nvPr/>
-        </p:nvCxnSpPr>
-        <p:spPr>
-          <a:xfrm flipV="1">
-            <a:off x="4375262" y="4602366"/>
-            <a:ext cx="1361414" cy="1"/>
-          </a:xfrm>
-          <a:prstGeom prst="straightConnector1">
-            <a:avLst/>
-          </a:prstGeom>
-          <a:ln w="25400">
-            <a:solidFill>
-              <a:schemeClr val="tx1">
-                <a:lumMod val="50000"/>
-                <a:lumOff val="50000"/>
+              <a:schemeClr val="bg1">
+                <a:lumMod val="85000"/>
               </a:schemeClr>
             </a:solidFill>
             <a:prstDash val="sysDash"/>

</xml_diff>

<commit_message>
Added sequence diagram to depict typical collate commands. Edited dev guide.
</commit_message>
<xml_diff>
--- a/docs/Diagrams.pptx
+++ b/docs/Diagrams.pptx
@@ -5,17 +5,18 @@
     <p:sldMasterId id="2147483672" r:id="rId1"/>
   </p:sldMasterIdLst>
   <p:notesMasterIdLst>
-    <p:notesMasterId r:id="rId7"/>
+    <p:notesMasterId r:id="rId8"/>
   </p:notesMasterIdLst>
   <p:handoutMasterIdLst>
-    <p:handoutMasterId r:id="rId8"/>
+    <p:handoutMasterId r:id="rId9"/>
   </p:handoutMasterIdLst>
   <p:sldIdLst>
     <p:sldId id="256" r:id="rId2"/>
     <p:sldId id="257" r:id="rId3"/>
     <p:sldId id="260" r:id="rId4"/>
     <p:sldId id="258" r:id="rId5"/>
-    <p:sldId id="259" r:id="rId6"/>
+    <p:sldId id="261" r:id="rId6"/>
+    <p:sldId id="259" r:id="rId7"/>
   </p:sldIdLst>
   <p:sldSz cx="12192000" cy="6858000"/>
   <p:notesSz cx="6742113" cy="9872663"/>
@@ -842,7 +843,7 @@
           <a:p>
             <a:fld id="{0EBC881F-A445-44A1-8BB1-A4D1BDD4D291}" type="datetime1">
               <a:rPr lang="en-GB" smtClean="0"/>
-              <a:t>29/07/2015</a:t>
+              <a:t>01/08/2015</a:t>
             </a:fld>
             <a:endParaRPr lang="en-GB"/>
           </a:p>
@@ -1012,7 +1013,7 @@
           <a:p>
             <a:fld id="{2584BEDC-1639-4090-8CAA-F6974F06BD49}" type="datetime1">
               <a:rPr lang="en-GB" smtClean="0"/>
-              <a:t>29/07/2015</a:t>
+              <a:t>01/08/2015</a:t>
             </a:fld>
             <a:endParaRPr lang="en-GB"/>
           </a:p>
@@ -1192,7 +1193,7 @@
           <a:p>
             <a:fld id="{00C779A6-9523-4A2E-A931-C8A709BD1078}" type="datetime1">
               <a:rPr lang="en-GB" smtClean="0"/>
-              <a:t>29/07/2015</a:t>
+              <a:t>01/08/2015</a:t>
             </a:fld>
             <a:endParaRPr lang="en-GB"/>
           </a:p>
@@ -1362,7 +1363,7 @@
           <a:p>
             <a:fld id="{3A5F7889-DF91-41C1-A5B0-E479EFB53093}" type="datetime1">
               <a:rPr lang="en-GB" smtClean="0"/>
-              <a:t>29/07/2015</a:t>
+              <a:t>01/08/2015</a:t>
             </a:fld>
             <a:endParaRPr lang="en-GB"/>
           </a:p>
@@ -1608,7 +1609,7 @@
           <a:p>
             <a:fld id="{B34262BB-05D7-48AA-A628-76FDB16BFEC4}" type="datetime1">
               <a:rPr lang="en-GB" smtClean="0"/>
-              <a:t>29/07/2015</a:t>
+              <a:t>01/08/2015</a:t>
             </a:fld>
             <a:endParaRPr lang="en-GB"/>
           </a:p>
@@ -1840,7 +1841,7 @@
           <a:p>
             <a:fld id="{5F96665D-1DD0-4E23-81EB-F6A1D45CFD28}" type="datetime1">
               <a:rPr lang="en-GB" smtClean="0"/>
-              <a:t>29/07/2015</a:t>
+              <a:t>01/08/2015</a:t>
             </a:fld>
             <a:endParaRPr lang="en-GB"/>
           </a:p>
@@ -2207,7 +2208,7 @@
           <a:p>
             <a:fld id="{D42FA776-28A0-43EC-9C84-117ACD802889}" type="datetime1">
               <a:rPr lang="en-GB" smtClean="0"/>
-              <a:t>29/07/2015</a:t>
+              <a:t>01/08/2015</a:t>
             </a:fld>
             <a:endParaRPr lang="en-GB"/>
           </a:p>
@@ -2325,7 +2326,7 @@
           <a:p>
             <a:fld id="{07BBC80A-0A96-4EDF-BA2F-C903D39F13F1}" type="datetime1">
               <a:rPr lang="en-GB" smtClean="0"/>
-              <a:t>29/07/2015</a:t>
+              <a:t>01/08/2015</a:t>
             </a:fld>
             <a:endParaRPr lang="en-GB"/>
           </a:p>
@@ -2420,7 +2421,7 @@
           <a:p>
             <a:fld id="{009CBC1F-8C05-4E88-A975-5E80693FEDD6}" type="datetime1">
               <a:rPr lang="en-GB" smtClean="0"/>
-              <a:t>29/07/2015</a:t>
+              <a:t>01/08/2015</a:t>
             </a:fld>
             <a:endParaRPr lang="en-GB"/>
           </a:p>
@@ -2697,7 +2698,7 @@
           <a:p>
             <a:fld id="{1672ABC0-87DA-4D74-93ED-587A9A376247}" type="datetime1">
               <a:rPr lang="en-GB" smtClean="0"/>
-              <a:t>29/07/2015</a:t>
+              <a:t>01/08/2015</a:t>
             </a:fld>
             <a:endParaRPr lang="en-GB"/>
           </a:p>
@@ -2954,7 +2955,7 @@
           <a:p>
             <a:fld id="{2874912F-E8E8-454B-8EB3-6790668B87CF}" type="datetime1">
               <a:rPr lang="en-GB" smtClean="0"/>
-              <a:t>29/07/2015</a:t>
+              <a:t>01/08/2015</a:t>
             </a:fld>
             <a:endParaRPr lang="en-GB"/>
           </a:p>
@@ -3167,7 +3168,7 @@
           <a:p>
             <a:fld id="{B1FA066A-16B7-44A6-B43D-AE26935FC13F}" type="datetime1">
               <a:rPr lang="en-GB" smtClean="0"/>
-              <a:t>29/07/2015</a:t>
+              <a:t>01/08/2015</a:t>
             </a:fld>
             <a:endParaRPr lang="en-GB"/>
           </a:p>
@@ -9093,6 +9094,2445 @@
 </file>
 
 <file path=ppt/slides/slide5.xml><?xml version="1.0" encoding="utf-8"?>
+<p:sld xmlns:a="http://schemas.openxmlformats.org/drawingml/2006/main" xmlns:r="http://schemas.openxmlformats.org/officeDocument/2006/relationships" xmlns:p="http://schemas.openxmlformats.org/presentationml/2006/main">
+  <p:cSld>
+    <p:spTree>
+      <p:nvGrpSpPr>
+        <p:cNvPr id="1" name=""/>
+        <p:cNvGrpSpPr/>
+        <p:nvPr/>
+      </p:nvGrpSpPr>
+      <p:grpSpPr>
+        <a:xfrm>
+          <a:off x="0" y="0"/>
+          <a:ext cx="0" cy="0"/>
+          <a:chOff x="0" y="0"/>
+          <a:chExt cx="0" cy="0"/>
+        </a:xfrm>
+      </p:grpSpPr>
+      <p:grpSp>
+        <p:nvGrpSpPr>
+          <p:cNvPr id="97" name="Group 96"/>
+          <p:cNvGrpSpPr/>
+          <p:nvPr/>
+        </p:nvGrpSpPr>
+        <p:grpSpPr>
+          <a:xfrm>
+            <a:off x="3582621" y="4606889"/>
+            <a:ext cx="303003" cy="197306"/>
+            <a:chOff x="5573201" y="2139309"/>
+            <a:chExt cx="303003" cy="197306"/>
+          </a:xfrm>
+        </p:grpSpPr>
+        <p:cxnSp>
+          <p:nvCxnSpPr>
+            <p:cNvPr id="98" name="Straight Arrow Connector 97"/>
+            <p:cNvCxnSpPr/>
+            <p:nvPr/>
+          </p:nvCxnSpPr>
+          <p:spPr>
+            <a:xfrm>
+              <a:off x="5573201" y="2139309"/>
+              <a:ext cx="303003" cy="0"/>
+            </a:xfrm>
+            <a:prstGeom prst="straightConnector1">
+              <a:avLst/>
+            </a:prstGeom>
+            <a:ln w="25400" cap="sq">
+              <a:solidFill>
+                <a:srgbClr val="8FAADC"/>
+              </a:solidFill>
+              <a:prstDash val="sysDash"/>
+              <a:tailEnd type="none" w="lg" len="lg"/>
+            </a:ln>
+          </p:spPr>
+          <p:style>
+            <a:lnRef idx="1">
+              <a:schemeClr val="accent1"/>
+            </a:lnRef>
+            <a:fillRef idx="0">
+              <a:schemeClr val="accent1"/>
+            </a:fillRef>
+            <a:effectRef idx="0">
+              <a:schemeClr val="accent1"/>
+            </a:effectRef>
+            <a:fontRef idx="minor">
+              <a:schemeClr val="tx1"/>
+            </a:fontRef>
+          </p:style>
+        </p:cxnSp>
+        <p:cxnSp>
+          <p:nvCxnSpPr>
+            <p:cNvPr id="99" name="Straight Arrow Connector 98"/>
+            <p:cNvCxnSpPr/>
+            <p:nvPr/>
+          </p:nvCxnSpPr>
+          <p:spPr>
+            <a:xfrm>
+              <a:off x="5876204" y="2139309"/>
+              <a:ext cx="0" cy="95249"/>
+            </a:xfrm>
+            <a:prstGeom prst="straightConnector1">
+              <a:avLst/>
+            </a:prstGeom>
+            <a:ln w="25400" cap="rnd">
+              <a:solidFill>
+                <a:srgbClr val="8FAADC"/>
+              </a:solidFill>
+              <a:prstDash val="sysDash"/>
+              <a:tailEnd type="none" w="lg" len="lg"/>
+            </a:ln>
+          </p:spPr>
+          <p:style>
+            <a:lnRef idx="1">
+              <a:schemeClr val="accent1"/>
+            </a:lnRef>
+            <a:fillRef idx="0">
+              <a:schemeClr val="accent1"/>
+            </a:fillRef>
+            <a:effectRef idx="0">
+              <a:schemeClr val="accent1"/>
+            </a:effectRef>
+            <a:fontRef idx="minor">
+              <a:schemeClr val="tx1"/>
+            </a:fontRef>
+          </p:style>
+        </p:cxnSp>
+        <p:cxnSp>
+          <p:nvCxnSpPr>
+            <p:cNvPr id="100" name="Straight Arrow Connector 99"/>
+            <p:cNvCxnSpPr/>
+            <p:nvPr/>
+          </p:nvCxnSpPr>
+          <p:spPr>
+            <a:xfrm flipH="1">
+              <a:off x="5705168" y="2234558"/>
+              <a:ext cx="171036" cy="102057"/>
+            </a:xfrm>
+            <a:prstGeom prst="straightConnector1">
+              <a:avLst/>
+            </a:prstGeom>
+            <a:ln w="25400" cap="rnd">
+              <a:solidFill>
+                <a:srgbClr val="8FAADC"/>
+              </a:solidFill>
+              <a:prstDash val="sysDash"/>
+              <a:tailEnd type="triangle" w="med" len="med"/>
+            </a:ln>
+          </p:spPr>
+          <p:style>
+            <a:lnRef idx="1">
+              <a:schemeClr val="accent1"/>
+            </a:lnRef>
+            <a:fillRef idx="0">
+              <a:schemeClr val="accent1"/>
+            </a:fillRef>
+            <a:effectRef idx="0">
+              <a:schemeClr val="accent1"/>
+            </a:effectRef>
+            <a:fontRef idx="minor">
+              <a:schemeClr val="tx1"/>
+            </a:fontRef>
+          </p:style>
+        </p:cxnSp>
+      </p:grpSp>
+      <p:grpSp>
+        <p:nvGrpSpPr>
+          <p:cNvPr id="60" name="Group 59"/>
+          <p:cNvGrpSpPr/>
+          <p:nvPr/>
+        </p:nvGrpSpPr>
+        <p:grpSpPr>
+          <a:xfrm>
+            <a:off x="6153029" y="2656886"/>
+            <a:ext cx="303003" cy="197306"/>
+            <a:chOff x="5573201" y="2139309"/>
+            <a:chExt cx="303003" cy="197306"/>
+          </a:xfrm>
+        </p:grpSpPr>
+        <p:cxnSp>
+          <p:nvCxnSpPr>
+            <p:cNvPr id="54" name="Straight Arrow Connector 53"/>
+            <p:cNvCxnSpPr/>
+            <p:nvPr/>
+          </p:nvCxnSpPr>
+          <p:spPr>
+            <a:xfrm>
+              <a:off x="5573201" y="2139309"/>
+              <a:ext cx="303003" cy="0"/>
+            </a:xfrm>
+            <a:prstGeom prst="straightConnector1">
+              <a:avLst/>
+            </a:prstGeom>
+            <a:ln w="25400" cap="sq">
+              <a:solidFill>
+                <a:srgbClr val="8FAADC"/>
+              </a:solidFill>
+              <a:prstDash val="sysDash"/>
+              <a:tailEnd type="none" w="lg" len="lg"/>
+            </a:ln>
+          </p:spPr>
+          <p:style>
+            <a:lnRef idx="1">
+              <a:schemeClr val="accent1"/>
+            </a:lnRef>
+            <a:fillRef idx="0">
+              <a:schemeClr val="accent1"/>
+            </a:fillRef>
+            <a:effectRef idx="0">
+              <a:schemeClr val="accent1"/>
+            </a:effectRef>
+            <a:fontRef idx="minor">
+              <a:schemeClr val="tx1"/>
+            </a:fontRef>
+          </p:style>
+        </p:cxnSp>
+        <p:cxnSp>
+          <p:nvCxnSpPr>
+            <p:cNvPr id="55" name="Straight Arrow Connector 54"/>
+            <p:cNvCxnSpPr/>
+            <p:nvPr/>
+          </p:nvCxnSpPr>
+          <p:spPr>
+            <a:xfrm>
+              <a:off x="5876204" y="2139309"/>
+              <a:ext cx="0" cy="95249"/>
+            </a:xfrm>
+            <a:prstGeom prst="straightConnector1">
+              <a:avLst/>
+            </a:prstGeom>
+            <a:ln w="25400" cap="rnd">
+              <a:solidFill>
+                <a:srgbClr val="8FAADC"/>
+              </a:solidFill>
+              <a:prstDash val="sysDash"/>
+              <a:tailEnd type="none" w="lg" len="lg"/>
+            </a:ln>
+          </p:spPr>
+          <p:style>
+            <a:lnRef idx="1">
+              <a:schemeClr val="accent1"/>
+            </a:lnRef>
+            <a:fillRef idx="0">
+              <a:schemeClr val="accent1"/>
+            </a:fillRef>
+            <a:effectRef idx="0">
+              <a:schemeClr val="accent1"/>
+            </a:effectRef>
+            <a:fontRef idx="minor">
+              <a:schemeClr val="tx1"/>
+            </a:fontRef>
+          </p:style>
+        </p:cxnSp>
+        <p:cxnSp>
+          <p:nvCxnSpPr>
+            <p:cNvPr id="56" name="Straight Arrow Connector 55"/>
+            <p:cNvCxnSpPr/>
+            <p:nvPr/>
+          </p:nvCxnSpPr>
+          <p:spPr>
+            <a:xfrm flipH="1">
+              <a:off x="5705168" y="2234558"/>
+              <a:ext cx="171036" cy="102057"/>
+            </a:xfrm>
+            <a:prstGeom prst="straightConnector1">
+              <a:avLst/>
+            </a:prstGeom>
+            <a:ln w="25400" cap="rnd">
+              <a:solidFill>
+                <a:srgbClr val="8FAADC"/>
+              </a:solidFill>
+              <a:prstDash val="sysDash"/>
+              <a:tailEnd type="triangle" w="med" len="med"/>
+            </a:ln>
+          </p:spPr>
+          <p:style>
+            <a:lnRef idx="1">
+              <a:schemeClr val="accent1"/>
+            </a:lnRef>
+            <a:fillRef idx="0">
+              <a:schemeClr val="accent1"/>
+            </a:fillRef>
+            <a:effectRef idx="0">
+              <a:schemeClr val="accent1"/>
+            </a:effectRef>
+            <a:fontRef idx="minor">
+              <a:schemeClr val="tx1"/>
+            </a:fontRef>
+          </p:style>
+        </p:cxnSp>
+      </p:grpSp>
+      <p:sp>
+        <p:nvSpPr>
+          <p:cNvPr id="2" name="Rectangle 1"/>
+          <p:cNvSpPr/>
+          <p:nvPr/>
+        </p:nvSpPr>
+        <p:spPr>
+          <a:xfrm>
+            <a:off x="2660258" y="379898"/>
+            <a:ext cx="1828800" cy="574632"/>
+          </a:xfrm>
+          <a:prstGeom prst="rect">
+            <a:avLst/>
+          </a:prstGeom>
+          <a:solidFill>
+            <a:schemeClr val="accent5">
+              <a:lumMod val="40000"/>
+              <a:lumOff val="60000"/>
+            </a:schemeClr>
+          </a:solidFill>
+          <a:ln>
+            <a:solidFill>
+              <a:schemeClr val="accent5">
+                <a:lumMod val="50000"/>
+              </a:schemeClr>
+            </a:solidFill>
+          </a:ln>
+        </p:spPr>
+        <p:style>
+          <a:lnRef idx="2">
+            <a:schemeClr val="accent1">
+              <a:shade val="50000"/>
+            </a:schemeClr>
+          </a:lnRef>
+          <a:fillRef idx="1">
+            <a:schemeClr val="accent1"/>
+          </a:fillRef>
+          <a:effectRef idx="0">
+            <a:schemeClr val="accent1"/>
+          </a:effectRef>
+          <a:fontRef idx="minor">
+            <a:schemeClr val="lt1"/>
+          </a:fontRef>
+        </p:style>
+        <p:txBody>
+          <a:bodyPr rot="0" spcFirstLastPara="0" vertOverflow="overflow" horzOverflow="overflow" vert="horz" wrap="square" lIns="91440" tIns="45720" rIns="91440" bIns="45720" numCol="1" spcCol="0" rtlCol="0" fromWordArt="0" anchor="ctr" anchorCtr="0" forceAA="0" compatLnSpc="1">
+            <a:prstTxWarp prst="textNoShape">
+              <a:avLst/>
+            </a:prstTxWarp>
+            <a:noAutofit/>
+          </a:bodyPr>
+          <a:lstStyle/>
+          <a:p>
+            <a:pPr algn="ctr"/>
+            <a:r>
+              <a:rPr lang="en-US" dirty="0" smtClean="0">
+                <a:solidFill>
+                  <a:schemeClr val="bg1"/>
+                </a:solidFill>
+                <a:latin typeface="Roboto" pitchFamily="2" charset="0"/>
+                <a:ea typeface="Roboto" pitchFamily="2" charset="0"/>
+              </a:rPr>
+              <a:t>:Logic</a:t>
+            </a:r>
+            <a:endParaRPr lang="en-GB" dirty="0">
+              <a:solidFill>
+                <a:schemeClr val="bg1"/>
+              </a:solidFill>
+              <a:latin typeface="Roboto" pitchFamily="2" charset="0"/>
+              <a:ea typeface="Roboto" pitchFamily="2" charset="0"/>
+            </a:endParaRPr>
+          </a:p>
+        </p:txBody>
+      </p:sp>
+      <p:cxnSp>
+        <p:nvCxnSpPr>
+          <p:cNvPr id="4" name="Straight Connector 3"/>
+          <p:cNvCxnSpPr>
+            <a:stCxn id="2" idx="2"/>
+          </p:cNvCxnSpPr>
+          <p:nvPr/>
+        </p:nvCxnSpPr>
+        <p:spPr>
+          <a:xfrm>
+            <a:off x="3574658" y="954530"/>
+            <a:ext cx="0" cy="4573433"/>
+          </a:xfrm>
+          <a:prstGeom prst="line">
+            <a:avLst/>
+          </a:prstGeom>
+          <a:ln w="25400">
+            <a:solidFill>
+              <a:schemeClr val="tx1">
+                <a:lumMod val="50000"/>
+                <a:lumOff val="50000"/>
+              </a:schemeClr>
+            </a:solidFill>
+            <a:prstDash val="dash"/>
+          </a:ln>
+        </p:spPr>
+        <p:style>
+          <a:lnRef idx="1">
+            <a:schemeClr val="accent1"/>
+          </a:lnRef>
+          <a:fillRef idx="0">
+            <a:schemeClr val="accent1"/>
+          </a:fillRef>
+          <a:effectRef idx="0">
+            <a:schemeClr val="accent1"/>
+          </a:effectRef>
+          <a:fontRef idx="minor">
+            <a:schemeClr val="tx1"/>
+          </a:fontRef>
+        </p:style>
+      </p:cxnSp>
+      <p:sp>
+        <p:nvSpPr>
+          <p:cNvPr id="5" name="Rectangle 4"/>
+          <p:cNvSpPr/>
+          <p:nvPr/>
+        </p:nvSpPr>
+        <p:spPr>
+          <a:xfrm>
+            <a:off x="3445349" y="1488524"/>
+            <a:ext cx="258618" cy="3507849"/>
+          </a:xfrm>
+          <a:prstGeom prst="rect">
+            <a:avLst/>
+          </a:prstGeom>
+          <a:solidFill>
+            <a:srgbClr val="B4C7E7"/>
+          </a:solidFill>
+          <a:ln>
+            <a:solidFill>
+              <a:schemeClr val="accent5">
+                <a:lumMod val="50000"/>
+              </a:schemeClr>
+            </a:solidFill>
+          </a:ln>
+        </p:spPr>
+        <p:style>
+          <a:lnRef idx="2">
+            <a:schemeClr val="accent1">
+              <a:shade val="50000"/>
+            </a:schemeClr>
+          </a:lnRef>
+          <a:fillRef idx="1">
+            <a:schemeClr val="accent1"/>
+          </a:fillRef>
+          <a:effectRef idx="0">
+            <a:schemeClr val="accent1"/>
+          </a:effectRef>
+          <a:fontRef idx="minor">
+            <a:schemeClr val="lt1"/>
+          </a:fontRef>
+        </p:style>
+        <p:txBody>
+          <a:bodyPr rtlCol="0" anchor="ctr"/>
+          <a:lstStyle/>
+          <a:p>
+            <a:pPr algn="ctr"/>
+            <a:endParaRPr lang="en-GB"/>
+          </a:p>
+        </p:txBody>
+      </p:sp>
+      <p:cxnSp>
+        <p:nvCxnSpPr>
+          <p:cNvPr id="7" name="Straight Arrow Connector 6"/>
+          <p:cNvCxnSpPr/>
+          <p:nvPr/>
+        </p:nvCxnSpPr>
+        <p:spPr>
+          <a:xfrm>
+            <a:off x="1326758" y="1488524"/>
+            <a:ext cx="2118591" cy="0"/>
+          </a:xfrm>
+          <a:prstGeom prst="straightConnector1">
+            <a:avLst/>
+          </a:prstGeom>
+          <a:ln w="25400">
+            <a:solidFill>
+              <a:srgbClr val="A9D18E"/>
+            </a:solidFill>
+            <a:tailEnd type="triangle" w="lg" len="lg"/>
+          </a:ln>
+        </p:spPr>
+        <p:style>
+          <a:lnRef idx="1">
+            <a:schemeClr val="accent1"/>
+          </a:lnRef>
+          <a:fillRef idx="0">
+            <a:schemeClr val="accent1"/>
+          </a:fillRef>
+          <a:effectRef idx="0">
+            <a:schemeClr val="accent1"/>
+          </a:effectRef>
+          <a:fontRef idx="minor">
+            <a:schemeClr val="tx1"/>
+          </a:fontRef>
+        </p:style>
+      </p:cxnSp>
+      <p:sp>
+        <p:nvSpPr>
+          <p:cNvPr id="9" name="TextBox 8"/>
+          <p:cNvSpPr txBox="1"/>
+          <p:nvPr/>
+        </p:nvSpPr>
+        <p:spPr>
+          <a:xfrm>
+            <a:off x="1400742" y="1051440"/>
+            <a:ext cx="1933543" cy="461665"/>
+          </a:xfrm>
+          <a:prstGeom prst="rect">
+            <a:avLst/>
+          </a:prstGeom>
+          <a:noFill/>
+        </p:spPr>
+        <p:txBody>
+          <a:bodyPr wrap="none" rtlCol="0">
+            <a:spAutoFit/>
+          </a:bodyPr>
+          <a:lstStyle/>
+          <a:p>
+            <a:r>
+              <a:rPr lang="en-US" sz="1200" dirty="0" err="1" smtClean="0">
+                <a:latin typeface="Roboto Condensed" pitchFamily="2" charset="0"/>
+                <a:ea typeface="Roboto Condensed" pitchFamily="2" charset="0"/>
+                <a:cs typeface="Consolas" panose="020B0609020204030204" pitchFamily="49" charset="0"/>
+              </a:rPr>
+              <a:t>executeCommand</a:t>
+            </a:r>
+            <a:endParaRPr lang="en-US" sz="1200" dirty="0" smtClean="0">
+              <a:latin typeface="Roboto Condensed" pitchFamily="2" charset="0"/>
+              <a:ea typeface="Roboto Condensed" pitchFamily="2" charset="0"/>
+              <a:cs typeface="Consolas" panose="020B0609020204030204" pitchFamily="49" charset="0"/>
+            </a:endParaRPr>
+          </a:p>
+          <a:p>
+            <a:r>
+              <a:rPr lang="en-US" sz="1200" dirty="0" smtClean="0">
+                <a:latin typeface="Roboto Condensed" pitchFamily="2" charset="0"/>
+                <a:ea typeface="Roboto Condensed" pitchFamily="2" charset="0"/>
+                <a:cs typeface="Consolas" panose="020B0609020204030204" pitchFamily="49" charset="0"/>
+              </a:rPr>
+              <a:t>(“collate from C:/source-files”)</a:t>
+            </a:r>
+            <a:endParaRPr lang="en-GB" sz="1200" dirty="0">
+              <a:latin typeface="Roboto Condensed" pitchFamily="2" charset="0"/>
+              <a:ea typeface="Roboto Condensed" pitchFamily="2" charset="0"/>
+              <a:cs typeface="Consolas" panose="020B0609020204030204" pitchFamily="49" charset="0"/>
+            </a:endParaRPr>
+          </a:p>
+        </p:txBody>
+      </p:sp>
+      <p:cxnSp>
+        <p:nvCxnSpPr>
+          <p:cNvPr id="10" name="Straight Arrow Connector 9"/>
+          <p:cNvCxnSpPr/>
+          <p:nvPr/>
+        </p:nvCxnSpPr>
+        <p:spPr>
+          <a:xfrm>
+            <a:off x="3703967" y="1640924"/>
+            <a:ext cx="2292375" cy="0"/>
+          </a:xfrm>
+          <a:prstGeom prst="straightConnector1">
+            <a:avLst/>
+          </a:prstGeom>
+          <a:ln w="25400">
+            <a:solidFill>
+              <a:srgbClr val="B4C7E7"/>
+            </a:solidFill>
+            <a:tailEnd type="triangle" w="lg" len="lg"/>
+          </a:ln>
+        </p:spPr>
+        <p:style>
+          <a:lnRef idx="1">
+            <a:schemeClr val="accent1"/>
+          </a:lnRef>
+          <a:fillRef idx="0">
+            <a:schemeClr val="accent1"/>
+          </a:fillRef>
+          <a:effectRef idx="0">
+            <a:schemeClr val="accent1"/>
+          </a:effectRef>
+          <a:fontRef idx="minor">
+            <a:schemeClr val="tx1"/>
+          </a:fontRef>
+        </p:style>
+      </p:cxnSp>
+      <p:sp>
+        <p:nvSpPr>
+          <p:cNvPr id="11" name="Rectangle 10"/>
+          <p:cNvSpPr/>
+          <p:nvPr/>
+        </p:nvSpPr>
+        <p:spPr>
+          <a:xfrm>
+            <a:off x="5084804" y="379898"/>
+            <a:ext cx="2090120" cy="574632"/>
+          </a:xfrm>
+          <a:prstGeom prst="rect">
+            <a:avLst/>
+          </a:prstGeom>
+          <a:solidFill>
+            <a:schemeClr val="accent5">
+              <a:lumMod val="60000"/>
+              <a:lumOff val="40000"/>
+            </a:schemeClr>
+          </a:solidFill>
+          <a:ln>
+            <a:solidFill>
+              <a:schemeClr val="accent5">
+                <a:lumMod val="50000"/>
+              </a:schemeClr>
+            </a:solidFill>
+          </a:ln>
+        </p:spPr>
+        <p:style>
+          <a:lnRef idx="2">
+            <a:schemeClr val="accent1">
+              <a:shade val="50000"/>
+            </a:schemeClr>
+          </a:lnRef>
+          <a:fillRef idx="1">
+            <a:schemeClr val="accent1"/>
+          </a:fillRef>
+          <a:effectRef idx="0">
+            <a:schemeClr val="accent1"/>
+          </a:effectRef>
+          <a:fontRef idx="minor">
+            <a:schemeClr val="lt1"/>
+          </a:fontRef>
+        </p:style>
+        <p:txBody>
+          <a:bodyPr rot="0" spcFirstLastPara="0" vertOverflow="overflow" horzOverflow="overflow" vert="horz" wrap="square" lIns="91440" tIns="45720" rIns="91440" bIns="45720" numCol="1" spcCol="0" rtlCol="0" fromWordArt="0" anchor="ctr" anchorCtr="0" forceAA="0" compatLnSpc="1">
+            <a:prstTxWarp prst="textNoShape">
+              <a:avLst/>
+            </a:prstTxWarp>
+            <a:noAutofit/>
+          </a:bodyPr>
+          <a:lstStyle/>
+          <a:p>
+            <a:pPr algn="ctr"/>
+            <a:r>
+              <a:rPr lang="en-US" dirty="0" smtClean="0">
+                <a:solidFill>
+                  <a:schemeClr val="bg1"/>
+                </a:solidFill>
+                <a:latin typeface="Roboto" pitchFamily="2" charset="0"/>
+                <a:ea typeface="Roboto" pitchFamily="2" charset="0"/>
+              </a:rPr>
+              <a:t>:CommandParser</a:t>
+            </a:r>
+            <a:endParaRPr lang="en-GB" dirty="0">
+              <a:solidFill>
+                <a:schemeClr val="bg1"/>
+              </a:solidFill>
+              <a:latin typeface="Roboto" pitchFamily="2" charset="0"/>
+              <a:ea typeface="Roboto" pitchFamily="2" charset="0"/>
+            </a:endParaRPr>
+          </a:p>
+        </p:txBody>
+      </p:sp>
+      <p:cxnSp>
+        <p:nvCxnSpPr>
+          <p:cNvPr id="12" name="Straight Connector 11"/>
+          <p:cNvCxnSpPr/>
+          <p:nvPr/>
+        </p:nvCxnSpPr>
+        <p:spPr>
+          <a:xfrm>
+            <a:off x="6125651" y="954530"/>
+            <a:ext cx="0" cy="4573433"/>
+          </a:xfrm>
+          <a:prstGeom prst="line">
+            <a:avLst/>
+          </a:prstGeom>
+          <a:ln w="25400">
+            <a:solidFill>
+              <a:schemeClr val="tx1">
+                <a:lumMod val="50000"/>
+                <a:lumOff val="50000"/>
+              </a:schemeClr>
+            </a:solidFill>
+            <a:prstDash val="dash"/>
+          </a:ln>
+        </p:spPr>
+        <p:style>
+          <a:lnRef idx="1">
+            <a:schemeClr val="accent1"/>
+          </a:lnRef>
+          <a:fillRef idx="0">
+            <a:schemeClr val="accent1"/>
+          </a:fillRef>
+          <a:effectRef idx="0">
+            <a:schemeClr val="accent1"/>
+          </a:effectRef>
+          <a:fontRef idx="minor">
+            <a:schemeClr val="tx1"/>
+          </a:fontRef>
+        </p:style>
+      </p:cxnSp>
+      <p:sp>
+        <p:nvSpPr>
+          <p:cNvPr id="13" name="Rectangle 12"/>
+          <p:cNvSpPr/>
+          <p:nvPr/>
+        </p:nvSpPr>
+        <p:spPr>
+          <a:xfrm>
+            <a:off x="5996342" y="1639998"/>
+            <a:ext cx="258618" cy="1313677"/>
+          </a:xfrm>
+          <a:prstGeom prst="rect">
+            <a:avLst/>
+          </a:prstGeom>
+          <a:solidFill>
+            <a:schemeClr val="accent5">
+              <a:lumMod val="60000"/>
+              <a:lumOff val="40000"/>
+            </a:schemeClr>
+          </a:solidFill>
+          <a:ln>
+            <a:solidFill>
+              <a:schemeClr val="accent5">
+                <a:lumMod val="50000"/>
+              </a:schemeClr>
+            </a:solidFill>
+          </a:ln>
+        </p:spPr>
+        <p:style>
+          <a:lnRef idx="2">
+            <a:schemeClr val="accent1">
+              <a:shade val="50000"/>
+            </a:schemeClr>
+          </a:lnRef>
+          <a:fillRef idx="1">
+            <a:schemeClr val="accent1"/>
+          </a:fillRef>
+          <a:effectRef idx="0">
+            <a:schemeClr val="accent1"/>
+          </a:effectRef>
+          <a:fontRef idx="minor">
+            <a:schemeClr val="lt1"/>
+          </a:fontRef>
+        </p:style>
+        <p:txBody>
+          <a:bodyPr rtlCol="0" anchor="ctr"/>
+          <a:lstStyle/>
+          <a:p>
+            <a:pPr algn="ctr"/>
+            <a:endParaRPr lang="en-GB"/>
+          </a:p>
+        </p:txBody>
+      </p:sp>
+      <p:sp>
+        <p:nvSpPr>
+          <p:cNvPr id="14" name="TextBox 13"/>
+          <p:cNvSpPr txBox="1"/>
+          <p:nvPr/>
+        </p:nvSpPr>
+        <p:spPr>
+          <a:xfrm>
+            <a:off x="3703967" y="1328482"/>
+            <a:ext cx="2252540" cy="276999"/>
+          </a:xfrm>
+          <a:prstGeom prst="rect">
+            <a:avLst/>
+          </a:prstGeom>
+          <a:noFill/>
+        </p:spPr>
+        <p:txBody>
+          <a:bodyPr wrap="none" rtlCol="0">
+            <a:spAutoFit/>
+          </a:bodyPr>
+          <a:lstStyle/>
+          <a:p>
+            <a:r>
+              <a:rPr lang="en-US" sz="1200" dirty="0" smtClean="0">
+                <a:latin typeface="Roboto Condensed" pitchFamily="2" charset="0"/>
+                <a:ea typeface="Roboto Condensed" pitchFamily="2" charset="0"/>
+                <a:cs typeface="Consolas" panose="020B0609020204030204" pitchFamily="49" charset="0"/>
+              </a:rPr>
+              <a:t>parse(</a:t>
+            </a:r>
+            <a:r>
+              <a:rPr lang="en-US" sz="1200" dirty="0">
+                <a:latin typeface="Roboto Condensed" pitchFamily="2" charset="0"/>
+                <a:ea typeface="Roboto Condensed" pitchFamily="2" charset="0"/>
+                <a:cs typeface="Consolas" panose="020B0609020204030204" pitchFamily="49" charset="0"/>
+              </a:rPr>
+              <a:t>“collate from C:/source-files”</a:t>
+            </a:r>
+            <a:r>
+              <a:rPr lang="en-US" sz="1200" dirty="0" smtClean="0">
+                <a:latin typeface="Roboto Condensed" pitchFamily="2" charset="0"/>
+                <a:ea typeface="Roboto Condensed" pitchFamily="2" charset="0"/>
+                <a:cs typeface="Consolas" panose="020B0609020204030204" pitchFamily="49" charset="0"/>
+              </a:rPr>
+              <a:t>)</a:t>
+            </a:r>
+            <a:endParaRPr lang="en-GB" sz="1200" dirty="0">
+              <a:latin typeface="Roboto Condensed" pitchFamily="2" charset="0"/>
+              <a:ea typeface="Roboto Condensed" pitchFamily="2" charset="0"/>
+              <a:cs typeface="Consolas" panose="020B0609020204030204" pitchFamily="49" charset="0"/>
+            </a:endParaRPr>
+          </a:p>
+        </p:txBody>
+      </p:sp>
+      <p:cxnSp>
+        <p:nvCxnSpPr>
+          <p:cNvPr id="15" name="Straight Arrow Connector 14"/>
+          <p:cNvCxnSpPr/>
+          <p:nvPr/>
+        </p:nvCxnSpPr>
+        <p:spPr>
+          <a:xfrm flipH="1">
+            <a:off x="3703966" y="2942781"/>
+            <a:ext cx="2292375" cy="0"/>
+          </a:xfrm>
+          <a:prstGeom prst="straightConnector1">
+            <a:avLst/>
+          </a:prstGeom>
+          <a:ln w="25400">
+            <a:solidFill>
+              <a:srgbClr val="8FAADC"/>
+            </a:solidFill>
+            <a:tailEnd type="triangle" w="lg" len="lg"/>
+          </a:ln>
+        </p:spPr>
+        <p:style>
+          <a:lnRef idx="1">
+            <a:schemeClr val="accent1"/>
+          </a:lnRef>
+          <a:fillRef idx="0">
+            <a:schemeClr val="accent1"/>
+          </a:fillRef>
+          <a:effectRef idx="0">
+            <a:schemeClr val="accent1"/>
+          </a:effectRef>
+          <a:fontRef idx="minor">
+            <a:schemeClr val="tx1"/>
+          </a:fontRef>
+        </p:style>
+      </p:cxnSp>
+      <p:sp>
+        <p:nvSpPr>
+          <p:cNvPr id="18" name="TextBox 17"/>
+          <p:cNvSpPr txBox="1"/>
+          <p:nvPr/>
+        </p:nvSpPr>
+        <p:spPr>
+          <a:xfrm>
+            <a:off x="5163574" y="2665782"/>
+            <a:ext cx="766557" cy="276999"/>
+          </a:xfrm>
+          <a:prstGeom prst="rect">
+            <a:avLst/>
+          </a:prstGeom>
+          <a:noFill/>
+        </p:spPr>
+        <p:txBody>
+          <a:bodyPr wrap="none" rtlCol="0">
+            <a:spAutoFit/>
+          </a:bodyPr>
+          <a:lstStyle/>
+          <a:p>
+            <a:r>
+              <a:rPr lang="en-US" sz="1200" dirty="0" smtClean="0">
+                <a:latin typeface="Roboto Condensed" pitchFamily="2" charset="0"/>
+                <a:ea typeface="Roboto Condensed" pitchFamily="2" charset="0"/>
+                <a:cs typeface="Consolas" panose="020B0609020204030204" pitchFamily="49" charset="0"/>
+              </a:rPr>
+              <a:t>Command</a:t>
+            </a:r>
+            <a:endParaRPr lang="en-GB" sz="1200" dirty="0">
+              <a:latin typeface="Roboto Condensed" pitchFamily="2" charset="0"/>
+              <a:ea typeface="Roboto Condensed" pitchFamily="2" charset="0"/>
+              <a:cs typeface="Consolas" panose="020B0609020204030204" pitchFamily="49" charset="0"/>
+            </a:endParaRPr>
+          </a:p>
+        </p:txBody>
+      </p:sp>
+      <p:sp>
+        <p:nvSpPr>
+          <p:cNvPr id="21" name="Rectangle 20"/>
+          <p:cNvSpPr/>
+          <p:nvPr/>
+        </p:nvSpPr>
+        <p:spPr>
+          <a:xfrm>
+            <a:off x="3574658" y="3365938"/>
+            <a:ext cx="258618" cy="1253687"/>
+          </a:xfrm>
+          <a:prstGeom prst="rect">
+            <a:avLst/>
+          </a:prstGeom>
+          <a:solidFill>
+            <a:srgbClr val="B4C7E7"/>
+          </a:solidFill>
+          <a:ln>
+            <a:solidFill>
+              <a:schemeClr val="accent5">
+                <a:lumMod val="50000"/>
+              </a:schemeClr>
+            </a:solidFill>
+          </a:ln>
+        </p:spPr>
+        <p:style>
+          <a:lnRef idx="2">
+            <a:schemeClr val="accent1">
+              <a:shade val="50000"/>
+            </a:schemeClr>
+          </a:lnRef>
+          <a:fillRef idx="1">
+            <a:schemeClr val="accent1"/>
+          </a:fillRef>
+          <a:effectRef idx="0">
+            <a:schemeClr val="accent1"/>
+          </a:effectRef>
+          <a:fontRef idx="minor">
+            <a:schemeClr val="lt1"/>
+          </a:fontRef>
+        </p:style>
+        <p:txBody>
+          <a:bodyPr rtlCol="0" anchor="ctr"/>
+          <a:lstStyle/>
+          <a:p>
+            <a:pPr algn="ctr"/>
+            <a:endParaRPr lang="en-GB"/>
+          </a:p>
+        </p:txBody>
+      </p:sp>
+      <p:sp>
+        <p:nvSpPr>
+          <p:cNvPr id="22" name="Rectangle 21"/>
+          <p:cNvSpPr/>
+          <p:nvPr/>
+        </p:nvSpPr>
+        <p:spPr>
+          <a:xfrm>
+            <a:off x="8945643" y="1906972"/>
+            <a:ext cx="1542066" cy="462509"/>
+          </a:xfrm>
+          <a:prstGeom prst="rect">
+            <a:avLst/>
+          </a:prstGeom>
+          <a:solidFill>
+            <a:schemeClr val="accent5">
+              <a:lumMod val="75000"/>
+            </a:schemeClr>
+          </a:solidFill>
+          <a:ln>
+            <a:solidFill>
+              <a:schemeClr val="accent5">
+                <a:lumMod val="50000"/>
+              </a:schemeClr>
+            </a:solidFill>
+          </a:ln>
+        </p:spPr>
+        <p:style>
+          <a:lnRef idx="2">
+            <a:schemeClr val="accent1">
+              <a:shade val="50000"/>
+            </a:schemeClr>
+          </a:lnRef>
+          <a:fillRef idx="1">
+            <a:schemeClr val="accent1"/>
+          </a:fillRef>
+          <a:effectRef idx="0">
+            <a:schemeClr val="accent1"/>
+          </a:effectRef>
+          <a:fontRef idx="minor">
+            <a:schemeClr val="lt1"/>
+          </a:fontRef>
+        </p:style>
+        <p:txBody>
+          <a:bodyPr rot="0" spcFirstLastPara="0" vertOverflow="overflow" horzOverflow="overflow" vert="horz" wrap="square" lIns="91440" tIns="45720" rIns="91440" bIns="45720" numCol="1" spcCol="0" rtlCol="0" fromWordArt="0" anchor="ctr" anchorCtr="0" forceAA="0" compatLnSpc="1">
+            <a:prstTxWarp prst="textNoShape">
+              <a:avLst/>
+            </a:prstTxWarp>
+            <a:noAutofit/>
+          </a:bodyPr>
+          <a:lstStyle/>
+          <a:p>
+            <a:pPr algn="ctr"/>
+            <a:r>
+              <a:rPr lang="en-US" dirty="0" smtClean="0">
+                <a:solidFill>
+                  <a:schemeClr val="bg1"/>
+                </a:solidFill>
+                <a:latin typeface="Roboto" pitchFamily="2" charset="0"/>
+                <a:ea typeface="Roboto" pitchFamily="2" charset="0"/>
+              </a:rPr>
+              <a:t>:Command</a:t>
+            </a:r>
+            <a:endParaRPr lang="en-GB" dirty="0">
+              <a:solidFill>
+                <a:schemeClr val="bg1"/>
+              </a:solidFill>
+              <a:latin typeface="Roboto" pitchFamily="2" charset="0"/>
+              <a:ea typeface="Roboto" pitchFamily="2" charset="0"/>
+            </a:endParaRPr>
+          </a:p>
+        </p:txBody>
+      </p:sp>
+      <p:cxnSp>
+        <p:nvCxnSpPr>
+          <p:cNvPr id="23" name="Straight Connector 22"/>
+          <p:cNvCxnSpPr>
+            <a:stCxn id="22" idx="2"/>
+          </p:cNvCxnSpPr>
+          <p:nvPr/>
+        </p:nvCxnSpPr>
+        <p:spPr>
+          <a:xfrm>
+            <a:off x="9716676" y="2369481"/>
+            <a:ext cx="0" cy="3144555"/>
+          </a:xfrm>
+          <a:prstGeom prst="line">
+            <a:avLst/>
+          </a:prstGeom>
+          <a:ln w="25400">
+            <a:solidFill>
+              <a:schemeClr val="tx1">
+                <a:lumMod val="50000"/>
+                <a:lumOff val="50000"/>
+              </a:schemeClr>
+            </a:solidFill>
+            <a:prstDash val="dash"/>
+          </a:ln>
+        </p:spPr>
+        <p:style>
+          <a:lnRef idx="1">
+            <a:schemeClr val="accent1"/>
+          </a:lnRef>
+          <a:fillRef idx="0">
+            <a:schemeClr val="accent1"/>
+          </a:fillRef>
+          <a:effectRef idx="0">
+            <a:schemeClr val="accent1"/>
+          </a:effectRef>
+          <a:fontRef idx="minor">
+            <a:schemeClr val="tx1"/>
+          </a:fontRef>
+        </p:style>
+      </p:cxnSp>
+      <p:sp>
+        <p:nvSpPr>
+          <p:cNvPr id="24" name="Rectangle 23"/>
+          <p:cNvSpPr/>
+          <p:nvPr/>
+        </p:nvSpPr>
+        <p:spPr>
+          <a:xfrm>
+            <a:off x="6129032" y="1937325"/>
+            <a:ext cx="258618" cy="728457"/>
+          </a:xfrm>
+          <a:prstGeom prst="rect">
+            <a:avLst/>
+          </a:prstGeom>
+          <a:solidFill>
+            <a:schemeClr val="accent5">
+              <a:lumMod val="60000"/>
+              <a:lumOff val="40000"/>
+            </a:schemeClr>
+          </a:solidFill>
+          <a:ln>
+            <a:solidFill>
+              <a:schemeClr val="accent5">
+                <a:lumMod val="50000"/>
+              </a:schemeClr>
+            </a:solidFill>
+          </a:ln>
+        </p:spPr>
+        <p:style>
+          <a:lnRef idx="2">
+            <a:schemeClr val="accent1">
+              <a:shade val="50000"/>
+            </a:schemeClr>
+          </a:lnRef>
+          <a:fillRef idx="1">
+            <a:schemeClr val="accent1"/>
+          </a:fillRef>
+          <a:effectRef idx="0">
+            <a:schemeClr val="accent1"/>
+          </a:effectRef>
+          <a:fontRef idx="minor">
+            <a:schemeClr val="lt1"/>
+          </a:fontRef>
+        </p:style>
+        <p:txBody>
+          <a:bodyPr rtlCol="0" anchor="ctr"/>
+          <a:lstStyle/>
+          <a:p>
+            <a:pPr algn="ctr"/>
+            <a:endParaRPr lang="en-GB"/>
+          </a:p>
+        </p:txBody>
+      </p:sp>
+      <p:grpSp>
+        <p:nvGrpSpPr>
+          <p:cNvPr id="67" name="Group 66"/>
+          <p:cNvGrpSpPr/>
+          <p:nvPr/>
+        </p:nvGrpSpPr>
+        <p:grpSpPr>
+          <a:xfrm>
+            <a:off x="6254960" y="1739943"/>
+            <a:ext cx="303003" cy="197306"/>
+            <a:chOff x="5702510" y="1597068"/>
+            <a:chExt cx="303003" cy="197306"/>
+          </a:xfrm>
+        </p:grpSpPr>
+        <p:cxnSp>
+          <p:nvCxnSpPr>
+            <p:cNvPr id="25" name="Straight Arrow Connector 24"/>
+            <p:cNvCxnSpPr/>
+            <p:nvPr/>
+          </p:nvCxnSpPr>
+          <p:spPr>
+            <a:xfrm>
+              <a:off x="5702510" y="1597068"/>
+              <a:ext cx="303003" cy="0"/>
+            </a:xfrm>
+            <a:prstGeom prst="straightConnector1">
+              <a:avLst/>
+            </a:prstGeom>
+            <a:ln w="25400" cap="sq">
+              <a:solidFill>
+                <a:srgbClr val="8FAADC"/>
+              </a:solidFill>
+              <a:tailEnd type="none" w="lg" len="lg"/>
+            </a:ln>
+          </p:spPr>
+          <p:style>
+            <a:lnRef idx="1">
+              <a:schemeClr val="accent1"/>
+            </a:lnRef>
+            <a:fillRef idx="0">
+              <a:schemeClr val="accent1"/>
+            </a:fillRef>
+            <a:effectRef idx="0">
+              <a:schemeClr val="accent1"/>
+            </a:effectRef>
+            <a:fontRef idx="minor">
+              <a:schemeClr val="tx1"/>
+            </a:fontRef>
+          </p:style>
+        </p:cxnSp>
+        <p:cxnSp>
+          <p:nvCxnSpPr>
+            <p:cNvPr id="43" name="Straight Arrow Connector 42"/>
+            <p:cNvCxnSpPr/>
+            <p:nvPr/>
+          </p:nvCxnSpPr>
+          <p:spPr>
+            <a:xfrm>
+              <a:off x="6005513" y="1597068"/>
+              <a:ext cx="0" cy="95249"/>
+            </a:xfrm>
+            <a:prstGeom prst="straightConnector1">
+              <a:avLst/>
+            </a:prstGeom>
+            <a:ln w="25400" cap="rnd">
+              <a:solidFill>
+                <a:srgbClr val="8FAADC"/>
+              </a:solidFill>
+              <a:tailEnd type="none" w="lg" len="lg"/>
+            </a:ln>
+          </p:spPr>
+          <p:style>
+            <a:lnRef idx="1">
+              <a:schemeClr val="accent1"/>
+            </a:lnRef>
+            <a:fillRef idx="0">
+              <a:schemeClr val="accent1"/>
+            </a:fillRef>
+            <a:effectRef idx="0">
+              <a:schemeClr val="accent1"/>
+            </a:effectRef>
+            <a:fontRef idx="minor">
+              <a:schemeClr val="tx1"/>
+            </a:fontRef>
+          </p:style>
+        </p:cxnSp>
+        <p:cxnSp>
+          <p:nvCxnSpPr>
+            <p:cNvPr id="47" name="Straight Arrow Connector 46"/>
+            <p:cNvCxnSpPr/>
+            <p:nvPr/>
+          </p:nvCxnSpPr>
+          <p:spPr>
+            <a:xfrm flipH="1">
+              <a:off x="5834477" y="1692317"/>
+              <a:ext cx="171036" cy="102057"/>
+            </a:xfrm>
+            <a:prstGeom prst="straightConnector1">
+              <a:avLst/>
+            </a:prstGeom>
+            <a:ln w="25400" cap="rnd">
+              <a:solidFill>
+                <a:srgbClr val="8FAADC"/>
+              </a:solidFill>
+              <a:tailEnd type="triangle" w="med" len="med"/>
+            </a:ln>
+          </p:spPr>
+          <p:style>
+            <a:lnRef idx="1">
+              <a:schemeClr val="accent1"/>
+            </a:lnRef>
+            <a:fillRef idx="0">
+              <a:schemeClr val="accent1"/>
+            </a:fillRef>
+            <a:effectRef idx="0">
+              <a:schemeClr val="accent1"/>
+            </a:effectRef>
+            <a:fontRef idx="minor">
+              <a:schemeClr val="tx1"/>
+            </a:fontRef>
+          </p:style>
+        </p:cxnSp>
+      </p:grpSp>
+      <p:sp>
+        <p:nvSpPr>
+          <p:cNvPr id="53" name="TextBox 52"/>
+          <p:cNvSpPr txBox="1"/>
+          <p:nvPr/>
+        </p:nvSpPr>
+        <p:spPr>
+          <a:xfrm>
+            <a:off x="6606090" y="1645210"/>
+            <a:ext cx="1431802" cy="276999"/>
+          </a:xfrm>
+          <a:prstGeom prst="rect">
+            <a:avLst/>
+          </a:prstGeom>
+          <a:noFill/>
+        </p:spPr>
+        <p:txBody>
+          <a:bodyPr wrap="none" rtlCol="0">
+            <a:spAutoFit/>
+          </a:bodyPr>
+          <a:lstStyle/>
+          <a:p>
+            <a:r>
+              <a:rPr lang="en-US" sz="1200" dirty="0" err="1">
+                <a:latin typeface="Roboto Condensed" pitchFamily="2" charset="0"/>
+                <a:ea typeface="Roboto Condensed" pitchFamily="2" charset="0"/>
+                <a:cs typeface="Consolas" panose="020B0609020204030204" pitchFamily="49" charset="0"/>
+              </a:rPr>
+              <a:t>initCollateCommand</a:t>
+            </a:r>
+            <a:r>
+              <a:rPr lang="en-US" sz="1200" dirty="0" smtClean="0">
+                <a:latin typeface="Roboto Condensed" pitchFamily="2" charset="0"/>
+                <a:ea typeface="Roboto Condensed" pitchFamily="2" charset="0"/>
+                <a:cs typeface="Consolas" panose="020B0609020204030204" pitchFamily="49" charset="0"/>
+              </a:rPr>
+              <a:t>()</a:t>
+            </a:r>
+            <a:endParaRPr lang="en-GB" sz="1200" dirty="0">
+              <a:latin typeface="Roboto Condensed" pitchFamily="2" charset="0"/>
+              <a:ea typeface="Roboto Condensed" pitchFamily="2" charset="0"/>
+              <a:cs typeface="Consolas" panose="020B0609020204030204" pitchFamily="49" charset="0"/>
+            </a:endParaRPr>
+          </a:p>
+        </p:txBody>
+      </p:sp>
+      <p:sp>
+        <p:nvSpPr>
+          <p:cNvPr id="57" name="TextBox 56"/>
+          <p:cNvSpPr txBox="1"/>
+          <p:nvPr/>
+        </p:nvSpPr>
+        <p:spPr>
+          <a:xfrm>
+            <a:off x="6486068" y="2609330"/>
+            <a:ext cx="766557" cy="276999"/>
+          </a:xfrm>
+          <a:prstGeom prst="rect">
+            <a:avLst/>
+          </a:prstGeom>
+          <a:noFill/>
+        </p:spPr>
+        <p:txBody>
+          <a:bodyPr wrap="none" rtlCol="0">
+            <a:spAutoFit/>
+          </a:bodyPr>
+          <a:lstStyle/>
+          <a:p>
+            <a:r>
+              <a:rPr lang="en-US" sz="1200" dirty="0" smtClean="0">
+                <a:latin typeface="Roboto Condensed" pitchFamily="2" charset="0"/>
+                <a:ea typeface="Roboto Condensed" pitchFamily="2" charset="0"/>
+                <a:cs typeface="Consolas" panose="020B0609020204030204" pitchFamily="49" charset="0"/>
+              </a:rPr>
+              <a:t>Command</a:t>
+            </a:r>
+            <a:endParaRPr lang="en-GB" sz="1200" dirty="0">
+              <a:latin typeface="Roboto Condensed" pitchFamily="2" charset="0"/>
+              <a:ea typeface="Roboto Condensed" pitchFamily="2" charset="0"/>
+              <a:cs typeface="Consolas" panose="020B0609020204030204" pitchFamily="49" charset="0"/>
+            </a:endParaRPr>
+          </a:p>
+        </p:txBody>
+      </p:sp>
+      <p:sp>
+        <p:nvSpPr>
+          <p:cNvPr id="59" name="Rectangle 58"/>
+          <p:cNvSpPr/>
+          <p:nvPr/>
+        </p:nvSpPr>
+        <p:spPr>
+          <a:xfrm>
+            <a:off x="6424104" y="1890988"/>
+            <a:ext cx="2329484" cy="276999"/>
+          </a:xfrm>
+          <a:prstGeom prst="rect">
+            <a:avLst/>
+          </a:prstGeom>
+        </p:spPr>
+        <p:txBody>
+          <a:bodyPr wrap="none">
+            <a:spAutoFit/>
+          </a:bodyPr>
+          <a:lstStyle/>
+          <a:p>
+            <a:r>
+              <a:rPr lang="en-GB" sz="1200" dirty="0">
+                <a:latin typeface="Roboto Condensed" pitchFamily="2" charset="0"/>
+                <a:ea typeface="Roboto Condensed" pitchFamily="2" charset="0"/>
+              </a:rPr>
+              <a:t>Command(</a:t>
+            </a:r>
+            <a:r>
+              <a:rPr lang="en-GB" sz="1200" dirty="0" err="1">
+                <a:latin typeface="Roboto Condensed" pitchFamily="2" charset="0"/>
+                <a:ea typeface="Roboto Condensed" pitchFamily="2" charset="0"/>
+              </a:rPr>
+              <a:t>Command.Type.COLLATE</a:t>
+            </a:r>
+            <a:r>
+              <a:rPr lang="en-GB" sz="1200" dirty="0">
+                <a:latin typeface="Roboto Condensed" pitchFamily="2" charset="0"/>
+                <a:ea typeface="Roboto Condensed" pitchFamily="2" charset="0"/>
+              </a:rPr>
+              <a:t>)</a:t>
+            </a:r>
+          </a:p>
+        </p:txBody>
+      </p:sp>
+      <p:cxnSp>
+        <p:nvCxnSpPr>
+          <p:cNvPr id="61" name="Straight Arrow Connector 60"/>
+          <p:cNvCxnSpPr/>
+          <p:nvPr/>
+        </p:nvCxnSpPr>
+        <p:spPr>
+          <a:xfrm>
+            <a:off x="6386927" y="2138227"/>
+            <a:ext cx="2542144" cy="0"/>
+          </a:xfrm>
+          <a:prstGeom prst="straightConnector1">
+            <a:avLst/>
+          </a:prstGeom>
+          <a:ln w="25400">
+            <a:solidFill>
+              <a:srgbClr val="8FAADC"/>
+            </a:solidFill>
+            <a:tailEnd type="triangle" w="lg" len="lg"/>
+          </a:ln>
+        </p:spPr>
+        <p:style>
+          <a:lnRef idx="1">
+            <a:schemeClr val="accent1"/>
+          </a:lnRef>
+          <a:fillRef idx="0">
+            <a:schemeClr val="accent1"/>
+          </a:fillRef>
+          <a:effectRef idx="0">
+            <a:schemeClr val="accent1"/>
+          </a:effectRef>
+          <a:fontRef idx="minor">
+            <a:schemeClr val="tx1"/>
+          </a:fontRef>
+        </p:style>
+      </p:cxnSp>
+      <p:sp>
+        <p:nvSpPr>
+          <p:cNvPr id="64" name="Rectangle 63"/>
+          <p:cNvSpPr/>
+          <p:nvPr/>
+        </p:nvSpPr>
+        <p:spPr>
+          <a:xfrm>
+            <a:off x="9587367" y="2373552"/>
+            <a:ext cx="258618" cy="148715"/>
+          </a:xfrm>
+          <a:prstGeom prst="rect">
+            <a:avLst/>
+          </a:prstGeom>
+          <a:solidFill>
+            <a:schemeClr val="accent5">
+              <a:lumMod val="75000"/>
+            </a:schemeClr>
+          </a:solidFill>
+          <a:ln>
+            <a:solidFill>
+              <a:schemeClr val="accent5">
+                <a:lumMod val="50000"/>
+              </a:schemeClr>
+            </a:solidFill>
+          </a:ln>
+        </p:spPr>
+        <p:style>
+          <a:lnRef idx="2">
+            <a:schemeClr val="accent1">
+              <a:shade val="50000"/>
+            </a:schemeClr>
+          </a:lnRef>
+          <a:fillRef idx="1">
+            <a:schemeClr val="accent1"/>
+          </a:fillRef>
+          <a:effectRef idx="0">
+            <a:schemeClr val="accent1"/>
+          </a:effectRef>
+          <a:fontRef idx="minor">
+            <a:schemeClr val="lt1"/>
+          </a:fontRef>
+        </p:style>
+        <p:txBody>
+          <a:bodyPr rtlCol="0" anchor="ctr"/>
+          <a:lstStyle/>
+          <a:p>
+            <a:pPr algn="ctr"/>
+            <a:endParaRPr lang="en-GB"/>
+          </a:p>
+        </p:txBody>
+      </p:sp>
+      <p:cxnSp>
+        <p:nvCxnSpPr>
+          <p:cNvPr id="65" name="Straight Arrow Connector 64"/>
+          <p:cNvCxnSpPr/>
+          <p:nvPr/>
+        </p:nvCxnSpPr>
+        <p:spPr>
+          <a:xfrm flipH="1">
+            <a:off x="6406461" y="2519873"/>
+            <a:ext cx="3180907" cy="0"/>
+          </a:xfrm>
+          <a:prstGeom prst="straightConnector1">
+            <a:avLst/>
+          </a:prstGeom>
+          <a:ln w="25400">
+            <a:solidFill>
+              <a:srgbClr val="2F5597"/>
+            </a:solidFill>
+            <a:prstDash val="sysDash"/>
+            <a:tailEnd type="triangle" w="lg" len="lg"/>
+          </a:ln>
+        </p:spPr>
+        <p:style>
+          <a:lnRef idx="1">
+            <a:schemeClr val="accent1"/>
+          </a:lnRef>
+          <a:fillRef idx="0">
+            <a:schemeClr val="accent1"/>
+          </a:fillRef>
+          <a:effectRef idx="0">
+            <a:schemeClr val="accent1"/>
+          </a:effectRef>
+          <a:fontRef idx="minor">
+            <a:schemeClr val="tx1"/>
+          </a:fontRef>
+        </p:style>
+      </p:cxnSp>
+      <p:grpSp>
+        <p:nvGrpSpPr>
+          <p:cNvPr id="68" name="Group 67"/>
+          <p:cNvGrpSpPr/>
+          <p:nvPr/>
+        </p:nvGrpSpPr>
+        <p:grpSpPr>
+          <a:xfrm>
+            <a:off x="3721609" y="3168633"/>
+            <a:ext cx="303003" cy="197306"/>
+            <a:chOff x="5702510" y="1597068"/>
+            <a:chExt cx="303003" cy="197306"/>
+          </a:xfrm>
+        </p:grpSpPr>
+        <p:cxnSp>
+          <p:nvCxnSpPr>
+            <p:cNvPr id="69" name="Straight Arrow Connector 68"/>
+            <p:cNvCxnSpPr/>
+            <p:nvPr/>
+          </p:nvCxnSpPr>
+          <p:spPr>
+            <a:xfrm>
+              <a:off x="5702510" y="1597068"/>
+              <a:ext cx="303003" cy="0"/>
+            </a:xfrm>
+            <a:prstGeom prst="straightConnector1">
+              <a:avLst/>
+            </a:prstGeom>
+            <a:ln w="25400" cap="sq">
+              <a:solidFill>
+                <a:srgbClr val="8FAADC"/>
+              </a:solidFill>
+              <a:tailEnd type="none" w="lg" len="lg"/>
+            </a:ln>
+          </p:spPr>
+          <p:style>
+            <a:lnRef idx="1">
+              <a:schemeClr val="accent1"/>
+            </a:lnRef>
+            <a:fillRef idx="0">
+              <a:schemeClr val="accent1"/>
+            </a:fillRef>
+            <a:effectRef idx="0">
+              <a:schemeClr val="accent1"/>
+            </a:effectRef>
+            <a:fontRef idx="minor">
+              <a:schemeClr val="tx1"/>
+            </a:fontRef>
+          </p:style>
+        </p:cxnSp>
+        <p:cxnSp>
+          <p:nvCxnSpPr>
+            <p:cNvPr id="70" name="Straight Arrow Connector 69"/>
+            <p:cNvCxnSpPr/>
+            <p:nvPr/>
+          </p:nvCxnSpPr>
+          <p:spPr>
+            <a:xfrm>
+              <a:off x="6005513" y="1597068"/>
+              <a:ext cx="0" cy="95249"/>
+            </a:xfrm>
+            <a:prstGeom prst="straightConnector1">
+              <a:avLst/>
+            </a:prstGeom>
+            <a:ln w="25400" cap="rnd">
+              <a:solidFill>
+                <a:srgbClr val="8FAADC"/>
+              </a:solidFill>
+              <a:tailEnd type="none" w="lg" len="lg"/>
+            </a:ln>
+          </p:spPr>
+          <p:style>
+            <a:lnRef idx="1">
+              <a:schemeClr val="accent1"/>
+            </a:lnRef>
+            <a:fillRef idx="0">
+              <a:schemeClr val="accent1"/>
+            </a:fillRef>
+            <a:effectRef idx="0">
+              <a:schemeClr val="accent1"/>
+            </a:effectRef>
+            <a:fontRef idx="minor">
+              <a:schemeClr val="tx1"/>
+            </a:fontRef>
+          </p:style>
+        </p:cxnSp>
+        <p:cxnSp>
+          <p:nvCxnSpPr>
+            <p:cNvPr id="71" name="Straight Arrow Connector 70"/>
+            <p:cNvCxnSpPr/>
+            <p:nvPr/>
+          </p:nvCxnSpPr>
+          <p:spPr>
+            <a:xfrm flipH="1">
+              <a:off x="5834477" y="1692317"/>
+              <a:ext cx="171036" cy="102057"/>
+            </a:xfrm>
+            <a:prstGeom prst="straightConnector1">
+              <a:avLst/>
+            </a:prstGeom>
+            <a:ln w="25400" cap="rnd">
+              <a:solidFill>
+                <a:srgbClr val="8FAADC"/>
+              </a:solidFill>
+              <a:tailEnd type="triangle" w="med" len="med"/>
+            </a:ln>
+          </p:spPr>
+          <p:style>
+            <a:lnRef idx="1">
+              <a:schemeClr val="accent1"/>
+            </a:lnRef>
+            <a:fillRef idx="0">
+              <a:schemeClr val="accent1"/>
+            </a:fillRef>
+            <a:effectRef idx="0">
+              <a:schemeClr val="accent1"/>
+            </a:effectRef>
+            <a:fontRef idx="minor">
+              <a:schemeClr val="tx1"/>
+            </a:fontRef>
+          </p:style>
+        </p:cxnSp>
+      </p:grpSp>
+      <p:sp>
+        <p:nvSpPr>
+          <p:cNvPr id="72" name="TextBox 71"/>
+          <p:cNvSpPr txBox="1"/>
+          <p:nvPr/>
+        </p:nvSpPr>
+        <p:spPr>
+          <a:xfrm>
+            <a:off x="4024218" y="3103529"/>
+            <a:ext cx="1636987" cy="276999"/>
+          </a:xfrm>
+          <a:prstGeom prst="rect">
+            <a:avLst/>
+          </a:prstGeom>
+          <a:noFill/>
+        </p:spPr>
+        <p:txBody>
+          <a:bodyPr wrap="none" rtlCol="0">
+            <a:spAutoFit/>
+          </a:bodyPr>
+          <a:lstStyle/>
+          <a:p>
+            <a:r>
+              <a:rPr lang="en-US" sz="1200" dirty="0" err="1" smtClean="0">
+                <a:latin typeface="Roboto Condensed" pitchFamily="2" charset="0"/>
+                <a:ea typeface="Roboto Condensed" pitchFamily="2" charset="0"/>
+                <a:cs typeface="Consolas" panose="020B0609020204030204" pitchFamily="49" charset="0"/>
+              </a:rPr>
+              <a:t>handleCollate</a:t>
+            </a:r>
+            <a:r>
+              <a:rPr lang="en-US" sz="1200" dirty="0" smtClean="0">
+                <a:latin typeface="Roboto Condensed" pitchFamily="2" charset="0"/>
+                <a:ea typeface="Roboto Condensed" pitchFamily="2" charset="0"/>
+                <a:cs typeface="Consolas" panose="020B0609020204030204" pitchFamily="49" charset="0"/>
+              </a:rPr>
+              <a:t>(Command)</a:t>
+            </a:r>
+            <a:endParaRPr lang="en-GB" sz="1200" dirty="0">
+              <a:latin typeface="Roboto Condensed" pitchFamily="2" charset="0"/>
+              <a:ea typeface="Roboto Condensed" pitchFamily="2" charset="0"/>
+              <a:cs typeface="Consolas" panose="020B0609020204030204" pitchFamily="49" charset="0"/>
+            </a:endParaRPr>
+          </a:p>
+        </p:txBody>
+      </p:sp>
+      <p:sp>
+        <p:nvSpPr>
+          <p:cNvPr id="73" name="Rectangle 72"/>
+          <p:cNvSpPr/>
+          <p:nvPr/>
+        </p:nvSpPr>
+        <p:spPr>
+          <a:xfrm>
+            <a:off x="10587689" y="379898"/>
+            <a:ext cx="1273541" cy="574632"/>
+          </a:xfrm>
+          <a:prstGeom prst="rect">
+            <a:avLst/>
+          </a:prstGeom>
+          <a:solidFill>
+            <a:schemeClr val="accent5">
+              <a:lumMod val="50000"/>
+            </a:schemeClr>
+          </a:solidFill>
+          <a:ln>
+            <a:solidFill>
+              <a:schemeClr val="accent5">
+                <a:lumMod val="50000"/>
+              </a:schemeClr>
+            </a:solidFill>
+          </a:ln>
+        </p:spPr>
+        <p:style>
+          <a:lnRef idx="2">
+            <a:schemeClr val="accent1">
+              <a:shade val="50000"/>
+            </a:schemeClr>
+          </a:lnRef>
+          <a:fillRef idx="1">
+            <a:schemeClr val="accent1"/>
+          </a:fillRef>
+          <a:effectRef idx="0">
+            <a:schemeClr val="accent1"/>
+          </a:effectRef>
+          <a:fontRef idx="minor">
+            <a:schemeClr val="lt1"/>
+          </a:fontRef>
+        </p:style>
+        <p:txBody>
+          <a:bodyPr rot="0" spcFirstLastPara="0" vertOverflow="overflow" horzOverflow="overflow" vert="horz" wrap="square" lIns="91440" tIns="45720" rIns="91440" bIns="45720" numCol="1" spcCol="0" rtlCol="0" fromWordArt="0" anchor="ctr" anchorCtr="0" forceAA="0" compatLnSpc="1">
+            <a:prstTxWarp prst="textNoShape">
+              <a:avLst/>
+            </a:prstTxWarp>
+            <a:noAutofit/>
+          </a:bodyPr>
+          <a:lstStyle/>
+          <a:p>
+            <a:pPr algn="ctr"/>
+            <a:r>
+              <a:rPr lang="en-US" dirty="0" smtClean="0">
+                <a:solidFill>
+                  <a:schemeClr val="bg1"/>
+                </a:solidFill>
+                <a:latin typeface="Roboto" pitchFamily="2" charset="0"/>
+                <a:ea typeface="Roboto" pitchFamily="2" charset="0"/>
+              </a:rPr>
+              <a:t>:Storage</a:t>
+            </a:r>
+            <a:endParaRPr lang="en-GB" dirty="0">
+              <a:solidFill>
+                <a:schemeClr val="bg1"/>
+              </a:solidFill>
+              <a:latin typeface="Roboto" pitchFamily="2" charset="0"/>
+              <a:ea typeface="Roboto" pitchFamily="2" charset="0"/>
+            </a:endParaRPr>
+          </a:p>
+        </p:txBody>
+      </p:sp>
+      <p:cxnSp>
+        <p:nvCxnSpPr>
+          <p:cNvPr id="74" name="Straight Connector 73"/>
+          <p:cNvCxnSpPr>
+            <a:stCxn id="73" idx="2"/>
+          </p:cNvCxnSpPr>
+          <p:nvPr/>
+        </p:nvCxnSpPr>
+        <p:spPr>
+          <a:xfrm>
+            <a:off x="11224460" y="954530"/>
+            <a:ext cx="0" cy="4573433"/>
+          </a:xfrm>
+          <a:prstGeom prst="line">
+            <a:avLst/>
+          </a:prstGeom>
+          <a:ln w="25400">
+            <a:solidFill>
+              <a:schemeClr val="tx1">
+                <a:lumMod val="50000"/>
+                <a:lumOff val="50000"/>
+              </a:schemeClr>
+            </a:solidFill>
+            <a:prstDash val="dash"/>
+          </a:ln>
+        </p:spPr>
+        <p:style>
+          <a:lnRef idx="1">
+            <a:schemeClr val="accent1"/>
+          </a:lnRef>
+          <a:fillRef idx="0">
+            <a:schemeClr val="accent1"/>
+          </a:fillRef>
+          <a:effectRef idx="0">
+            <a:schemeClr val="accent1"/>
+          </a:effectRef>
+          <a:fontRef idx="minor">
+            <a:schemeClr val="tx1"/>
+          </a:fontRef>
+        </p:style>
+      </p:cxnSp>
+      <p:sp>
+        <p:nvSpPr>
+          <p:cNvPr id="75" name="Rectangle 74"/>
+          <p:cNvSpPr/>
+          <p:nvPr/>
+        </p:nvSpPr>
+        <p:spPr>
+          <a:xfrm>
+            <a:off x="11095150" y="4006806"/>
+            <a:ext cx="258618" cy="273275"/>
+          </a:xfrm>
+          <a:prstGeom prst="rect">
+            <a:avLst/>
+          </a:prstGeom>
+          <a:solidFill>
+            <a:schemeClr val="accent5">
+              <a:lumMod val="50000"/>
+            </a:schemeClr>
+          </a:solidFill>
+          <a:ln>
+            <a:solidFill>
+              <a:schemeClr val="accent5">
+                <a:lumMod val="50000"/>
+              </a:schemeClr>
+            </a:solidFill>
+          </a:ln>
+        </p:spPr>
+        <p:style>
+          <a:lnRef idx="2">
+            <a:schemeClr val="accent1">
+              <a:shade val="50000"/>
+            </a:schemeClr>
+          </a:lnRef>
+          <a:fillRef idx="1">
+            <a:schemeClr val="accent1"/>
+          </a:fillRef>
+          <a:effectRef idx="0">
+            <a:schemeClr val="accent1"/>
+          </a:effectRef>
+          <a:fontRef idx="minor">
+            <a:schemeClr val="lt1"/>
+          </a:fontRef>
+        </p:style>
+        <p:txBody>
+          <a:bodyPr rtlCol="0" anchor="ctr"/>
+          <a:lstStyle/>
+          <a:p>
+            <a:pPr algn="ctr"/>
+            <a:endParaRPr lang="en-GB">
+              <a:solidFill>
+                <a:schemeClr val="bg1"/>
+              </a:solidFill>
+            </a:endParaRPr>
+          </a:p>
+        </p:txBody>
+      </p:sp>
+      <p:cxnSp>
+        <p:nvCxnSpPr>
+          <p:cNvPr id="76" name="Straight Arrow Connector 75"/>
+          <p:cNvCxnSpPr/>
+          <p:nvPr/>
+        </p:nvCxnSpPr>
+        <p:spPr>
+          <a:xfrm>
+            <a:off x="3844783" y="4024061"/>
+            <a:ext cx="7250367" cy="0"/>
+          </a:xfrm>
+          <a:prstGeom prst="straightConnector1">
+            <a:avLst/>
+          </a:prstGeom>
+          <a:ln w="25400">
+            <a:solidFill>
+              <a:srgbClr val="B4C7E7"/>
+            </a:solidFill>
+            <a:tailEnd type="triangle" w="lg" len="lg"/>
+          </a:ln>
+        </p:spPr>
+        <p:style>
+          <a:lnRef idx="1">
+            <a:schemeClr val="accent1"/>
+          </a:lnRef>
+          <a:fillRef idx="0">
+            <a:schemeClr val="accent1"/>
+          </a:fillRef>
+          <a:effectRef idx="0">
+            <a:schemeClr val="accent1"/>
+          </a:effectRef>
+          <a:fontRef idx="minor">
+            <a:schemeClr val="tx1"/>
+          </a:fontRef>
+        </p:style>
+      </p:cxnSp>
+      <p:sp>
+        <p:nvSpPr>
+          <p:cNvPr id="78" name="Rectangle 77"/>
+          <p:cNvSpPr/>
+          <p:nvPr/>
+        </p:nvSpPr>
+        <p:spPr>
+          <a:xfrm>
+            <a:off x="2721697" y="3597276"/>
+            <a:ext cx="8794028" cy="847962"/>
+          </a:xfrm>
+          <a:prstGeom prst="rect">
+            <a:avLst/>
+          </a:prstGeom>
+          <a:noFill/>
+          <a:ln w="25400">
+            <a:solidFill>
+              <a:schemeClr val="tx1"/>
+            </a:solidFill>
+          </a:ln>
+        </p:spPr>
+        <p:style>
+          <a:lnRef idx="2">
+            <a:schemeClr val="accent1">
+              <a:shade val="50000"/>
+            </a:schemeClr>
+          </a:lnRef>
+          <a:fillRef idx="1">
+            <a:schemeClr val="accent1"/>
+          </a:fillRef>
+          <a:effectRef idx="0">
+            <a:schemeClr val="accent1"/>
+          </a:effectRef>
+          <a:fontRef idx="minor">
+            <a:schemeClr val="lt1"/>
+          </a:fontRef>
+        </p:style>
+        <p:txBody>
+          <a:bodyPr rtlCol="0" anchor="ctr"/>
+          <a:lstStyle/>
+          <a:p>
+            <a:pPr algn="ctr"/>
+            <a:endParaRPr lang="en-GB"/>
+          </a:p>
+        </p:txBody>
+      </p:sp>
+      <p:grpSp>
+        <p:nvGrpSpPr>
+          <p:cNvPr id="91" name="Group 90"/>
+          <p:cNvGrpSpPr/>
+          <p:nvPr/>
+        </p:nvGrpSpPr>
+        <p:grpSpPr>
+          <a:xfrm>
+            <a:off x="2721697" y="3606069"/>
+            <a:ext cx="535015" cy="279016"/>
+            <a:chOff x="2021606" y="3463194"/>
+            <a:chExt cx="535015" cy="240246"/>
+          </a:xfrm>
+        </p:grpSpPr>
+        <p:cxnSp>
+          <p:nvCxnSpPr>
+            <p:cNvPr id="80" name="Straight Connector 79"/>
+            <p:cNvCxnSpPr/>
+            <p:nvPr/>
+          </p:nvCxnSpPr>
+          <p:spPr>
+            <a:xfrm>
+              <a:off x="2021606" y="3701645"/>
+              <a:ext cx="482207" cy="0"/>
+            </a:xfrm>
+            <a:prstGeom prst="line">
+              <a:avLst/>
+            </a:prstGeom>
+            <a:ln w="25400">
+              <a:solidFill>
+                <a:schemeClr val="tx1"/>
+              </a:solidFill>
+            </a:ln>
+          </p:spPr>
+          <p:style>
+            <a:lnRef idx="1">
+              <a:schemeClr val="accent1"/>
+            </a:lnRef>
+            <a:fillRef idx="0">
+              <a:schemeClr val="accent1"/>
+            </a:fillRef>
+            <a:effectRef idx="0">
+              <a:schemeClr val="accent1"/>
+            </a:effectRef>
+            <a:fontRef idx="minor">
+              <a:schemeClr val="tx1"/>
+            </a:fontRef>
+          </p:style>
+        </p:cxnSp>
+        <p:cxnSp>
+          <p:nvCxnSpPr>
+            <p:cNvPr id="81" name="Straight Connector 80"/>
+            <p:cNvCxnSpPr/>
+            <p:nvPr/>
+          </p:nvCxnSpPr>
+          <p:spPr>
+            <a:xfrm flipV="1">
+              <a:off x="2498469" y="3640141"/>
+              <a:ext cx="58152" cy="63299"/>
+            </a:xfrm>
+            <a:prstGeom prst="line">
+              <a:avLst/>
+            </a:prstGeom>
+            <a:ln w="25400">
+              <a:solidFill>
+                <a:schemeClr val="tx1"/>
+              </a:solidFill>
+            </a:ln>
+          </p:spPr>
+          <p:style>
+            <a:lnRef idx="1">
+              <a:schemeClr val="accent1"/>
+            </a:lnRef>
+            <a:fillRef idx="0">
+              <a:schemeClr val="accent1"/>
+            </a:fillRef>
+            <a:effectRef idx="0">
+              <a:schemeClr val="accent1"/>
+            </a:effectRef>
+            <a:fontRef idx="minor">
+              <a:schemeClr val="tx1"/>
+            </a:fontRef>
+          </p:style>
+        </p:cxnSp>
+        <p:cxnSp>
+          <p:nvCxnSpPr>
+            <p:cNvPr id="84" name="Straight Connector 83"/>
+            <p:cNvCxnSpPr/>
+            <p:nvPr/>
+          </p:nvCxnSpPr>
+          <p:spPr>
+            <a:xfrm flipV="1">
+              <a:off x="2556621" y="3463194"/>
+              <a:ext cx="0" cy="176947"/>
+            </a:xfrm>
+            <a:prstGeom prst="line">
+              <a:avLst/>
+            </a:prstGeom>
+            <a:ln w="25400">
+              <a:solidFill>
+                <a:schemeClr val="tx1"/>
+              </a:solidFill>
+            </a:ln>
+          </p:spPr>
+          <p:style>
+            <a:lnRef idx="1">
+              <a:schemeClr val="accent1"/>
+            </a:lnRef>
+            <a:fillRef idx="0">
+              <a:schemeClr val="accent1"/>
+            </a:fillRef>
+            <a:effectRef idx="0">
+              <a:schemeClr val="accent1"/>
+            </a:effectRef>
+            <a:fontRef idx="minor">
+              <a:schemeClr val="tx1"/>
+            </a:fontRef>
+          </p:style>
+        </p:cxnSp>
+      </p:grpSp>
+      <p:sp>
+        <p:nvSpPr>
+          <p:cNvPr id="90" name="TextBox 89"/>
+          <p:cNvSpPr txBox="1"/>
+          <p:nvPr/>
+        </p:nvSpPr>
+        <p:spPr>
+          <a:xfrm>
+            <a:off x="2747942" y="3599050"/>
+            <a:ext cx="434734" cy="276999"/>
+          </a:xfrm>
+          <a:prstGeom prst="rect">
+            <a:avLst/>
+          </a:prstGeom>
+          <a:noFill/>
+        </p:spPr>
+        <p:txBody>
+          <a:bodyPr wrap="none" rtlCol="0">
+            <a:spAutoFit/>
+          </a:bodyPr>
+          <a:lstStyle/>
+          <a:p>
+            <a:r>
+              <a:rPr lang="en-US" sz="1200" dirty="0" smtClean="0">
+                <a:latin typeface="Roboto Condensed" pitchFamily="2" charset="0"/>
+                <a:ea typeface="Roboto Condensed" pitchFamily="2" charset="0"/>
+                <a:cs typeface="Consolas" panose="020B0609020204030204" pitchFamily="49" charset="0"/>
+              </a:rPr>
+              <a:t>loop</a:t>
+            </a:r>
+            <a:endParaRPr lang="en-GB" sz="1200" dirty="0">
+              <a:latin typeface="Roboto Condensed" pitchFamily="2" charset="0"/>
+              <a:ea typeface="Roboto Condensed" pitchFamily="2" charset="0"/>
+              <a:cs typeface="Consolas" panose="020B0609020204030204" pitchFamily="49" charset="0"/>
+            </a:endParaRPr>
+          </a:p>
+        </p:txBody>
+      </p:sp>
+      <p:sp>
+        <p:nvSpPr>
+          <p:cNvPr id="92" name="TextBox 91"/>
+          <p:cNvSpPr txBox="1"/>
+          <p:nvPr/>
+        </p:nvSpPr>
+        <p:spPr>
+          <a:xfrm>
+            <a:off x="3278658" y="3617611"/>
+            <a:ext cx="1059906" cy="276999"/>
+          </a:xfrm>
+          <a:prstGeom prst="rect">
+            <a:avLst/>
+          </a:prstGeom>
+          <a:solidFill>
+            <a:schemeClr val="bg1">
+              <a:alpha val="80000"/>
+            </a:schemeClr>
+          </a:solidFill>
+        </p:spPr>
+        <p:txBody>
+          <a:bodyPr wrap="none" rtlCol="0">
+            <a:spAutoFit/>
+          </a:bodyPr>
+          <a:lstStyle/>
+          <a:p>
+            <a:r>
+              <a:rPr lang="en-US" sz="1200" dirty="0" smtClean="0">
+                <a:latin typeface="Roboto Condensed" pitchFamily="2" charset="0"/>
+                <a:ea typeface="Roboto Condensed" pitchFamily="2" charset="0"/>
+                <a:cs typeface="Consolas" panose="020B0609020204030204" pitchFamily="49" charset="0"/>
+              </a:rPr>
+              <a:t>[for all authors]</a:t>
+            </a:r>
+            <a:endParaRPr lang="en-GB" sz="1200" dirty="0">
+              <a:latin typeface="Roboto Condensed" pitchFamily="2" charset="0"/>
+              <a:ea typeface="Roboto Condensed" pitchFamily="2" charset="0"/>
+              <a:cs typeface="Consolas" panose="020B0609020204030204" pitchFamily="49" charset="0"/>
+            </a:endParaRPr>
+          </a:p>
+        </p:txBody>
+      </p:sp>
+      <p:sp>
+        <p:nvSpPr>
+          <p:cNvPr id="93" name="TextBox 92"/>
+          <p:cNvSpPr txBox="1"/>
+          <p:nvPr/>
+        </p:nvSpPr>
+        <p:spPr>
+          <a:xfrm>
+            <a:off x="4360509" y="3725095"/>
+            <a:ext cx="2696572" cy="276999"/>
+          </a:xfrm>
+          <a:prstGeom prst="rect">
+            <a:avLst/>
+          </a:prstGeom>
+          <a:solidFill>
+            <a:schemeClr val="bg1">
+              <a:alpha val="80000"/>
+            </a:schemeClr>
+          </a:solidFill>
+        </p:spPr>
+        <p:txBody>
+          <a:bodyPr wrap="none" rtlCol="0">
+            <a:spAutoFit/>
+          </a:bodyPr>
+          <a:lstStyle/>
+          <a:p>
+            <a:r>
+              <a:rPr lang="en-US" sz="1200" dirty="0" err="1" smtClean="0">
+                <a:latin typeface="Roboto Condensed" pitchFamily="2" charset="0"/>
+                <a:ea typeface="Roboto Condensed" pitchFamily="2" charset="0"/>
+                <a:cs typeface="Consolas" panose="020B0609020204030204" pitchFamily="49" charset="0"/>
+              </a:rPr>
+              <a:t>addCollatedFile</a:t>
+            </a:r>
+            <a:r>
+              <a:rPr lang="en-US" sz="1200" dirty="0" smtClean="0">
+                <a:latin typeface="Roboto Condensed" pitchFamily="2" charset="0"/>
+                <a:ea typeface="Roboto Condensed" pitchFamily="2" charset="0"/>
+                <a:cs typeface="Consolas" panose="020B0609020204030204" pitchFamily="49" charset="0"/>
+              </a:rPr>
+              <a:t>(</a:t>
+            </a:r>
+            <a:r>
+              <a:rPr lang="en-US" sz="1200" dirty="0" err="1" smtClean="0">
+                <a:latin typeface="Roboto Condensed" pitchFamily="2" charset="0"/>
+                <a:ea typeface="Roboto Condensed" pitchFamily="2" charset="0"/>
+                <a:cs typeface="Consolas" panose="020B0609020204030204" pitchFamily="49" charset="0"/>
+              </a:rPr>
+              <a:t>authorName</a:t>
+            </a:r>
+            <a:r>
+              <a:rPr lang="en-US" sz="1200" dirty="0" smtClean="0">
+                <a:latin typeface="Roboto Condensed" pitchFamily="2" charset="0"/>
+                <a:ea typeface="Roboto Condensed" pitchFamily="2" charset="0"/>
+                <a:cs typeface="Consolas" panose="020B0609020204030204" pitchFamily="49" charset="0"/>
+              </a:rPr>
+              <a:t>, </a:t>
+            </a:r>
+            <a:r>
+              <a:rPr lang="en-US" sz="1200" dirty="0" err="1" smtClean="0">
+                <a:latin typeface="Roboto Condensed" pitchFamily="2" charset="0"/>
+                <a:ea typeface="Roboto Condensed" pitchFamily="2" charset="0"/>
+                <a:cs typeface="Consolas" panose="020B0609020204030204" pitchFamily="49" charset="0"/>
+              </a:rPr>
+              <a:t>collatedLines</a:t>
+            </a:r>
+            <a:r>
+              <a:rPr lang="en-US" sz="1200" dirty="0" smtClean="0">
+                <a:latin typeface="Roboto Condensed" pitchFamily="2" charset="0"/>
+                <a:ea typeface="Roboto Condensed" pitchFamily="2" charset="0"/>
+                <a:cs typeface="Consolas" panose="020B0609020204030204" pitchFamily="49" charset="0"/>
+              </a:rPr>
+              <a:t>)</a:t>
+            </a:r>
+            <a:endParaRPr lang="en-GB" sz="1200" dirty="0">
+              <a:latin typeface="Roboto Condensed" pitchFamily="2" charset="0"/>
+              <a:ea typeface="Roboto Condensed" pitchFamily="2" charset="0"/>
+              <a:cs typeface="Consolas" panose="020B0609020204030204" pitchFamily="49" charset="0"/>
+            </a:endParaRPr>
+          </a:p>
+        </p:txBody>
+      </p:sp>
+      <p:cxnSp>
+        <p:nvCxnSpPr>
+          <p:cNvPr id="95" name="Straight Arrow Connector 94"/>
+          <p:cNvCxnSpPr/>
+          <p:nvPr/>
+        </p:nvCxnSpPr>
+        <p:spPr>
+          <a:xfrm flipH="1">
+            <a:off x="3833276" y="4280081"/>
+            <a:ext cx="7261875" cy="0"/>
+          </a:xfrm>
+          <a:prstGeom prst="straightConnector1">
+            <a:avLst/>
+          </a:prstGeom>
+          <a:ln w="25400">
+            <a:solidFill>
+              <a:srgbClr val="203864"/>
+            </a:solidFill>
+            <a:prstDash val="sysDash"/>
+            <a:tailEnd type="triangle" w="lg" len="lg"/>
+          </a:ln>
+        </p:spPr>
+        <p:style>
+          <a:lnRef idx="1">
+            <a:schemeClr val="accent1"/>
+          </a:lnRef>
+          <a:fillRef idx="0">
+            <a:schemeClr val="accent1"/>
+          </a:fillRef>
+          <a:effectRef idx="0">
+            <a:schemeClr val="accent1"/>
+          </a:effectRef>
+          <a:fontRef idx="minor">
+            <a:schemeClr val="tx1"/>
+          </a:fontRef>
+        </p:style>
+      </p:cxnSp>
+      <p:sp>
+        <p:nvSpPr>
+          <p:cNvPr id="101" name="Rectangle 100"/>
+          <p:cNvSpPr/>
+          <p:nvPr/>
+        </p:nvSpPr>
+        <p:spPr>
+          <a:xfrm>
+            <a:off x="1804374" y="4698365"/>
+            <a:ext cx="1659429" cy="276999"/>
+          </a:xfrm>
+          <a:prstGeom prst="rect">
+            <a:avLst/>
+          </a:prstGeom>
+        </p:spPr>
+        <p:txBody>
+          <a:bodyPr wrap="none">
+            <a:spAutoFit/>
+          </a:bodyPr>
+          <a:lstStyle/>
+          <a:p>
+            <a:r>
+              <a:rPr lang="en-GB" sz="1200" dirty="0" err="1" smtClean="0">
+                <a:latin typeface="Roboto Condensed" pitchFamily="2" charset="0"/>
+                <a:ea typeface="Roboto Condensed" pitchFamily="2" charset="0"/>
+              </a:rPr>
+              <a:t>Command.Type.COLLATE</a:t>
+            </a:r>
+            <a:endParaRPr lang="en-GB" sz="1200" dirty="0">
+              <a:latin typeface="Roboto Condensed" pitchFamily="2" charset="0"/>
+              <a:ea typeface="Roboto Condensed" pitchFamily="2" charset="0"/>
+            </a:endParaRPr>
+          </a:p>
+        </p:txBody>
+      </p:sp>
+      <p:cxnSp>
+        <p:nvCxnSpPr>
+          <p:cNvPr id="102" name="Straight Arrow Connector 101"/>
+          <p:cNvCxnSpPr/>
+          <p:nvPr/>
+        </p:nvCxnSpPr>
+        <p:spPr>
+          <a:xfrm flipH="1">
+            <a:off x="1326758" y="4996373"/>
+            <a:ext cx="2118592" cy="0"/>
+          </a:xfrm>
+          <a:prstGeom prst="straightConnector1">
+            <a:avLst/>
+          </a:prstGeom>
+          <a:ln w="25400">
+            <a:solidFill>
+              <a:srgbClr val="B4C7E7"/>
+            </a:solidFill>
+            <a:prstDash val="sysDash"/>
+            <a:tailEnd type="triangle" w="lg" len="lg"/>
+          </a:ln>
+        </p:spPr>
+        <p:style>
+          <a:lnRef idx="1">
+            <a:schemeClr val="accent1"/>
+          </a:lnRef>
+          <a:fillRef idx="0">
+            <a:schemeClr val="accent1"/>
+          </a:fillRef>
+          <a:effectRef idx="0">
+            <a:schemeClr val="accent1"/>
+          </a:effectRef>
+          <a:fontRef idx="minor">
+            <a:schemeClr val="tx1"/>
+          </a:fontRef>
+        </p:style>
+      </p:cxnSp>
+      <p:cxnSp>
+        <p:nvCxnSpPr>
+          <p:cNvPr id="110" name="Straight Connector 109"/>
+          <p:cNvCxnSpPr/>
+          <p:nvPr/>
+        </p:nvCxnSpPr>
+        <p:spPr>
+          <a:xfrm>
+            <a:off x="1326758" y="940603"/>
+            <a:ext cx="0" cy="4573433"/>
+          </a:xfrm>
+          <a:prstGeom prst="line">
+            <a:avLst/>
+          </a:prstGeom>
+          <a:ln w="25400">
+            <a:solidFill>
+              <a:schemeClr val="tx1">
+                <a:lumMod val="50000"/>
+                <a:lumOff val="50000"/>
+              </a:schemeClr>
+            </a:solidFill>
+            <a:prstDash val="dash"/>
+          </a:ln>
+        </p:spPr>
+        <p:style>
+          <a:lnRef idx="1">
+            <a:schemeClr val="accent1"/>
+          </a:lnRef>
+          <a:fillRef idx="0">
+            <a:schemeClr val="accent1"/>
+          </a:fillRef>
+          <a:effectRef idx="0">
+            <a:schemeClr val="accent1"/>
+          </a:effectRef>
+          <a:fontRef idx="minor">
+            <a:schemeClr val="tx1"/>
+          </a:fontRef>
+        </p:style>
+      </p:cxnSp>
+      <p:sp>
+        <p:nvSpPr>
+          <p:cNvPr id="115" name="Rectangle 114"/>
+          <p:cNvSpPr/>
+          <p:nvPr/>
+        </p:nvSpPr>
+        <p:spPr>
+          <a:xfrm>
+            <a:off x="565890" y="379898"/>
+            <a:ext cx="1521736" cy="574632"/>
+          </a:xfrm>
+          <a:prstGeom prst="rect">
+            <a:avLst/>
+          </a:prstGeom>
+          <a:solidFill>
+            <a:srgbClr val="A9D18E"/>
+          </a:solidFill>
+          <a:ln>
+            <a:solidFill>
+              <a:schemeClr val="accent5">
+                <a:lumMod val="50000"/>
+              </a:schemeClr>
+            </a:solidFill>
+          </a:ln>
+        </p:spPr>
+        <p:style>
+          <a:lnRef idx="2">
+            <a:schemeClr val="accent1">
+              <a:shade val="50000"/>
+            </a:schemeClr>
+          </a:lnRef>
+          <a:fillRef idx="1">
+            <a:schemeClr val="accent1"/>
+          </a:fillRef>
+          <a:effectRef idx="0">
+            <a:schemeClr val="accent1"/>
+          </a:effectRef>
+          <a:fontRef idx="minor">
+            <a:schemeClr val="lt1"/>
+          </a:fontRef>
+        </p:style>
+        <p:txBody>
+          <a:bodyPr rot="0" spcFirstLastPara="0" vertOverflow="overflow" horzOverflow="overflow" vert="horz" wrap="square" lIns="91440" tIns="45720" rIns="91440" bIns="45720" numCol="1" spcCol="0" rtlCol="0" fromWordArt="0" anchor="ctr" anchorCtr="0" forceAA="0" compatLnSpc="1">
+            <a:prstTxWarp prst="textNoShape">
+              <a:avLst/>
+            </a:prstTxWarp>
+            <a:noAutofit/>
+          </a:bodyPr>
+          <a:lstStyle/>
+          <a:p>
+            <a:pPr algn="ctr"/>
+            <a:r>
+              <a:rPr lang="en-US" dirty="0" smtClean="0">
+                <a:solidFill>
+                  <a:schemeClr val="bg1"/>
+                </a:solidFill>
+                <a:latin typeface="Roboto" pitchFamily="2" charset="0"/>
+                <a:ea typeface="Roboto" pitchFamily="2" charset="0"/>
+              </a:rPr>
+              <a:t>:GUI</a:t>
+            </a:r>
+            <a:endParaRPr lang="en-GB" dirty="0">
+              <a:solidFill>
+                <a:schemeClr val="bg1"/>
+              </a:solidFill>
+              <a:latin typeface="Roboto" pitchFamily="2" charset="0"/>
+              <a:ea typeface="Roboto" pitchFamily="2" charset="0"/>
+            </a:endParaRPr>
+          </a:p>
+        </p:txBody>
+      </p:sp>
+      <p:sp>
+        <p:nvSpPr>
+          <p:cNvPr id="121" name="TextBox 120"/>
+          <p:cNvSpPr txBox="1"/>
+          <p:nvPr/>
+        </p:nvSpPr>
+        <p:spPr>
+          <a:xfrm>
+            <a:off x="519710" y="5737351"/>
+            <a:ext cx="4631396" cy="338554"/>
+          </a:xfrm>
+          <a:prstGeom prst="rect">
+            <a:avLst/>
+          </a:prstGeom>
+          <a:noFill/>
+        </p:spPr>
+        <p:txBody>
+          <a:bodyPr wrap="none" rtlCol="0">
+            <a:spAutoFit/>
+          </a:bodyPr>
+          <a:lstStyle/>
+          <a:p>
+            <a:r>
+              <a:rPr lang="en-US" sz="1600" dirty="0" smtClean="0">
+                <a:latin typeface="Roboto Condensed" pitchFamily="2" charset="0"/>
+                <a:ea typeface="Roboto Condensed" pitchFamily="2" charset="0"/>
+              </a:rPr>
+              <a:t>Figure </a:t>
+            </a:r>
+            <a:r>
+              <a:rPr lang="en-US" sz="1600" dirty="0" smtClean="0">
+                <a:latin typeface="Roboto Condensed" pitchFamily="2" charset="0"/>
+                <a:ea typeface="Roboto Condensed" pitchFamily="2" charset="0"/>
+              </a:rPr>
+              <a:t>5: Sequence </a:t>
+            </a:r>
+            <a:r>
+              <a:rPr lang="en-US" sz="1600" dirty="0" smtClean="0">
+                <a:latin typeface="Roboto Condensed" pitchFamily="2" charset="0"/>
+                <a:ea typeface="Roboto Condensed" pitchFamily="2" charset="0"/>
+              </a:rPr>
+              <a:t>diagram for </a:t>
+            </a:r>
+            <a:r>
+              <a:rPr lang="en-US" sz="1600" dirty="0" smtClean="0">
+                <a:latin typeface="Roboto Condensed" pitchFamily="2" charset="0"/>
+                <a:ea typeface="Roboto Condensed" pitchFamily="2" charset="0"/>
+              </a:rPr>
+              <a:t>a typical collate command</a:t>
+            </a:r>
+            <a:endParaRPr lang="en-GB" sz="1600" dirty="0">
+              <a:latin typeface="Roboto Condensed" pitchFamily="2" charset="0"/>
+              <a:ea typeface="Roboto Condensed" pitchFamily="2" charset="0"/>
+            </a:endParaRPr>
+          </a:p>
+        </p:txBody>
+      </p:sp>
+    </p:spTree>
+    <p:extLst>
+      <p:ext uri="{BB962C8B-B14F-4D97-AF65-F5344CB8AC3E}">
+        <p14:creationId xmlns:p14="http://schemas.microsoft.com/office/powerpoint/2010/main" val="2466569103"/>
+      </p:ext>
+    </p:extLst>
+  </p:cSld>
+  <p:clrMapOvr>
+    <a:masterClrMapping/>
+  </p:clrMapOvr>
+</p:sld>
+</file>
+
+<file path=ppt/slides/slide6.xml><?xml version="1.0" encoding="utf-8"?>
 <p:sld xmlns:a="http://schemas.openxmlformats.org/drawingml/2006/main" xmlns:r="http://schemas.openxmlformats.org/officeDocument/2006/relationships" xmlns:p="http://schemas.openxmlformats.org/presentationml/2006/main">
   <p:cSld>
     <p:spTree>
@@ -9774,7 +12214,21 @@
                 <a:latin typeface="Roboto Condensed" pitchFamily="2" charset="0"/>
                 <a:ea typeface="Roboto Condensed" pitchFamily="2" charset="0"/>
               </a:rPr>
-              <a:t>Figure 5: Class diagram for Data component</a:t>
+              <a:t>Figure </a:t>
+            </a:r>
+            <a:r>
+              <a:rPr lang="en-US" sz="1600" dirty="0" smtClean="0">
+                <a:latin typeface="Roboto Condensed" pitchFamily="2" charset="0"/>
+                <a:ea typeface="Roboto Condensed" pitchFamily="2" charset="0"/>
+              </a:rPr>
+              <a:t>6: </a:t>
+            </a:r>
+            <a:r>
+              <a:rPr lang="en-US" sz="1600" dirty="0" smtClean="0">
+                <a:latin typeface="Roboto Condensed" pitchFamily="2" charset="0"/>
+                <a:ea typeface="Roboto Condensed" pitchFamily="2" charset="0"/>
+              </a:rPr>
+              <a:t>Class diagram for Data component</a:t>
             </a:r>
             <a:endParaRPr lang="en-GB" sz="1600" dirty="0">
               <a:latin typeface="Roboto Condensed" pitchFamily="2" charset="0"/>

</xml_diff>

<commit_message>
Corrected return line type in sequence diagram
</commit_message>
<xml_diff>
--- a/docs/Diagrams.pptx
+++ b/docs/Diagrams.pptx
@@ -9110,6 +9110,207 @@
           <a:chExt cx="0" cy="0"/>
         </a:xfrm>
       </p:grpSpPr>
+      <p:cxnSp>
+        <p:nvCxnSpPr>
+          <p:cNvPr id="4" name="Straight Connector 3"/>
+          <p:cNvCxnSpPr>
+            <a:stCxn id="2" idx="2"/>
+          </p:cNvCxnSpPr>
+          <p:nvPr/>
+        </p:nvCxnSpPr>
+        <p:spPr>
+          <a:xfrm>
+            <a:off x="3574658" y="954530"/>
+            <a:ext cx="0" cy="4573433"/>
+          </a:xfrm>
+          <a:prstGeom prst="line">
+            <a:avLst/>
+          </a:prstGeom>
+          <a:ln w="25400">
+            <a:solidFill>
+              <a:schemeClr val="tx1">
+                <a:lumMod val="50000"/>
+                <a:lumOff val="50000"/>
+              </a:schemeClr>
+            </a:solidFill>
+            <a:prstDash val="dash"/>
+          </a:ln>
+        </p:spPr>
+        <p:style>
+          <a:lnRef idx="1">
+            <a:schemeClr val="accent1"/>
+          </a:lnRef>
+          <a:fillRef idx="0">
+            <a:schemeClr val="accent1"/>
+          </a:fillRef>
+          <a:effectRef idx="0">
+            <a:schemeClr val="accent1"/>
+          </a:effectRef>
+          <a:fontRef idx="minor">
+            <a:schemeClr val="tx1"/>
+          </a:fontRef>
+        </p:style>
+      </p:cxnSp>
+      <p:cxnSp>
+        <p:nvCxnSpPr>
+          <p:cNvPr id="12" name="Straight Connector 11"/>
+          <p:cNvCxnSpPr/>
+          <p:nvPr/>
+        </p:nvCxnSpPr>
+        <p:spPr>
+          <a:xfrm>
+            <a:off x="6125651" y="954530"/>
+            <a:ext cx="0" cy="4573433"/>
+          </a:xfrm>
+          <a:prstGeom prst="line">
+            <a:avLst/>
+          </a:prstGeom>
+          <a:ln w="25400">
+            <a:solidFill>
+              <a:schemeClr val="tx1">
+                <a:lumMod val="50000"/>
+                <a:lumOff val="50000"/>
+              </a:schemeClr>
+            </a:solidFill>
+            <a:prstDash val="dash"/>
+          </a:ln>
+        </p:spPr>
+        <p:style>
+          <a:lnRef idx="1">
+            <a:schemeClr val="accent1"/>
+          </a:lnRef>
+          <a:fillRef idx="0">
+            <a:schemeClr val="accent1"/>
+          </a:fillRef>
+          <a:effectRef idx="0">
+            <a:schemeClr val="accent1"/>
+          </a:effectRef>
+          <a:fontRef idx="minor">
+            <a:schemeClr val="tx1"/>
+          </a:fontRef>
+        </p:style>
+      </p:cxnSp>
+      <p:cxnSp>
+        <p:nvCxnSpPr>
+          <p:cNvPr id="110" name="Straight Connector 109"/>
+          <p:cNvCxnSpPr/>
+          <p:nvPr/>
+        </p:nvCxnSpPr>
+        <p:spPr>
+          <a:xfrm>
+            <a:off x="1326758" y="940603"/>
+            <a:ext cx="0" cy="4573433"/>
+          </a:xfrm>
+          <a:prstGeom prst="line">
+            <a:avLst/>
+          </a:prstGeom>
+          <a:ln w="25400">
+            <a:solidFill>
+              <a:schemeClr val="tx1">
+                <a:lumMod val="50000"/>
+                <a:lumOff val="50000"/>
+              </a:schemeClr>
+            </a:solidFill>
+            <a:prstDash val="dash"/>
+          </a:ln>
+        </p:spPr>
+        <p:style>
+          <a:lnRef idx="1">
+            <a:schemeClr val="accent1"/>
+          </a:lnRef>
+          <a:fillRef idx="0">
+            <a:schemeClr val="accent1"/>
+          </a:fillRef>
+          <a:effectRef idx="0">
+            <a:schemeClr val="accent1"/>
+          </a:effectRef>
+          <a:fontRef idx="minor">
+            <a:schemeClr val="tx1"/>
+          </a:fontRef>
+        </p:style>
+      </p:cxnSp>
+      <p:cxnSp>
+        <p:nvCxnSpPr>
+          <p:cNvPr id="128" name="Straight Connector 127"/>
+          <p:cNvCxnSpPr>
+            <a:stCxn id="73" idx="2"/>
+          </p:cNvCxnSpPr>
+          <p:nvPr/>
+        </p:nvCxnSpPr>
+        <p:spPr>
+          <a:xfrm>
+            <a:off x="10931636" y="954530"/>
+            <a:ext cx="3064" cy="4559506"/>
+          </a:xfrm>
+          <a:prstGeom prst="line">
+            <a:avLst/>
+          </a:prstGeom>
+          <a:ln w="25400">
+            <a:solidFill>
+              <a:schemeClr val="tx1">
+                <a:lumMod val="50000"/>
+                <a:lumOff val="50000"/>
+              </a:schemeClr>
+            </a:solidFill>
+            <a:prstDash val="dash"/>
+          </a:ln>
+        </p:spPr>
+        <p:style>
+          <a:lnRef idx="1">
+            <a:schemeClr val="accent1"/>
+          </a:lnRef>
+          <a:fillRef idx="0">
+            <a:schemeClr val="accent1"/>
+          </a:fillRef>
+          <a:effectRef idx="0">
+            <a:schemeClr val="accent1"/>
+          </a:effectRef>
+          <a:fontRef idx="minor">
+            <a:schemeClr val="tx1"/>
+          </a:fontRef>
+        </p:style>
+      </p:cxnSp>
+      <p:cxnSp>
+        <p:nvCxnSpPr>
+          <p:cNvPr id="134" name="Straight Connector 133"/>
+          <p:cNvCxnSpPr>
+            <a:stCxn id="22" idx="2"/>
+          </p:cNvCxnSpPr>
+          <p:nvPr/>
+        </p:nvCxnSpPr>
+        <p:spPr>
+          <a:xfrm>
+            <a:off x="9625070" y="2369481"/>
+            <a:ext cx="0" cy="3172410"/>
+          </a:xfrm>
+          <a:prstGeom prst="line">
+            <a:avLst/>
+          </a:prstGeom>
+          <a:ln w="25400">
+            <a:solidFill>
+              <a:schemeClr val="tx1">
+                <a:lumMod val="50000"/>
+                <a:lumOff val="50000"/>
+              </a:schemeClr>
+            </a:solidFill>
+            <a:prstDash val="dash"/>
+          </a:ln>
+        </p:spPr>
+        <p:style>
+          <a:lnRef idx="1">
+            <a:schemeClr val="accent1"/>
+          </a:lnRef>
+          <a:fillRef idx="0">
+            <a:schemeClr val="accent1"/>
+          </a:fillRef>
+          <a:effectRef idx="0">
+            <a:schemeClr val="accent1"/>
+          </a:effectRef>
+          <a:fontRef idx="minor">
+            <a:schemeClr val="tx1"/>
+          </a:fontRef>
+        </p:style>
+      </p:cxnSp>
       <p:grpSp>
         <p:nvGrpSpPr>
           <p:cNvPr id="97" name="Group 96"/>
@@ -9436,47 +9637,6 @@
           </a:p>
         </p:txBody>
       </p:sp>
-      <p:cxnSp>
-        <p:nvCxnSpPr>
-          <p:cNvPr id="4" name="Straight Connector 3"/>
-          <p:cNvCxnSpPr>
-            <a:stCxn id="2" idx="2"/>
-          </p:cNvCxnSpPr>
-          <p:nvPr/>
-        </p:nvCxnSpPr>
-        <p:spPr>
-          <a:xfrm>
-            <a:off x="3574658" y="954530"/>
-            <a:ext cx="0" cy="4573433"/>
-          </a:xfrm>
-          <a:prstGeom prst="line">
-            <a:avLst/>
-          </a:prstGeom>
-          <a:ln w="25400">
-            <a:solidFill>
-              <a:schemeClr val="tx1">
-                <a:lumMod val="50000"/>
-                <a:lumOff val="50000"/>
-              </a:schemeClr>
-            </a:solidFill>
-            <a:prstDash val="dash"/>
-          </a:ln>
-        </p:spPr>
-        <p:style>
-          <a:lnRef idx="1">
-            <a:schemeClr val="accent1"/>
-          </a:lnRef>
-          <a:fillRef idx="0">
-            <a:schemeClr val="accent1"/>
-          </a:fillRef>
-          <a:effectRef idx="0">
-            <a:schemeClr val="accent1"/>
-          </a:effectRef>
-          <a:fontRef idx="minor">
-            <a:schemeClr val="tx1"/>
-          </a:fontRef>
-        </p:style>
-      </p:cxnSp>
       <p:sp>
         <p:nvSpPr>
           <p:cNvPr id="5" name="Rectangle 4"/>
@@ -9571,7 +9731,7 @@
         </p:nvSpPr>
         <p:spPr>
           <a:xfrm>
-            <a:off x="1400742" y="1051440"/>
+            <a:off x="1400742" y="996024"/>
             <a:ext cx="1933543" cy="461665"/>
           </a:xfrm>
           <a:prstGeom prst="rect">
@@ -9726,45 +9886,6 @@
           </a:p>
         </p:txBody>
       </p:sp>
-      <p:cxnSp>
-        <p:nvCxnSpPr>
-          <p:cNvPr id="12" name="Straight Connector 11"/>
-          <p:cNvCxnSpPr/>
-          <p:nvPr/>
-        </p:nvCxnSpPr>
-        <p:spPr>
-          <a:xfrm>
-            <a:off x="6125651" y="954530"/>
-            <a:ext cx="0" cy="4573433"/>
-          </a:xfrm>
-          <a:prstGeom prst="line">
-            <a:avLst/>
-          </a:prstGeom>
-          <a:ln w="25400">
-            <a:solidFill>
-              <a:schemeClr val="tx1">
-                <a:lumMod val="50000"/>
-                <a:lumOff val="50000"/>
-              </a:schemeClr>
-            </a:solidFill>
-            <a:prstDash val="dash"/>
-          </a:ln>
-        </p:spPr>
-        <p:style>
-          <a:lnRef idx="1">
-            <a:schemeClr val="accent1"/>
-          </a:lnRef>
-          <a:fillRef idx="0">
-            <a:schemeClr val="accent1"/>
-          </a:fillRef>
-          <a:effectRef idx="0">
-            <a:schemeClr val="accent1"/>
-          </a:effectRef>
-          <a:fontRef idx="minor">
-            <a:schemeClr val="tx1"/>
-          </a:fontRef>
-        </p:style>
-      </p:cxnSp>
       <p:sp>
         <p:nvSpPr>
           <p:cNvPr id="13" name="Rectangle 12"/>
@@ -9890,6 +10011,7 @@
             <a:solidFill>
               <a:srgbClr val="8FAADC"/>
             </a:solidFill>
+            <a:prstDash val="sysDash"/>
             <a:tailEnd type="triangle" w="lg" len="lg"/>
           </a:ln>
         </p:spPr>
@@ -10005,7 +10127,7 @@
         <p:spPr>
           <a:xfrm>
             <a:off x="8945643" y="1906972"/>
-            <a:ext cx="1542066" cy="462509"/>
+            <a:ext cx="1358853" cy="462509"/>
           </a:xfrm>
           <a:prstGeom prst="rect">
             <a:avLst/>
@@ -10069,47 +10191,6 @@
           </a:p>
         </p:txBody>
       </p:sp>
-      <p:cxnSp>
-        <p:nvCxnSpPr>
-          <p:cNvPr id="23" name="Straight Connector 22"/>
-          <p:cNvCxnSpPr>
-            <a:stCxn id="22" idx="2"/>
-          </p:cNvCxnSpPr>
-          <p:nvPr/>
-        </p:nvCxnSpPr>
-        <p:spPr>
-          <a:xfrm>
-            <a:off x="9716676" y="2369481"/>
-            <a:ext cx="0" cy="3144555"/>
-          </a:xfrm>
-          <a:prstGeom prst="line">
-            <a:avLst/>
-          </a:prstGeom>
-          <a:ln w="25400">
-            <a:solidFill>
-              <a:schemeClr val="tx1">
-                <a:lumMod val="50000"/>
-                <a:lumOff val="50000"/>
-              </a:schemeClr>
-            </a:solidFill>
-            <a:prstDash val="dash"/>
-          </a:ln>
-        </p:spPr>
-        <p:style>
-          <a:lnRef idx="1">
-            <a:schemeClr val="accent1"/>
-          </a:lnRef>
-          <a:fillRef idx="0">
-            <a:schemeClr val="accent1"/>
-          </a:fillRef>
-          <a:effectRef idx="0">
-            <a:schemeClr val="accent1"/>
-          </a:effectRef>
-          <a:fontRef idx="minor">
-            <a:schemeClr val="tx1"/>
-          </a:fontRef>
-        </p:style>
-      </p:cxnSp>
       <p:sp>
         <p:nvSpPr>
           <p:cNvPr id="24" name="Rectangle 23"/>
@@ -10378,7 +10459,7 @@
         </p:nvSpPr>
         <p:spPr>
           <a:xfrm>
-            <a:off x="6424104" y="1890988"/>
+            <a:off x="6424104" y="1863280"/>
             <a:ext cx="2329484" cy="276999"/>
           </a:xfrm>
           <a:prstGeom prst="rect">
@@ -10459,8 +10540,8 @@
         </p:nvSpPr>
         <p:spPr>
           <a:xfrm>
-            <a:off x="9587367" y="2373552"/>
-            <a:ext cx="258618" cy="148715"/>
+            <a:off x="9501867" y="2367513"/>
+            <a:ext cx="258618" cy="125808"/>
           </a:xfrm>
           <a:prstGeom prst="rect">
             <a:avLst/>
@@ -10511,7 +10592,7 @@
         </p:nvCxnSpPr>
         <p:spPr>
           <a:xfrm flipH="1">
-            <a:off x="6406461" y="2519873"/>
+            <a:off x="6406461" y="2481773"/>
             <a:ext cx="3180907" cy="0"/>
           </a:xfrm>
           <a:prstGeom prst="straightConnector1">
@@ -10671,7 +10752,7 @@
         </p:nvSpPr>
         <p:spPr>
           <a:xfrm>
-            <a:off x="4024218" y="3103529"/>
+            <a:off x="4024218" y="3094293"/>
             <a:ext cx="1636987" cy="276999"/>
           </a:xfrm>
           <a:prstGeom prst="rect">
@@ -10717,8 +10798,8 @@
         </p:nvSpPr>
         <p:spPr>
           <a:xfrm>
-            <a:off x="10587689" y="379898"/>
-            <a:ext cx="1273541" cy="574632"/>
+            <a:off x="10347546" y="379898"/>
+            <a:ext cx="1168180" cy="574632"/>
           </a:xfrm>
           <a:prstGeom prst="rect">
             <a:avLst/>
@@ -10782,47 +10863,6 @@
           </a:p>
         </p:txBody>
       </p:sp>
-      <p:cxnSp>
-        <p:nvCxnSpPr>
-          <p:cNvPr id="74" name="Straight Connector 73"/>
-          <p:cNvCxnSpPr>
-            <a:stCxn id="73" idx="2"/>
-          </p:cNvCxnSpPr>
-          <p:nvPr/>
-        </p:nvCxnSpPr>
-        <p:spPr>
-          <a:xfrm>
-            <a:off x="11224460" y="954530"/>
-            <a:ext cx="0" cy="4573433"/>
-          </a:xfrm>
-          <a:prstGeom prst="line">
-            <a:avLst/>
-          </a:prstGeom>
-          <a:ln w="25400">
-            <a:solidFill>
-              <a:schemeClr val="tx1">
-                <a:lumMod val="50000"/>
-                <a:lumOff val="50000"/>
-              </a:schemeClr>
-            </a:solidFill>
-            <a:prstDash val="dash"/>
-          </a:ln>
-        </p:spPr>
-        <p:style>
-          <a:lnRef idx="1">
-            <a:schemeClr val="accent1"/>
-          </a:lnRef>
-          <a:fillRef idx="0">
-            <a:schemeClr val="accent1"/>
-          </a:fillRef>
-          <a:effectRef idx="0">
-            <a:schemeClr val="accent1"/>
-          </a:effectRef>
-          <a:fontRef idx="minor">
-            <a:schemeClr val="tx1"/>
-          </a:fontRef>
-        </p:style>
-      </p:cxnSp>
       <p:sp>
         <p:nvSpPr>
           <p:cNvPr id="75" name="Rectangle 74"/>
@@ -10831,7 +10871,7 @@
         </p:nvSpPr>
         <p:spPr>
           <a:xfrm>
-            <a:off x="11095150" y="4006806"/>
+            <a:off x="10802327" y="4021257"/>
             <a:ext cx="258618" cy="273275"/>
           </a:xfrm>
           <a:prstGeom prst="rect">
@@ -10888,7 +10928,7 @@
         <p:spPr>
           <a:xfrm>
             <a:off x="3844783" y="4024061"/>
-            <a:ext cx="7250367" cy="0"/>
+            <a:ext cx="6957544" cy="0"/>
           </a:xfrm>
           <a:prstGeom prst="straightConnector1">
             <a:avLst/>
@@ -10924,7 +10964,7 @@
         <p:spPr>
           <a:xfrm>
             <a:off x="2721697" y="3597276"/>
-            <a:ext cx="8794028" cy="847962"/>
+            <a:ext cx="8479703" cy="847962"/>
           </a:xfrm>
           <a:prstGeom prst="rect">
             <a:avLst/>
@@ -11251,8 +11291,8 @@
         </p:nvCxnSpPr>
         <p:spPr>
           <a:xfrm flipH="1">
-            <a:off x="3833276" y="4280081"/>
-            <a:ext cx="7261875" cy="0"/>
+            <a:off x="3833277" y="4280081"/>
+            <a:ext cx="6969050" cy="0"/>
           </a:xfrm>
           <a:prstGeom prst="straightConnector1">
             <a:avLst/>
@@ -11335,45 +11375,6 @@
             </a:solidFill>
             <a:prstDash val="sysDash"/>
             <a:tailEnd type="triangle" w="lg" len="lg"/>
-          </a:ln>
-        </p:spPr>
-        <p:style>
-          <a:lnRef idx="1">
-            <a:schemeClr val="accent1"/>
-          </a:lnRef>
-          <a:fillRef idx="0">
-            <a:schemeClr val="accent1"/>
-          </a:fillRef>
-          <a:effectRef idx="0">
-            <a:schemeClr val="accent1"/>
-          </a:effectRef>
-          <a:fontRef idx="minor">
-            <a:schemeClr val="tx1"/>
-          </a:fontRef>
-        </p:style>
-      </p:cxnSp>
-      <p:cxnSp>
-        <p:nvCxnSpPr>
-          <p:cNvPr id="110" name="Straight Connector 109"/>
-          <p:cNvCxnSpPr/>
-          <p:nvPr/>
-        </p:nvCxnSpPr>
-        <p:spPr>
-          <a:xfrm>
-            <a:off x="1326758" y="940603"/>
-            <a:ext cx="0" cy="4573433"/>
-          </a:xfrm>
-          <a:prstGeom prst="line">
-            <a:avLst/>
-          </a:prstGeom>
-          <a:ln w="25400">
-            <a:solidFill>
-              <a:schemeClr val="tx1">
-                <a:lumMod val="50000"/>
-                <a:lumOff val="50000"/>
-              </a:schemeClr>
-            </a:solidFill>
-            <a:prstDash val="dash"/>
           </a:ln>
         </p:spPr>
         <p:style>

</xml_diff>

<commit_message>
Updated GUI class diagram
</commit_message>
<xml_diff>
--- a/docs/Diagrams.pptx
+++ b/docs/Diagrams.pptx
@@ -5,18 +5,19 @@
     <p:sldMasterId id="2147483672" r:id="rId1"/>
   </p:sldMasterIdLst>
   <p:notesMasterIdLst>
-    <p:notesMasterId r:id="rId8"/>
+    <p:notesMasterId r:id="rId9"/>
   </p:notesMasterIdLst>
   <p:handoutMasterIdLst>
-    <p:handoutMasterId r:id="rId9"/>
+    <p:handoutMasterId r:id="rId10"/>
   </p:handoutMasterIdLst>
   <p:sldIdLst>
     <p:sldId id="256" r:id="rId2"/>
     <p:sldId id="257" r:id="rId3"/>
-    <p:sldId id="260" r:id="rId4"/>
-    <p:sldId id="258" r:id="rId5"/>
-    <p:sldId id="261" r:id="rId6"/>
-    <p:sldId id="259" r:id="rId7"/>
+    <p:sldId id="262" r:id="rId4"/>
+    <p:sldId id="260" r:id="rId5"/>
+    <p:sldId id="258" r:id="rId6"/>
+    <p:sldId id="261" r:id="rId7"/>
+    <p:sldId id="259" r:id="rId8"/>
   </p:sldIdLst>
   <p:sldSz cx="12192000" cy="6858000"/>
   <p:notesSz cx="6742113" cy="9872663"/>
@@ -3630,7 +3631,22 @@
               <a:rPr lang="en-US" sz="2200" dirty="0">
                 <a:ea typeface="Roboto Condensed" pitchFamily="2" charset="0"/>
               </a:rPr>
-              <a:t>Graphical UI</a:t>
+              <a:t>Graphical </a:t>
+            </a:r>
+            <a:r>
+              <a:rPr lang="en-US" sz="2200" dirty="0" smtClean="0">
+                <a:ea typeface="Roboto Condensed" pitchFamily="2" charset="0"/>
+              </a:rPr>
+              <a:t>UI</a:t>
+            </a:r>
+          </a:p>
+          <a:p>
+            <a:pPr algn="ctr"/>
+            <a:r>
+              <a:rPr lang="en-US" sz="2200" dirty="0" smtClean="0">
+                <a:ea typeface="Roboto Condensed" pitchFamily="2" charset="0"/>
+              </a:rPr>
+              <a:t>(GUI)</a:t>
             </a:r>
             <a:endParaRPr lang="en-GB" sz="2200" dirty="0">
               <a:ea typeface="Roboto Condensed" pitchFamily="2" charset="0"/>
@@ -3646,8 +3662,8 @@
         </p:nvSpPr>
         <p:spPr>
           <a:xfrm>
-            <a:off x="3100623" y="2492389"/>
-            <a:ext cx="1828800" cy="730940"/>
+            <a:off x="3100623" y="2492388"/>
+            <a:ext cx="1828800" cy="993663"/>
           </a:xfrm>
           <a:prstGeom prst="roundRect">
             <a:avLst>
@@ -3694,7 +3710,22 @@
               <a:rPr lang="en-US" sz="2200" dirty="0">
                 <a:ea typeface="Roboto Condensed" pitchFamily="2" charset="0"/>
               </a:rPr>
-              <a:t>Text UI</a:t>
+              <a:t>Text </a:t>
+            </a:r>
+            <a:r>
+              <a:rPr lang="en-US" sz="2200" dirty="0" smtClean="0">
+                <a:ea typeface="Roboto Condensed" pitchFamily="2" charset="0"/>
+              </a:rPr>
+              <a:t>UI </a:t>
+            </a:r>
+          </a:p>
+          <a:p>
+            <a:pPr algn="ctr"/>
+            <a:r>
+              <a:rPr lang="en-US" sz="2200" dirty="0" smtClean="0">
+                <a:ea typeface="Roboto Condensed" pitchFamily="2" charset="0"/>
+              </a:rPr>
+              <a:t>(TUI)</a:t>
             </a:r>
             <a:endParaRPr lang="en-GB" sz="2200" dirty="0">
               <a:ea typeface="Roboto Condensed" pitchFamily="2" charset="0"/>
@@ -4226,40 +4257,6 @@
       </p:grpSp>
       <p:sp>
         <p:nvSpPr>
-          <p:cNvPr id="35" name="TextBox 34"/>
-          <p:cNvSpPr txBox="1"/>
-          <p:nvPr/>
-        </p:nvSpPr>
-        <p:spPr>
-          <a:xfrm>
-            <a:off x="1880861" y="6086350"/>
-            <a:ext cx="4866332" cy="338554"/>
-          </a:xfrm>
-          <a:prstGeom prst="rect">
-            <a:avLst/>
-          </a:prstGeom>
-          <a:noFill/>
-        </p:spPr>
-        <p:txBody>
-          <a:bodyPr wrap="none" rtlCol="0">
-            <a:spAutoFit/>
-          </a:bodyPr>
-          <a:lstStyle/>
-          <a:p>
-            <a:r>
-              <a:rPr lang="en-US" sz="1600" dirty="0" smtClean="0">
-                <a:ea typeface="Roboto Condensed" pitchFamily="2" charset="0"/>
-              </a:rPr>
-              <a:t>Figure 1: Components of Collate and their dependencies</a:t>
-            </a:r>
-            <a:endParaRPr lang="en-GB" sz="1600" dirty="0">
-              <a:ea typeface="Roboto Condensed" pitchFamily="2" charset="0"/>
-            </a:endParaRPr>
-          </a:p>
-        </p:txBody>
-      </p:sp>
-      <p:sp>
-        <p:nvSpPr>
           <p:cNvPr id="2" name="Rounded Rectangle 1"/>
           <p:cNvSpPr/>
           <p:nvPr/>
@@ -4604,8 +4601,8 @@
         </p:nvCxnSpPr>
         <p:spPr>
           <a:xfrm rot="10800000">
-            <a:off x="4015024" y="3223330"/>
-            <a:ext cx="271049" cy="2133179"/>
+            <a:off x="4015024" y="3486052"/>
+            <a:ext cx="271049" cy="1870457"/>
           </a:xfrm>
           <a:prstGeom prst="bentConnector2">
             <a:avLst/>
@@ -4782,7 +4779,7 @@
         <p:spPr>
           <a:xfrm>
             <a:off x="2525868" y="2456718"/>
-            <a:ext cx="574755" cy="401141"/>
+            <a:ext cx="574755" cy="532502"/>
           </a:xfrm>
           <a:prstGeom prst="straightConnector1">
             <a:avLst/>
@@ -4885,62 +4882,6 @@
       </p:grpSpPr>
       <p:sp>
         <p:nvSpPr>
-          <p:cNvPr id="39" name="Rounded Rectangle 38"/>
-          <p:cNvSpPr/>
-          <p:nvPr/>
-        </p:nvSpPr>
-        <p:spPr>
-          <a:xfrm>
-            <a:off x="8252858" y="3751422"/>
-            <a:ext cx="2567542" cy="2445055"/>
-          </a:xfrm>
-          <a:prstGeom prst="roundRect">
-            <a:avLst>
-              <a:gd name="adj" fmla="val 11057"/>
-            </a:avLst>
-          </a:prstGeom>
-          <a:solidFill>
-            <a:srgbClr val="BF94E0"/>
-          </a:solidFill>
-          <a:ln>
-            <a:noFill/>
-          </a:ln>
-        </p:spPr>
-        <p:style>
-          <a:lnRef idx="2">
-            <a:schemeClr val="accent1">
-              <a:shade val="50000"/>
-            </a:schemeClr>
-          </a:lnRef>
-          <a:fillRef idx="1">
-            <a:schemeClr val="accent1"/>
-          </a:fillRef>
-          <a:effectRef idx="0">
-            <a:schemeClr val="accent1"/>
-          </a:effectRef>
-          <a:fontRef idx="minor">
-            <a:schemeClr val="lt1"/>
-          </a:fontRef>
-        </p:style>
-        <p:txBody>
-          <a:bodyPr rtlCol="0" anchor="t" anchorCtr="0"/>
-          <a:lstStyle/>
-          <a:p>
-            <a:pPr algn="ctr"/>
-            <a:r>
-              <a:rPr lang="en-US" dirty="0" smtClean="0">
-                <a:ea typeface="Roboto Condensed" pitchFamily="2" charset="0"/>
-              </a:rPr>
-              <a:t>Data</a:t>
-            </a:r>
-            <a:endParaRPr lang="en-GB" dirty="0">
-              <a:ea typeface="Roboto Condensed" pitchFamily="2" charset="0"/>
-            </a:endParaRPr>
-          </a:p>
-        </p:txBody>
-      </p:sp>
-      <p:sp>
-        <p:nvSpPr>
           <p:cNvPr id="5" name="Rounded Rectangle 4"/>
           <p:cNvSpPr/>
           <p:nvPr/>
@@ -5011,8 +4952,8 @@
         </p:nvSpPr>
         <p:spPr>
           <a:xfrm>
-            <a:off x="1543863" y="1309351"/>
-            <a:ext cx="6069026" cy="3074972"/>
+            <a:off x="1543863" y="1309350"/>
+            <a:ext cx="6069026" cy="3257269"/>
           </a:xfrm>
           <a:prstGeom prst="rect">
             <a:avLst/>
@@ -5137,8 +5078,8 @@
         </p:nvSpPr>
         <p:spPr>
           <a:xfrm>
-            <a:off x="5879847" y="1666561"/>
-            <a:ext cx="1464658" cy="1276499"/>
+            <a:off x="1844270" y="1630478"/>
+            <a:ext cx="2120806" cy="1290721"/>
           </a:xfrm>
           <a:prstGeom prst="rect">
             <a:avLst/>
@@ -5211,8 +5152,8 @@
         </p:nvSpPr>
         <p:spPr>
           <a:xfrm>
-            <a:off x="4640720" y="3305019"/>
-            <a:ext cx="2697648" cy="548640"/>
+            <a:off x="1843852" y="3589044"/>
+            <a:ext cx="2452407" cy="548640"/>
           </a:xfrm>
           <a:prstGeom prst="rect">
             <a:avLst/>
@@ -5285,8 +5226,8 @@
         </p:nvSpPr>
         <p:spPr>
           <a:xfrm>
-            <a:off x="1535771" y="4805838"/>
-            <a:ext cx="6069026" cy="1092422"/>
+            <a:off x="1535771" y="4864838"/>
+            <a:ext cx="6069026" cy="1033422"/>
           </a:xfrm>
           <a:prstGeom prst="rect">
             <a:avLst/>
@@ -5358,7 +5299,7 @@
         </p:nvSpPr>
         <p:spPr>
           <a:xfrm>
-            <a:off x="1535771" y="4579260"/>
+            <a:off x="1535771" y="4636410"/>
             <a:ext cx="890124" cy="226578"/>
           </a:xfrm>
           <a:prstGeom prst="rect">
@@ -5403,70 +5344,6 @@
           </a:p>
         </p:txBody>
       </p:sp>
-      <p:sp>
-        <p:nvSpPr>
-          <p:cNvPr id="16" name="Rounded Rectangle 15"/>
-          <p:cNvSpPr/>
-          <p:nvPr/>
-        </p:nvSpPr>
-        <p:spPr>
-          <a:xfrm>
-            <a:off x="8252858" y="661525"/>
-            <a:ext cx="2567542" cy="2804598"/>
-          </a:xfrm>
-          <a:prstGeom prst="roundRect">
-            <a:avLst>
-              <a:gd name="adj" fmla="val 11791"/>
-            </a:avLst>
-          </a:prstGeom>
-          <a:solidFill>
-            <a:schemeClr val="accent5">
-              <a:lumMod val="60000"/>
-              <a:lumOff val="40000"/>
-            </a:schemeClr>
-          </a:solidFill>
-          <a:ln>
-            <a:noFill/>
-          </a:ln>
-        </p:spPr>
-        <p:style>
-          <a:lnRef idx="2">
-            <a:schemeClr val="accent1">
-              <a:shade val="50000"/>
-            </a:schemeClr>
-          </a:lnRef>
-          <a:fillRef idx="1">
-            <a:schemeClr val="accent1"/>
-          </a:fillRef>
-          <a:effectRef idx="0">
-            <a:schemeClr val="accent1"/>
-          </a:effectRef>
-          <a:fontRef idx="minor">
-            <a:schemeClr val="lt1"/>
-          </a:fontRef>
-        </p:style>
-        <p:txBody>
-          <a:bodyPr rot="0" spcFirstLastPara="0" vertOverflow="overflow" horzOverflow="overflow" vert="horz" wrap="square" lIns="91440" tIns="91440" rIns="91440" bIns="45720" numCol="1" spcCol="0" rtlCol="0" fromWordArt="0" anchor="t" anchorCtr="0" forceAA="0" compatLnSpc="1">
-            <a:prstTxWarp prst="textNoShape">
-              <a:avLst/>
-            </a:prstTxWarp>
-            <a:noAutofit/>
-          </a:bodyPr>
-          <a:lstStyle/>
-          <a:p>
-            <a:pPr algn="ctr"/>
-            <a:r>
-              <a:rPr lang="en-US" dirty="0">
-                <a:ea typeface="Roboto Condensed" pitchFamily="2" charset="0"/>
-              </a:rPr>
-              <a:t>Backend</a:t>
-            </a:r>
-            <a:endParaRPr lang="en-GB" dirty="0">
-              <a:ea typeface="Roboto Condensed" pitchFamily="2" charset="0"/>
-            </a:endParaRPr>
-          </a:p>
-        </p:txBody>
-      </p:sp>
       <p:cxnSp>
         <p:nvCxnSpPr>
           <p:cNvPr id="17" name="Straight Arrow Connector 16"/>
@@ -5477,8 +5354,8 @@
         </p:nvCxnSpPr>
         <p:spPr>
           <a:xfrm>
-            <a:off x="5989544" y="2943059"/>
-            <a:ext cx="0" cy="361960"/>
+            <a:off x="3070056" y="2921199"/>
+            <a:ext cx="0" cy="667845"/>
           </a:xfrm>
           <a:prstGeom prst="straightConnector1">
             <a:avLst/>
@@ -5514,14 +5391,14 @@
         <p:nvCxnSpPr>
           <p:cNvPr id="20" name="Straight Arrow Connector 19"/>
           <p:cNvCxnSpPr>
-            <a:stCxn id="7" idx="1"/>
+            <a:endCxn id="10" idx="1"/>
           </p:cNvCxnSpPr>
           <p:nvPr/>
         </p:nvCxnSpPr>
         <p:spPr>
-          <a:xfrm flipH="1">
-            <a:off x="4288671" y="2304810"/>
-            <a:ext cx="1591176" cy="995458"/>
+          <a:xfrm>
+            <a:off x="3960181" y="2755566"/>
+            <a:ext cx="839446" cy="0"/>
           </a:xfrm>
           <a:prstGeom prst="straightConnector1">
             <a:avLst/>
@@ -5556,14 +5433,14 @@
         <p:nvCxnSpPr>
           <p:cNvPr id="25" name="Straight Arrow Connector 24"/>
           <p:cNvCxnSpPr>
-            <a:endCxn id="10" idx="3"/>
+            <a:endCxn id="9" idx="1"/>
           </p:cNvCxnSpPr>
           <p:nvPr/>
         </p:nvCxnSpPr>
         <p:spPr>
-          <a:xfrm flipH="1">
-            <a:off x="4294807" y="1937693"/>
-            <a:ext cx="1572766" cy="1"/>
+          <a:xfrm>
+            <a:off x="3960181" y="1904133"/>
+            <a:ext cx="827059" cy="0"/>
           </a:xfrm>
           <a:prstGeom prst="straightConnector1">
             <a:avLst/>
@@ -5605,7 +5482,7 @@
         </p:nvCxnSpPr>
         <p:spPr>
           <a:xfrm>
-            <a:off x="3072910" y="2212013"/>
+            <a:off x="5910443" y="3029886"/>
             <a:ext cx="0" cy="272948"/>
           </a:xfrm>
           <a:prstGeom prst="straightConnector1">
@@ -5639,14 +5516,14 @@
       </p:cxnSp>
       <p:cxnSp>
         <p:nvCxnSpPr>
-          <p:cNvPr id="40" name="Straight Arrow Connector 39"/>
+          <p:cNvPr id="43" name="Straight Arrow Connector 42"/>
           <p:cNvCxnSpPr/>
           <p:nvPr/>
         </p:nvCxnSpPr>
         <p:spPr>
-          <a:xfrm>
-            <a:off x="1662546" y="1937692"/>
-            <a:ext cx="0" cy="2343037"/>
+          <a:xfrm flipV="1">
+            <a:off x="1684020" y="2280758"/>
+            <a:ext cx="0" cy="2150565"/>
           </a:xfrm>
           <a:prstGeom prst="straightConnector1">
             <a:avLst/>
@@ -5677,88 +5554,6 @@
           </a:fontRef>
         </p:style>
       </p:cxnSp>
-      <p:cxnSp>
-        <p:nvCxnSpPr>
-          <p:cNvPr id="43" name="Straight Arrow Connector 42"/>
-          <p:cNvCxnSpPr>
-            <a:endCxn id="9" idx="2"/>
-          </p:cNvCxnSpPr>
-          <p:nvPr/>
-        </p:nvCxnSpPr>
-        <p:spPr>
-          <a:xfrm flipV="1">
-            <a:off x="3066774" y="3847905"/>
-            <a:ext cx="0" cy="141237"/>
-          </a:xfrm>
-          <a:prstGeom prst="straightConnector1">
-            <a:avLst/>
-          </a:prstGeom>
-          <a:ln w="25400" cap="sq">
-            <a:solidFill>
-              <a:schemeClr val="tx1">
-                <a:lumMod val="50000"/>
-                <a:lumOff val="50000"/>
-              </a:schemeClr>
-            </a:solidFill>
-            <a:prstDash val="sysDash"/>
-            <a:tailEnd type="none" w="med" len="med"/>
-          </a:ln>
-        </p:spPr>
-        <p:style>
-          <a:lnRef idx="1">
-            <a:schemeClr val="accent1"/>
-          </a:lnRef>
-          <a:fillRef idx="0">
-            <a:schemeClr val="accent1"/>
-          </a:fillRef>
-          <a:effectRef idx="0">
-            <a:schemeClr val="accent1"/>
-          </a:effectRef>
-          <a:fontRef idx="minor">
-            <a:schemeClr val="tx1"/>
-          </a:fontRef>
-        </p:style>
-      </p:cxnSp>
-      <p:cxnSp>
-        <p:nvCxnSpPr>
-          <p:cNvPr id="52" name="Straight Arrow Connector 51"/>
-          <p:cNvCxnSpPr/>
-          <p:nvPr/>
-        </p:nvCxnSpPr>
-        <p:spPr>
-          <a:xfrm flipH="1">
-            <a:off x="1656409" y="1937692"/>
-            <a:ext cx="188468" cy="0"/>
-          </a:xfrm>
-          <a:prstGeom prst="straightConnector1">
-            <a:avLst/>
-          </a:prstGeom>
-          <a:ln w="25400" cap="sq">
-            <a:solidFill>
-              <a:schemeClr val="tx1">
-                <a:lumMod val="50000"/>
-                <a:lumOff val="50000"/>
-              </a:schemeClr>
-            </a:solidFill>
-            <a:prstDash val="sysDash"/>
-            <a:tailEnd type="none" w="med" len="med"/>
-          </a:ln>
-        </p:spPr>
-        <p:style>
-          <a:lnRef idx="1">
-            <a:schemeClr val="accent1"/>
-          </a:lnRef>
-          <a:fillRef idx="0">
-            <a:schemeClr val="accent1"/>
-          </a:fillRef>
-          <a:effectRef idx="0">
-            <a:schemeClr val="accent1"/>
-          </a:effectRef>
-          <a:fontRef idx="minor">
-            <a:schemeClr val="tx1"/>
-          </a:fontRef>
-        </p:style>
-      </p:cxnSp>
       <p:sp>
         <p:nvSpPr>
           <p:cNvPr id="9" name="Rectangle 8"/>
@@ -5767,8 +5562,8 @@
         </p:nvSpPr>
         <p:spPr>
           <a:xfrm>
-            <a:off x="1844877" y="3299265"/>
-            <a:ext cx="2443794" cy="548640"/>
+            <a:off x="4787240" y="1629813"/>
+            <a:ext cx="2221631" cy="548640"/>
           </a:xfrm>
           <a:prstGeom prst="rect">
             <a:avLst/>
@@ -5841,8 +5636,8 @@
         </p:nvSpPr>
         <p:spPr>
           <a:xfrm>
-            <a:off x="1851013" y="2484961"/>
-            <a:ext cx="2443794" cy="548640"/>
+            <a:off x="5151740" y="3302834"/>
+            <a:ext cx="1517405" cy="548640"/>
           </a:xfrm>
           <a:prstGeom prst="rect">
             <a:avLst/>
@@ -5915,8 +5710,8 @@
         </p:nvSpPr>
         <p:spPr>
           <a:xfrm>
-            <a:off x="1851013" y="1663373"/>
-            <a:ext cx="2443794" cy="548640"/>
+            <a:off x="4799627" y="2481246"/>
+            <a:ext cx="2221631" cy="548640"/>
           </a:xfrm>
           <a:prstGeom prst="rect">
             <a:avLst/>
@@ -5989,7 +5784,7 @@
         </p:nvSpPr>
         <p:spPr>
           <a:xfrm>
-            <a:off x="6002776" y="3065338"/>
+            <a:off x="3097576" y="3349363"/>
             <a:ext cx="338554" cy="276999"/>
           </a:xfrm>
           <a:prstGeom prst="rect">
@@ -6035,7 +5830,7 @@
         </p:nvSpPr>
         <p:spPr>
           <a:xfrm>
-            <a:off x="4366199" y="3189123"/>
+            <a:off x="4510418" y="1598279"/>
             <a:ext cx="338554" cy="276999"/>
           </a:xfrm>
           <a:prstGeom prst="rect">
@@ -6081,7 +5876,7 @@
         </p:nvSpPr>
         <p:spPr>
           <a:xfrm>
-            <a:off x="4361734" y="1942445"/>
+            <a:off x="4522805" y="2449712"/>
             <a:ext cx="338554" cy="276999"/>
           </a:xfrm>
           <a:prstGeom prst="rect">
@@ -6127,8 +5922,8 @@
         </p:nvSpPr>
         <p:spPr>
           <a:xfrm>
-            <a:off x="3076038" y="2209469"/>
-            <a:ext cx="338554" cy="369332"/>
+            <a:off x="5928959" y="3027342"/>
+            <a:ext cx="307776" cy="369332"/>
           </a:xfrm>
           <a:prstGeom prst="rect">
             <a:avLst/>
@@ -6515,172 +6310,261 @@
           </a:p>
         </p:txBody>
       </p:sp>
-      <p:sp>
-        <p:nvSpPr>
-          <p:cNvPr id="85" name="Rectangle 84"/>
-          <p:cNvSpPr/>
+      <p:grpSp>
+        <p:nvGrpSpPr>
+          <p:cNvPr id="29" name="Group 28"/>
+          <p:cNvGrpSpPr/>
           <p:nvPr/>
-        </p:nvSpPr>
-        <p:spPr>
-          <a:xfrm>
-            <a:off x="8511388" y="1447897"/>
-            <a:ext cx="2015545" cy="1741226"/>
-          </a:xfrm>
-          <a:prstGeom prst="rect">
-            <a:avLst/>
-          </a:prstGeom>
-          <a:solidFill>
-            <a:schemeClr val="bg1"/>
-          </a:solidFill>
-          <a:ln>
+        </p:nvGrpSpPr>
+        <p:grpSpPr>
+          <a:xfrm>
+            <a:off x="8244106" y="3302834"/>
+            <a:ext cx="2567542" cy="2804598"/>
+            <a:chOff x="8252858" y="661525"/>
+            <a:chExt cx="2567542" cy="2804598"/>
+          </a:xfrm>
+        </p:grpSpPr>
+        <p:sp>
+          <p:nvSpPr>
+            <p:cNvPr id="16" name="Rounded Rectangle 15"/>
+            <p:cNvSpPr/>
+            <p:nvPr/>
+          </p:nvSpPr>
+          <p:spPr>
+            <a:xfrm>
+              <a:off x="8252858" y="661525"/>
+              <a:ext cx="2567542" cy="2804598"/>
+            </a:xfrm>
+            <a:prstGeom prst="roundRect">
+              <a:avLst>
+                <a:gd name="adj" fmla="val 11791"/>
+              </a:avLst>
+            </a:prstGeom>
             <a:solidFill>
-              <a:srgbClr val="6A8ED0"/>
+              <a:schemeClr val="accent5">
+                <a:lumMod val="60000"/>
+                <a:lumOff val="40000"/>
+              </a:schemeClr>
             </a:solidFill>
-          </a:ln>
-        </p:spPr>
-        <p:style>
-          <a:lnRef idx="2">
-            <a:schemeClr val="accent1">
-              <a:shade val="50000"/>
-            </a:schemeClr>
-          </a:lnRef>
-          <a:fillRef idx="1">
-            <a:schemeClr val="accent1"/>
-          </a:fillRef>
-          <a:effectRef idx="0">
-            <a:schemeClr val="accent1"/>
-          </a:effectRef>
-          <a:fontRef idx="minor">
-            <a:schemeClr val="lt1"/>
-          </a:fontRef>
-        </p:style>
-        <p:txBody>
-          <a:bodyPr rot="0" spcFirstLastPara="0" vertOverflow="overflow" horzOverflow="overflow" vert="horz" wrap="square" lIns="91440" tIns="45720" rIns="91440" bIns="45720" numCol="1" spcCol="0" rtlCol="0" fromWordArt="0" anchor="t" anchorCtr="0" forceAA="0" compatLnSpc="1">
-            <a:prstTxWarp prst="textNoShape">
+            <a:ln>
+              <a:noFill/>
+            </a:ln>
+          </p:spPr>
+          <p:style>
+            <a:lnRef idx="2">
+              <a:schemeClr val="accent1">
+                <a:shade val="50000"/>
+              </a:schemeClr>
+            </a:lnRef>
+            <a:fillRef idx="1">
+              <a:schemeClr val="accent1"/>
+            </a:fillRef>
+            <a:effectRef idx="0">
+              <a:schemeClr val="accent1"/>
+            </a:effectRef>
+            <a:fontRef idx="minor">
+              <a:schemeClr val="lt1"/>
+            </a:fontRef>
+          </p:style>
+          <p:txBody>
+            <a:bodyPr rot="0" spcFirstLastPara="0" vertOverflow="overflow" horzOverflow="overflow" vert="horz" wrap="square" lIns="91440" tIns="91440" rIns="91440" bIns="45720" numCol="1" spcCol="0" rtlCol="0" fromWordArt="0" anchor="t" anchorCtr="0" forceAA="0" compatLnSpc="1">
+              <a:prstTxWarp prst="textNoShape">
+                <a:avLst/>
+              </a:prstTxWarp>
+              <a:noAutofit/>
+            </a:bodyPr>
+            <a:lstStyle/>
+            <a:p>
+              <a:pPr algn="ctr"/>
+              <a:r>
+                <a:rPr lang="en-US" dirty="0">
+                  <a:ea typeface="Roboto Condensed" pitchFamily="2" charset="0"/>
+                </a:rPr>
+                <a:t>Backend</a:t>
+              </a:r>
+              <a:endParaRPr lang="en-GB" dirty="0">
+                <a:ea typeface="Roboto Condensed" pitchFamily="2" charset="0"/>
+              </a:endParaRPr>
+            </a:p>
+          </p:txBody>
+        </p:sp>
+        <p:sp>
+          <p:nvSpPr>
+            <p:cNvPr id="85" name="Rectangle 84"/>
+            <p:cNvSpPr/>
+            <p:nvPr/>
+          </p:nvSpPr>
+          <p:spPr>
+            <a:xfrm>
+              <a:off x="8511388" y="1447897"/>
+              <a:ext cx="2015545" cy="1741226"/>
+            </a:xfrm>
+            <a:prstGeom prst="rect">
               <a:avLst/>
-            </a:prstTxWarp>
-            <a:noAutofit/>
-          </a:bodyPr>
-          <a:lstStyle/>
-          <a:p>
-            <a:pPr algn="ctr"/>
-            <a:endParaRPr lang="en-GB" sz="1400" dirty="0">
+            </a:prstGeom>
+            <a:solidFill>
+              <a:schemeClr val="bg1"/>
+            </a:solidFill>
+            <a:ln>
               <a:solidFill>
-                <a:schemeClr val="tx1">
-                  <a:lumMod val="75000"/>
-                  <a:lumOff val="25000"/>
-                </a:schemeClr>
+                <a:srgbClr val="6A8ED0"/>
               </a:solidFill>
-              <a:ea typeface="Roboto Condensed" pitchFamily="2" charset="0"/>
-            </a:endParaRPr>
-          </a:p>
-        </p:txBody>
-      </p:sp>
-      <p:sp>
-        <p:nvSpPr>
-          <p:cNvPr id="86" name="Rectangle 85"/>
-          <p:cNvSpPr/>
-          <p:nvPr/>
-        </p:nvSpPr>
-        <p:spPr>
-          <a:xfrm>
-            <a:off x="8511388" y="1221317"/>
-            <a:ext cx="735640" cy="226578"/>
-          </a:xfrm>
-          <a:prstGeom prst="rect">
-            <a:avLst/>
-          </a:prstGeom>
-          <a:solidFill>
-            <a:schemeClr val="bg1"/>
-          </a:solidFill>
-          <a:ln>
+            </a:ln>
+          </p:spPr>
+          <p:style>
+            <a:lnRef idx="2">
+              <a:schemeClr val="accent1">
+                <a:shade val="50000"/>
+              </a:schemeClr>
+            </a:lnRef>
+            <a:fillRef idx="1">
+              <a:schemeClr val="accent1"/>
+            </a:fillRef>
+            <a:effectRef idx="0">
+              <a:schemeClr val="accent1"/>
+            </a:effectRef>
+            <a:fontRef idx="minor">
+              <a:schemeClr val="lt1"/>
+            </a:fontRef>
+          </p:style>
+          <p:txBody>
+            <a:bodyPr rot="0" spcFirstLastPara="0" vertOverflow="overflow" horzOverflow="overflow" vert="horz" wrap="square" lIns="91440" tIns="45720" rIns="91440" bIns="45720" numCol="1" spcCol="0" rtlCol="0" fromWordArt="0" anchor="t" anchorCtr="0" forceAA="0" compatLnSpc="1">
+              <a:prstTxWarp prst="textNoShape">
+                <a:avLst/>
+              </a:prstTxWarp>
+              <a:noAutofit/>
+            </a:bodyPr>
+            <a:lstStyle/>
+            <a:p>
+              <a:pPr algn="ctr"/>
+              <a:endParaRPr lang="en-GB" sz="1400" dirty="0">
+                <a:solidFill>
+                  <a:schemeClr val="tx1">
+                    <a:lumMod val="75000"/>
+                    <a:lumOff val="25000"/>
+                  </a:schemeClr>
+                </a:solidFill>
+                <a:ea typeface="Roboto Condensed" pitchFamily="2" charset="0"/>
+              </a:endParaRPr>
+            </a:p>
+          </p:txBody>
+        </p:sp>
+        <p:sp>
+          <p:nvSpPr>
+            <p:cNvPr id="86" name="Rectangle 85"/>
+            <p:cNvSpPr/>
+            <p:nvPr/>
+          </p:nvSpPr>
+          <p:spPr>
+            <a:xfrm>
+              <a:off x="8511388" y="1221317"/>
+              <a:ext cx="735640" cy="226578"/>
+            </a:xfrm>
+            <a:prstGeom prst="rect">
+              <a:avLst/>
+            </a:prstGeom>
             <a:solidFill>
-              <a:srgbClr val="6A8ED0"/>
+              <a:schemeClr val="bg1"/>
             </a:solidFill>
-          </a:ln>
-        </p:spPr>
-        <p:style>
-          <a:lnRef idx="2">
-            <a:schemeClr val="accent1">
-              <a:shade val="50000"/>
-            </a:schemeClr>
-          </a:lnRef>
-          <a:fillRef idx="1">
-            <a:schemeClr val="accent1"/>
-          </a:fillRef>
-          <a:effectRef idx="0">
-            <a:schemeClr val="accent1"/>
-          </a:effectRef>
-          <a:fontRef idx="minor">
-            <a:schemeClr val="lt1"/>
-          </a:fontRef>
-        </p:style>
-        <p:txBody>
-          <a:bodyPr rot="0" spcFirstLastPara="0" vertOverflow="overflow" horzOverflow="overflow" vert="horz" wrap="square" lIns="91440" tIns="45720" rIns="91440" bIns="45720" numCol="1" spcCol="0" rtlCol="0" fromWordArt="0" anchor="ctr" anchorCtr="0" forceAA="0" compatLnSpc="1">
-            <a:prstTxWarp prst="textNoShape">
+            <a:ln>
+              <a:solidFill>
+                <a:srgbClr val="6A8ED0"/>
+              </a:solidFill>
+            </a:ln>
+          </p:spPr>
+          <p:style>
+            <a:lnRef idx="2">
+              <a:schemeClr val="accent1">
+                <a:shade val="50000"/>
+              </a:schemeClr>
+            </a:lnRef>
+            <a:fillRef idx="1">
+              <a:schemeClr val="accent1"/>
+            </a:fillRef>
+            <a:effectRef idx="0">
+              <a:schemeClr val="accent1"/>
+            </a:effectRef>
+            <a:fontRef idx="minor">
+              <a:schemeClr val="lt1"/>
+            </a:fontRef>
+          </p:style>
+          <p:txBody>
+            <a:bodyPr rot="0" spcFirstLastPara="0" vertOverflow="overflow" horzOverflow="overflow" vert="horz" wrap="square" lIns="91440" tIns="45720" rIns="91440" bIns="45720" numCol="1" spcCol="0" rtlCol="0" fromWordArt="0" anchor="ctr" anchorCtr="0" forceAA="0" compatLnSpc="1">
+              <a:prstTxWarp prst="textNoShape">
+                <a:avLst/>
+              </a:prstTxWarp>
+              <a:noAutofit/>
+            </a:bodyPr>
+            <a:lstStyle/>
+            <a:p>
+              <a:pPr algn="ctr"/>
+              <a:endParaRPr lang="en-GB"/>
+            </a:p>
+          </p:txBody>
+        </p:sp>
+        <p:sp>
+          <p:nvSpPr>
+            <p:cNvPr id="89" name="Rectangle 88"/>
+            <p:cNvSpPr/>
+            <p:nvPr/>
+          </p:nvSpPr>
+          <p:spPr>
+            <a:xfrm>
+              <a:off x="8746699" y="1663373"/>
+              <a:ext cx="1511270" cy="1279686"/>
+            </a:xfrm>
+            <a:prstGeom prst="rect">
               <a:avLst/>
-            </a:prstTxWarp>
-            <a:noAutofit/>
-          </a:bodyPr>
-          <a:lstStyle/>
-          <a:p>
-            <a:pPr algn="ctr"/>
-            <a:endParaRPr lang="en-GB"/>
-          </a:p>
-        </p:txBody>
-      </p:sp>
-      <p:sp>
-        <p:nvSpPr>
-          <p:cNvPr id="89" name="Rectangle 88"/>
-          <p:cNvSpPr/>
-          <p:nvPr/>
-        </p:nvSpPr>
-        <p:spPr>
-          <a:xfrm>
-            <a:off x="8746699" y="1663373"/>
-            <a:ext cx="1511270" cy="1279686"/>
-          </a:xfrm>
-          <a:prstGeom prst="rect">
-            <a:avLst/>
-          </a:prstGeom>
-          <a:solidFill>
-            <a:schemeClr val="accent5">
-              <a:lumMod val="40000"/>
-              <a:lumOff val="60000"/>
-            </a:schemeClr>
-          </a:solidFill>
-          <a:ln>
-            <a:noFill/>
-          </a:ln>
-        </p:spPr>
-        <p:style>
-          <a:lnRef idx="2">
-            <a:schemeClr val="accent1">
-              <a:shade val="50000"/>
-            </a:schemeClr>
-          </a:lnRef>
-          <a:fillRef idx="1">
-            <a:schemeClr val="accent1"/>
-          </a:fillRef>
-          <a:effectRef idx="0">
-            <a:schemeClr val="accent1"/>
-          </a:effectRef>
-          <a:fontRef idx="minor">
-            <a:schemeClr val="lt1"/>
-          </a:fontRef>
-        </p:style>
-        <p:txBody>
-          <a:bodyPr rot="0" spcFirstLastPara="0" vertOverflow="overflow" horzOverflow="overflow" vert="horz" wrap="square" lIns="91440" tIns="45720" rIns="91440" bIns="45720" numCol="1" spcCol="0" rtlCol="0" fromWordArt="0" anchor="ctr" anchorCtr="0" forceAA="0" compatLnSpc="1">
-            <a:prstTxWarp prst="textNoShape">
-              <a:avLst/>
-            </a:prstTxWarp>
-            <a:noAutofit/>
-          </a:bodyPr>
-          <a:lstStyle/>
-          <a:p>
-            <a:pPr algn="ctr"/>
-            <a:r>
-              <a:rPr lang="en-US" dirty="0">
+            </a:prstGeom>
+            <a:solidFill>
+              <a:schemeClr val="accent5">
+                <a:lumMod val="40000"/>
+                <a:lumOff val="60000"/>
+              </a:schemeClr>
+            </a:solidFill>
+            <a:ln>
+              <a:noFill/>
+            </a:ln>
+          </p:spPr>
+          <p:style>
+            <a:lnRef idx="2">
+              <a:schemeClr val="accent1">
+                <a:shade val="50000"/>
+              </a:schemeClr>
+            </a:lnRef>
+            <a:fillRef idx="1">
+              <a:schemeClr val="accent1"/>
+            </a:fillRef>
+            <a:effectRef idx="0">
+              <a:schemeClr val="accent1"/>
+            </a:effectRef>
+            <a:fontRef idx="minor">
+              <a:schemeClr val="lt1"/>
+            </a:fontRef>
+          </p:style>
+          <p:txBody>
+            <a:bodyPr rot="0" spcFirstLastPara="0" vertOverflow="overflow" horzOverflow="overflow" vert="horz" wrap="square" lIns="91440" tIns="45720" rIns="91440" bIns="45720" numCol="1" spcCol="0" rtlCol="0" fromWordArt="0" anchor="ctr" anchorCtr="0" forceAA="0" compatLnSpc="1">
+              <a:prstTxWarp prst="textNoShape">
+                <a:avLst/>
+              </a:prstTxWarp>
+              <a:noAutofit/>
+            </a:bodyPr>
+            <a:lstStyle/>
+            <a:p>
+              <a:pPr algn="ctr"/>
+              <a:r>
+                <a:rPr lang="en-US" dirty="0">
+                  <a:solidFill>
+                    <a:schemeClr val="tx1">
+                      <a:lumMod val="65000"/>
+                      <a:lumOff val="35000"/>
+                    </a:schemeClr>
+                  </a:solidFill>
+                  <a:ea typeface="Roboto" pitchFamily="2" charset="0"/>
+                </a:rPr>
+                <a:t>Logic</a:t>
+              </a:r>
+              <a:endParaRPr lang="en-GB" dirty="0">
                 <a:solidFill>
                   <a:schemeClr val="tx1">
                     <a:lumMod val="65000"/>
@@ -6688,33 +6572,21 @@
                   </a:schemeClr>
                 </a:solidFill>
                 <a:ea typeface="Roboto" pitchFamily="2" charset="0"/>
-              </a:rPr>
-              <a:t>Logic</a:t>
-            </a:r>
-            <a:endParaRPr lang="en-GB" dirty="0">
-              <a:solidFill>
-                <a:schemeClr val="tx1">
-                  <a:lumMod val="65000"/>
-                  <a:lumOff val="35000"/>
-                </a:schemeClr>
-              </a:solidFill>
-              <a:ea typeface="Roboto" pitchFamily="2" charset="0"/>
-            </a:endParaRPr>
-          </a:p>
-        </p:txBody>
-      </p:sp>
+              </a:endParaRPr>
+            </a:p>
+          </p:txBody>
+        </p:sp>
+      </p:grpSp>
       <p:cxnSp>
         <p:nvCxnSpPr>
           <p:cNvPr id="30" name="Straight Arrow Connector 29"/>
-          <p:cNvCxnSpPr>
-            <a:stCxn id="7" idx="3"/>
-          </p:cNvCxnSpPr>
+          <p:cNvCxnSpPr/>
           <p:nvPr/>
         </p:nvCxnSpPr>
         <p:spPr>
           <a:xfrm flipV="1">
-            <a:off x="7344505" y="2304810"/>
-            <a:ext cx="1402194" cy="1"/>
+            <a:off x="1681410" y="4431325"/>
+            <a:ext cx="7056537" cy="1"/>
           </a:xfrm>
           <a:prstGeom prst="straightConnector1">
             <a:avLst/>
@@ -6745,16 +6617,469 @@
           </a:fontRef>
         </p:style>
       </p:cxnSp>
+      <p:grpSp>
+        <p:nvGrpSpPr>
+          <p:cNvPr id="28" name="Group 27"/>
+          <p:cNvGrpSpPr/>
+          <p:nvPr/>
+        </p:nvGrpSpPr>
+        <p:grpSpPr>
+          <a:xfrm>
+            <a:off x="8244930" y="654744"/>
+            <a:ext cx="2567542" cy="2445055"/>
+            <a:chOff x="8252858" y="3751422"/>
+            <a:chExt cx="2567542" cy="2445055"/>
+          </a:xfrm>
+        </p:grpSpPr>
+        <p:sp>
+          <p:nvSpPr>
+            <p:cNvPr id="39" name="Rounded Rectangle 38"/>
+            <p:cNvSpPr/>
+            <p:nvPr/>
+          </p:nvSpPr>
+          <p:spPr>
+            <a:xfrm>
+              <a:off x="8252858" y="3751422"/>
+              <a:ext cx="2567542" cy="2445055"/>
+            </a:xfrm>
+            <a:prstGeom prst="roundRect">
+              <a:avLst>
+                <a:gd name="adj" fmla="val 11057"/>
+              </a:avLst>
+            </a:prstGeom>
+            <a:solidFill>
+              <a:srgbClr val="BF94E0"/>
+            </a:solidFill>
+            <a:ln>
+              <a:noFill/>
+            </a:ln>
+          </p:spPr>
+          <p:style>
+            <a:lnRef idx="2">
+              <a:schemeClr val="accent1">
+                <a:shade val="50000"/>
+              </a:schemeClr>
+            </a:lnRef>
+            <a:fillRef idx="1">
+              <a:schemeClr val="accent1"/>
+            </a:fillRef>
+            <a:effectRef idx="0">
+              <a:schemeClr val="accent1"/>
+            </a:effectRef>
+            <a:fontRef idx="minor">
+              <a:schemeClr val="lt1"/>
+            </a:fontRef>
+          </p:style>
+          <p:txBody>
+            <a:bodyPr rtlCol="0" anchor="t" anchorCtr="0"/>
+            <a:lstStyle/>
+            <a:p>
+              <a:pPr algn="ctr"/>
+              <a:r>
+                <a:rPr lang="en-US" dirty="0" smtClean="0">
+                  <a:ea typeface="Roboto Condensed" pitchFamily="2" charset="0"/>
+                </a:rPr>
+                <a:t>Data</a:t>
+              </a:r>
+              <a:endParaRPr lang="en-GB" dirty="0">
+                <a:ea typeface="Roboto Condensed" pitchFamily="2" charset="0"/>
+              </a:endParaRPr>
+            </a:p>
+          </p:txBody>
+        </p:sp>
+        <p:sp>
+          <p:nvSpPr>
+            <p:cNvPr id="41" name="Rectangle 40"/>
+            <p:cNvSpPr/>
+            <p:nvPr/>
+          </p:nvSpPr>
+          <p:spPr>
+            <a:xfrm>
+              <a:off x="8528033" y="4430428"/>
+              <a:ext cx="2015545" cy="1484009"/>
+            </a:xfrm>
+            <a:prstGeom prst="rect">
+              <a:avLst/>
+            </a:prstGeom>
+            <a:solidFill>
+              <a:schemeClr val="bg1"/>
+            </a:solidFill>
+            <a:ln>
+              <a:solidFill>
+                <a:srgbClr val="9F5ED0"/>
+              </a:solidFill>
+            </a:ln>
+          </p:spPr>
+          <p:style>
+            <a:lnRef idx="2">
+              <a:schemeClr val="accent1">
+                <a:shade val="50000"/>
+              </a:schemeClr>
+            </a:lnRef>
+            <a:fillRef idx="1">
+              <a:schemeClr val="accent1"/>
+            </a:fillRef>
+            <a:effectRef idx="0">
+              <a:schemeClr val="accent1"/>
+            </a:effectRef>
+            <a:fontRef idx="minor">
+              <a:schemeClr val="lt1"/>
+            </a:fontRef>
+          </p:style>
+          <p:txBody>
+            <a:bodyPr rot="0" spcFirstLastPara="0" vertOverflow="overflow" horzOverflow="overflow" vert="horz" wrap="square" lIns="91440" tIns="45720" rIns="91440" bIns="45720" numCol="1" spcCol="0" rtlCol="0" fromWordArt="0" anchor="t" anchorCtr="0" forceAA="0" compatLnSpc="1">
+              <a:prstTxWarp prst="textNoShape">
+                <a:avLst/>
+              </a:prstTxWarp>
+              <a:noAutofit/>
+            </a:bodyPr>
+            <a:lstStyle/>
+            <a:p>
+              <a:pPr algn="ctr"/>
+              <a:endParaRPr lang="en-GB" sz="1400" dirty="0">
+                <a:solidFill>
+                  <a:schemeClr val="tx1">
+                    <a:lumMod val="75000"/>
+                    <a:lumOff val="25000"/>
+                  </a:schemeClr>
+                </a:solidFill>
+                <a:ea typeface="Roboto Condensed" pitchFamily="2" charset="0"/>
+              </a:endParaRPr>
+            </a:p>
+          </p:txBody>
+        </p:sp>
+        <p:sp>
+          <p:nvSpPr>
+            <p:cNvPr id="42" name="Rectangle 41"/>
+            <p:cNvSpPr/>
+            <p:nvPr/>
+          </p:nvSpPr>
+          <p:spPr>
+            <a:xfrm>
+              <a:off x="8528033" y="4203850"/>
+              <a:ext cx="735640" cy="226578"/>
+            </a:xfrm>
+            <a:prstGeom prst="rect">
+              <a:avLst/>
+            </a:prstGeom>
+            <a:solidFill>
+              <a:schemeClr val="bg1"/>
+            </a:solidFill>
+            <a:ln>
+              <a:solidFill>
+                <a:srgbClr val="9F5ED0"/>
+              </a:solidFill>
+            </a:ln>
+          </p:spPr>
+          <p:style>
+            <a:lnRef idx="2">
+              <a:schemeClr val="accent1">
+                <a:shade val="50000"/>
+              </a:schemeClr>
+            </a:lnRef>
+            <a:fillRef idx="1">
+              <a:schemeClr val="accent1"/>
+            </a:fillRef>
+            <a:effectRef idx="0">
+              <a:schemeClr val="accent1"/>
+            </a:effectRef>
+            <a:fontRef idx="minor">
+              <a:schemeClr val="lt1"/>
+            </a:fontRef>
+          </p:style>
+          <p:txBody>
+            <a:bodyPr rot="0" spcFirstLastPara="0" vertOverflow="overflow" horzOverflow="overflow" vert="horz" wrap="square" lIns="91440" tIns="45720" rIns="91440" bIns="45720" numCol="1" spcCol="0" rtlCol="0" fromWordArt="0" anchor="ctr" anchorCtr="0" forceAA="0" compatLnSpc="1">
+              <a:prstTxWarp prst="textNoShape">
+                <a:avLst/>
+              </a:prstTxWarp>
+              <a:noAutofit/>
+            </a:bodyPr>
+            <a:lstStyle/>
+            <a:p>
+              <a:pPr algn="ctr"/>
+              <a:endParaRPr lang="en-GB"/>
+            </a:p>
+          </p:txBody>
+        </p:sp>
+        <p:sp>
+          <p:nvSpPr>
+            <p:cNvPr id="87" name="Rectangle 86"/>
+            <p:cNvSpPr/>
+            <p:nvPr/>
+          </p:nvSpPr>
+          <p:spPr>
+            <a:xfrm>
+              <a:off x="8783980" y="4570504"/>
+              <a:ext cx="1503650" cy="548640"/>
+            </a:xfrm>
+            <a:prstGeom prst="rect">
+              <a:avLst/>
+            </a:prstGeom>
+            <a:solidFill>
+              <a:srgbClr val="D8BEEC"/>
+            </a:solidFill>
+            <a:ln>
+              <a:noFill/>
+            </a:ln>
+          </p:spPr>
+          <p:style>
+            <a:lnRef idx="2">
+              <a:schemeClr val="accent1">
+                <a:shade val="50000"/>
+              </a:schemeClr>
+            </a:lnRef>
+            <a:fillRef idx="1">
+              <a:schemeClr val="accent1"/>
+            </a:fillRef>
+            <a:effectRef idx="0">
+              <a:schemeClr val="accent1"/>
+            </a:effectRef>
+            <a:fontRef idx="minor">
+              <a:schemeClr val="lt1"/>
+            </a:fontRef>
+          </p:style>
+          <p:txBody>
+            <a:bodyPr rot="0" spcFirstLastPara="0" vertOverflow="overflow" horzOverflow="overflow" vert="horz" wrap="square" lIns="91440" tIns="45720" rIns="91440" bIns="45720" numCol="1" spcCol="0" rtlCol="0" fromWordArt="0" anchor="ctr" anchorCtr="0" forceAA="0" compatLnSpc="1">
+              <a:prstTxWarp prst="textNoShape">
+                <a:avLst/>
+              </a:prstTxWarp>
+              <a:noAutofit/>
+            </a:bodyPr>
+            <a:lstStyle/>
+            <a:p>
+              <a:pPr algn="ctr"/>
+              <a:r>
+                <a:rPr lang="en-US" dirty="0">
+                  <a:solidFill>
+                    <a:schemeClr val="tx1">
+                      <a:lumMod val="65000"/>
+                      <a:lumOff val="35000"/>
+                    </a:schemeClr>
+                  </a:solidFill>
+                  <a:ea typeface="Roboto" pitchFamily="2" charset="0"/>
+                </a:rPr>
+                <a:t>Author</a:t>
+              </a:r>
+              <a:endParaRPr lang="en-GB" dirty="0">
+                <a:solidFill>
+                  <a:schemeClr val="tx1">
+                    <a:lumMod val="65000"/>
+                    <a:lumOff val="35000"/>
+                  </a:schemeClr>
+                </a:solidFill>
+                <a:ea typeface="Roboto" pitchFamily="2" charset="0"/>
+              </a:endParaRPr>
+            </a:p>
+          </p:txBody>
+        </p:sp>
+        <p:sp>
+          <p:nvSpPr>
+            <p:cNvPr id="88" name="Rectangle 87"/>
+            <p:cNvSpPr/>
+            <p:nvPr/>
+          </p:nvSpPr>
+          <p:spPr>
+            <a:xfrm>
+              <a:off x="8783980" y="5223026"/>
+              <a:ext cx="1503650" cy="548640"/>
+            </a:xfrm>
+            <a:prstGeom prst="rect">
+              <a:avLst/>
+            </a:prstGeom>
+            <a:solidFill>
+              <a:srgbClr val="D8BEEC"/>
+            </a:solidFill>
+            <a:ln>
+              <a:noFill/>
+            </a:ln>
+          </p:spPr>
+          <p:style>
+            <a:lnRef idx="2">
+              <a:schemeClr val="accent1">
+                <a:shade val="50000"/>
+              </a:schemeClr>
+            </a:lnRef>
+            <a:fillRef idx="1">
+              <a:schemeClr val="accent1"/>
+            </a:fillRef>
+            <a:effectRef idx="0">
+              <a:schemeClr val="accent1"/>
+            </a:effectRef>
+            <a:fontRef idx="minor">
+              <a:schemeClr val="lt1"/>
+            </a:fontRef>
+          </p:style>
+          <p:txBody>
+            <a:bodyPr rot="0" spcFirstLastPara="0" vertOverflow="overflow" horzOverflow="overflow" vert="horz" wrap="square" lIns="91440" tIns="45720" rIns="91440" bIns="45720" numCol="1" spcCol="0" rtlCol="0" fromWordArt="0" anchor="ctr" anchorCtr="0" forceAA="0" compatLnSpc="1">
+              <a:prstTxWarp prst="textNoShape">
+                <a:avLst/>
+              </a:prstTxWarp>
+              <a:noAutofit/>
+            </a:bodyPr>
+            <a:lstStyle/>
+            <a:p>
+              <a:pPr algn="ctr"/>
+              <a:r>
+                <a:rPr lang="en-US" dirty="0">
+                  <a:solidFill>
+                    <a:schemeClr val="tx1">
+                      <a:lumMod val="65000"/>
+                      <a:lumOff val="35000"/>
+                    </a:schemeClr>
+                  </a:solidFill>
+                  <a:ea typeface="Roboto" pitchFamily="2" charset="0"/>
+                </a:rPr>
+                <a:t>CodeSnippet</a:t>
+              </a:r>
+              <a:endParaRPr lang="en-GB" dirty="0">
+                <a:solidFill>
+                  <a:schemeClr val="tx1">
+                    <a:lumMod val="65000"/>
+                    <a:lumOff val="35000"/>
+                  </a:schemeClr>
+                </a:solidFill>
+                <a:ea typeface="Roboto" pitchFamily="2" charset="0"/>
+              </a:endParaRPr>
+            </a:p>
+          </p:txBody>
+        </p:sp>
+      </p:grpSp>
       <p:cxnSp>
         <p:nvCxnSpPr>
-          <p:cNvPr id="38" name="Straight Arrow Connector 37"/>
+          <p:cNvPr id="44" name="Straight Arrow Connector 43"/>
           <p:cNvCxnSpPr/>
           <p:nvPr/>
         </p:nvCxnSpPr>
         <p:spPr>
           <a:xfrm>
-            <a:off x="1662547" y="4280729"/>
-            <a:ext cx="6315593" cy="0"/>
+            <a:off x="7021258" y="2605534"/>
+            <a:ext cx="1754794" cy="0"/>
+          </a:xfrm>
+          <a:prstGeom prst="straightConnector1">
+            <a:avLst/>
+          </a:prstGeom>
+          <a:ln w="25400" cap="sq">
+            <a:solidFill>
+              <a:schemeClr val="tx1">
+                <a:lumMod val="50000"/>
+                <a:lumOff val="50000"/>
+              </a:schemeClr>
+            </a:solidFill>
+            <a:prstDash val="sysDash"/>
+            <a:tailEnd type="arrow" w="med" len="med"/>
+          </a:ln>
+        </p:spPr>
+        <p:style>
+          <a:lnRef idx="1">
+            <a:schemeClr val="accent1"/>
+          </a:lnRef>
+          <a:fillRef idx="0">
+            <a:schemeClr val="accent1"/>
+          </a:fillRef>
+          <a:effectRef idx="0">
+            <a:schemeClr val="accent1"/>
+          </a:effectRef>
+          <a:fontRef idx="minor">
+            <a:schemeClr val="tx1"/>
+          </a:fontRef>
+        </p:style>
+      </p:cxnSp>
+      <p:cxnSp>
+        <p:nvCxnSpPr>
+          <p:cNvPr id="51" name="Straight Arrow Connector 50"/>
+          <p:cNvCxnSpPr/>
+          <p:nvPr/>
+        </p:nvCxnSpPr>
+        <p:spPr>
+          <a:xfrm>
+            <a:off x="7021258" y="1924841"/>
+            <a:ext cx="1754794" cy="0"/>
+          </a:xfrm>
+          <a:prstGeom prst="straightConnector1">
+            <a:avLst/>
+          </a:prstGeom>
+          <a:ln w="25400" cap="sq">
+            <a:solidFill>
+              <a:schemeClr val="tx1">
+                <a:lumMod val="50000"/>
+                <a:lumOff val="50000"/>
+              </a:schemeClr>
+            </a:solidFill>
+            <a:prstDash val="sysDash"/>
+            <a:tailEnd type="arrow" w="med" len="med"/>
+          </a:ln>
+        </p:spPr>
+        <p:style>
+          <a:lnRef idx="1">
+            <a:schemeClr val="accent1"/>
+          </a:lnRef>
+          <a:fillRef idx="0">
+            <a:schemeClr val="accent1"/>
+          </a:fillRef>
+          <a:effectRef idx="0">
+            <a:schemeClr val="accent1"/>
+          </a:effectRef>
+          <a:fontRef idx="minor">
+            <a:schemeClr val="tx1"/>
+          </a:fontRef>
+        </p:style>
+      </p:cxnSp>
+      <p:sp>
+        <p:nvSpPr>
+          <p:cNvPr id="46" name="TextBox 45"/>
+          <p:cNvSpPr txBox="1"/>
+          <p:nvPr/>
+        </p:nvSpPr>
+        <p:spPr>
+          <a:xfrm>
+            <a:off x="2798010" y="2912645"/>
+            <a:ext cx="338554" cy="276999"/>
+          </a:xfrm>
+          <a:prstGeom prst="rect">
+            <a:avLst/>
+          </a:prstGeom>
+          <a:noFill/>
+        </p:spPr>
+        <p:txBody>
+          <a:bodyPr wrap="square" rtlCol="0">
+            <a:spAutoFit/>
+          </a:bodyPr>
+          <a:lstStyle/>
+          <a:p>
+            <a:r>
+              <a:rPr lang="en-US" sz="1200" dirty="0">
+                <a:solidFill>
+                  <a:schemeClr val="tx1">
+                    <a:lumMod val="50000"/>
+                    <a:lumOff val="50000"/>
+                  </a:schemeClr>
+                </a:solidFill>
+                <a:ea typeface="Roboto Condensed" pitchFamily="2" charset="0"/>
+              </a:rPr>
+              <a:t>1</a:t>
+            </a:r>
+            <a:endParaRPr lang="en-GB" sz="1200" dirty="0">
+              <a:solidFill>
+                <a:schemeClr val="tx1">
+                  <a:lumMod val="50000"/>
+                  <a:lumOff val="50000"/>
+                </a:schemeClr>
+              </a:solidFill>
+              <a:ea typeface="Roboto Condensed" pitchFamily="2" charset="0"/>
+            </a:endParaRPr>
+          </a:p>
+        </p:txBody>
+      </p:sp>
+      <p:cxnSp>
+        <p:nvCxnSpPr>
+          <p:cNvPr id="55" name="Straight Arrow Connector 54"/>
+          <p:cNvCxnSpPr/>
+          <p:nvPr/>
+        </p:nvCxnSpPr>
+        <p:spPr>
+          <a:xfrm flipH="1">
+            <a:off x="1684020" y="2275838"/>
+            <a:ext cx="159832" cy="0"/>
           </a:xfrm>
           <a:prstGeom prst="straightConnector1">
             <a:avLst/>
@@ -6785,542 +7110,6 @@
           </a:fontRef>
         </p:style>
       </p:cxnSp>
-      <p:cxnSp>
-        <p:nvCxnSpPr>
-          <p:cNvPr id="49" name="Straight Arrow Connector 48"/>
-          <p:cNvCxnSpPr/>
-          <p:nvPr/>
-        </p:nvCxnSpPr>
-        <p:spPr>
-          <a:xfrm flipV="1">
-            <a:off x="3066774" y="3989144"/>
-            <a:ext cx="5063766" cy="1"/>
-          </a:xfrm>
-          <a:prstGeom prst="straightConnector1">
-            <a:avLst/>
-          </a:prstGeom>
-          <a:ln w="25400">
-            <a:solidFill>
-              <a:schemeClr val="tx1">
-                <a:lumMod val="50000"/>
-                <a:lumOff val="50000"/>
-              </a:schemeClr>
-            </a:solidFill>
-            <a:prstDash val="sysDash"/>
-            <a:tailEnd type="none" w="med" len="med"/>
-          </a:ln>
-        </p:spPr>
-        <p:style>
-          <a:lnRef idx="1">
-            <a:schemeClr val="accent1"/>
-          </a:lnRef>
-          <a:fillRef idx="0">
-            <a:schemeClr val="accent1"/>
-          </a:fillRef>
-          <a:effectRef idx="0">
-            <a:schemeClr val="accent1"/>
-          </a:effectRef>
-          <a:fontRef idx="minor">
-            <a:schemeClr val="tx1"/>
-          </a:fontRef>
-        </p:style>
-      </p:cxnSp>
-      <p:sp>
-        <p:nvSpPr>
-          <p:cNvPr id="96" name="TextBox 95"/>
-          <p:cNvSpPr txBox="1"/>
-          <p:nvPr/>
-        </p:nvSpPr>
-        <p:spPr>
-          <a:xfrm>
-            <a:off x="1180737" y="6300835"/>
-            <a:ext cx="3739678" cy="338554"/>
-          </a:xfrm>
-          <a:prstGeom prst="rect">
-            <a:avLst/>
-          </a:prstGeom>
-          <a:noFill/>
-        </p:spPr>
-        <p:txBody>
-          <a:bodyPr wrap="none" rtlCol="0">
-            <a:spAutoFit/>
-          </a:bodyPr>
-          <a:lstStyle/>
-          <a:p>
-            <a:r>
-              <a:rPr lang="en-US" sz="1600" dirty="0" smtClean="0">
-                <a:ea typeface="Roboto Condensed" pitchFamily="2" charset="0"/>
-              </a:rPr>
-              <a:t>Figure 2: Class diagram for GUI component</a:t>
-            </a:r>
-            <a:endParaRPr lang="en-GB" sz="1600" dirty="0">
-              <a:ea typeface="Roboto Condensed" pitchFamily="2" charset="0"/>
-            </a:endParaRPr>
-          </a:p>
-        </p:txBody>
-      </p:sp>
-      <p:sp>
-        <p:nvSpPr>
-          <p:cNvPr id="41" name="Rectangle 40"/>
-          <p:cNvSpPr/>
-          <p:nvPr/>
-        </p:nvSpPr>
-        <p:spPr>
-          <a:xfrm>
-            <a:off x="8528033" y="4430428"/>
-            <a:ext cx="2015545" cy="1484009"/>
-          </a:xfrm>
-          <a:prstGeom prst="rect">
-            <a:avLst/>
-          </a:prstGeom>
-          <a:solidFill>
-            <a:schemeClr val="bg1"/>
-          </a:solidFill>
-          <a:ln>
-            <a:solidFill>
-              <a:srgbClr val="9F5ED0"/>
-            </a:solidFill>
-          </a:ln>
-        </p:spPr>
-        <p:style>
-          <a:lnRef idx="2">
-            <a:schemeClr val="accent1">
-              <a:shade val="50000"/>
-            </a:schemeClr>
-          </a:lnRef>
-          <a:fillRef idx="1">
-            <a:schemeClr val="accent1"/>
-          </a:fillRef>
-          <a:effectRef idx="0">
-            <a:schemeClr val="accent1"/>
-          </a:effectRef>
-          <a:fontRef idx="minor">
-            <a:schemeClr val="lt1"/>
-          </a:fontRef>
-        </p:style>
-        <p:txBody>
-          <a:bodyPr rot="0" spcFirstLastPara="0" vertOverflow="overflow" horzOverflow="overflow" vert="horz" wrap="square" lIns="91440" tIns="45720" rIns="91440" bIns="45720" numCol="1" spcCol="0" rtlCol="0" fromWordArt="0" anchor="t" anchorCtr="0" forceAA="0" compatLnSpc="1">
-            <a:prstTxWarp prst="textNoShape">
-              <a:avLst/>
-            </a:prstTxWarp>
-            <a:noAutofit/>
-          </a:bodyPr>
-          <a:lstStyle/>
-          <a:p>
-            <a:pPr algn="ctr"/>
-            <a:endParaRPr lang="en-GB" sz="1400" dirty="0">
-              <a:solidFill>
-                <a:schemeClr val="tx1">
-                  <a:lumMod val="75000"/>
-                  <a:lumOff val="25000"/>
-                </a:schemeClr>
-              </a:solidFill>
-              <a:ea typeface="Roboto Condensed" pitchFamily="2" charset="0"/>
-            </a:endParaRPr>
-          </a:p>
-        </p:txBody>
-      </p:sp>
-      <p:sp>
-        <p:nvSpPr>
-          <p:cNvPr id="42" name="Rectangle 41"/>
-          <p:cNvSpPr/>
-          <p:nvPr/>
-        </p:nvSpPr>
-        <p:spPr>
-          <a:xfrm>
-            <a:off x="8528033" y="4203850"/>
-            <a:ext cx="735640" cy="226578"/>
-          </a:xfrm>
-          <a:prstGeom prst="rect">
-            <a:avLst/>
-          </a:prstGeom>
-          <a:solidFill>
-            <a:schemeClr val="bg1"/>
-          </a:solidFill>
-          <a:ln>
-            <a:solidFill>
-              <a:srgbClr val="9F5ED0"/>
-            </a:solidFill>
-          </a:ln>
-        </p:spPr>
-        <p:style>
-          <a:lnRef idx="2">
-            <a:schemeClr val="accent1">
-              <a:shade val="50000"/>
-            </a:schemeClr>
-          </a:lnRef>
-          <a:fillRef idx="1">
-            <a:schemeClr val="accent1"/>
-          </a:fillRef>
-          <a:effectRef idx="0">
-            <a:schemeClr val="accent1"/>
-          </a:effectRef>
-          <a:fontRef idx="minor">
-            <a:schemeClr val="lt1"/>
-          </a:fontRef>
-        </p:style>
-        <p:txBody>
-          <a:bodyPr rot="0" spcFirstLastPara="0" vertOverflow="overflow" horzOverflow="overflow" vert="horz" wrap="square" lIns="91440" tIns="45720" rIns="91440" bIns="45720" numCol="1" spcCol="0" rtlCol="0" fromWordArt="0" anchor="ctr" anchorCtr="0" forceAA="0" compatLnSpc="1">
-            <a:prstTxWarp prst="textNoShape">
-              <a:avLst/>
-            </a:prstTxWarp>
-            <a:noAutofit/>
-          </a:bodyPr>
-          <a:lstStyle/>
-          <a:p>
-            <a:pPr algn="ctr"/>
-            <a:endParaRPr lang="en-GB"/>
-          </a:p>
-        </p:txBody>
-      </p:sp>
-      <p:sp>
-        <p:nvSpPr>
-          <p:cNvPr id="87" name="Rectangle 86"/>
-          <p:cNvSpPr/>
-          <p:nvPr/>
-        </p:nvSpPr>
-        <p:spPr>
-          <a:xfrm>
-            <a:off x="8783980" y="4570504"/>
-            <a:ext cx="1503650" cy="548640"/>
-          </a:xfrm>
-          <a:prstGeom prst="rect">
-            <a:avLst/>
-          </a:prstGeom>
-          <a:solidFill>
-            <a:srgbClr val="D8BEEC"/>
-          </a:solidFill>
-          <a:ln>
-            <a:noFill/>
-          </a:ln>
-        </p:spPr>
-        <p:style>
-          <a:lnRef idx="2">
-            <a:schemeClr val="accent1">
-              <a:shade val="50000"/>
-            </a:schemeClr>
-          </a:lnRef>
-          <a:fillRef idx="1">
-            <a:schemeClr val="accent1"/>
-          </a:fillRef>
-          <a:effectRef idx="0">
-            <a:schemeClr val="accent1"/>
-          </a:effectRef>
-          <a:fontRef idx="minor">
-            <a:schemeClr val="lt1"/>
-          </a:fontRef>
-        </p:style>
-        <p:txBody>
-          <a:bodyPr rot="0" spcFirstLastPara="0" vertOverflow="overflow" horzOverflow="overflow" vert="horz" wrap="square" lIns="91440" tIns="45720" rIns="91440" bIns="45720" numCol="1" spcCol="0" rtlCol="0" fromWordArt="0" anchor="ctr" anchorCtr="0" forceAA="0" compatLnSpc="1">
-            <a:prstTxWarp prst="textNoShape">
-              <a:avLst/>
-            </a:prstTxWarp>
-            <a:noAutofit/>
-          </a:bodyPr>
-          <a:lstStyle/>
-          <a:p>
-            <a:pPr algn="ctr"/>
-            <a:r>
-              <a:rPr lang="en-US" dirty="0">
-                <a:solidFill>
-                  <a:schemeClr val="tx1">
-                    <a:lumMod val="65000"/>
-                    <a:lumOff val="35000"/>
-                  </a:schemeClr>
-                </a:solidFill>
-                <a:ea typeface="Roboto" pitchFamily="2" charset="0"/>
-              </a:rPr>
-              <a:t>Author</a:t>
-            </a:r>
-            <a:endParaRPr lang="en-GB" dirty="0">
-              <a:solidFill>
-                <a:schemeClr val="tx1">
-                  <a:lumMod val="65000"/>
-                  <a:lumOff val="35000"/>
-                </a:schemeClr>
-              </a:solidFill>
-              <a:ea typeface="Roboto" pitchFamily="2" charset="0"/>
-            </a:endParaRPr>
-          </a:p>
-        </p:txBody>
-      </p:sp>
-      <p:sp>
-        <p:nvSpPr>
-          <p:cNvPr id="88" name="Rectangle 87"/>
-          <p:cNvSpPr/>
-          <p:nvPr/>
-        </p:nvSpPr>
-        <p:spPr>
-          <a:xfrm>
-            <a:off x="8783980" y="5223026"/>
-            <a:ext cx="1503650" cy="548640"/>
-          </a:xfrm>
-          <a:prstGeom prst="rect">
-            <a:avLst/>
-          </a:prstGeom>
-          <a:solidFill>
-            <a:srgbClr val="D8BEEC"/>
-          </a:solidFill>
-          <a:ln>
-            <a:noFill/>
-          </a:ln>
-        </p:spPr>
-        <p:style>
-          <a:lnRef idx="2">
-            <a:schemeClr val="accent1">
-              <a:shade val="50000"/>
-            </a:schemeClr>
-          </a:lnRef>
-          <a:fillRef idx="1">
-            <a:schemeClr val="accent1"/>
-          </a:fillRef>
-          <a:effectRef idx="0">
-            <a:schemeClr val="accent1"/>
-          </a:effectRef>
-          <a:fontRef idx="minor">
-            <a:schemeClr val="lt1"/>
-          </a:fontRef>
-        </p:style>
-        <p:txBody>
-          <a:bodyPr rot="0" spcFirstLastPara="0" vertOverflow="overflow" horzOverflow="overflow" vert="horz" wrap="square" lIns="91440" tIns="45720" rIns="91440" bIns="45720" numCol="1" spcCol="0" rtlCol="0" fromWordArt="0" anchor="ctr" anchorCtr="0" forceAA="0" compatLnSpc="1">
-            <a:prstTxWarp prst="textNoShape">
-              <a:avLst/>
-            </a:prstTxWarp>
-            <a:noAutofit/>
-          </a:bodyPr>
-          <a:lstStyle/>
-          <a:p>
-            <a:pPr algn="ctr"/>
-            <a:r>
-              <a:rPr lang="en-US" dirty="0">
-                <a:solidFill>
-                  <a:schemeClr val="tx1">
-                    <a:lumMod val="65000"/>
-                    <a:lumOff val="35000"/>
-                  </a:schemeClr>
-                </a:solidFill>
-                <a:ea typeface="Roboto" pitchFamily="2" charset="0"/>
-              </a:rPr>
-              <a:t>CodeSnippet</a:t>
-            </a:r>
-            <a:endParaRPr lang="en-GB" dirty="0">
-              <a:solidFill>
-                <a:schemeClr val="tx1">
-                  <a:lumMod val="65000"/>
-                  <a:lumOff val="35000"/>
-                </a:schemeClr>
-              </a:solidFill>
-              <a:ea typeface="Roboto" pitchFamily="2" charset="0"/>
-            </a:endParaRPr>
-          </a:p>
-        </p:txBody>
-      </p:sp>
-      <p:cxnSp>
-        <p:nvCxnSpPr>
-          <p:cNvPr id="44" name="Straight Arrow Connector 43"/>
-          <p:cNvCxnSpPr/>
-          <p:nvPr/>
-        </p:nvCxnSpPr>
-        <p:spPr>
-          <a:xfrm>
-            <a:off x="7978140" y="5501134"/>
-            <a:ext cx="805840" cy="0"/>
-          </a:xfrm>
-          <a:prstGeom prst="straightConnector1">
-            <a:avLst/>
-          </a:prstGeom>
-          <a:ln w="25400" cap="sq">
-            <a:solidFill>
-              <a:schemeClr val="tx1">
-                <a:lumMod val="50000"/>
-                <a:lumOff val="50000"/>
-              </a:schemeClr>
-            </a:solidFill>
-            <a:prstDash val="sysDash"/>
-            <a:tailEnd type="arrow" w="med" len="med"/>
-          </a:ln>
-        </p:spPr>
-        <p:style>
-          <a:lnRef idx="1">
-            <a:schemeClr val="accent1"/>
-          </a:lnRef>
-          <a:fillRef idx="0">
-            <a:schemeClr val="accent1"/>
-          </a:fillRef>
-          <a:effectRef idx="0">
-            <a:schemeClr val="accent1"/>
-          </a:effectRef>
-          <a:fontRef idx="minor">
-            <a:schemeClr val="tx1"/>
-          </a:fontRef>
-        </p:style>
-      </p:cxnSp>
-      <p:cxnSp>
-        <p:nvCxnSpPr>
-          <p:cNvPr id="45" name="Straight Arrow Connector 44"/>
-          <p:cNvCxnSpPr/>
-          <p:nvPr/>
-        </p:nvCxnSpPr>
-        <p:spPr>
-          <a:xfrm>
-            <a:off x="7978140" y="4280729"/>
-            <a:ext cx="0" cy="1220405"/>
-          </a:xfrm>
-          <a:prstGeom prst="straightConnector1">
-            <a:avLst/>
-          </a:prstGeom>
-          <a:ln w="25400" cap="sq">
-            <a:solidFill>
-              <a:schemeClr val="tx1">
-                <a:lumMod val="50000"/>
-                <a:lumOff val="50000"/>
-              </a:schemeClr>
-            </a:solidFill>
-            <a:prstDash val="sysDash"/>
-            <a:tailEnd type="none" w="med" len="med"/>
-          </a:ln>
-        </p:spPr>
-        <p:style>
-          <a:lnRef idx="1">
-            <a:schemeClr val="accent1"/>
-          </a:lnRef>
-          <a:fillRef idx="0">
-            <a:schemeClr val="accent1"/>
-          </a:fillRef>
-          <a:effectRef idx="0">
-            <a:schemeClr val="accent1"/>
-          </a:effectRef>
-          <a:fontRef idx="minor">
-            <a:schemeClr val="tx1"/>
-          </a:fontRef>
-        </p:style>
-      </p:cxnSp>
-      <p:cxnSp>
-        <p:nvCxnSpPr>
-          <p:cNvPr id="51" name="Straight Arrow Connector 50"/>
-          <p:cNvCxnSpPr/>
-          <p:nvPr/>
-        </p:nvCxnSpPr>
-        <p:spPr>
-          <a:xfrm>
-            <a:off x="8140700" y="4850259"/>
-            <a:ext cx="643280" cy="0"/>
-          </a:xfrm>
-          <a:prstGeom prst="straightConnector1">
-            <a:avLst/>
-          </a:prstGeom>
-          <a:ln w="25400" cap="sq">
-            <a:solidFill>
-              <a:schemeClr val="tx1">
-                <a:lumMod val="50000"/>
-                <a:lumOff val="50000"/>
-              </a:schemeClr>
-            </a:solidFill>
-            <a:prstDash val="sysDash"/>
-            <a:tailEnd type="arrow" w="med" len="med"/>
-          </a:ln>
-        </p:spPr>
-        <p:style>
-          <a:lnRef idx="1">
-            <a:schemeClr val="accent1"/>
-          </a:lnRef>
-          <a:fillRef idx="0">
-            <a:schemeClr val="accent1"/>
-          </a:fillRef>
-          <a:effectRef idx="0">
-            <a:schemeClr val="accent1"/>
-          </a:effectRef>
-          <a:fontRef idx="minor">
-            <a:schemeClr val="tx1"/>
-          </a:fontRef>
-        </p:style>
-      </p:cxnSp>
-      <p:cxnSp>
-        <p:nvCxnSpPr>
-          <p:cNvPr id="54" name="Straight Arrow Connector 53"/>
-          <p:cNvCxnSpPr/>
-          <p:nvPr/>
-        </p:nvCxnSpPr>
-        <p:spPr>
-          <a:xfrm>
-            <a:off x="8130540" y="3989142"/>
-            <a:ext cx="0" cy="861117"/>
-          </a:xfrm>
-          <a:prstGeom prst="straightConnector1">
-            <a:avLst/>
-          </a:prstGeom>
-          <a:ln w="25400" cap="sq">
-            <a:solidFill>
-              <a:schemeClr val="tx1">
-                <a:lumMod val="50000"/>
-                <a:lumOff val="50000"/>
-              </a:schemeClr>
-            </a:solidFill>
-            <a:prstDash val="sysDash"/>
-            <a:tailEnd type="none" w="med" len="med"/>
-          </a:ln>
-        </p:spPr>
-        <p:style>
-          <a:lnRef idx="1">
-            <a:schemeClr val="accent1"/>
-          </a:lnRef>
-          <a:fillRef idx="0">
-            <a:schemeClr val="accent1"/>
-          </a:fillRef>
-          <a:effectRef idx="0">
-            <a:schemeClr val="accent1"/>
-          </a:effectRef>
-          <a:fontRef idx="minor">
-            <a:schemeClr val="tx1"/>
-          </a:fontRef>
-        </p:style>
-      </p:cxnSp>
-      <p:sp>
-        <p:nvSpPr>
-          <p:cNvPr id="46" name="TextBox 45"/>
-          <p:cNvSpPr txBox="1"/>
-          <p:nvPr/>
-        </p:nvSpPr>
-        <p:spPr>
-          <a:xfrm>
-            <a:off x="5743338" y="2914731"/>
-            <a:ext cx="338554" cy="276999"/>
-          </a:xfrm>
-          <a:prstGeom prst="rect">
-            <a:avLst/>
-          </a:prstGeom>
-          <a:noFill/>
-        </p:spPr>
-        <p:txBody>
-          <a:bodyPr wrap="square" rtlCol="0">
-            <a:spAutoFit/>
-          </a:bodyPr>
-          <a:lstStyle/>
-          <a:p>
-            <a:r>
-              <a:rPr lang="en-US" sz="1200" dirty="0">
-                <a:solidFill>
-                  <a:schemeClr val="tx1">
-                    <a:lumMod val="50000"/>
-                    <a:lumOff val="50000"/>
-                  </a:schemeClr>
-                </a:solidFill>
-                <a:ea typeface="Roboto Condensed" pitchFamily="2" charset="0"/>
-              </a:rPr>
-              <a:t>1</a:t>
-            </a:r>
-            <a:endParaRPr lang="en-GB" sz="1200" dirty="0">
-              <a:solidFill>
-                <a:schemeClr val="tx1">
-                  <a:lumMod val="50000"/>
-                  <a:lumOff val="50000"/>
-                </a:schemeClr>
-              </a:solidFill>
-              <a:ea typeface="Roboto Condensed" pitchFamily="2" charset="0"/>
-            </a:endParaRPr>
-          </a:p>
-        </p:txBody>
-      </p:sp>
     </p:spTree>
     <p:extLst>
       <p:ext uri="{BB962C8B-B14F-4D97-AF65-F5344CB8AC3E}">
@@ -7353,18 +7142,170 @@
       </p:grpSpPr>
       <p:grpSp>
         <p:nvGrpSpPr>
-          <p:cNvPr id="27" name="Group 26"/>
+          <p:cNvPr id="44" name="Group 43"/>
           <p:cNvGrpSpPr/>
           <p:nvPr/>
         </p:nvGrpSpPr>
         <p:grpSpPr>
           <a:xfrm>
-            <a:off x="2506664" y="2554559"/>
-            <a:ext cx="7178672" cy="1748882"/>
-            <a:chOff x="2953619" y="2819400"/>
-            <a:chExt cx="7178672" cy="1748882"/>
+            <a:off x="1688845" y="1579239"/>
+            <a:ext cx="8814311" cy="3699522"/>
+            <a:chOff x="1632446" y="456842"/>
+            <a:chExt cx="8814311" cy="3699522"/>
           </a:xfrm>
         </p:grpSpPr>
+        <p:cxnSp>
+          <p:nvCxnSpPr>
+            <p:cNvPr id="4" name="Straight Connector 3"/>
+            <p:cNvCxnSpPr>
+              <a:stCxn id="2" idx="2"/>
+            </p:cNvCxnSpPr>
+            <p:nvPr/>
+          </p:nvCxnSpPr>
+          <p:spPr>
+            <a:xfrm>
+              <a:off x="9532357" y="1362565"/>
+              <a:ext cx="0" cy="2793799"/>
+            </a:xfrm>
+            <a:prstGeom prst="line">
+              <a:avLst/>
+            </a:prstGeom>
+            <a:ln w="25400">
+              <a:solidFill>
+                <a:schemeClr val="tx1">
+                  <a:lumMod val="50000"/>
+                  <a:lumOff val="50000"/>
+                </a:schemeClr>
+              </a:solidFill>
+              <a:prstDash val="dash"/>
+            </a:ln>
+          </p:spPr>
+          <p:style>
+            <a:lnRef idx="1">
+              <a:schemeClr val="accent1"/>
+            </a:lnRef>
+            <a:fillRef idx="0">
+              <a:schemeClr val="accent1"/>
+            </a:fillRef>
+            <a:effectRef idx="0">
+              <a:schemeClr val="accent1"/>
+            </a:effectRef>
+            <a:fontRef idx="minor">
+              <a:schemeClr val="tx1"/>
+            </a:fontRef>
+          </p:style>
+        </p:cxnSp>
+        <p:cxnSp>
+          <p:nvCxnSpPr>
+            <p:cNvPr id="110" name="Straight Connector 109"/>
+            <p:cNvCxnSpPr/>
+            <p:nvPr/>
+          </p:nvCxnSpPr>
+          <p:spPr>
+            <a:xfrm>
+              <a:off x="7284457" y="1348638"/>
+              <a:ext cx="0" cy="2807726"/>
+            </a:xfrm>
+            <a:prstGeom prst="line">
+              <a:avLst/>
+            </a:prstGeom>
+            <a:ln w="25400">
+              <a:solidFill>
+                <a:schemeClr val="tx1">
+                  <a:lumMod val="50000"/>
+                  <a:lumOff val="50000"/>
+                </a:schemeClr>
+              </a:solidFill>
+              <a:prstDash val="dash"/>
+            </a:ln>
+          </p:spPr>
+          <p:style>
+            <a:lnRef idx="1">
+              <a:schemeClr val="accent1"/>
+            </a:lnRef>
+            <a:fillRef idx="0">
+              <a:schemeClr val="accent1"/>
+            </a:fillRef>
+            <a:effectRef idx="0">
+              <a:schemeClr val="accent1"/>
+            </a:effectRef>
+            <a:fontRef idx="minor">
+              <a:schemeClr val="tx1"/>
+            </a:fontRef>
+          </p:style>
+        </p:cxnSp>
+        <p:sp>
+          <p:nvSpPr>
+            <p:cNvPr id="2" name="Rectangle 1"/>
+            <p:cNvSpPr/>
+            <p:nvPr/>
+          </p:nvSpPr>
+          <p:spPr>
+            <a:xfrm>
+              <a:off x="8617957" y="787933"/>
+              <a:ext cx="1828800" cy="574632"/>
+            </a:xfrm>
+            <a:prstGeom prst="rect">
+              <a:avLst/>
+            </a:prstGeom>
+            <a:solidFill>
+              <a:schemeClr val="accent5">
+                <a:lumMod val="40000"/>
+                <a:lumOff val="60000"/>
+              </a:schemeClr>
+            </a:solidFill>
+            <a:ln>
+              <a:solidFill>
+                <a:schemeClr val="accent5">
+                  <a:lumMod val="50000"/>
+                </a:schemeClr>
+              </a:solidFill>
+            </a:ln>
+          </p:spPr>
+          <p:style>
+            <a:lnRef idx="2">
+              <a:schemeClr val="accent1">
+                <a:shade val="50000"/>
+              </a:schemeClr>
+            </a:lnRef>
+            <a:fillRef idx="1">
+              <a:schemeClr val="accent1"/>
+            </a:fillRef>
+            <a:effectRef idx="0">
+              <a:schemeClr val="accent1"/>
+            </a:effectRef>
+            <a:fontRef idx="minor">
+              <a:schemeClr val="lt1"/>
+            </a:fontRef>
+          </p:style>
+          <p:txBody>
+            <a:bodyPr rot="0" spcFirstLastPara="0" vertOverflow="overflow" horzOverflow="overflow" vert="horz" wrap="square" lIns="91440" tIns="45720" rIns="91440" bIns="45720" numCol="1" spcCol="0" rtlCol="0" fromWordArt="0" anchor="ctr" anchorCtr="0" forceAA="0" compatLnSpc="1">
+              <a:prstTxWarp prst="textNoShape">
+                <a:avLst/>
+              </a:prstTxWarp>
+              <a:noAutofit/>
+            </a:bodyPr>
+            <a:lstStyle/>
+            <a:p>
+              <a:pPr algn="ctr"/>
+              <a:r>
+                <a:rPr lang="en-US" dirty="0" smtClean="0">
+                  <a:solidFill>
+                    <a:schemeClr val="bg1"/>
+                  </a:solidFill>
+                  <a:ea typeface="Roboto" pitchFamily="2" charset="0"/>
+                </a:rPr>
+                <a:t>:Logic</a:t>
+              </a:r>
+              <a:endParaRPr lang="en-GB" dirty="0">
+                <a:solidFill>
+                  <a:schemeClr val="bg1"/>
+                </a:solidFill>
+                <a:ea typeface="Roboto" pitchFamily="2" charset="0"/>
+              </a:endParaRPr>
+            </a:p>
+          </p:txBody>
+        </p:sp>
         <p:sp>
           <p:nvSpPr>
             <p:cNvPr id="5" name="Rectangle 4"/>
@@ -7373,25 +7314,22 @@
           </p:nvSpPr>
           <p:spPr>
             <a:xfrm>
-              <a:off x="3045980" y="2819400"/>
-              <a:ext cx="7086311" cy="1219200"/>
+              <a:off x="9403048" y="2581089"/>
+              <a:ext cx="258618" cy="724956"/>
             </a:xfrm>
             <a:prstGeom prst="rect">
               <a:avLst/>
             </a:prstGeom>
             <a:solidFill>
-              <a:schemeClr val="bg1"/>
+              <a:srgbClr val="B4C7E7"/>
             </a:solidFill>
             <a:ln>
-              <a:noFill/>
+              <a:solidFill>
+                <a:schemeClr val="accent5">
+                  <a:lumMod val="50000"/>
+                </a:schemeClr>
+              </a:solidFill>
             </a:ln>
-            <a:effectLst>
-              <a:outerShdw blurRad="127000" dist="38100" dir="5400000" sx="101000" sy="101000" algn="t" rotWithShape="0">
-                <a:prstClr val="black">
-                  <a:alpha val="20000"/>
-                </a:prstClr>
-              </a:outerShdw>
-            </a:effectLst>
           </p:spPr>
           <p:style>
             <a:lnRef idx="2">
@@ -7414,29 +7352,188 @@
             <a:lstStyle/>
             <a:p>
               <a:pPr algn="ctr"/>
-              <a:endParaRPr lang="en-GB" dirty="0"/>
+              <a:endParaRPr lang="en-GB"/>
+            </a:p>
+          </p:txBody>
+        </p:sp>
+        <p:cxnSp>
+          <p:nvCxnSpPr>
+            <p:cNvPr id="7" name="Straight Arrow Connector 6"/>
+            <p:cNvCxnSpPr/>
+            <p:nvPr/>
+          </p:nvCxnSpPr>
+          <p:spPr>
+            <a:xfrm>
+              <a:off x="7324139" y="2581089"/>
+              <a:ext cx="2078909" cy="0"/>
+            </a:xfrm>
+            <a:prstGeom prst="straightConnector1">
+              <a:avLst/>
+            </a:prstGeom>
+            <a:ln w="25400">
+              <a:solidFill>
+                <a:srgbClr val="A9D18E"/>
+              </a:solidFill>
+              <a:tailEnd type="triangle" w="lg" len="lg"/>
+            </a:ln>
+          </p:spPr>
+          <p:style>
+            <a:lnRef idx="1">
+              <a:schemeClr val="accent1"/>
+            </a:lnRef>
+            <a:fillRef idx="0">
+              <a:schemeClr val="accent1"/>
+            </a:fillRef>
+            <a:effectRef idx="0">
+              <a:schemeClr val="accent1"/>
+            </a:effectRef>
+            <a:fontRef idx="minor">
+              <a:schemeClr val="tx1"/>
+            </a:fontRef>
+          </p:style>
+        </p:cxnSp>
+        <p:sp>
+          <p:nvSpPr>
+            <p:cNvPr id="9" name="TextBox 8"/>
+            <p:cNvSpPr txBox="1"/>
+            <p:nvPr/>
+          </p:nvSpPr>
+          <p:spPr>
+            <a:xfrm>
+              <a:off x="7400274" y="2049497"/>
+              <a:ext cx="2084289" cy="461665"/>
+            </a:xfrm>
+            <a:prstGeom prst="rect">
+              <a:avLst/>
+            </a:prstGeom>
+            <a:noFill/>
+          </p:spPr>
+          <p:txBody>
+            <a:bodyPr wrap="none" rtlCol="0">
+              <a:spAutoFit/>
+            </a:bodyPr>
+            <a:lstStyle/>
+            <a:p>
+              <a:r>
+                <a:rPr lang="en-US" sz="1200" dirty="0" err="1" smtClean="0">
+                  <a:ea typeface="Roboto Condensed" pitchFamily="2" charset="0"/>
+                  <a:cs typeface="Consolas" panose="020B0609020204030204" pitchFamily="49" charset="0"/>
+                </a:rPr>
+                <a:t>executeCommand</a:t>
+              </a:r>
+              <a:endParaRPr lang="en-US" sz="1200" dirty="0" smtClean="0">
+                <a:ea typeface="Roboto Condensed" pitchFamily="2" charset="0"/>
+                <a:cs typeface="Consolas" panose="020B0609020204030204" pitchFamily="49" charset="0"/>
+              </a:endParaRPr>
+            </a:p>
+            <a:p>
+              <a:r>
+                <a:rPr lang="en-US" sz="1200" dirty="0" smtClean="0">
+                  <a:ea typeface="Roboto Condensed" pitchFamily="2" charset="0"/>
+                  <a:cs typeface="Consolas" panose="020B0609020204030204" pitchFamily="49" charset="0"/>
+                </a:rPr>
+                <a:t>(“collate from C:/source-files”)</a:t>
+              </a:r>
+              <a:endParaRPr lang="en-GB" sz="1200" dirty="0">
+                <a:ea typeface="Roboto Condensed" pitchFamily="2" charset="0"/>
+                <a:cs typeface="Consolas" panose="020B0609020204030204" pitchFamily="49" charset="0"/>
+              </a:endParaRPr>
             </a:p>
           </p:txBody>
         </p:sp>
         <p:sp>
           <p:nvSpPr>
-            <p:cNvPr id="6" name="Oval 5"/>
+            <p:cNvPr id="101" name="Rectangle 100"/>
             <p:cNvSpPr/>
             <p:nvPr/>
           </p:nvSpPr>
           <p:spPr>
             <a:xfrm>
-              <a:off x="3253221" y="3050309"/>
-              <a:ext cx="766618" cy="766618"/>
+              <a:off x="7708733" y="2997532"/>
+              <a:ext cx="1725665" cy="277000"/>
             </a:xfrm>
-            <a:prstGeom prst="ellipse">
+            <a:prstGeom prst="rect">
+              <a:avLst/>
+            </a:prstGeom>
+          </p:spPr>
+          <p:txBody>
+            <a:bodyPr wrap="none">
+              <a:spAutoFit/>
+            </a:bodyPr>
+            <a:lstStyle/>
+            <a:p>
+              <a:r>
+                <a:rPr lang="en-GB" sz="1200" dirty="0" err="1" smtClean="0">
+                  <a:ea typeface="Roboto Condensed" pitchFamily="2" charset="0"/>
+                </a:rPr>
+                <a:t>Command.Type.COLLATE</a:t>
+              </a:r>
+              <a:endParaRPr lang="en-GB" sz="1200" dirty="0">
+                <a:ea typeface="Roboto Condensed" pitchFamily="2" charset="0"/>
+              </a:endParaRPr>
+            </a:p>
+          </p:txBody>
+        </p:sp>
+        <p:cxnSp>
+          <p:nvCxnSpPr>
+            <p:cNvPr id="102" name="Straight Arrow Connector 101"/>
+            <p:cNvCxnSpPr/>
+            <p:nvPr/>
+          </p:nvCxnSpPr>
+          <p:spPr>
+            <a:xfrm flipH="1">
+              <a:off x="7416133" y="3295541"/>
+              <a:ext cx="1986916" cy="0"/>
+            </a:xfrm>
+            <a:prstGeom prst="straightConnector1">
+              <a:avLst/>
+            </a:prstGeom>
+            <a:ln w="25400">
+              <a:solidFill>
+                <a:srgbClr val="B4C7E7"/>
+              </a:solidFill>
+              <a:prstDash val="sysDash"/>
+              <a:tailEnd type="triangle" w="lg" len="lg"/>
+            </a:ln>
+          </p:spPr>
+          <p:style>
+            <a:lnRef idx="1">
+              <a:schemeClr val="accent1"/>
+            </a:lnRef>
+            <a:fillRef idx="0">
+              <a:schemeClr val="accent1"/>
+            </a:fillRef>
+            <a:effectRef idx="0">
+              <a:schemeClr val="accent1"/>
+            </a:effectRef>
+            <a:fontRef idx="minor">
+              <a:schemeClr val="tx1"/>
+            </a:fontRef>
+          </p:style>
+        </p:cxnSp>
+        <p:sp>
+          <p:nvSpPr>
+            <p:cNvPr id="115" name="Rectangle 114"/>
+            <p:cNvSpPr/>
+            <p:nvPr/>
+          </p:nvSpPr>
+          <p:spPr>
+            <a:xfrm>
+              <a:off x="6523589" y="787933"/>
+              <a:ext cx="1521736" cy="574632"/>
+            </a:xfrm>
+            <a:prstGeom prst="rect">
               <a:avLst/>
             </a:prstGeom>
             <a:solidFill>
-              <a:srgbClr val="51FF61"/>
+              <a:srgbClr val="A9D18E"/>
             </a:solidFill>
             <a:ln>
-              <a:noFill/>
+              <a:solidFill>
+                <a:schemeClr val="accent5">
+                  <a:lumMod val="50000"/>
+                </a:schemeClr>
+              </a:solidFill>
             </a:ln>
           </p:spPr>
           <p:style>
@@ -7456,106 +7553,187 @@
             </a:fontRef>
           </p:style>
           <p:txBody>
-            <a:bodyPr wrap="none" rtlCol="0" anchor="ctr"/>
+            <a:bodyPr rot="0" spcFirstLastPara="0" vertOverflow="overflow" horzOverflow="overflow" vert="horz" wrap="square" lIns="91440" tIns="45720" rIns="91440" bIns="45720" numCol="1" spcCol="0" rtlCol="0" fromWordArt="0" anchor="ctr" anchorCtr="0" forceAA="0" compatLnSpc="1">
+              <a:prstTxWarp prst="textNoShape">
+                <a:avLst/>
+              </a:prstTxWarp>
+              <a:noAutofit/>
+            </a:bodyPr>
             <a:lstStyle/>
             <a:p>
               <a:pPr algn="ctr"/>
               <a:r>
-                <a:rPr lang="en-US" b="1" dirty="0" smtClean="0">
+                <a:rPr lang="en-US" dirty="0" smtClean="0">
                   <a:solidFill>
-                    <a:schemeClr val="tx1"/>
+                    <a:schemeClr val="bg1"/>
                   </a:solidFill>
-                  <a:latin typeface="Segoe UI" panose="020B0502040204020203" pitchFamily="34" charset="0"/>
-                  <a:cs typeface="Segoe UI" panose="020B0502040204020203" pitchFamily="34" charset="0"/>
+                  <a:ea typeface="Roboto" pitchFamily="2" charset="0"/>
                 </a:rPr>
-                <a:t>100%</a:t>
+                <a:t>:MainApp</a:t>
               </a:r>
-              <a:endParaRPr lang="en-GB" b="1" dirty="0">
+              <a:endParaRPr lang="en-GB" dirty="0">
                 <a:solidFill>
-                  <a:schemeClr val="tx1"/>
+                  <a:schemeClr val="bg1"/>
                 </a:solidFill>
-                <a:latin typeface="Segoe UI" panose="020B0502040204020203" pitchFamily="34" charset="0"/>
-                <a:cs typeface="Segoe UI" panose="020B0502040204020203" pitchFamily="34" charset="0"/>
+                <a:ea typeface="Roboto" pitchFamily="2" charset="0"/>
               </a:endParaRPr>
             </a:p>
           </p:txBody>
         </p:sp>
+        <p:cxnSp>
+          <p:nvCxnSpPr>
+            <p:cNvPr id="62" name="Straight Connector 61"/>
+            <p:cNvCxnSpPr/>
+            <p:nvPr/>
+          </p:nvCxnSpPr>
+          <p:spPr>
+            <a:xfrm>
+              <a:off x="4568233" y="1362565"/>
+              <a:ext cx="0" cy="2766090"/>
+            </a:xfrm>
+            <a:prstGeom prst="line">
+              <a:avLst/>
+            </a:prstGeom>
+            <a:ln w="25400">
+              <a:solidFill>
+                <a:schemeClr val="tx1">
+                  <a:lumMod val="50000"/>
+                  <a:lumOff val="50000"/>
+                </a:schemeClr>
+              </a:solidFill>
+              <a:prstDash val="dash"/>
+            </a:ln>
+          </p:spPr>
+          <p:style>
+            <a:lnRef idx="1">
+              <a:schemeClr val="accent1"/>
+            </a:lnRef>
+            <a:fillRef idx="0">
+              <a:schemeClr val="accent1"/>
+            </a:fillRef>
+            <a:effectRef idx="0">
+              <a:schemeClr val="accent1"/>
+            </a:effectRef>
+            <a:fontRef idx="minor">
+              <a:schemeClr val="tx1"/>
+            </a:fontRef>
+          </p:style>
+        </p:cxnSp>
         <p:sp>
           <p:nvSpPr>
-            <p:cNvPr id="8" name="TextBox 7"/>
+            <p:cNvPr id="63" name="Rectangle 62"/>
+            <p:cNvSpPr/>
+            <p:nvPr/>
+          </p:nvSpPr>
+          <p:spPr>
+            <a:xfrm>
+              <a:off x="3241270" y="787933"/>
+              <a:ext cx="2710917" cy="574632"/>
+            </a:xfrm>
+            <a:prstGeom prst="rect">
+              <a:avLst/>
+            </a:prstGeom>
+            <a:solidFill>
+              <a:srgbClr val="8FC36B"/>
+            </a:solidFill>
+            <a:ln>
+              <a:solidFill>
+                <a:schemeClr val="accent5">
+                  <a:lumMod val="50000"/>
+                </a:schemeClr>
+              </a:solidFill>
+            </a:ln>
+          </p:spPr>
+          <p:style>
+            <a:lnRef idx="2">
+              <a:schemeClr val="accent1">
+                <a:shade val="50000"/>
+              </a:schemeClr>
+            </a:lnRef>
+            <a:fillRef idx="1">
+              <a:schemeClr val="accent1"/>
+            </a:fillRef>
+            <a:effectRef idx="0">
+              <a:schemeClr val="accent1"/>
+            </a:effectRef>
+            <a:fontRef idx="minor">
+              <a:schemeClr val="lt1"/>
+            </a:fontRef>
+          </p:style>
+          <p:txBody>
+            <a:bodyPr rot="0" spcFirstLastPara="0" vertOverflow="overflow" horzOverflow="overflow" vert="horz" wrap="square" lIns="91440" tIns="45720" rIns="91440" bIns="45720" numCol="1" spcCol="0" rtlCol="0" fromWordArt="0" anchor="ctr" anchorCtr="0" forceAA="0" compatLnSpc="1">
+              <a:prstTxWarp prst="textNoShape">
+                <a:avLst/>
+              </a:prstTxWarp>
+              <a:noAutofit/>
+            </a:bodyPr>
+            <a:lstStyle/>
+            <a:p>
+              <a:pPr algn="ctr"/>
+              <a:r>
+                <a:rPr lang="en-US" dirty="0" smtClean="0">
+                  <a:solidFill>
+                    <a:schemeClr val="bg1"/>
+                  </a:solidFill>
+                  <a:ea typeface="Roboto" pitchFamily="2" charset="0"/>
+                </a:rPr>
+                <a:t>:CommandBarController</a:t>
+              </a:r>
+              <a:endParaRPr lang="en-GB" dirty="0">
+                <a:solidFill>
+                  <a:schemeClr val="bg1"/>
+                </a:solidFill>
+                <a:ea typeface="Roboto" pitchFamily="2" charset="0"/>
+              </a:endParaRPr>
+            </a:p>
+          </p:txBody>
+        </p:sp>
+        <p:cxnSp>
+          <p:nvCxnSpPr>
+            <p:cNvPr id="66" name="Straight Arrow Connector 65"/>
+            <p:cNvCxnSpPr/>
+            <p:nvPr/>
+          </p:nvCxnSpPr>
+          <p:spPr>
+            <a:xfrm>
+              <a:off x="4693178" y="2026146"/>
+              <a:ext cx="2464337" cy="0"/>
+            </a:xfrm>
+            <a:prstGeom prst="straightConnector1">
+              <a:avLst/>
+            </a:prstGeom>
+            <a:ln w="25400">
+              <a:solidFill>
+                <a:srgbClr val="8FC36B"/>
+              </a:solidFill>
+              <a:tailEnd type="triangle" w="lg" len="lg"/>
+            </a:ln>
+          </p:spPr>
+          <p:style>
+            <a:lnRef idx="1">
+              <a:schemeClr val="accent1"/>
+            </a:lnRef>
+            <a:fillRef idx="0">
+              <a:schemeClr val="accent1"/>
+            </a:fillRef>
+            <a:effectRef idx="0">
+              <a:schemeClr val="accent1"/>
+            </a:effectRef>
+            <a:fontRef idx="minor">
+              <a:schemeClr val="tx1"/>
+            </a:fontRef>
+          </p:style>
+        </p:cxnSp>
+        <p:sp>
+          <p:nvSpPr>
+            <p:cNvPr id="74" name="TextBox 73"/>
             <p:cNvSpPr txBox="1"/>
             <p:nvPr/>
           </p:nvSpPr>
           <p:spPr>
             <a:xfrm>
-              <a:off x="4125482" y="3047472"/>
-              <a:ext cx="4419095" cy="684803"/>
-            </a:xfrm>
-            <a:prstGeom prst="rect">
-              <a:avLst/>
-            </a:prstGeom>
-            <a:noFill/>
-          </p:spPr>
-          <p:txBody>
-            <a:bodyPr wrap="none" rtlCol="0">
-              <a:spAutoFit/>
-            </a:bodyPr>
-            <a:lstStyle/>
-            <a:p>
-              <a:pPr>
-                <a:spcAft>
-                  <a:spcPts val="300"/>
-                </a:spcAft>
-              </a:pPr>
-              <a:r>
-                <a:rPr lang="en-US" b="1" dirty="0" smtClean="0">
-                  <a:latin typeface="Segoe UI" panose="020B0502040204020203" pitchFamily="34" charset="0"/>
-                  <a:cs typeface="Segoe UI" panose="020B0502040204020203" pitchFamily="34" charset="0"/>
-                </a:rPr>
-                <a:t>main\resources\layouts\</a:t>
-              </a:r>
-              <a:r>
-                <a:rPr lang="en-US" b="1" dirty="0" err="1" smtClean="0">
-                  <a:latin typeface="Segoe UI" panose="020B0502040204020203" pitchFamily="34" charset="0"/>
-                  <a:cs typeface="Segoe UI" panose="020B0502040204020203" pitchFamily="34" charset="0"/>
-                </a:rPr>
-                <a:t>Summary.fxml</a:t>
-              </a:r>
-              <a:endParaRPr lang="en-US" b="1" dirty="0" smtClean="0">
-                <a:latin typeface="Segoe UI" panose="020B0502040204020203" pitchFamily="34" charset="0"/>
-                <a:cs typeface="Segoe UI" panose="020B0502040204020203" pitchFamily="34" charset="0"/>
-              </a:endParaRPr>
-            </a:p>
-            <a:p>
-              <a:pPr>
-                <a:spcAft>
-                  <a:spcPts val="300"/>
-                </a:spcAft>
-              </a:pPr>
-              <a:r>
-                <a:rPr lang="en-US" dirty="0" smtClean="0">
-                  <a:latin typeface="Segoe UI" panose="020B0502040204020203" pitchFamily="34" charset="0"/>
-                  <a:cs typeface="Segoe UI" panose="020B0502040204020203" pitchFamily="34" charset="0"/>
-                </a:rPr>
-                <a:t>25 lines</a:t>
-              </a:r>
-              <a:endParaRPr lang="en-GB" dirty="0">
-                <a:latin typeface="Segoe UI" panose="020B0502040204020203" pitchFamily="34" charset="0"/>
-                <a:cs typeface="Segoe UI" panose="020B0502040204020203" pitchFamily="34" charset="0"/>
-              </a:endParaRPr>
-            </a:p>
-          </p:txBody>
-        </p:sp>
-        <p:sp>
-          <p:nvSpPr>
-            <p:cNvPr id="26" name="TextBox 25"/>
-            <p:cNvSpPr txBox="1"/>
-            <p:nvPr/>
-          </p:nvSpPr>
-          <p:spPr>
-            <a:xfrm>
-              <a:off x="2953619" y="4229728"/>
-              <a:ext cx="3438057" cy="338554"/>
+              <a:off x="4727867" y="1564480"/>
+              <a:ext cx="2119555" cy="461665"/>
             </a:xfrm>
             <a:prstGeom prst="rect">
               <a:avLst/>
@@ -7569,28 +7747,433 @@
             <a:lstStyle/>
             <a:p>
               <a:r>
-                <a:rPr lang="en-US" sz="1600" dirty="0" smtClean="0">
+                <a:rPr lang="en-US" sz="1200" dirty="0" err="1" smtClean="0">
+                  <a:ea typeface="Roboto Condensed" pitchFamily="2" charset="0"/>
+                  <a:cs typeface="Consolas" panose="020B0609020204030204" pitchFamily="49" charset="0"/>
+                </a:rPr>
+                <a:t>handleKeyPress</a:t>
+              </a:r>
+              <a:endParaRPr lang="en-US" sz="1200" dirty="0" smtClean="0">
+                <a:ea typeface="Roboto Condensed" pitchFamily="2" charset="0"/>
+                <a:cs typeface="Consolas" panose="020B0609020204030204" pitchFamily="49" charset="0"/>
+              </a:endParaRPr>
+            </a:p>
+            <a:p>
+              <a:r>
+                <a:rPr lang="en-US" sz="1200" dirty="0" smtClean="0">
+                  <a:ea typeface="Roboto Condensed" pitchFamily="2" charset="0"/>
+                  <a:cs typeface="Consolas" panose="020B0609020204030204" pitchFamily="49" charset="0"/>
+                </a:rPr>
+                <a:t>(“collate from C:/source-files”)</a:t>
+              </a:r>
+              <a:endParaRPr lang="en-GB" sz="1200" dirty="0">
+                <a:ea typeface="Roboto Condensed" pitchFamily="2" charset="0"/>
+                <a:cs typeface="Consolas" panose="020B0609020204030204" pitchFamily="49" charset="0"/>
+              </a:endParaRPr>
+            </a:p>
+          </p:txBody>
+        </p:sp>
+        <p:sp>
+          <p:nvSpPr>
+            <p:cNvPr id="79" name="Rectangle 78"/>
+            <p:cNvSpPr/>
+            <p:nvPr/>
+          </p:nvSpPr>
+          <p:spPr>
+            <a:xfrm>
+              <a:off x="4434560" y="1799359"/>
+              <a:ext cx="258618" cy="1840910"/>
+            </a:xfrm>
+            <a:prstGeom prst="rect">
+              <a:avLst/>
+            </a:prstGeom>
+            <a:solidFill>
+              <a:srgbClr val="8FC36B"/>
+            </a:solidFill>
+            <a:ln>
+              <a:solidFill>
+                <a:schemeClr val="accent5">
+                  <a:lumMod val="50000"/>
+                </a:schemeClr>
+              </a:solidFill>
+            </a:ln>
+          </p:spPr>
+          <p:style>
+            <a:lnRef idx="2">
+              <a:schemeClr val="accent1">
+                <a:shade val="50000"/>
+              </a:schemeClr>
+            </a:lnRef>
+            <a:fillRef idx="1">
+              <a:schemeClr val="accent1"/>
+            </a:fillRef>
+            <a:effectRef idx="0">
+              <a:schemeClr val="accent1"/>
+            </a:effectRef>
+            <a:fontRef idx="minor">
+              <a:schemeClr val="lt1"/>
+            </a:fontRef>
+          </p:style>
+          <p:txBody>
+            <a:bodyPr rtlCol="0" anchor="ctr"/>
+            <a:lstStyle/>
+            <a:p>
+              <a:pPr algn="ctr"/>
+              <a:endParaRPr lang="en-GB"/>
+            </a:p>
+          </p:txBody>
+        </p:sp>
+        <p:cxnSp>
+          <p:nvCxnSpPr>
+            <p:cNvPr id="82" name="Straight Arrow Connector 81"/>
+            <p:cNvCxnSpPr/>
+            <p:nvPr/>
+          </p:nvCxnSpPr>
+          <p:spPr>
+            <a:xfrm flipH="1">
+              <a:off x="4693178" y="3640269"/>
+              <a:ext cx="2464337" cy="0"/>
+            </a:xfrm>
+            <a:prstGeom prst="straightConnector1">
+              <a:avLst/>
+            </a:prstGeom>
+            <a:ln w="25400">
+              <a:solidFill>
+                <a:srgbClr val="A9D18E"/>
+              </a:solidFill>
+              <a:prstDash val="sysDash"/>
+              <a:tailEnd type="triangle" w="lg" len="lg"/>
+            </a:ln>
+          </p:spPr>
+          <p:style>
+            <a:lnRef idx="1">
+              <a:schemeClr val="accent1"/>
+            </a:lnRef>
+            <a:fillRef idx="0">
+              <a:schemeClr val="accent1"/>
+            </a:fillRef>
+            <a:effectRef idx="0">
+              <a:schemeClr val="accent1"/>
+            </a:effectRef>
+            <a:fontRef idx="minor">
+              <a:schemeClr val="tx1"/>
+            </a:fontRef>
+          </p:style>
+        </p:cxnSp>
+        <p:sp>
+          <p:nvSpPr>
+            <p:cNvPr id="77" name="Rectangle 76"/>
+            <p:cNvSpPr/>
+            <p:nvPr/>
+          </p:nvSpPr>
+          <p:spPr>
+            <a:xfrm>
+              <a:off x="7157515" y="2026145"/>
+              <a:ext cx="258618" cy="1614124"/>
+            </a:xfrm>
+            <a:prstGeom prst="rect">
+              <a:avLst/>
+            </a:prstGeom>
+            <a:solidFill>
+              <a:srgbClr val="A9D18E"/>
+            </a:solidFill>
+            <a:ln>
+              <a:solidFill>
+                <a:schemeClr val="accent5">
+                  <a:lumMod val="50000"/>
+                </a:schemeClr>
+              </a:solidFill>
+            </a:ln>
+          </p:spPr>
+          <p:style>
+            <a:lnRef idx="2">
+              <a:schemeClr val="accent1">
+                <a:shade val="50000"/>
+              </a:schemeClr>
+            </a:lnRef>
+            <a:fillRef idx="1">
+              <a:schemeClr val="accent1"/>
+            </a:fillRef>
+            <a:effectRef idx="0">
+              <a:schemeClr val="accent1"/>
+            </a:effectRef>
+            <a:fontRef idx="minor">
+              <a:schemeClr val="lt1"/>
+            </a:fontRef>
+          </p:style>
+          <p:txBody>
+            <a:bodyPr rtlCol="0" anchor="ctr"/>
+            <a:lstStyle/>
+            <a:p>
+              <a:pPr algn="ctr"/>
+              <a:endParaRPr lang="en-GB"/>
+            </a:p>
+          </p:txBody>
+        </p:sp>
+        <p:sp>
+          <p:nvSpPr>
+            <p:cNvPr id="83" name="TextBox 82"/>
+            <p:cNvSpPr txBox="1"/>
+            <p:nvPr/>
+          </p:nvSpPr>
+          <p:spPr>
+            <a:xfrm>
+              <a:off x="5613087" y="3136032"/>
+              <a:ext cx="1555554" cy="461665"/>
+            </a:xfrm>
+            <a:prstGeom prst="rect">
+              <a:avLst/>
+            </a:prstGeom>
+            <a:noFill/>
+          </p:spPr>
+          <p:txBody>
+            <a:bodyPr wrap="none" rtlCol="0">
+              <a:spAutoFit/>
+            </a:bodyPr>
+            <a:lstStyle/>
+            <a:p>
+              <a:r>
+                <a:rPr lang="en-US" sz="1200" dirty="0" err="1" smtClean="0">
+                  <a:ea typeface="Roboto Condensed" pitchFamily="2" charset="0"/>
+                  <a:cs typeface="Consolas" panose="020B0609020204030204" pitchFamily="49" charset="0"/>
+                </a:rPr>
+                <a:t>setFeedback</a:t>
+              </a:r>
+              <a:endParaRPr lang="en-US" sz="1200" dirty="0" smtClean="0">
+                <a:ea typeface="Roboto Condensed" pitchFamily="2" charset="0"/>
+                <a:cs typeface="Consolas" panose="020B0609020204030204" pitchFamily="49" charset="0"/>
+              </a:endParaRPr>
+            </a:p>
+            <a:p>
+              <a:r>
+                <a:rPr lang="en-US" sz="1200" dirty="0" smtClean="0">
+                  <a:ea typeface="Roboto Condensed" pitchFamily="2" charset="0"/>
+                  <a:cs typeface="Consolas" panose="020B0609020204030204" pitchFamily="49" charset="0"/>
+                </a:rPr>
+                <a:t>(“</a:t>
+              </a:r>
+              <a:r>
+                <a:rPr lang="en-GB" sz="1200" dirty="0"/>
+                <a:t>Collate successful!</a:t>
+              </a:r>
+              <a:r>
+                <a:rPr lang="en-US" sz="1200" dirty="0" smtClean="0">
+                  <a:ea typeface="Roboto Condensed" pitchFamily="2" charset="0"/>
+                  <a:cs typeface="Consolas" panose="020B0609020204030204" pitchFamily="49" charset="0"/>
+                </a:rPr>
+                <a:t>”)</a:t>
+              </a:r>
+              <a:endParaRPr lang="en-GB" sz="1200" dirty="0">
+                <a:ea typeface="Roboto Condensed" pitchFamily="2" charset="0"/>
+                <a:cs typeface="Consolas" panose="020B0609020204030204" pitchFamily="49" charset="0"/>
+              </a:endParaRPr>
+            </a:p>
+          </p:txBody>
+        </p:sp>
+        <p:sp>
+          <p:nvSpPr>
+            <p:cNvPr id="85" name="Smiley Face 84"/>
+            <p:cNvSpPr/>
+            <p:nvPr/>
+          </p:nvSpPr>
+          <p:spPr>
+            <a:xfrm>
+              <a:off x="1645229" y="456842"/>
+              <a:ext cx="606228" cy="606228"/>
+            </a:xfrm>
+            <a:prstGeom prst="smileyFace">
+              <a:avLst/>
+            </a:prstGeom>
+            <a:noFill/>
+            <a:ln w="25400">
+              <a:solidFill>
+                <a:schemeClr val="bg2">
+                  <a:lumMod val="50000"/>
+                </a:schemeClr>
+              </a:solidFill>
+            </a:ln>
+          </p:spPr>
+          <p:style>
+            <a:lnRef idx="2">
+              <a:schemeClr val="accent6">
+                <a:shade val="50000"/>
+              </a:schemeClr>
+            </a:lnRef>
+            <a:fillRef idx="1">
+              <a:schemeClr val="accent6"/>
+            </a:fillRef>
+            <a:effectRef idx="0">
+              <a:schemeClr val="accent6"/>
+            </a:effectRef>
+            <a:fontRef idx="minor">
+              <a:schemeClr val="lt1"/>
+            </a:fontRef>
+          </p:style>
+          <p:txBody>
+            <a:bodyPr rtlCol="0" anchor="ctr"/>
+            <a:lstStyle/>
+            <a:p>
+              <a:pPr algn="ctr"/>
+              <a:endParaRPr lang="en-GB"/>
+            </a:p>
+          </p:txBody>
+        </p:sp>
+        <p:sp>
+          <p:nvSpPr>
+            <p:cNvPr id="86" name="TextBox 85"/>
+            <p:cNvSpPr txBox="1"/>
+            <p:nvPr/>
+          </p:nvSpPr>
+          <p:spPr>
+            <a:xfrm>
+              <a:off x="1632446" y="1079219"/>
+              <a:ext cx="617477" cy="369332"/>
+            </a:xfrm>
+            <a:prstGeom prst="rect">
+              <a:avLst/>
+            </a:prstGeom>
+            <a:noFill/>
+          </p:spPr>
+          <p:txBody>
+            <a:bodyPr wrap="none" rtlCol="0">
+              <a:spAutoFit/>
+            </a:bodyPr>
+            <a:lstStyle/>
+            <a:p>
+              <a:r>
+                <a:rPr lang="en-US" dirty="0" smtClean="0">
+                  <a:solidFill>
+                    <a:srgbClr val="767171"/>
+                  </a:solidFill>
                   <a:ea typeface="Roboto Condensed" pitchFamily="2" charset="0"/>
                 </a:rPr>
-                <a:t>Figure 3: Appearance of a </a:t>
+                <a:t>User</a:t>
               </a:r>
-              <a:r>
-                <a:rPr lang="en-US" sz="1600" dirty="0" err="1" smtClean="0">
-                  <a:ea typeface="Roboto Condensed" pitchFamily="2" charset="0"/>
-                </a:rPr>
-                <a:t>FileStatsItem</a:t>
-              </a:r>
-              <a:endParaRPr lang="en-GB" sz="1600" dirty="0">
+              <a:endParaRPr lang="en-GB" dirty="0">
+                <a:solidFill>
+                  <a:srgbClr val="767171"/>
+                </a:solidFill>
                 <a:ea typeface="Roboto Condensed" pitchFamily="2" charset="0"/>
               </a:endParaRPr>
             </a:p>
           </p:txBody>
         </p:sp>
+        <p:cxnSp>
+          <p:nvCxnSpPr>
+            <p:cNvPr id="87" name="Straight Connector 86"/>
+            <p:cNvCxnSpPr/>
+            <p:nvPr/>
+          </p:nvCxnSpPr>
+          <p:spPr>
+            <a:xfrm>
+              <a:off x="1929460" y="1448551"/>
+              <a:ext cx="0" cy="2707813"/>
+            </a:xfrm>
+            <a:prstGeom prst="line">
+              <a:avLst/>
+            </a:prstGeom>
+            <a:ln w="25400">
+              <a:solidFill>
+                <a:schemeClr val="tx1">
+                  <a:lumMod val="50000"/>
+                  <a:lumOff val="50000"/>
+                </a:schemeClr>
+              </a:solidFill>
+              <a:prstDash val="dash"/>
+            </a:ln>
+          </p:spPr>
+          <p:style>
+            <a:lnRef idx="1">
+              <a:schemeClr val="accent1"/>
+            </a:lnRef>
+            <a:fillRef idx="0">
+              <a:schemeClr val="accent1"/>
+            </a:fillRef>
+            <a:effectRef idx="0">
+              <a:schemeClr val="accent1"/>
+            </a:effectRef>
+            <a:fontRef idx="minor">
+              <a:schemeClr val="tx1"/>
+            </a:fontRef>
+          </p:style>
+        </p:cxnSp>
+        <p:sp>
+          <p:nvSpPr>
+            <p:cNvPr id="88" name="TextBox 87"/>
+            <p:cNvSpPr txBox="1"/>
+            <p:nvPr/>
+          </p:nvSpPr>
+          <p:spPr>
+            <a:xfrm>
+              <a:off x="1928373" y="1518313"/>
+              <a:ext cx="2466509" cy="276999"/>
+            </a:xfrm>
+            <a:prstGeom prst="rect">
+              <a:avLst/>
+            </a:prstGeom>
+            <a:noFill/>
+          </p:spPr>
+          <p:txBody>
+            <a:bodyPr wrap="none" rtlCol="0">
+              <a:spAutoFit/>
+            </a:bodyPr>
+            <a:lstStyle/>
+            <a:p>
+              <a:r>
+                <a:rPr lang="en-US" sz="1200" dirty="0" smtClean="0">
+                  <a:ea typeface="Roboto Condensed" pitchFamily="2" charset="0"/>
+                  <a:cs typeface="Consolas" panose="020B0609020204030204" pitchFamily="49" charset="0"/>
+                </a:rPr>
+                <a:t>Enters “collate from C:/source-files”</a:t>
+              </a:r>
+              <a:endParaRPr lang="en-GB" sz="1200" dirty="0">
+                <a:ea typeface="Roboto Condensed" pitchFamily="2" charset="0"/>
+                <a:cs typeface="Consolas" panose="020B0609020204030204" pitchFamily="49" charset="0"/>
+              </a:endParaRPr>
+            </a:p>
+          </p:txBody>
+        </p:sp>
+        <p:cxnSp>
+          <p:nvCxnSpPr>
+            <p:cNvPr id="89" name="Straight Arrow Connector 88"/>
+            <p:cNvCxnSpPr/>
+            <p:nvPr/>
+          </p:nvCxnSpPr>
+          <p:spPr>
+            <a:xfrm>
+              <a:off x="1929460" y="1795312"/>
+              <a:ext cx="2504013" cy="0"/>
+            </a:xfrm>
+            <a:prstGeom prst="straightConnector1">
+              <a:avLst/>
+            </a:prstGeom>
+            <a:ln w="25400">
+              <a:solidFill>
+                <a:srgbClr val="767171"/>
+              </a:solidFill>
+              <a:tailEnd type="triangle" w="lg" len="lg"/>
+            </a:ln>
+          </p:spPr>
+          <p:style>
+            <a:lnRef idx="1">
+              <a:schemeClr val="accent1"/>
+            </a:lnRef>
+            <a:fillRef idx="0">
+              <a:schemeClr val="accent1"/>
+            </a:fillRef>
+            <a:effectRef idx="0">
+              <a:schemeClr val="accent1"/>
+            </a:effectRef>
+            <a:fontRef idx="minor">
+              <a:schemeClr val="tx1"/>
+            </a:fontRef>
+          </p:style>
+        </p:cxnSp>
       </p:grpSp>
     </p:spTree>
     <p:extLst>
       <p:ext uri="{BB962C8B-B14F-4D97-AF65-F5344CB8AC3E}">
-        <p14:creationId xmlns:p14="http://schemas.microsoft.com/office/powerpoint/2010/main" val="1945888093"/>
+        <p14:creationId xmlns:p14="http://schemas.microsoft.com/office/powerpoint/2010/main" val="111028292"/>
       </p:ext>
     </p:extLst>
   </p:cSld>
@@ -7619,14 +8202,129 @@
       </p:grpSpPr>
       <p:sp>
         <p:nvSpPr>
-          <p:cNvPr id="140" name="TextBox 139"/>
+          <p:cNvPr id="5" name="Rectangle 4"/>
+          <p:cNvSpPr/>
+          <p:nvPr/>
+        </p:nvSpPr>
+        <p:spPr>
+          <a:xfrm>
+            <a:off x="2599025" y="2554559"/>
+            <a:ext cx="7086311" cy="1219200"/>
+          </a:xfrm>
+          <a:prstGeom prst="rect">
+            <a:avLst/>
+          </a:prstGeom>
+          <a:solidFill>
+            <a:schemeClr val="bg1"/>
+          </a:solidFill>
+          <a:ln>
+            <a:noFill/>
+          </a:ln>
+          <a:effectLst>
+            <a:outerShdw blurRad="127000" dist="38100" dir="5400000" sx="101000" sy="101000" algn="t" rotWithShape="0">
+              <a:prstClr val="black">
+                <a:alpha val="20000"/>
+              </a:prstClr>
+            </a:outerShdw>
+          </a:effectLst>
+        </p:spPr>
+        <p:style>
+          <a:lnRef idx="2">
+            <a:schemeClr val="accent1">
+              <a:shade val="50000"/>
+            </a:schemeClr>
+          </a:lnRef>
+          <a:fillRef idx="1">
+            <a:schemeClr val="accent1"/>
+          </a:fillRef>
+          <a:effectRef idx="0">
+            <a:schemeClr val="accent1"/>
+          </a:effectRef>
+          <a:fontRef idx="minor">
+            <a:schemeClr val="lt1"/>
+          </a:fontRef>
+        </p:style>
+        <p:txBody>
+          <a:bodyPr rtlCol="0" anchor="ctr"/>
+          <a:lstStyle/>
+          <a:p>
+            <a:pPr algn="ctr"/>
+            <a:endParaRPr lang="en-GB" dirty="0"/>
+          </a:p>
+        </p:txBody>
+      </p:sp>
+      <p:sp>
+        <p:nvSpPr>
+          <p:cNvPr id="6" name="Oval 5"/>
+          <p:cNvSpPr/>
+          <p:nvPr/>
+        </p:nvSpPr>
+        <p:spPr>
+          <a:xfrm>
+            <a:off x="2806266" y="2785468"/>
+            <a:ext cx="766618" cy="766618"/>
+          </a:xfrm>
+          <a:prstGeom prst="ellipse">
+            <a:avLst/>
+          </a:prstGeom>
+          <a:solidFill>
+            <a:srgbClr val="51FF61"/>
+          </a:solidFill>
+          <a:ln>
+            <a:noFill/>
+          </a:ln>
+        </p:spPr>
+        <p:style>
+          <a:lnRef idx="2">
+            <a:schemeClr val="accent1">
+              <a:shade val="50000"/>
+            </a:schemeClr>
+          </a:lnRef>
+          <a:fillRef idx="1">
+            <a:schemeClr val="accent1"/>
+          </a:fillRef>
+          <a:effectRef idx="0">
+            <a:schemeClr val="accent1"/>
+          </a:effectRef>
+          <a:fontRef idx="minor">
+            <a:schemeClr val="lt1"/>
+          </a:fontRef>
+        </p:style>
+        <p:txBody>
+          <a:bodyPr wrap="none" rtlCol="0" anchor="ctr"/>
+          <a:lstStyle/>
+          <a:p>
+            <a:pPr algn="ctr"/>
+            <a:r>
+              <a:rPr lang="en-US" b="1" dirty="0" smtClean="0">
+                <a:solidFill>
+                  <a:schemeClr val="tx1"/>
+                </a:solidFill>
+                <a:latin typeface="Segoe UI" panose="020B0502040204020203" pitchFamily="34" charset="0"/>
+                <a:cs typeface="Segoe UI" panose="020B0502040204020203" pitchFamily="34" charset="0"/>
+              </a:rPr>
+              <a:t>100%</a:t>
+            </a:r>
+            <a:endParaRPr lang="en-GB" b="1" dirty="0">
+              <a:solidFill>
+                <a:schemeClr val="tx1"/>
+              </a:solidFill>
+              <a:latin typeface="Segoe UI" panose="020B0502040204020203" pitchFamily="34" charset="0"/>
+              <a:cs typeface="Segoe UI" panose="020B0502040204020203" pitchFamily="34" charset="0"/>
+            </a:endParaRPr>
+          </a:p>
+        </p:txBody>
+      </p:sp>
+      <p:sp>
+        <p:nvSpPr>
+          <p:cNvPr id="8" name="TextBox 7"/>
           <p:cNvSpPr txBox="1"/>
           <p:nvPr/>
         </p:nvSpPr>
         <p:spPr>
           <a:xfrm>
-            <a:off x="1441694" y="6218090"/>
-            <a:ext cx="4127412" cy="338554"/>
+            <a:off x="3678527" y="2782631"/>
+            <a:ext cx="4419095" cy="684803"/>
           </a:xfrm>
           <a:prstGeom prst="rect">
             <a:avLst/>
@@ -7639,18 +8337,80 @@
           </a:bodyPr>
           <a:lstStyle/>
           <a:p>
-            <a:r>
-              <a:rPr lang="en-US" sz="1600" dirty="0" smtClean="0">
-                <a:ea typeface="Roboto Condensed" pitchFamily="2" charset="0"/>
+            <a:pPr>
+              <a:spcAft>
+                <a:spcPts val="300"/>
+              </a:spcAft>
+            </a:pPr>
+            <a:r>
+              <a:rPr lang="en-US" b="1" dirty="0" smtClean="0">
+                <a:latin typeface="Segoe UI" panose="020B0502040204020203" pitchFamily="34" charset="0"/>
+                <a:cs typeface="Segoe UI" panose="020B0502040204020203" pitchFamily="34" charset="0"/>
               </a:rPr>
-              <a:t>Figure 4: Class diagram for Backend component</a:t>
-            </a:r>
-            <a:endParaRPr lang="en-GB" sz="1600" dirty="0">
-              <a:ea typeface="Roboto Condensed" pitchFamily="2" charset="0"/>
+              <a:t>main\resources\layouts\</a:t>
+            </a:r>
+            <a:r>
+              <a:rPr lang="en-US" b="1" dirty="0" err="1" smtClean="0">
+                <a:latin typeface="Segoe UI" panose="020B0502040204020203" pitchFamily="34" charset="0"/>
+                <a:cs typeface="Segoe UI" panose="020B0502040204020203" pitchFamily="34" charset="0"/>
+              </a:rPr>
+              <a:t>Summary.fxml</a:t>
+            </a:r>
+            <a:endParaRPr lang="en-US" b="1" dirty="0" smtClean="0">
+              <a:latin typeface="Segoe UI" panose="020B0502040204020203" pitchFamily="34" charset="0"/>
+              <a:cs typeface="Segoe UI" panose="020B0502040204020203" pitchFamily="34" charset="0"/>
             </a:endParaRPr>
           </a:p>
-        </p:txBody>
-      </p:sp>
+          <a:p>
+            <a:pPr>
+              <a:spcAft>
+                <a:spcPts val="300"/>
+              </a:spcAft>
+            </a:pPr>
+            <a:r>
+              <a:rPr lang="en-US" dirty="0" smtClean="0">
+                <a:latin typeface="Segoe UI" panose="020B0502040204020203" pitchFamily="34" charset="0"/>
+                <a:cs typeface="Segoe UI" panose="020B0502040204020203" pitchFamily="34" charset="0"/>
+              </a:rPr>
+              <a:t>25 lines</a:t>
+            </a:r>
+            <a:endParaRPr lang="en-GB" dirty="0">
+              <a:latin typeface="Segoe UI" panose="020B0502040204020203" pitchFamily="34" charset="0"/>
+              <a:cs typeface="Segoe UI" panose="020B0502040204020203" pitchFamily="34" charset="0"/>
+            </a:endParaRPr>
+          </a:p>
+        </p:txBody>
+      </p:sp>
+    </p:spTree>
+    <p:extLst>
+      <p:ext uri="{BB962C8B-B14F-4D97-AF65-F5344CB8AC3E}">
+        <p14:creationId xmlns:p14="http://schemas.microsoft.com/office/powerpoint/2010/main" val="1945888093"/>
+      </p:ext>
+    </p:extLst>
+  </p:cSld>
+  <p:clrMapOvr>
+    <a:masterClrMapping/>
+  </p:clrMapOvr>
+</p:sld>
+</file>
+
+<file path=ppt/slides/slide5.xml><?xml version="1.0" encoding="utf-8"?>
+<p:sld xmlns:a="http://schemas.openxmlformats.org/drawingml/2006/main" xmlns:r="http://schemas.openxmlformats.org/officeDocument/2006/relationships" xmlns:p="http://schemas.openxmlformats.org/presentationml/2006/main">
+  <p:cSld>
+    <p:spTree>
+      <p:nvGrpSpPr>
+        <p:cNvPr id="1" name=""/>
+        <p:cNvGrpSpPr/>
+        <p:nvPr/>
+      </p:nvGrpSpPr>
+      <p:grpSpPr>
+        <a:xfrm>
+          <a:off x="0" y="0"/>
+          <a:ext cx="0" cy="0"/>
+          <a:chOff x="0" y="0"/>
+          <a:chExt cx="0" cy="0"/>
+        </a:xfrm>
+      </p:grpSpPr>
       <p:sp>
         <p:nvSpPr>
           <p:cNvPr id="5" name="Rounded Rectangle 4"/>
@@ -9019,7 +9779,7 @@
 </p:sld>
 </file>
 
-<file path=ppt/slides/slide5.xml><?xml version="1.0" encoding="utf-8"?>
+<file path=ppt/slides/slide6.xml><?xml version="1.0" encoding="utf-8"?>
 <p:sld xmlns:a="http://schemas.openxmlformats.org/drawingml/2006/main" xmlns:r="http://schemas.openxmlformats.org/officeDocument/2006/relationships" xmlns:p="http://schemas.openxmlformats.org/presentationml/2006/main">
   <p:cSld>
     <p:spTree>
@@ -11345,40 +12105,6 @@
           </a:p>
         </p:txBody>
       </p:sp>
-      <p:sp>
-        <p:nvSpPr>
-          <p:cNvPr id="121" name="TextBox 120"/>
-          <p:cNvSpPr txBox="1"/>
-          <p:nvPr/>
-        </p:nvSpPr>
-        <p:spPr>
-          <a:xfrm>
-            <a:off x="519710" y="5737351"/>
-            <a:ext cx="4987584" cy="338554"/>
-          </a:xfrm>
-          <a:prstGeom prst="rect">
-            <a:avLst/>
-          </a:prstGeom>
-          <a:noFill/>
-        </p:spPr>
-        <p:txBody>
-          <a:bodyPr wrap="none" rtlCol="0">
-            <a:spAutoFit/>
-          </a:bodyPr>
-          <a:lstStyle/>
-          <a:p>
-            <a:r>
-              <a:rPr lang="en-US" sz="1600" dirty="0" smtClean="0">
-                <a:ea typeface="Roboto Condensed" pitchFamily="2" charset="0"/>
-              </a:rPr>
-              <a:t>Figure 5: Sequence diagram for a typical collate command</a:t>
-            </a:r>
-            <a:endParaRPr lang="en-GB" sz="1600" dirty="0">
-              <a:ea typeface="Roboto Condensed" pitchFamily="2" charset="0"/>
-            </a:endParaRPr>
-          </a:p>
-        </p:txBody>
-      </p:sp>
     </p:spTree>
     <p:extLst>
       <p:ext uri="{BB962C8B-B14F-4D97-AF65-F5344CB8AC3E}">
@@ -11392,7 +12118,7 @@
 </p:sld>
 </file>
 
-<file path=ppt/slides/slide6.xml><?xml version="1.0" encoding="utf-8"?>
+<file path=ppt/slides/slide7.xml><?xml version="1.0" encoding="utf-8"?>
 <p:sld xmlns:a="http://schemas.openxmlformats.org/drawingml/2006/main" xmlns:r="http://schemas.openxmlformats.org/officeDocument/2006/relationships" xmlns:p="http://schemas.openxmlformats.org/presentationml/2006/main">
   <p:cSld>
     <p:spTree>
@@ -12032,40 +12758,6 @@
           </p:txBody>
         </p:sp>
       </p:grpSp>
-      <p:sp>
-        <p:nvSpPr>
-          <p:cNvPr id="32" name="TextBox 31"/>
-          <p:cNvSpPr txBox="1"/>
-          <p:nvPr/>
-        </p:nvSpPr>
-        <p:spPr>
-          <a:xfrm>
-            <a:off x="2182633" y="4545825"/>
-            <a:ext cx="3813801" cy="338554"/>
-          </a:xfrm>
-          <a:prstGeom prst="rect">
-            <a:avLst/>
-          </a:prstGeom>
-          <a:noFill/>
-        </p:spPr>
-        <p:txBody>
-          <a:bodyPr wrap="none" rtlCol="0">
-            <a:spAutoFit/>
-          </a:bodyPr>
-          <a:lstStyle/>
-          <a:p>
-            <a:r>
-              <a:rPr lang="en-US" sz="1600" dirty="0" smtClean="0">
-                <a:ea typeface="Roboto Condensed" pitchFamily="2" charset="0"/>
-              </a:rPr>
-              <a:t>Figure 6: Class diagram for Data component</a:t>
-            </a:r>
-            <a:endParaRPr lang="en-GB" sz="1600" dirty="0">
-              <a:ea typeface="Roboto Condensed" pitchFamily="2" charset="0"/>
-            </a:endParaRPr>
-          </a:p>
-        </p:txBody>
-      </p:sp>
     </p:spTree>
     <p:extLst>
       <p:ext uri="{BB962C8B-B14F-4D97-AF65-F5344CB8AC3E}">

</xml_diff>

<commit_message>
Updated documentation for the new AuthorBean class.
</commit_message>
<xml_diff>
--- a/docs/Diagrams.pptx
+++ b/docs/Diagrams.pptx
@@ -844,7 +844,7 @@
           <a:p>
             <a:fld id="{0EBC881F-A445-44A1-8BB1-A4D1BDD4D291}" type="datetime1">
               <a:rPr lang="en-GB" smtClean="0"/>
-              <a:t>23/08/2015</a:t>
+              <a:t>26/08/2015</a:t>
             </a:fld>
             <a:endParaRPr lang="en-GB"/>
           </a:p>
@@ -1014,7 +1014,7 @@
           <a:p>
             <a:fld id="{2584BEDC-1639-4090-8CAA-F6974F06BD49}" type="datetime1">
               <a:rPr lang="en-GB" smtClean="0"/>
-              <a:t>23/08/2015</a:t>
+              <a:t>26/08/2015</a:t>
             </a:fld>
             <a:endParaRPr lang="en-GB"/>
           </a:p>
@@ -1194,7 +1194,7 @@
           <a:p>
             <a:fld id="{00C779A6-9523-4A2E-A931-C8A709BD1078}" type="datetime1">
               <a:rPr lang="en-GB" smtClean="0"/>
-              <a:t>23/08/2015</a:t>
+              <a:t>26/08/2015</a:t>
             </a:fld>
             <a:endParaRPr lang="en-GB"/>
           </a:p>
@@ -1364,7 +1364,7 @@
           <a:p>
             <a:fld id="{3A5F7889-DF91-41C1-A5B0-E479EFB53093}" type="datetime1">
               <a:rPr lang="en-GB" smtClean="0"/>
-              <a:t>23/08/2015</a:t>
+              <a:t>26/08/2015</a:t>
             </a:fld>
             <a:endParaRPr lang="en-GB"/>
           </a:p>
@@ -1610,7 +1610,7 @@
           <a:p>
             <a:fld id="{B34262BB-05D7-48AA-A628-76FDB16BFEC4}" type="datetime1">
               <a:rPr lang="en-GB" smtClean="0"/>
-              <a:t>23/08/2015</a:t>
+              <a:t>26/08/2015</a:t>
             </a:fld>
             <a:endParaRPr lang="en-GB"/>
           </a:p>
@@ -1842,7 +1842,7 @@
           <a:p>
             <a:fld id="{5F96665D-1DD0-4E23-81EB-F6A1D45CFD28}" type="datetime1">
               <a:rPr lang="en-GB" smtClean="0"/>
-              <a:t>23/08/2015</a:t>
+              <a:t>26/08/2015</a:t>
             </a:fld>
             <a:endParaRPr lang="en-GB"/>
           </a:p>
@@ -2209,7 +2209,7 @@
           <a:p>
             <a:fld id="{D42FA776-28A0-43EC-9C84-117ACD802889}" type="datetime1">
               <a:rPr lang="en-GB" smtClean="0"/>
-              <a:t>23/08/2015</a:t>
+              <a:t>26/08/2015</a:t>
             </a:fld>
             <a:endParaRPr lang="en-GB"/>
           </a:p>
@@ -2327,7 +2327,7 @@
           <a:p>
             <a:fld id="{07BBC80A-0A96-4EDF-BA2F-C903D39F13F1}" type="datetime1">
               <a:rPr lang="en-GB" smtClean="0"/>
-              <a:t>23/08/2015</a:t>
+              <a:t>26/08/2015</a:t>
             </a:fld>
             <a:endParaRPr lang="en-GB"/>
           </a:p>
@@ -2422,7 +2422,7 @@
           <a:p>
             <a:fld id="{009CBC1F-8C05-4E88-A975-5E80693FEDD6}" type="datetime1">
               <a:rPr lang="en-GB" smtClean="0"/>
-              <a:t>23/08/2015</a:t>
+              <a:t>26/08/2015</a:t>
             </a:fld>
             <a:endParaRPr lang="en-GB"/>
           </a:p>
@@ -2699,7 +2699,7 @@
           <a:p>
             <a:fld id="{1672ABC0-87DA-4D74-93ED-587A9A376247}" type="datetime1">
               <a:rPr lang="en-GB" smtClean="0"/>
-              <a:t>23/08/2015</a:t>
+              <a:t>26/08/2015</a:t>
             </a:fld>
             <a:endParaRPr lang="en-GB"/>
           </a:p>
@@ -2956,7 +2956,7 @@
           <a:p>
             <a:fld id="{2874912F-E8E8-454B-8EB3-6790668B87CF}" type="datetime1">
               <a:rPr lang="en-GB" smtClean="0"/>
-              <a:t>23/08/2015</a:t>
+              <a:t>26/08/2015</a:t>
             </a:fld>
             <a:endParaRPr lang="en-GB"/>
           </a:p>
@@ -3169,7 +3169,7 @@
           <a:p>
             <a:fld id="{B1FA066A-16B7-44A6-B43D-AE26935FC13F}" type="datetime1">
               <a:rPr lang="en-GB" smtClean="0"/>
-              <a:t>23/08/2015</a:t>
+              <a:t>26/08/2015</a:t>
             </a:fld>
             <a:endParaRPr lang="en-GB"/>
           </a:p>
@@ -5079,7 +5079,7 @@
         <p:spPr>
           <a:xfrm>
             <a:off x="1844270" y="1630478"/>
-            <a:ext cx="2120806" cy="1290721"/>
+            <a:ext cx="1490427" cy="1290721"/>
           </a:xfrm>
           <a:prstGeom prst="rect">
             <a:avLst/>
@@ -5347,14 +5347,12 @@
       <p:cxnSp>
         <p:nvCxnSpPr>
           <p:cNvPr id="17" name="Straight Arrow Connector 16"/>
-          <p:cNvCxnSpPr>
-            <a:endCxn id="8" idx="0"/>
-          </p:cNvCxnSpPr>
+          <p:cNvCxnSpPr/>
           <p:nvPr/>
         </p:nvCxnSpPr>
         <p:spPr>
           <a:xfrm>
-            <a:off x="3070056" y="2921199"/>
+            <a:off x="2559253" y="2929395"/>
             <a:ext cx="0" cy="667845"/>
           </a:xfrm>
           <a:prstGeom prst="straightConnector1">
@@ -5397,8 +5395,8 @@
         </p:nvCxnSpPr>
         <p:spPr>
           <a:xfrm>
-            <a:off x="3960181" y="2755566"/>
-            <a:ext cx="839446" cy="0"/>
+            <a:off x="3334697" y="2764632"/>
+            <a:ext cx="1450963" cy="0"/>
           </a:xfrm>
           <a:prstGeom prst="straightConnector1">
             <a:avLst/>
@@ -5432,15 +5430,13 @@
       <p:cxnSp>
         <p:nvCxnSpPr>
           <p:cNvPr id="25" name="Straight Arrow Connector 24"/>
-          <p:cNvCxnSpPr>
-            <a:endCxn id="9" idx="1"/>
-          </p:cNvCxnSpPr>
+          <p:cNvCxnSpPr/>
           <p:nvPr/>
         </p:nvCxnSpPr>
         <p:spPr>
           <a:xfrm>
-            <a:off x="3960181" y="1904133"/>
-            <a:ext cx="827059" cy="0"/>
+            <a:off x="3334697" y="2022466"/>
+            <a:ext cx="373243" cy="0"/>
           </a:xfrm>
           <a:prstGeom prst="straightConnector1">
             <a:avLst/>
@@ -5482,8 +5478,8 @@
         </p:nvCxnSpPr>
         <p:spPr>
           <a:xfrm>
-            <a:off x="5910443" y="3029886"/>
-            <a:ext cx="0" cy="272948"/>
+            <a:off x="5896476" y="3038952"/>
+            <a:ext cx="1580" cy="304430"/>
           </a:xfrm>
           <a:prstGeom prst="straightConnector1">
             <a:avLst/>
@@ -5522,8 +5518,8 @@
         </p:nvCxnSpPr>
         <p:spPr>
           <a:xfrm flipV="1">
-            <a:off x="1684020" y="2280758"/>
-            <a:ext cx="0" cy="2150565"/>
+            <a:off x="1684020" y="2280759"/>
+            <a:ext cx="0" cy="2101853"/>
           </a:xfrm>
           <a:prstGeom prst="straightConnector1">
             <a:avLst/>
@@ -5562,8 +5558,8 @@
         </p:nvSpPr>
         <p:spPr>
           <a:xfrm>
-            <a:off x="4787240" y="1629813"/>
-            <a:ext cx="2221631" cy="548640"/>
+            <a:off x="3714308" y="1742841"/>
+            <a:ext cx="2054231" cy="548640"/>
           </a:xfrm>
           <a:prstGeom prst="rect">
             <a:avLst/>
@@ -5636,7 +5632,7 @@
         </p:nvSpPr>
         <p:spPr>
           <a:xfrm>
-            <a:off x="5151740" y="3302834"/>
+            <a:off x="5139353" y="3343382"/>
             <a:ext cx="1517405" cy="548640"/>
           </a:xfrm>
           <a:prstGeom prst="rect">
@@ -5710,7 +5706,7 @@
         </p:nvSpPr>
         <p:spPr>
           <a:xfrm>
-            <a:off x="4799627" y="2481246"/>
+            <a:off x="4785660" y="2490312"/>
             <a:ext cx="2221631" cy="548640"/>
           </a:xfrm>
           <a:prstGeom prst="rect">
@@ -5784,7 +5780,7 @@
         </p:nvSpPr>
         <p:spPr>
           <a:xfrm>
-            <a:off x="3097576" y="3349363"/>
+            <a:off x="2586773" y="3357559"/>
             <a:ext cx="338554" cy="276999"/>
           </a:xfrm>
           <a:prstGeom prst="rect">
@@ -5830,7 +5826,7 @@
         </p:nvSpPr>
         <p:spPr>
           <a:xfrm>
-            <a:off x="4510418" y="1598279"/>
+            <a:off x="3453338" y="1734857"/>
             <a:ext cx="338554" cy="276999"/>
           </a:xfrm>
           <a:prstGeom prst="rect">
@@ -5922,7 +5918,7 @@
         </p:nvSpPr>
         <p:spPr>
           <a:xfrm>
-            <a:off x="5928959" y="3027342"/>
+            <a:off x="5916572" y="3067890"/>
             <a:ext cx="307776" cy="369332"/>
           </a:xfrm>
           <a:prstGeom prst="rect">
@@ -6367,7 +6363,7 @@
             </a:fontRef>
           </p:style>
           <p:txBody>
-            <a:bodyPr rot="0" spcFirstLastPara="0" vertOverflow="overflow" horzOverflow="overflow" vert="horz" wrap="square" lIns="91440" tIns="91440" rIns="91440" bIns="45720" numCol="1" spcCol="0" rtlCol="0" fromWordArt="0" anchor="t" anchorCtr="0" forceAA="0" compatLnSpc="1">
+            <a:bodyPr rot="0" spcFirstLastPara="0" vertOverflow="overflow" horzOverflow="overflow" vert="horz" wrap="square" lIns="91440" tIns="45720" rIns="91440" bIns="45720" numCol="1" spcCol="0" rtlCol="0" fromWordArt="0" anchor="t" anchorCtr="0" forceAA="0" compatLnSpc="1">
               <a:prstTxWarp prst="textNoShape">
                 <a:avLst/>
               </a:prstTxWarp>
@@ -6396,8 +6392,8 @@
           </p:nvSpPr>
           <p:spPr>
             <a:xfrm>
-              <a:off x="8511388" y="1447897"/>
-              <a:ext cx="2015545" cy="1741226"/>
+              <a:off x="8511388" y="1374431"/>
+              <a:ext cx="2015545" cy="1856034"/>
             </a:xfrm>
             <a:prstGeom prst="rect">
               <a:avLst/>
@@ -6457,7 +6453,7 @@
           </p:nvSpPr>
           <p:spPr>
             <a:xfrm>
-              <a:off x="8511388" y="1221317"/>
+              <a:off x="8511388" y="1145117"/>
               <a:ext cx="735640" cy="226578"/>
             </a:xfrm>
             <a:prstGeom prst="rect">
@@ -6510,8 +6506,8 @@
           </p:nvSpPr>
           <p:spPr>
             <a:xfrm>
-              <a:off x="8746699" y="1663373"/>
-              <a:ext cx="1511270" cy="1279686"/>
+              <a:off x="8746699" y="1553669"/>
+              <a:ext cx="1511270" cy="1407655"/>
             </a:xfrm>
             <a:prstGeom prst="rect">
               <a:avLst/>
@@ -6585,7 +6581,7 @@
         </p:nvCxnSpPr>
         <p:spPr>
           <a:xfrm flipV="1">
-            <a:off x="1681410" y="4431325"/>
+            <a:off x="1681410" y="4382612"/>
             <a:ext cx="7056537" cy="1"/>
           </a:xfrm>
           <a:prstGeom prst="straightConnector1">
@@ -6920,7 +6916,7 @@
             <a:p>
               <a:pPr algn="ctr"/>
               <a:r>
-                <a:rPr lang="en-US" dirty="0">
+                <a:rPr lang="en-US" dirty="0" smtClean="0">
                   <a:solidFill>
                     <a:schemeClr val="tx1">
                       <a:lumMod val="65000"/>
@@ -6929,7 +6925,7 @@
                   </a:solidFill>
                   <a:ea typeface="Roboto" pitchFamily="2" charset="0"/>
                 </a:rPr>
-                <a:t>CodeSnippet</a:t>
+                <a:t>SourceFile</a:t>
               </a:r>
               <a:endParaRPr lang="en-GB" dirty="0">
                 <a:solidFill>
@@ -6992,8 +6988,8 @@
         </p:nvCxnSpPr>
         <p:spPr>
           <a:xfrm>
-            <a:off x="7021258" y="1924841"/>
-            <a:ext cx="1754794" cy="0"/>
+            <a:off x="7418375" y="1924841"/>
+            <a:ext cx="1357677" cy="0"/>
           </a:xfrm>
           <a:prstGeom prst="straightConnector1">
             <a:avLst/>
@@ -7032,7 +7028,7 @@
         </p:nvSpPr>
         <p:spPr>
           <a:xfrm>
-            <a:off x="2798010" y="2912645"/>
+            <a:off x="2287207" y="2920841"/>
             <a:ext cx="338554" cy="276999"/>
           </a:xfrm>
           <a:prstGeom prst="rect">
@@ -7110,6 +7106,169 @@
           </a:fontRef>
         </p:style>
       </p:cxnSp>
+      <p:sp>
+        <p:nvSpPr>
+          <p:cNvPr id="45" name="Rectangle 44"/>
+          <p:cNvSpPr/>
+          <p:nvPr/>
+        </p:nvSpPr>
+        <p:spPr>
+          <a:xfrm>
+            <a:off x="6112659" y="1742841"/>
+            <a:ext cx="1308167" cy="548640"/>
+          </a:xfrm>
+          <a:prstGeom prst="rect">
+            <a:avLst/>
+          </a:prstGeom>
+          <a:solidFill>
+            <a:schemeClr val="accent6">
+              <a:lumMod val="40000"/>
+              <a:lumOff val="60000"/>
+            </a:schemeClr>
+          </a:solidFill>
+          <a:ln>
+            <a:noFill/>
+          </a:ln>
+        </p:spPr>
+        <p:style>
+          <a:lnRef idx="2">
+            <a:schemeClr val="accent1">
+              <a:shade val="50000"/>
+            </a:schemeClr>
+          </a:lnRef>
+          <a:fillRef idx="1">
+            <a:schemeClr val="accent1"/>
+          </a:fillRef>
+          <a:effectRef idx="0">
+            <a:schemeClr val="accent1"/>
+          </a:effectRef>
+          <a:fontRef idx="minor">
+            <a:schemeClr val="lt1"/>
+          </a:fontRef>
+        </p:style>
+        <p:txBody>
+          <a:bodyPr rot="0" spcFirstLastPara="0" vertOverflow="overflow" horzOverflow="overflow" vert="horz" wrap="square" lIns="91440" tIns="45720" rIns="91440" bIns="45720" numCol="1" spcCol="0" rtlCol="0" fromWordArt="0" anchor="ctr" anchorCtr="0" forceAA="0" compatLnSpc="1">
+            <a:prstTxWarp prst="textNoShape">
+              <a:avLst/>
+            </a:prstTxWarp>
+            <a:noAutofit/>
+          </a:bodyPr>
+          <a:lstStyle/>
+          <a:p>
+            <a:pPr algn="ctr"/>
+            <a:r>
+              <a:rPr lang="en-US" dirty="0" smtClean="0">
+                <a:solidFill>
+                  <a:schemeClr val="tx1">
+                    <a:lumMod val="65000"/>
+                    <a:lumOff val="35000"/>
+                  </a:schemeClr>
+                </a:solidFill>
+                <a:ea typeface="Roboto" pitchFamily="2" charset="0"/>
+              </a:rPr>
+              <a:t>AuthorBean</a:t>
+            </a:r>
+            <a:endParaRPr lang="en-GB" dirty="0">
+              <a:solidFill>
+                <a:schemeClr val="tx1">
+                  <a:lumMod val="65000"/>
+                  <a:lumOff val="35000"/>
+                </a:schemeClr>
+              </a:solidFill>
+              <a:ea typeface="Roboto" pitchFamily="2" charset="0"/>
+            </a:endParaRPr>
+          </a:p>
+        </p:txBody>
+      </p:sp>
+      <p:cxnSp>
+        <p:nvCxnSpPr>
+          <p:cNvPr id="47" name="Straight Arrow Connector 46"/>
+          <p:cNvCxnSpPr>
+            <a:stCxn id="9" idx="3"/>
+            <a:endCxn id="45" idx="1"/>
+          </p:cNvCxnSpPr>
+          <p:nvPr/>
+        </p:nvCxnSpPr>
+        <p:spPr>
+          <a:xfrm>
+            <a:off x="5768539" y="2017161"/>
+            <a:ext cx="344120" cy="0"/>
+          </a:xfrm>
+          <a:prstGeom prst="straightConnector1">
+            <a:avLst/>
+          </a:prstGeom>
+          <a:ln w="25400">
+            <a:solidFill>
+              <a:schemeClr val="tx1">
+                <a:lumMod val="50000"/>
+                <a:lumOff val="50000"/>
+              </a:schemeClr>
+            </a:solidFill>
+            <a:prstDash val="solid"/>
+            <a:tailEnd type="arrow" w="med" len="med"/>
+          </a:ln>
+        </p:spPr>
+        <p:style>
+          <a:lnRef idx="1">
+            <a:schemeClr val="accent1"/>
+          </a:lnRef>
+          <a:fillRef idx="0">
+            <a:schemeClr val="accent1"/>
+          </a:fillRef>
+          <a:effectRef idx="0">
+            <a:schemeClr val="accent1"/>
+          </a:effectRef>
+          <a:fontRef idx="minor">
+            <a:schemeClr val="tx1"/>
+          </a:fontRef>
+        </p:style>
+      </p:cxnSp>
+      <p:sp>
+        <p:nvSpPr>
+          <p:cNvPr id="48" name="TextBox 47"/>
+          <p:cNvSpPr txBox="1"/>
+          <p:nvPr/>
+        </p:nvSpPr>
+        <p:spPr>
+          <a:xfrm>
+            <a:off x="5870598" y="1704868"/>
+            <a:ext cx="307776" cy="369332"/>
+          </a:xfrm>
+          <a:prstGeom prst="rect">
+            <a:avLst/>
+          </a:prstGeom>
+          <a:noFill/>
+        </p:spPr>
+        <p:txBody>
+          <a:bodyPr wrap="square" rtlCol="0">
+            <a:spAutoFit/>
+          </a:bodyPr>
+          <a:lstStyle/>
+          <a:p>
+            <a:r>
+              <a:rPr lang="en-US" dirty="0">
+                <a:solidFill>
+                  <a:schemeClr val="tx1">
+                    <a:lumMod val="50000"/>
+                    <a:lumOff val="50000"/>
+                  </a:schemeClr>
+                </a:solidFill>
+                <a:ea typeface="Roboto Condensed" pitchFamily="2" charset="0"/>
+              </a:rPr>
+              <a:t>*</a:t>
+            </a:r>
+            <a:endParaRPr lang="en-GB" dirty="0">
+              <a:solidFill>
+                <a:schemeClr val="tx1">
+                  <a:lumMod val="50000"/>
+                  <a:lumOff val="50000"/>
+                </a:schemeClr>
+              </a:solidFill>
+              <a:ea typeface="Roboto Condensed" pitchFamily="2" charset="0"/>
+            </a:endParaRPr>
+          </a:p>
+        </p:txBody>
+      </p:sp>
     </p:spTree>
     <p:extLst>
       <p:ext uri="{BB962C8B-B14F-4D97-AF65-F5344CB8AC3E}">

</xml_diff>

<commit_message>
[#36] Added high level seq diagram
</commit_message>
<xml_diff>
--- a/docs/Diagrams.pptx
+++ b/docs/Diagrams.pptx
@@ -5,10 +5,10 @@
     <p:sldMasterId id="2147483672" r:id="rId1"/>
   </p:sldMasterIdLst>
   <p:notesMasterIdLst>
-    <p:notesMasterId r:id="rId9"/>
+    <p:notesMasterId r:id="rId10"/>
   </p:notesMasterIdLst>
   <p:handoutMasterIdLst>
-    <p:handoutMasterId r:id="rId10"/>
+    <p:handoutMasterId r:id="rId11"/>
   </p:handoutMasterIdLst>
   <p:sldIdLst>
     <p:sldId id="256" r:id="rId2"/>
@@ -18,6 +18,7 @@
     <p:sldId id="258" r:id="rId6"/>
     <p:sldId id="261" r:id="rId7"/>
     <p:sldId id="259" r:id="rId8"/>
+    <p:sldId id="263" r:id="rId9"/>
   </p:sldIdLst>
   <p:sldSz cx="12192000" cy="6858000"/>
   <p:notesSz cx="6742113" cy="9872663"/>
@@ -844,7 +845,7 @@
           <a:p>
             <a:fld id="{0EBC881F-A445-44A1-8BB1-A4D1BDD4D291}" type="datetime1">
               <a:rPr lang="en-GB" smtClean="0"/>
-              <a:t>26/08/2015</a:t>
+              <a:t>13/01/2016</a:t>
             </a:fld>
             <a:endParaRPr lang="en-GB"/>
           </a:p>
@@ -1014,7 +1015,7 @@
           <a:p>
             <a:fld id="{2584BEDC-1639-4090-8CAA-F6974F06BD49}" type="datetime1">
               <a:rPr lang="en-GB" smtClean="0"/>
-              <a:t>26/08/2015</a:t>
+              <a:t>13/01/2016</a:t>
             </a:fld>
             <a:endParaRPr lang="en-GB"/>
           </a:p>
@@ -1194,7 +1195,7 @@
           <a:p>
             <a:fld id="{00C779A6-9523-4A2E-A931-C8A709BD1078}" type="datetime1">
               <a:rPr lang="en-GB" smtClean="0"/>
-              <a:t>26/08/2015</a:t>
+              <a:t>13/01/2016</a:t>
             </a:fld>
             <a:endParaRPr lang="en-GB"/>
           </a:p>
@@ -1364,7 +1365,7 @@
           <a:p>
             <a:fld id="{3A5F7889-DF91-41C1-A5B0-E479EFB53093}" type="datetime1">
               <a:rPr lang="en-GB" smtClean="0"/>
-              <a:t>26/08/2015</a:t>
+              <a:t>13/01/2016</a:t>
             </a:fld>
             <a:endParaRPr lang="en-GB"/>
           </a:p>
@@ -1610,7 +1611,7 @@
           <a:p>
             <a:fld id="{B34262BB-05D7-48AA-A628-76FDB16BFEC4}" type="datetime1">
               <a:rPr lang="en-GB" smtClean="0"/>
-              <a:t>26/08/2015</a:t>
+              <a:t>13/01/2016</a:t>
             </a:fld>
             <a:endParaRPr lang="en-GB"/>
           </a:p>
@@ -1842,7 +1843,7 @@
           <a:p>
             <a:fld id="{5F96665D-1DD0-4E23-81EB-F6A1D45CFD28}" type="datetime1">
               <a:rPr lang="en-GB" smtClean="0"/>
-              <a:t>26/08/2015</a:t>
+              <a:t>13/01/2016</a:t>
             </a:fld>
             <a:endParaRPr lang="en-GB"/>
           </a:p>
@@ -2209,7 +2210,7 @@
           <a:p>
             <a:fld id="{D42FA776-28A0-43EC-9C84-117ACD802889}" type="datetime1">
               <a:rPr lang="en-GB" smtClean="0"/>
-              <a:t>26/08/2015</a:t>
+              <a:t>13/01/2016</a:t>
             </a:fld>
             <a:endParaRPr lang="en-GB"/>
           </a:p>
@@ -2327,7 +2328,7 @@
           <a:p>
             <a:fld id="{07BBC80A-0A96-4EDF-BA2F-C903D39F13F1}" type="datetime1">
               <a:rPr lang="en-GB" smtClean="0"/>
-              <a:t>26/08/2015</a:t>
+              <a:t>13/01/2016</a:t>
             </a:fld>
             <a:endParaRPr lang="en-GB"/>
           </a:p>
@@ -2422,7 +2423,7 @@
           <a:p>
             <a:fld id="{009CBC1F-8C05-4E88-A975-5E80693FEDD6}" type="datetime1">
               <a:rPr lang="en-GB" smtClean="0"/>
-              <a:t>26/08/2015</a:t>
+              <a:t>13/01/2016</a:t>
             </a:fld>
             <a:endParaRPr lang="en-GB"/>
           </a:p>
@@ -2699,7 +2700,7 @@
           <a:p>
             <a:fld id="{1672ABC0-87DA-4D74-93ED-587A9A376247}" type="datetime1">
               <a:rPr lang="en-GB" smtClean="0"/>
-              <a:t>26/08/2015</a:t>
+              <a:t>13/01/2016</a:t>
             </a:fld>
             <a:endParaRPr lang="en-GB"/>
           </a:p>
@@ -2956,7 +2957,7 @@
           <a:p>
             <a:fld id="{2874912F-E8E8-454B-8EB3-6790668B87CF}" type="datetime1">
               <a:rPr lang="en-GB" smtClean="0"/>
-              <a:t>26/08/2015</a:t>
+              <a:t>13/01/2016</a:t>
             </a:fld>
             <a:endParaRPr lang="en-GB"/>
           </a:p>
@@ -3169,7 +3170,7 @@
           <a:p>
             <a:fld id="{B1FA066A-16B7-44A6-B43D-AE26935FC13F}" type="datetime1">
               <a:rPr lang="en-GB" smtClean="0"/>
-              <a:t>26/08/2015</a:t>
+              <a:t>13/01/2016</a:t>
             </a:fld>
             <a:endParaRPr lang="en-GB"/>
           </a:p>
@@ -10037,45 +10038,6 @@
       </p:cxnSp>
       <p:cxnSp>
         <p:nvCxnSpPr>
-          <p:cNvPr id="110" name="Straight Connector 109"/>
-          <p:cNvCxnSpPr/>
-          <p:nvPr/>
-        </p:nvCxnSpPr>
-        <p:spPr>
-          <a:xfrm>
-            <a:off x="1326758" y="940603"/>
-            <a:ext cx="0" cy="4573433"/>
-          </a:xfrm>
-          <a:prstGeom prst="line">
-            <a:avLst/>
-          </a:prstGeom>
-          <a:ln w="25400">
-            <a:solidFill>
-              <a:schemeClr val="tx1">
-                <a:lumMod val="50000"/>
-                <a:lumOff val="50000"/>
-              </a:schemeClr>
-            </a:solidFill>
-            <a:prstDash val="dash"/>
-          </a:ln>
-        </p:spPr>
-        <p:style>
-          <a:lnRef idx="1">
-            <a:schemeClr val="accent1"/>
-          </a:lnRef>
-          <a:fillRef idx="0">
-            <a:schemeClr val="accent1"/>
-          </a:fillRef>
-          <a:effectRef idx="0">
-            <a:schemeClr val="accent1"/>
-          </a:effectRef>
-          <a:fontRef idx="minor">
-            <a:schemeClr val="tx1"/>
-          </a:fontRef>
-        </p:style>
-      </p:cxnSp>
-      <p:cxnSp>
-        <p:nvCxnSpPr>
           <p:cNvPr id="128" name="Straight Connector 127"/>
           <p:cNvCxnSpPr>
             <a:stCxn id="73" idx="2"/>
@@ -12195,75 +12157,6 @@
           </a:fontRef>
         </p:style>
       </p:cxnSp>
-      <p:sp>
-        <p:nvSpPr>
-          <p:cNvPr id="115" name="Rectangle 114"/>
-          <p:cNvSpPr/>
-          <p:nvPr/>
-        </p:nvSpPr>
-        <p:spPr>
-          <a:xfrm>
-            <a:off x="565890" y="379898"/>
-            <a:ext cx="1521736" cy="574632"/>
-          </a:xfrm>
-          <a:prstGeom prst="rect">
-            <a:avLst/>
-          </a:prstGeom>
-          <a:solidFill>
-            <a:srgbClr val="A9D18E"/>
-          </a:solidFill>
-          <a:ln>
-            <a:solidFill>
-              <a:schemeClr val="accent5">
-                <a:lumMod val="50000"/>
-              </a:schemeClr>
-            </a:solidFill>
-          </a:ln>
-        </p:spPr>
-        <p:style>
-          <a:lnRef idx="2">
-            <a:schemeClr val="accent1">
-              <a:shade val="50000"/>
-            </a:schemeClr>
-          </a:lnRef>
-          <a:fillRef idx="1">
-            <a:schemeClr val="accent1"/>
-          </a:fillRef>
-          <a:effectRef idx="0">
-            <a:schemeClr val="accent1"/>
-          </a:effectRef>
-          <a:fontRef idx="minor">
-            <a:schemeClr val="lt1"/>
-          </a:fontRef>
-        </p:style>
-        <p:txBody>
-          <a:bodyPr rot="0" spcFirstLastPara="0" vertOverflow="overflow" horzOverflow="overflow" vert="horz" wrap="square" lIns="91440" tIns="45720" rIns="91440" bIns="45720" numCol="1" spcCol="0" rtlCol="0" fromWordArt="0" anchor="ctr" anchorCtr="0" forceAA="0" compatLnSpc="1">
-            <a:prstTxWarp prst="textNoShape">
-              <a:avLst/>
-            </a:prstTxWarp>
-            <a:noAutofit/>
-          </a:bodyPr>
-          <a:lstStyle/>
-          <a:p>
-            <a:pPr algn="ctr"/>
-            <a:r>
-              <a:rPr lang="en-US" dirty="0" smtClean="0">
-                <a:solidFill>
-                  <a:schemeClr val="bg1"/>
-                </a:solidFill>
-                <a:ea typeface="Roboto" pitchFamily="2" charset="0"/>
-              </a:rPr>
-              <a:t>:GUI</a:t>
-            </a:r>
-            <a:endParaRPr lang="en-GB" dirty="0">
-              <a:solidFill>
-                <a:schemeClr val="bg1"/>
-              </a:solidFill>
-              <a:ea typeface="Roboto" pitchFamily="2" charset="0"/>
-            </a:endParaRPr>
-          </a:p>
-        </p:txBody>
-      </p:sp>
     </p:spTree>
     <p:extLst>
       <p:ext uri="{BB962C8B-B14F-4D97-AF65-F5344CB8AC3E}">
@@ -12921,6 +12814,1171 @@
     <p:extLst>
       <p:ext uri="{BB962C8B-B14F-4D97-AF65-F5344CB8AC3E}">
         <p14:creationId xmlns:p14="http://schemas.microsoft.com/office/powerpoint/2010/main" val="781613834"/>
+      </p:ext>
+    </p:extLst>
+  </p:cSld>
+  <p:clrMapOvr>
+    <a:masterClrMapping/>
+  </p:clrMapOvr>
+</p:sld>
+</file>
+
+<file path=ppt/slides/slide8.xml><?xml version="1.0" encoding="utf-8"?>
+<p:sld xmlns:a="http://schemas.openxmlformats.org/drawingml/2006/main" xmlns:r="http://schemas.openxmlformats.org/officeDocument/2006/relationships" xmlns:p="http://schemas.openxmlformats.org/presentationml/2006/main">
+  <p:cSld>
+    <p:spTree>
+      <p:nvGrpSpPr>
+        <p:cNvPr id="1" name=""/>
+        <p:cNvGrpSpPr/>
+        <p:nvPr/>
+      </p:nvGrpSpPr>
+      <p:grpSpPr>
+        <a:xfrm>
+          <a:off x="0" y="0"/>
+          <a:ext cx="0" cy="0"/>
+          <a:chOff x="0" y="0"/>
+          <a:chExt cx="0" cy="0"/>
+        </a:xfrm>
+      </p:grpSpPr>
+      <p:grpSp>
+        <p:nvGrpSpPr>
+          <p:cNvPr id="87" name="Group 86"/>
+          <p:cNvGrpSpPr/>
+          <p:nvPr/>
+        </p:nvGrpSpPr>
+        <p:grpSpPr>
+          <a:xfrm>
+            <a:off x="4748383" y="3804479"/>
+            <a:ext cx="303003" cy="197306"/>
+            <a:chOff x="5702510" y="1597068"/>
+            <a:chExt cx="303003" cy="197306"/>
+          </a:xfrm>
+        </p:grpSpPr>
+        <p:cxnSp>
+          <p:nvCxnSpPr>
+            <p:cNvPr id="88" name="Straight Arrow Connector 87"/>
+            <p:cNvCxnSpPr/>
+            <p:nvPr/>
+          </p:nvCxnSpPr>
+          <p:spPr>
+            <a:xfrm>
+              <a:off x="5702510" y="1597068"/>
+              <a:ext cx="303003" cy="0"/>
+            </a:xfrm>
+            <a:prstGeom prst="straightConnector1">
+              <a:avLst/>
+            </a:prstGeom>
+            <a:ln w="25400" cap="sq">
+              <a:solidFill>
+                <a:schemeClr val="accent2">
+                  <a:lumMod val="60000"/>
+                  <a:lumOff val="40000"/>
+                </a:schemeClr>
+              </a:solidFill>
+              <a:tailEnd type="none" w="lg" len="lg"/>
+            </a:ln>
+          </p:spPr>
+          <p:style>
+            <a:lnRef idx="1">
+              <a:schemeClr val="accent1"/>
+            </a:lnRef>
+            <a:fillRef idx="0">
+              <a:schemeClr val="accent1"/>
+            </a:fillRef>
+            <a:effectRef idx="0">
+              <a:schemeClr val="accent1"/>
+            </a:effectRef>
+            <a:fontRef idx="minor">
+              <a:schemeClr val="tx1"/>
+            </a:fontRef>
+          </p:style>
+        </p:cxnSp>
+        <p:cxnSp>
+          <p:nvCxnSpPr>
+            <p:cNvPr id="89" name="Straight Arrow Connector 88"/>
+            <p:cNvCxnSpPr/>
+            <p:nvPr/>
+          </p:nvCxnSpPr>
+          <p:spPr>
+            <a:xfrm>
+              <a:off x="6005513" y="1597068"/>
+              <a:ext cx="0" cy="95249"/>
+            </a:xfrm>
+            <a:prstGeom prst="straightConnector1">
+              <a:avLst/>
+            </a:prstGeom>
+            <a:ln w="25400" cap="rnd">
+              <a:solidFill>
+                <a:schemeClr val="accent2">
+                  <a:lumMod val="60000"/>
+                  <a:lumOff val="40000"/>
+                </a:schemeClr>
+              </a:solidFill>
+              <a:tailEnd type="none" w="lg" len="lg"/>
+            </a:ln>
+          </p:spPr>
+          <p:style>
+            <a:lnRef idx="1">
+              <a:schemeClr val="accent1"/>
+            </a:lnRef>
+            <a:fillRef idx="0">
+              <a:schemeClr val="accent1"/>
+            </a:fillRef>
+            <a:effectRef idx="0">
+              <a:schemeClr val="accent1"/>
+            </a:effectRef>
+            <a:fontRef idx="minor">
+              <a:schemeClr val="tx1"/>
+            </a:fontRef>
+          </p:style>
+        </p:cxnSp>
+        <p:cxnSp>
+          <p:nvCxnSpPr>
+            <p:cNvPr id="90" name="Straight Arrow Connector 89"/>
+            <p:cNvCxnSpPr/>
+            <p:nvPr/>
+          </p:nvCxnSpPr>
+          <p:spPr>
+            <a:xfrm flipH="1">
+              <a:off x="5834477" y="1692317"/>
+              <a:ext cx="171036" cy="102057"/>
+            </a:xfrm>
+            <a:prstGeom prst="straightConnector1">
+              <a:avLst/>
+            </a:prstGeom>
+            <a:ln w="25400" cap="rnd">
+              <a:solidFill>
+                <a:schemeClr val="accent2">
+                  <a:lumMod val="60000"/>
+                  <a:lumOff val="40000"/>
+                </a:schemeClr>
+              </a:solidFill>
+              <a:tailEnd type="triangle" w="med" len="med"/>
+            </a:ln>
+          </p:spPr>
+          <p:style>
+            <a:lnRef idx="1">
+              <a:schemeClr val="accent1"/>
+            </a:lnRef>
+            <a:fillRef idx="0">
+              <a:schemeClr val="accent1"/>
+            </a:fillRef>
+            <a:effectRef idx="0">
+              <a:schemeClr val="accent1"/>
+            </a:effectRef>
+            <a:fontRef idx="minor">
+              <a:schemeClr val="tx1"/>
+            </a:fontRef>
+          </p:style>
+        </p:cxnSp>
+      </p:grpSp>
+      <p:cxnSp>
+        <p:nvCxnSpPr>
+          <p:cNvPr id="60" name="Straight Connector 59"/>
+          <p:cNvCxnSpPr/>
+          <p:nvPr/>
+        </p:nvCxnSpPr>
+        <p:spPr>
+          <a:xfrm>
+            <a:off x="7340856" y="2471035"/>
+            <a:ext cx="0" cy="2807726"/>
+          </a:xfrm>
+          <a:prstGeom prst="line">
+            <a:avLst/>
+          </a:prstGeom>
+          <a:ln w="25400">
+            <a:solidFill>
+              <a:schemeClr val="tx1">
+                <a:lumMod val="50000"/>
+                <a:lumOff val="50000"/>
+              </a:schemeClr>
+            </a:solidFill>
+            <a:prstDash val="dash"/>
+          </a:ln>
+        </p:spPr>
+        <p:style>
+          <a:lnRef idx="1">
+            <a:schemeClr val="accent1"/>
+          </a:lnRef>
+          <a:fillRef idx="0">
+            <a:schemeClr val="accent1"/>
+          </a:fillRef>
+          <a:effectRef idx="0">
+            <a:schemeClr val="accent1"/>
+          </a:effectRef>
+          <a:fontRef idx="minor">
+            <a:schemeClr val="tx1"/>
+          </a:fontRef>
+        </p:style>
+      </p:cxnSp>
+      <p:sp>
+        <p:nvSpPr>
+          <p:cNvPr id="67" name="Rectangle 66"/>
+          <p:cNvSpPr/>
+          <p:nvPr/>
+        </p:nvSpPr>
+        <p:spPr>
+          <a:xfrm>
+            <a:off x="6579988" y="1910330"/>
+            <a:ext cx="1521736" cy="574632"/>
+          </a:xfrm>
+          <a:prstGeom prst="rect">
+            <a:avLst/>
+          </a:prstGeom>
+          <a:solidFill>
+            <a:srgbClr val="8FAADC"/>
+          </a:solidFill>
+          <a:ln>
+            <a:solidFill>
+              <a:schemeClr val="accent5">
+                <a:lumMod val="50000"/>
+              </a:schemeClr>
+            </a:solidFill>
+          </a:ln>
+        </p:spPr>
+        <p:style>
+          <a:lnRef idx="2">
+            <a:schemeClr val="accent1">
+              <a:shade val="50000"/>
+            </a:schemeClr>
+          </a:lnRef>
+          <a:fillRef idx="1">
+            <a:schemeClr val="accent1"/>
+          </a:fillRef>
+          <a:effectRef idx="0">
+            <a:schemeClr val="accent1"/>
+          </a:effectRef>
+          <a:fontRef idx="minor">
+            <a:schemeClr val="lt1"/>
+          </a:fontRef>
+        </p:style>
+        <p:txBody>
+          <a:bodyPr rot="0" spcFirstLastPara="0" vertOverflow="overflow" horzOverflow="overflow" vert="horz" wrap="square" lIns="91440" tIns="45720" rIns="91440" bIns="45720" numCol="1" spcCol="0" rtlCol="0" fromWordArt="0" anchor="ctr" anchorCtr="0" forceAA="0" compatLnSpc="1">
+            <a:prstTxWarp prst="textNoShape">
+              <a:avLst/>
+            </a:prstTxWarp>
+            <a:noAutofit/>
+          </a:bodyPr>
+          <a:lstStyle/>
+          <a:p>
+            <a:pPr algn="ctr"/>
+            <a:r>
+              <a:rPr lang="en-US" dirty="0" smtClean="0">
+                <a:solidFill>
+                  <a:schemeClr val="bg1"/>
+                </a:solidFill>
+                <a:ea typeface="Roboto" pitchFamily="2" charset="0"/>
+              </a:rPr>
+              <a:t>:Backend</a:t>
+            </a:r>
+            <a:endParaRPr lang="en-GB" dirty="0">
+              <a:solidFill>
+                <a:schemeClr val="bg1"/>
+              </a:solidFill>
+              <a:ea typeface="Roboto" pitchFamily="2" charset="0"/>
+            </a:endParaRPr>
+          </a:p>
+        </p:txBody>
+      </p:sp>
+      <p:cxnSp>
+        <p:nvCxnSpPr>
+          <p:cNvPr id="68" name="Straight Connector 67"/>
+          <p:cNvCxnSpPr/>
+          <p:nvPr/>
+        </p:nvCxnSpPr>
+        <p:spPr>
+          <a:xfrm>
+            <a:off x="4624632" y="2484962"/>
+            <a:ext cx="0" cy="2766090"/>
+          </a:xfrm>
+          <a:prstGeom prst="line">
+            <a:avLst/>
+          </a:prstGeom>
+          <a:ln w="25400">
+            <a:solidFill>
+              <a:schemeClr val="tx1">
+                <a:lumMod val="50000"/>
+                <a:lumOff val="50000"/>
+              </a:schemeClr>
+            </a:solidFill>
+            <a:prstDash val="dash"/>
+          </a:ln>
+        </p:spPr>
+        <p:style>
+          <a:lnRef idx="1">
+            <a:schemeClr val="accent1"/>
+          </a:lnRef>
+          <a:fillRef idx="0">
+            <a:schemeClr val="accent1"/>
+          </a:fillRef>
+          <a:effectRef idx="0">
+            <a:schemeClr val="accent1"/>
+          </a:effectRef>
+          <a:fontRef idx="minor">
+            <a:schemeClr val="tx1"/>
+          </a:fontRef>
+        </p:style>
+      </p:cxnSp>
+      <p:sp>
+        <p:nvSpPr>
+          <p:cNvPr id="69" name="Rectangle 68"/>
+          <p:cNvSpPr/>
+          <p:nvPr/>
+        </p:nvSpPr>
+        <p:spPr>
+          <a:xfrm>
+            <a:off x="4192089" y="1910330"/>
+            <a:ext cx="922078" cy="574632"/>
+          </a:xfrm>
+          <a:prstGeom prst="rect">
+            <a:avLst/>
+          </a:prstGeom>
+          <a:solidFill>
+            <a:schemeClr val="accent2">
+              <a:lumMod val="60000"/>
+              <a:lumOff val="40000"/>
+            </a:schemeClr>
+          </a:solidFill>
+          <a:ln>
+            <a:solidFill>
+              <a:schemeClr val="accent5">
+                <a:lumMod val="50000"/>
+              </a:schemeClr>
+            </a:solidFill>
+          </a:ln>
+        </p:spPr>
+        <p:style>
+          <a:lnRef idx="2">
+            <a:schemeClr val="accent1">
+              <a:shade val="50000"/>
+            </a:schemeClr>
+          </a:lnRef>
+          <a:fillRef idx="1">
+            <a:schemeClr val="accent1"/>
+          </a:fillRef>
+          <a:effectRef idx="0">
+            <a:schemeClr val="accent1"/>
+          </a:effectRef>
+          <a:fontRef idx="minor">
+            <a:schemeClr val="lt1"/>
+          </a:fontRef>
+        </p:style>
+        <p:txBody>
+          <a:bodyPr rot="0" spcFirstLastPara="0" vertOverflow="overflow" horzOverflow="overflow" vert="horz" wrap="square" lIns="91440" tIns="45720" rIns="91440" bIns="45720" numCol="1" spcCol="0" rtlCol="0" fromWordArt="0" anchor="ctr" anchorCtr="0" forceAA="0" compatLnSpc="1">
+            <a:prstTxWarp prst="textNoShape">
+              <a:avLst/>
+            </a:prstTxWarp>
+            <a:noAutofit/>
+          </a:bodyPr>
+          <a:lstStyle/>
+          <a:p>
+            <a:pPr algn="ctr"/>
+            <a:r>
+              <a:rPr lang="en-US" dirty="0" smtClean="0">
+                <a:solidFill>
+                  <a:schemeClr val="bg1"/>
+                </a:solidFill>
+                <a:ea typeface="Roboto" pitchFamily="2" charset="0"/>
+              </a:rPr>
+              <a:t>:</a:t>
+            </a:r>
+            <a:r>
+              <a:rPr lang="en-US" dirty="0" err="1" smtClean="0">
+                <a:solidFill>
+                  <a:schemeClr val="bg1"/>
+                </a:solidFill>
+                <a:ea typeface="Roboto" pitchFamily="2" charset="0"/>
+              </a:rPr>
+              <a:t>Tui</a:t>
+            </a:r>
+            <a:endParaRPr lang="en-GB" dirty="0">
+              <a:solidFill>
+                <a:schemeClr val="bg1"/>
+              </a:solidFill>
+              <a:ea typeface="Roboto" pitchFamily="2" charset="0"/>
+            </a:endParaRPr>
+          </a:p>
+        </p:txBody>
+      </p:sp>
+      <p:cxnSp>
+        <p:nvCxnSpPr>
+          <p:cNvPr id="70" name="Straight Arrow Connector 69"/>
+          <p:cNvCxnSpPr/>
+          <p:nvPr/>
+        </p:nvCxnSpPr>
+        <p:spPr>
+          <a:xfrm>
+            <a:off x="4749577" y="3148543"/>
+            <a:ext cx="2464337" cy="0"/>
+          </a:xfrm>
+          <a:prstGeom prst="straightConnector1">
+            <a:avLst/>
+          </a:prstGeom>
+          <a:ln w="25400">
+            <a:solidFill>
+              <a:schemeClr val="accent2">
+                <a:lumMod val="60000"/>
+                <a:lumOff val="40000"/>
+              </a:schemeClr>
+            </a:solidFill>
+            <a:tailEnd type="triangle" w="lg" len="lg"/>
+          </a:ln>
+        </p:spPr>
+        <p:style>
+          <a:lnRef idx="1">
+            <a:schemeClr val="accent1"/>
+          </a:lnRef>
+          <a:fillRef idx="0">
+            <a:schemeClr val="accent1"/>
+          </a:fillRef>
+          <a:effectRef idx="0">
+            <a:schemeClr val="accent1"/>
+          </a:effectRef>
+          <a:fontRef idx="minor">
+            <a:schemeClr val="tx1"/>
+          </a:fontRef>
+        </p:style>
+      </p:cxnSp>
+      <p:sp>
+        <p:nvSpPr>
+          <p:cNvPr id="71" name="TextBox 70"/>
+          <p:cNvSpPr txBox="1"/>
+          <p:nvPr/>
+        </p:nvSpPr>
+        <p:spPr>
+          <a:xfrm>
+            <a:off x="4784266" y="2686877"/>
+            <a:ext cx="2084289" cy="461665"/>
+          </a:xfrm>
+          <a:prstGeom prst="rect">
+            <a:avLst/>
+          </a:prstGeom>
+          <a:noFill/>
+        </p:spPr>
+        <p:txBody>
+          <a:bodyPr wrap="none" rtlCol="0">
+            <a:spAutoFit/>
+          </a:bodyPr>
+          <a:lstStyle/>
+          <a:p>
+            <a:r>
+              <a:rPr lang="en-US" sz="1200" dirty="0" err="1" smtClean="0">
+                <a:ea typeface="Roboto Condensed" pitchFamily="2" charset="0"/>
+                <a:cs typeface="Consolas" panose="020B0609020204030204" pitchFamily="49" charset="0"/>
+              </a:rPr>
+              <a:t>executeCommand</a:t>
+            </a:r>
+            <a:endParaRPr lang="en-US" sz="1200" dirty="0" smtClean="0">
+              <a:ea typeface="Roboto Condensed" pitchFamily="2" charset="0"/>
+              <a:cs typeface="Consolas" panose="020B0609020204030204" pitchFamily="49" charset="0"/>
+            </a:endParaRPr>
+          </a:p>
+          <a:p>
+            <a:r>
+              <a:rPr lang="en-US" sz="1200" dirty="0" smtClean="0">
+                <a:ea typeface="Roboto Condensed" pitchFamily="2" charset="0"/>
+                <a:cs typeface="Consolas" panose="020B0609020204030204" pitchFamily="49" charset="0"/>
+              </a:rPr>
+              <a:t>(“collate </a:t>
+            </a:r>
+            <a:r>
+              <a:rPr lang="en-US" sz="1200" dirty="0" smtClean="0">
+                <a:ea typeface="Roboto Condensed" pitchFamily="2" charset="0"/>
+                <a:cs typeface="Consolas" panose="020B0609020204030204" pitchFamily="49" charset="0"/>
+              </a:rPr>
+              <a:t>from C:/source-files”)</a:t>
+            </a:r>
+            <a:endParaRPr lang="en-GB" sz="1200" dirty="0">
+              <a:ea typeface="Roboto Condensed" pitchFamily="2" charset="0"/>
+              <a:cs typeface="Consolas" panose="020B0609020204030204" pitchFamily="49" charset="0"/>
+            </a:endParaRPr>
+          </a:p>
+        </p:txBody>
+      </p:sp>
+      <p:sp>
+        <p:nvSpPr>
+          <p:cNvPr id="72" name="Rectangle 71"/>
+          <p:cNvSpPr/>
+          <p:nvPr/>
+        </p:nvSpPr>
+        <p:spPr>
+          <a:xfrm>
+            <a:off x="4490959" y="2921756"/>
+            <a:ext cx="258618" cy="2119582"/>
+          </a:xfrm>
+          <a:prstGeom prst="rect">
+            <a:avLst/>
+          </a:prstGeom>
+          <a:solidFill>
+            <a:schemeClr val="accent2">
+              <a:lumMod val="60000"/>
+              <a:lumOff val="40000"/>
+            </a:schemeClr>
+          </a:solidFill>
+          <a:ln>
+            <a:solidFill>
+              <a:schemeClr val="accent5">
+                <a:lumMod val="50000"/>
+              </a:schemeClr>
+            </a:solidFill>
+          </a:ln>
+        </p:spPr>
+        <p:style>
+          <a:lnRef idx="2">
+            <a:schemeClr val="accent1">
+              <a:shade val="50000"/>
+            </a:schemeClr>
+          </a:lnRef>
+          <a:fillRef idx="1">
+            <a:schemeClr val="accent1"/>
+          </a:fillRef>
+          <a:effectRef idx="0">
+            <a:schemeClr val="accent1"/>
+          </a:effectRef>
+          <a:fontRef idx="minor">
+            <a:schemeClr val="lt1"/>
+          </a:fontRef>
+        </p:style>
+        <p:txBody>
+          <a:bodyPr rtlCol="0" anchor="ctr"/>
+          <a:lstStyle/>
+          <a:p>
+            <a:pPr algn="ctr"/>
+            <a:endParaRPr lang="en-GB"/>
+          </a:p>
+        </p:txBody>
+      </p:sp>
+      <p:cxnSp>
+        <p:nvCxnSpPr>
+          <p:cNvPr id="73" name="Straight Arrow Connector 72"/>
+          <p:cNvCxnSpPr/>
+          <p:nvPr/>
+        </p:nvCxnSpPr>
+        <p:spPr>
+          <a:xfrm flipH="1">
+            <a:off x="4749577" y="3613597"/>
+            <a:ext cx="2464337" cy="0"/>
+          </a:xfrm>
+          <a:prstGeom prst="straightConnector1">
+            <a:avLst/>
+          </a:prstGeom>
+          <a:ln w="25400">
+            <a:solidFill>
+              <a:srgbClr val="8FAADC"/>
+            </a:solidFill>
+            <a:prstDash val="sysDash"/>
+            <a:tailEnd type="triangle" w="lg" len="lg"/>
+          </a:ln>
+        </p:spPr>
+        <p:style>
+          <a:lnRef idx="1">
+            <a:schemeClr val="accent1"/>
+          </a:lnRef>
+          <a:fillRef idx="0">
+            <a:schemeClr val="accent1"/>
+          </a:fillRef>
+          <a:effectRef idx="0">
+            <a:schemeClr val="accent1"/>
+          </a:effectRef>
+          <a:fontRef idx="minor">
+            <a:schemeClr val="tx1"/>
+          </a:fontRef>
+        </p:style>
+      </p:cxnSp>
+      <p:sp>
+        <p:nvSpPr>
+          <p:cNvPr id="74" name="Rectangle 73"/>
+          <p:cNvSpPr/>
+          <p:nvPr/>
+        </p:nvSpPr>
+        <p:spPr>
+          <a:xfrm>
+            <a:off x="7213914" y="3148542"/>
+            <a:ext cx="258618" cy="465055"/>
+          </a:xfrm>
+          <a:prstGeom prst="rect">
+            <a:avLst/>
+          </a:prstGeom>
+          <a:solidFill>
+            <a:srgbClr val="8FAADC"/>
+          </a:solidFill>
+          <a:ln>
+            <a:solidFill>
+              <a:schemeClr val="accent5">
+                <a:lumMod val="50000"/>
+              </a:schemeClr>
+            </a:solidFill>
+          </a:ln>
+        </p:spPr>
+        <p:style>
+          <a:lnRef idx="2">
+            <a:schemeClr val="accent1">
+              <a:shade val="50000"/>
+            </a:schemeClr>
+          </a:lnRef>
+          <a:fillRef idx="1">
+            <a:schemeClr val="accent1"/>
+          </a:fillRef>
+          <a:effectRef idx="0">
+            <a:schemeClr val="accent1"/>
+          </a:effectRef>
+          <a:fontRef idx="minor">
+            <a:schemeClr val="lt1"/>
+          </a:fontRef>
+        </p:style>
+        <p:txBody>
+          <a:bodyPr rtlCol="0" anchor="ctr"/>
+          <a:lstStyle/>
+          <a:p>
+            <a:pPr algn="ctr"/>
+            <a:endParaRPr lang="en-GB"/>
+          </a:p>
+        </p:txBody>
+      </p:sp>
+      <p:sp>
+        <p:nvSpPr>
+          <p:cNvPr id="75" name="TextBox 74"/>
+          <p:cNvSpPr txBox="1"/>
+          <p:nvPr/>
+        </p:nvSpPr>
+        <p:spPr>
+          <a:xfrm>
+            <a:off x="5491608" y="3320872"/>
+            <a:ext cx="1725665" cy="405555"/>
+          </a:xfrm>
+          <a:prstGeom prst="rect">
+            <a:avLst/>
+          </a:prstGeom>
+          <a:noFill/>
+        </p:spPr>
+        <p:txBody>
+          <a:bodyPr wrap="none" rtlCol="0">
+            <a:spAutoFit/>
+          </a:bodyPr>
+          <a:lstStyle/>
+          <a:p>
+            <a:r>
+              <a:rPr lang="en-GB" sz="1200" dirty="0" err="1">
+                <a:ea typeface="Roboto Condensed" pitchFamily="2" charset="0"/>
+              </a:rPr>
+              <a:t>Command.Type.COLLATE</a:t>
+            </a:r>
+            <a:endParaRPr lang="en-GB" sz="1200" dirty="0">
+              <a:ea typeface="Roboto Condensed" pitchFamily="2" charset="0"/>
+            </a:endParaRPr>
+          </a:p>
+        </p:txBody>
+      </p:sp>
+      <p:sp>
+        <p:nvSpPr>
+          <p:cNvPr id="76" name="Smiley Face 75"/>
+          <p:cNvSpPr/>
+          <p:nvPr/>
+        </p:nvSpPr>
+        <p:spPr>
+          <a:xfrm>
+            <a:off x="1701628" y="1579239"/>
+            <a:ext cx="606228" cy="606228"/>
+          </a:xfrm>
+          <a:prstGeom prst="smileyFace">
+            <a:avLst/>
+          </a:prstGeom>
+          <a:noFill/>
+          <a:ln w="25400">
+            <a:solidFill>
+              <a:schemeClr val="bg2">
+                <a:lumMod val="50000"/>
+              </a:schemeClr>
+            </a:solidFill>
+          </a:ln>
+        </p:spPr>
+        <p:style>
+          <a:lnRef idx="2">
+            <a:schemeClr val="accent6">
+              <a:shade val="50000"/>
+            </a:schemeClr>
+          </a:lnRef>
+          <a:fillRef idx="1">
+            <a:schemeClr val="accent6"/>
+          </a:fillRef>
+          <a:effectRef idx="0">
+            <a:schemeClr val="accent6"/>
+          </a:effectRef>
+          <a:fontRef idx="minor">
+            <a:schemeClr val="lt1"/>
+          </a:fontRef>
+        </p:style>
+        <p:txBody>
+          <a:bodyPr rtlCol="0" anchor="ctr"/>
+          <a:lstStyle/>
+          <a:p>
+            <a:pPr algn="ctr"/>
+            <a:endParaRPr lang="en-GB"/>
+          </a:p>
+        </p:txBody>
+      </p:sp>
+      <p:sp>
+        <p:nvSpPr>
+          <p:cNvPr id="77" name="TextBox 76"/>
+          <p:cNvSpPr txBox="1"/>
+          <p:nvPr/>
+        </p:nvSpPr>
+        <p:spPr>
+          <a:xfrm>
+            <a:off x="1688845" y="2201616"/>
+            <a:ext cx="617477" cy="369332"/>
+          </a:xfrm>
+          <a:prstGeom prst="rect">
+            <a:avLst/>
+          </a:prstGeom>
+          <a:noFill/>
+        </p:spPr>
+        <p:txBody>
+          <a:bodyPr wrap="none" rtlCol="0">
+            <a:spAutoFit/>
+          </a:bodyPr>
+          <a:lstStyle/>
+          <a:p>
+            <a:r>
+              <a:rPr lang="en-US" dirty="0" smtClean="0">
+                <a:solidFill>
+                  <a:srgbClr val="767171"/>
+                </a:solidFill>
+                <a:ea typeface="Roboto Condensed" pitchFamily="2" charset="0"/>
+              </a:rPr>
+              <a:t>User</a:t>
+            </a:r>
+            <a:endParaRPr lang="en-GB" dirty="0">
+              <a:solidFill>
+                <a:srgbClr val="767171"/>
+              </a:solidFill>
+              <a:ea typeface="Roboto Condensed" pitchFamily="2" charset="0"/>
+            </a:endParaRPr>
+          </a:p>
+        </p:txBody>
+      </p:sp>
+      <p:cxnSp>
+        <p:nvCxnSpPr>
+          <p:cNvPr id="78" name="Straight Connector 77"/>
+          <p:cNvCxnSpPr/>
+          <p:nvPr/>
+        </p:nvCxnSpPr>
+        <p:spPr>
+          <a:xfrm>
+            <a:off x="1985859" y="2570948"/>
+            <a:ext cx="0" cy="2707813"/>
+          </a:xfrm>
+          <a:prstGeom prst="line">
+            <a:avLst/>
+          </a:prstGeom>
+          <a:ln w="25400">
+            <a:solidFill>
+              <a:schemeClr val="tx1">
+                <a:lumMod val="50000"/>
+                <a:lumOff val="50000"/>
+              </a:schemeClr>
+            </a:solidFill>
+            <a:prstDash val="dash"/>
+          </a:ln>
+        </p:spPr>
+        <p:style>
+          <a:lnRef idx="1">
+            <a:schemeClr val="accent1"/>
+          </a:lnRef>
+          <a:fillRef idx="0">
+            <a:schemeClr val="accent1"/>
+          </a:fillRef>
+          <a:effectRef idx="0">
+            <a:schemeClr val="accent1"/>
+          </a:effectRef>
+          <a:fontRef idx="minor">
+            <a:schemeClr val="tx1"/>
+          </a:fontRef>
+        </p:style>
+      </p:cxnSp>
+      <p:sp>
+        <p:nvSpPr>
+          <p:cNvPr id="79" name="TextBox 78"/>
+          <p:cNvSpPr txBox="1"/>
+          <p:nvPr/>
+        </p:nvSpPr>
+        <p:spPr>
+          <a:xfrm>
+            <a:off x="1984772" y="2640710"/>
+            <a:ext cx="2466509" cy="276999"/>
+          </a:xfrm>
+          <a:prstGeom prst="rect">
+            <a:avLst/>
+          </a:prstGeom>
+          <a:noFill/>
+        </p:spPr>
+        <p:txBody>
+          <a:bodyPr wrap="none" rtlCol="0">
+            <a:spAutoFit/>
+          </a:bodyPr>
+          <a:lstStyle/>
+          <a:p>
+            <a:r>
+              <a:rPr lang="en-US" sz="1200" dirty="0" smtClean="0">
+                <a:ea typeface="Roboto Condensed" pitchFamily="2" charset="0"/>
+                <a:cs typeface="Consolas" panose="020B0609020204030204" pitchFamily="49" charset="0"/>
+              </a:rPr>
+              <a:t>Enters “collate from C:/source-files”</a:t>
+            </a:r>
+            <a:endParaRPr lang="en-GB" sz="1200" dirty="0">
+              <a:ea typeface="Roboto Condensed" pitchFamily="2" charset="0"/>
+              <a:cs typeface="Consolas" panose="020B0609020204030204" pitchFamily="49" charset="0"/>
+            </a:endParaRPr>
+          </a:p>
+        </p:txBody>
+      </p:sp>
+      <p:cxnSp>
+        <p:nvCxnSpPr>
+          <p:cNvPr id="80" name="Straight Arrow Connector 79"/>
+          <p:cNvCxnSpPr/>
+          <p:nvPr/>
+        </p:nvCxnSpPr>
+        <p:spPr>
+          <a:xfrm>
+            <a:off x="1985859" y="2917709"/>
+            <a:ext cx="2504013" cy="0"/>
+          </a:xfrm>
+          <a:prstGeom prst="straightConnector1">
+            <a:avLst/>
+          </a:prstGeom>
+          <a:ln w="25400">
+            <a:solidFill>
+              <a:srgbClr val="767171"/>
+            </a:solidFill>
+            <a:tailEnd type="triangle" w="lg" len="lg"/>
+          </a:ln>
+        </p:spPr>
+        <p:style>
+          <a:lnRef idx="1">
+            <a:schemeClr val="accent1"/>
+          </a:lnRef>
+          <a:fillRef idx="0">
+            <a:schemeClr val="accent1"/>
+          </a:fillRef>
+          <a:effectRef idx="0">
+            <a:schemeClr val="accent1"/>
+          </a:effectRef>
+          <a:fontRef idx="minor">
+            <a:schemeClr val="tx1"/>
+          </a:fontRef>
+        </p:style>
+      </p:cxnSp>
+      <p:grpSp>
+        <p:nvGrpSpPr>
+          <p:cNvPr id="82" name="Group 81"/>
+          <p:cNvGrpSpPr/>
+          <p:nvPr/>
+        </p:nvGrpSpPr>
+        <p:grpSpPr>
+          <a:xfrm>
+            <a:off x="4634128" y="4675893"/>
+            <a:ext cx="303003" cy="197306"/>
+            <a:chOff x="5573201" y="2139309"/>
+            <a:chExt cx="303003" cy="197306"/>
+          </a:xfrm>
+        </p:grpSpPr>
+        <p:cxnSp>
+          <p:nvCxnSpPr>
+            <p:cNvPr id="83" name="Straight Arrow Connector 82"/>
+            <p:cNvCxnSpPr/>
+            <p:nvPr/>
+          </p:nvCxnSpPr>
+          <p:spPr>
+            <a:xfrm>
+              <a:off x="5573201" y="2139309"/>
+              <a:ext cx="303003" cy="0"/>
+            </a:xfrm>
+            <a:prstGeom prst="straightConnector1">
+              <a:avLst/>
+            </a:prstGeom>
+            <a:ln w="25400" cap="sq">
+              <a:solidFill>
+                <a:schemeClr val="accent2">
+                  <a:lumMod val="60000"/>
+                  <a:lumOff val="40000"/>
+                </a:schemeClr>
+              </a:solidFill>
+              <a:prstDash val="sysDash"/>
+              <a:tailEnd type="none" w="lg" len="lg"/>
+            </a:ln>
+          </p:spPr>
+          <p:style>
+            <a:lnRef idx="1">
+              <a:schemeClr val="accent1"/>
+            </a:lnRef>
+            <a:fillRef idx="0">
+              <a:schemeClr val="accent1"/>
+            </a:fillRef>
+            <a:effectRef idx="0">
+              <a:schemeClr val="accent1"/>
+            </a:effectRef>
+            <a:fontRef idx="minor">
+              <a:schemeClr val="tx1"/>
+            </a:fontRef>
+          </p:style>
+        </p:cxnSp>
+        <p:cxnSp>
+          <p:nvCxnSpPr>
+            <p:cNvPr id="84" name="Straight Arrow Connector 83"/>
+            <p:cNvCxnSpPr/>
+            <p:nvPr/>
+          </p:nvCxnSpPr>
+          <p:spPr>
+            <a:xfrm>
+              <a:off x="5876204" y="2139309"/>
+              <a:ext cx="0" cy="95249"/>
+            </a:xfrm>
+            <a:prstGeom prst="straightConnector1">
+              <a:avLst/>
+            </a:prstGeom>
+            <a:ln w="25400" cap="rnd">
+              <a:solidFill>
+                <a:schemeClr val="accent2">
+                  <a:lumMod val="60000"/>
+                  <a:lumOff val="40000"/>
+                </a:schemeClr>
+              </a:solidFill>
+              <a:prstDash val="sysDash"/>
+              <a:tailEnd type="none" w="lg" len="lg"/>
+            </a:ln>
+          </p:spPr>
+          <p:style>
+            <a:lnRef idx="1">
+              <a:schemeClr val="accent1"/>
+            </a:lnRef>
+            <a:fillRef idx="0">
+              <a:schemeClr val="accent1"/>
+            </a:fillRef>
+            <a:effectRef idx="0">
+              <a:schemeClr val="accent1"/>
+            </a:effectRef>
+            <a:fontRef idx="minor">
+              <a:schemeClr val="tx1"/>
+            </a:fontRef>
+          </p:style>
+        </p:cxnSp>
+        <p:cxnSp>
+          <p:nvCxnSpPr>
+            <p:cNvPr id="85" name="Straight Arrow Connector 84"/>
+            <p:cNvCxnSpPr/>
+            <p:nvPr/>
+          </p:nvCxnSpPr>
+          <p:spPr>
+            <a:xfrm flipH="1">
+              <a:off x="5705168" y="2234558"/>
+              <a:ext cx="171036" cy="102057"/>
+            </a:xfrm>
+            <a:prstGeom prst="straightConnector1">
+              <a:avLst/>
+            </a:prstGeom>
+            <a:ln w="25400" cap="rnd">
+              <a:solidFill>
+                <a:schemeClr val="accent2">
+                  <a:lumMod val="60000"/>
+                  <a:lumOff val="40000"/>
+                </a:schemeClr>
+              </a:solidFill>
+              <a:prstDash val="sysDash"/>
+              <a:tailEnd type="triangle" w="med" len="med"/>
+            </a:ln>
+          </p:spPr>
+          <p:style>
+            <a:lnRef idx="1">
+              <a:schemeClr val="accent1"/>
+            </a:lnRef>
+            <a:fillRef idx="0">
+              <a:schemeClr val="accent1"/>
+            </a:fillRef>
+            <a:effectRef idx="0">
+              <a:schemeClr val="accent1"/>
+            </a:effectRef>
+            <a:fontRef idx="minor">
+              <a:schemeClr val="tx1"/>
+            </a:fontRef>
+          </p:style>
+        </p:cxnSp>
+      </p:grpSp>
+      <p:sp>
+        <p:nvSpPr>
+          <p:cNvPr id="86" name="Rectangle 85"/>
+          <p:cNvSpPr/>
+          <p:nvPr/>
+        </p:nvSpPr>
+        <p:spPr>
+          <a:xfrm>
+            <a:off x="4601432" y="4001784"/>
+            <a:ext cx="258618" cy="685419"/>
+          </a:xfrm>
+          <a:prstGeom prst="rect">
+            <a:avLst/>
+          </a:prstGeom>
+          <a:solidFill>
+            <a:schemeClr val="accent2">
+              <a:lumMod val="60000"/>
+              <a:lumOff val="40000"/>
+            </a:schemeClr>
+          </a:solidFill>
+          <a:ln>
+            <a:solidFill>
+              <a:schemeClr val="accent5">
+                <a:lumMod val="50000"/>
+              </a:schemeClr>
+            </a:solidFill>
+          </a:ln>
+        </p:spPr>
+        <p:style>
+          <a:lnRef idx="2">
+            <a:schemeClr val="accent1">
+              <a:shade val="50000"/>
+            </a:schemeClr>
+          </a:lnRef>
+          <a:fillRef idx="1">
+            <a:schemeClr val="accent1"/>
+          </a:fillRef>
+          <a:effectRef idx="0">
+            <a:schemeClr val="accent1"/>
+          </a:effectRef>
+          <a:fontRef idx="minor">
+            <a:schemeClr val="lt1"/>
+          </a:fontRef>
+        </p:style>
+        <p:txBody>
+          <a:bodyPr rtlCol="0" anchor="ctr"/>
+          <a:lstStyle/>
+          <a:p>
+            <a:pPr algn="ctr"/>
+            <a:endParaRPr lang="en-GB"/>
+          </a:p>
+        </p:txBody>
+      </p:sp>
+      <p:sp>
+        <p:nvSpPr>
+          <p:cNvPr id="91" name="TextBox 90"/>
+          <p:cNvSpPr txBox="1"/>
+          <p:nvPr/>
+        </p:nvSpPr>
+        <p:spPr>
+          <a:xfrm>
+            <a:off x="5050992" y="3730139"/>
+            <a:ext cx="1942327" cy="276999"/>
+          </a:xfrm>
+          <a:prstGeom prst="rect">
+            <a:avLst/>
+          </a:prstGeom>
+          <a:noFill/>
+        </p:spPr>
+        <p:txBody>
+          <a:bodyPr wrap="none" rtlCol="0">
+            <a:spAutoFit/>
+          </a:bodyPr>
+          <a:lstStyle/>
+          <a:p>
+            <a:r>
+              <a:rPr lang="en-US" sz="1200" dirty="0" err="1" smtClean="0">
+                <a:ea typeface="Roboto Condensed" pitchFamily="2" charset="0"/>
+                <a:cs typeface="Consolas" panose="020B0609020204030204" pitchFamily="49" charset="0"/>
+              </a:rPr>
+              <a:t>handleSummaryCommand</a:t>
+            </a:r>
+            <a:r>
+              <a:rPr lang="en-US" sz="1200" dirty="0" smtClean="0">
+                <a:ea typeface="Roboto Condensed" pitchFamily="2" charset="0"/>
+                <a:cs typeface="Consolas" panose="020B0609020204030204" pitchFamily="49" charset="0"/>
+              </a:rPr>
+              <a:t>()</a:t>
+            </a:r>
+            <a:endParaRPr lang="en-GB" sz="1200" dirty="0">
+              <a:ea typeface="Roboto Condensed" pitchFamily="2" charset="0"/>
+              <a:cs typeface="Consolas" panose="020B0609020204030204" pitchFamily="49" charset="0"/>
+            </a:endParaRPr>
+          </a:p>
+        </p:txBody>
+      </p:sp>
+      <p:cxnSp>
+        <p:nvCxnSpPr>
+          <p:cNvPr id="92" name="Straight Arrow Connector 91"/>
+          <p:cNvCxnSpPr/>
+          <p:nvPr/>
+        </p:nvCxnSpPr>
+        <p:spPr>
+          <a:xfrm flipH="1">
+            <a:off x="1995036" y="5028354"/>
+            <a:ext cx="2464337" cy="0"/>
+          </a:xfrm>
+          <a:prstGeom prst="straightConnector1">
+            <a:avLst/>
+          </a:prstGeom>
+          <a:ln w="25400">
+            <a:solidFill>
+              <a:schemeClr val="accent2">
+                <a:lumMod val="60000"/>
+                <a:lumOff val="40000"/>
+              </a:schemeClr>
+            </a:solidFill>
+            <a:prstDash val="sysDash"/>
+            <a:tailEnd type="triangle" w="lg" len="lg"/>
+          </a:ln>
+        </p:spPr>
+        <p:style>
+          <a:lnRef idx="1">
+            <a:schemeClr val="accent1"/>
+          </a:lnRef>
+          <a:fillRef idx="0">
+            <a:schemeClr val="accent1"/>
+          </a:fillRef>
+          <a:effectRef idx="0">
+            <a:schemeClr val="accent1"/>
+          </a:effectRef>
+          <a:fontRef idx="minor">
+            <a:schemeClr val="tx1"/>
+          </a:fontRef>
+        </p:style>
+      </p:cxnSp>
+      <p:sp>
+        <p:nvSpPr>
+          <p:cNvPr id="93" name="TextBox 92"/>
+          <p:cNvSpPr txBox="1"/>
+          <p:nvPr/>
+        </p:nvSpPr>
+        <p:spPr>
+          <a:xfrm>
+            <a:off x="2739871" y="4734699"/>
+            <a:ext cx="1721818" cy="276999"/>
+          </a:xfrm>
+          <a:prstGeom prst="rect">
+            <a:avLst/>
+          </a:prstGeom>
+          <a:noFill/>
+        </p:spPr>
+        <p:txBody>
+          <a:bodyPr wrap="none" rtlCol="0">
+            <a:spAutoFit/>
+          </a:bodyPr>
+          <a:lstStyle/>
+          <a:p>
+            <a:r>
+              <a:rPr lang="en-US" sz="1200" dirty="0" smtClean="0">
+                <a:ea typeface="Roboto Condensed" pitchFamily="2" charset="0"/>
+                <a:cs typeface="Consolas" panose="020B0609020204030204" pitchFamily="49" charset="0"/>
+              </a:rPr>
+              <a:t>Show summary statistics</a:t>
+            </a:r>
+            <a:endParaRPr lang="en-GB" sz="1200" dirty="0">
+              <a:ea typeface="Roboto Condensed" pitchFamily="2" charset="0"/>
+              <a:cs typeface="Consolas" panose="020B0609020204030204" pitchFamily="49" charset="0"/>
+            </a:endParaRPr>
+          </a:p>
+        </p:txBody>
+      </p:sp>
+    </p:spTree>
+    <p:extLst>
+      <p:ext uri="{BB962C8B-B14F-4D97-AF65-F5344CB8AC3E}">
+        <p14:creationId xmlns:p14="http://schemas.microsoft.com/office/powerpoint/2010/main" val="3626368765"/>
       </p:ext>
     </p:extLst>
   </p:cSld>

</xml_diff>

<commit_message>
Update User Guide about legality of author names, update GUI class diagram
</commit_message>
<xml_diff>
--- a/docs/Diagrams.pptx
+++ b/docs/Diagrams.pptx
@@ -845,7 +845,7 @@
           <a:p>
             <a:fld id="{0EBC881F-A445-44A1-8BB1-A4D1BDD4D291}" type="datetime1">
               <a:rPr lang="en-GB" smtClean="0"/>
-              <a:t>13/01/2016</a:t>
+              <a:t>13/12/2016</a:t>
             </a:fld>
             <a:endParaRPr lang="en-GB"/>
           </a:p>
@@ -1015,7 +1015,7 @@
           <a:p>
             <a:fld id="{2584BEDC-1639-4090-8CAA-F6974F06BD49}" type="datetime1">
               <a:rPr lang="en-GB" smtClean="0"/>
-              <a:t>13/01/2016</a:t>
+              <a:t>13/12/2016</a:t>
             </a:fld>
             <a:endParaRPr lang="en-GB"/>
           </a:p>
@@ -1195,7 +1195,7 @@
           <a:p>
             <a:fld id="{00C779A6-9523-4A2E-A931-C8A709BD1078}" type="datetime1">
               <a:rPr lang="en-GB" smtClean="0"/>
-              <a:t>13/01/2016</a:t>
+              <a:t>13/12/2016</a:t>
             </a:fld>
             <a:endParaRPr lang="en-GB"/>
           </a:p>
@@ -1365,7 +1365,7 @@
           <a:p>
             <a:fld id="{3A5F7889-DF91-41C1-A5B0-E479EFB53093}" type="datetime1">
               <a:rPr lang="en-GB" smtClean="0"/>
-              <a:t>13/01/2016</a:t>
+              <a:t>13/12/2016</a:t>
             </a:fld>
             <a:endParaRPr lang="en-GB"/>
           </a:p>
@@ -1611,7 +1611,7 @@
           <a:p>
             <a:fld id="{B34262BB-05D7-48AA-A628-76FDB16BFEC4}" type="datetime1">
               <a:rPr lang="en-GB" smtClean="0"/>
-              <a:t>13/01/2016</a:t>
+              <a:t>13/12/2016</a:t>
             </a:fld>
             <a:endParaRPr lang="en-GB"/>
           </a:p>
@@ -1843,7 +1843,7 @@
           <a:p>
             <a:fld id="{5F96665D-1DD0-4E23-81EB-F6A1D45CFD28}" type="datetime1">
               <a:rPr lang="en-GB" smtClean="0"/>
-              <a:t>13/01/2016</a:t>
+              <a:t>13/12/2016</a:t>
             </a:fld>
             <a:endParaRPr lang="en-GB"/>
           </a:p>
@@ -2210,7 +2210,7 @@
           <a:p>
             <a:fld id="{D42FA776-28A0-43EC-9C84-117ACD802889}" type="datetime1">
               <a:rPr lang="en-GB" smtClean="0"/>
-              <a:t>13/01/2016</a:t>
+              <a:t>13/12/2016</a:t>
             </a:fld>
             <a:endParaRPr lang="en-GB"/>
           </a:p>
@@ -2328,7 +2328,7 @@
           <a:p>
             <a:fld id="{07BBC80A-0A96-4EDF-BA2F-C903D39F13F1}" type="datetime1">
               <a:rPr lang="en-GB" smtClean="0"/>
-              <a:t>13/01/2016</a:t>
+              <a:t>13/12/2016</a:t>
             </a:fld>
             <a:endParaRPr lang="en-GB"/>
           </a:p>
@@ -2423,7 +2423,7 @@
           <a:p>
             <a:fld id="{009CBC1F-8C05-4E88-A975-5E80693FEDD6}" type="datetime1">
               <a:rPr lang="en-GB" smtClean="0"/>
-              <a:t>13/01/2016</a:t>
+              <a:t>13/12/2016</a:t>
             </a:fld>
             <a:endParaRPr lang="en-GB"/>
           </a:p>
@@ -2700,7 +2700,7 @@
           <a:p>
             <a:fld id="{1672ABC0-87DA-4D74-93ED-587A9A376247}" type="datetime1">
               <a:rPr lang="en-GB" smtClean="0"/>
-              <a:t>13/01/2016</a:t>
+              <a:t>13/12/2016</a:t>
             </a:fld>
             <a:endParaRPr lang="en-GB"/>
           </a:p>
@@ -2957,7 +2957,7 @@
           <a:p>
             <a:fld id="{2874912F-E8E8-454B-8EB3-6790668B87CF}" type="datetime1">
               <a:rPr lang="en-GB" smtClean="0"/>
-              <a:t>13/01/2016</a:t>
+              <a:t>13/12/2016</a:t>
             </a:fld>
             <a:endParaRPr lang="en-GB"/>
           </a:p>
@@ -3170,7 +3170,7 @@
           <a:p>
             <a:fld id="{B1FA066A-16B7-44A6-B43D-AE26935FC13F}" type="datetime1">
               <a:rPr lang="en-GB" smtClean="0"/>
-              <a:t>13/01/2016</a:t>
+              <a:t>13/12/2016</a:t>
             </a:fld>
             <a:endParaRPr lang="en-GB"/>
           </a:p>
@@ -5450,6 +5450,7 @@
               </a:schemeClr>
             </a:solidFill>
             <a:prstDash val="solid"/>
+            <a:headEnd type="arrow"/>
             <a:tailEnd type="arrow" w="med" len="med"/>
           </a:ln>
         </p:spPr>
@@ -7259,6 +7260,52 @@
               <a:t>*</a:t>
             </a:r>
             <a:endParaRPr lang="en-GB" dirty="0">
+              <a:solidFill>
+                <a:schemeClr val="tx1">
+                  <a:lumMod val="50000"/>
+                  <a:lumOff val="50000"/>
+                </a:schemeClr>
+              </a:solidFill>
+              <a:ea typeface="Roboto Condensed" pitchFamily="2" charset="0"/>
+            </a:endParaRPr>
+          </a:p>
+        </p:txBody>
+      </p:sp>
+      <p:sp>
+        <p:nvSpPr>
+          <p:cNvPr id="49" name="TextBox 48"/>
+          <p:cNvSpPr txBox="1"/>
+          <p:nvPr/>
+        </p:nvSpPr>
+        <p:spPr>
+          <a:xfrm>
+            <a:off x="3291736" y="2052628"/>
+            <a:ext cx="338554" cy="276999"/>
+          </a:xfrm>
+          <a:prstGeom prst="rect">
+            <a:avLst/>
+          </a:prstGeom>
+          <a:noFill/>
+        </p:spPr>
+        <p:txBody>
+          <a:bodyPr wrap="square" rtlCol="0">
+            <a:spAutoFit/>
+          </a:bodyPr>
+          <a:lstStyle/>
+          <a:p>
+            <a:r>
+              <a:rPr lang="en-US" sz="1200" dirty="0">
+                <a:solidFill>
+                  <a:schemeClr val="tx1">
+                    <a:lumMod val="50000"/>
+                    <a:lumOff val="50000"/>
+                  </a:schemeClr>
+                </a:solidFill>
+                <a:ea typeface="Roboto Condensed" pitchFamily="2" charset="0"/>
+              </a:rPr>
+              <a:t>1</a:t>
+            </a:r>
+            <a:endParaRPr lang="en-GB" sz="1200" dirty="0">
               <a:solidFill>
                 <a:schemeClr val="tx1">
                   <a:lumMod val="50000"/>
@@ -13279,14 +13326,7 @@
                 <a:ea typeface="Roboto Condensed" pitchFamily="2" charset="0"/>
                 <a:cs typeface="Consolas" panose="020B0609020204030204" pitchFamily="49" charset="0"/>
               </a:rPr>
-              <a:t>(“collate </a:t>
-            </a:r>
-            <a:r>
-              <a:rPr lang="en-US" sz="1200" dirty="0" smtClean="0">
-                <a:ea typeface="Roboto Condensed" pitchFamily="2" charset="0"/>
-                <a:cs typeface="Consolas" panose="020B0609020204030204" pitchFamily="49" charset="0"/>
-              </a:rPr>
-              <a:t>from C:/source-files”)</a:t>
+              <a:t>(“collate from C:/source-files”)</a:t>
             </a:r>
             <a:endParaRPr lang="en-GB" sz="1200" dirty="0">
               <a:ea typeface="Roboto Condensed" pitchFamily="2" charset="0"/>

</xml_diff>